<commit_message>
Finished visualization with R, still to be written in relation.
</commit_message>
<xml_diff>
--- a/relazione.pptx
+++ b/relazione.pptx
@@ -10,6 +10,7 @@
     <p:sldId id="259" r:id="rId4"/>
     <p:sldId id="260" r:id="rId5"/>
     <p:sldId id="261" r:id="rId6"/>
+    <p:sldId id="262" r:id="rId7"/>
   </p:sldIdLst>
   <p:sldSz cx="9144000" cy="6858000" type="screen4x3"/>
   <p:notesSz cx="6858000" cy="9144000"/>
@@ -3287,7 +3288,7 @@
         </p:nvSpPr>
         <p:spPr>
           <a:xfrm>
-            <a:off x="457200" y="1371600"/>
+            <a:off x="457200" y="838200"/>
             <a:ext cx="8229600" cy="857250"/>
           </a:xfrm>
         </p:spPr>
@@ -3576,43 +3577,6 @@
           <a:chExt cx="0" cy="0"/>
         </a:xfrm>
       </p:grpSpPr>
-      <p:sp>
-        <p:nvSpPr>
-          <p:cNvPr id="2" name="Titolo 1">
-            <a:extLst>
-              <a:ext uri="{FF2B5EF4-FFF2-40B4-BE49-F238E27FC236}">
-                <a16:creationId xmlns:a16="http://schemas.microsoft.com/office/drawing/2014/main" id="{A9E5E19C-A471-4F4F-AC04-6DE78354DD6C}"/>
-              </a:ext>
-            </a:extLst>
-          </p:cNvPr>
-          <p:cNvSpPr>
-            <a:spLocks noGrp="1"/>
-          </p:cNvSpPr>
-          <p:nvPr>
-            <p:ph type="title"/>
-          </p:nvPr>
-        </p:nvSpPr>
-        <p:spPr/>
-        <p:txBody>
-          <a:bodyPr/>
-          <a:lstStyle/>
-          <a:p>
-            <a:r>
-              <a:rPr lang="it-IT" b="1" dirty="0"/>
-              <a:t>DATA UNDERSTANDING: </a:t>
-            </a:r>
-            <a:r>
-              <a:rPr lang="it-IT" dirty="0"/>
-              <a:t>DATASET</a:t>
-            </a:r>
-            <a:r>
-              <a:rPr lang="it-IT" b="1" dirty="0"/>
-              <a:t> </a:t>
-            </a:r>
-            <a:endParaRPr lang="en-US" dirty="0"/>
-          </a:p>
-        </p:txBody>
-      </p:sp>
       <p:graphicFrame>
         <p:nvGraphicFramePr>
           <p:cNvPr id="4" name="Segnaposto contenuto 3">
@@ -5375,6 +5339,66 @@
           </a:p>
         </p:txBody>
       </p:sp>
+      <p:sp>
+        <p:nvSpPr>
+          <p:cNvPr id="11" name="Titolo 1">
+            <a:extLst>
+              <a:ext uri="{FF2B5EF4-FFF2-40B4-BE49-F238E27FC236}">
+                <a16:creationId xmlns:a16="http://schemas.microsoft.com/office/drawing/2014/main" id="{E4B142F6-989A-44B5-AF67-3A1BB4088781}"/>
+              </a:ext>
+            </a:extLst>
+          </p:cNvPr>
+          <p:cNvSpPr txBox="1">
+            <a:spLocks/>
+          </p:cNvSpPr>
+          <p:nvPr/>
+        </p:nvSpPr>
+        <p:spPr>
+          <a:xfrm>
+            <a:off x="457200" y="838200"/>
+            <a:ext cx="8229600" cy="857250"/>
+          </a:xfrm>
+          <a:prstGeom prst="rect">
+            <a:avLst/>
+          </a:prstGeom>
+        </p:spPr>
+        <p:txBody>
+          <a:bodyPr vert="horz" lIns="91440" tIns="45720" rIns="91440" bIns="45720" rtlCol="0" anchor="ctr">
+            <a:normAutofit/>
+          </a:bodyPr>
+          <a:lstStyle>
+            <a:lvl1pPr algn="ctr" defTabSz="342900" rtl="0" eaLnBrk="1" latinLnBrk="0" hangingPunct="1">
+              <a:spcBef>
+                <a:spcPct val="0"/>
+              </a:spcBef>
+              <a:buNone/>
+              <a:defRPr sz="3300" kern="1200">
+                <a:solidFill>
+                  <a:schemeClr val="tx1"/>
+                </a:solidFill>
+                <a:latin typeface="+mj-lt"/>
+                <a:ea typeface="+mj-ea"/>
+                <a:cs typeface="+mj-cs"/>
+              </a:defRPr>
+            </a:lvl1pPr>
+          </a:lstStyle>
+          <a:p>
+            <a:r>
+              <a:rPr lang="it-IT" b="1"/>
+              <a:t>DATA UNDERSTANDING: </a:t>
+            </a:r>
+            <a:r>
+              <a:rPr lang="it-IT"/>
+              <a:t>DATASET</a:t>
+            </a:r>
+            <a:r>
+              <a:rPr lang="it-IT" b="1"/>
+              <a:t> </a:t>
+            </a:r>
+            <a:endParaRPr lang="en-US" dirty="0"/>
+          </a:p>
+        </p:txBody>
+      </p:sp>
     </p:spTree>
     <p:extLst>
       <p:ext uri="{BB962C8B-B14F-4D97-AF65-F5344CB8AC3E}">
@@ -6176,6 +6200,106 @@
     <p:extLst>
       <p:ext uri="{BB962C8B-B14F-4D97-AF65-F5344CB8AC3E}">
         <p14:creationId xmlns:p14="http://schemas.microsoft.com/office/powerpoint/2010/main" val="529427341"/>
+      </p:ext>
+    </p:extLst>
+  </p:cSld>
+  <p:clrMapOvr>
+    <a:masterClrMapping/>
+  </p:clrMapOvr>
+</p:sld>
+</file>
+
+<file path=ppt/slides/slide6.xml><?xml version="1.0" encoding="utf-8"?>
+<p:sld xmlns:a="http://schemas.openxmlformats.org/drawingml/2006/main" xmlns:r="http://schemas.openxmlformats.org/officeDocument/2006/relationships" xmlns:p="http://schemas.openxmlformats.org/presentationml/2006/main">
+  <p:cSld>
+    <p:spTree>
+      <p:nvGrpSpPr>
+        <p:cNvPr id="1" name=""/>
+        <p:cNvGrpSpPr/>
+        <p:nvPr/>
+      </p:nvGrpSpPr>
+      <p:grpSpPr>
+        <a:xfrm>
+          <a:off x="0" y="0"/>
+          <a:ext cx="0" cy="0"/>
+          <a:chOff x="0" y="0"/>
+          <a:chExt cx="0" cy="0"/>
+        </a:xfrm>
+      </p:grpSpPr>
+      <p:sp>
+        <p:nvSpPr>
+          <p:cNvPr id="2" name="Titolo 1">
+            <a:extLst>
+              <a:ext uri="{FF2B5EF4-FFF2-40B4-BE49-F238E27FC236}">
+                <a16:creationId xmlns:a16="http://schemas.microsoft.com/office/drawing/2014/main" id="{866C4E33-318F-45C6-90C3-7F33D8AF9E45}"/>
+              </a:ext>
+            </a:extLst>
+          </p:cNvPr>
+          <p:cNvSpPr>
+            <a:spLocks noGrp="1"/>
+          </p:cNvSpPr>
+          <p:nvPr>
+            <p:ph type="title"/>
+          </p:nvPr>
+        </p:nvSpPr>
+        <p:spPr/>
+        <p:txBody>
+          <a:bodyPr/>
+          <a:lstStyle/>
+          <a:p>
+            <a:endParaRPr lang="en-US"/>
+          </a:p>
+        </p:txBody>
+      </p:sp>
+      <p:sp>
+        <p:nvSpPr>
+          <p:cNvPr id="3" name="Segnaposto contenuto 2">
+            <a:extLst>
+              <a:ext uri="{FF2B5EF4-FFF2-40B4-BE49-F238E27FC236}">
+                <a16:creationId xmlns:a16="http://schemas.microsoft.com/office/drawing/2014/main" id="{FE7ABC2F-9BF7-4B30-841B-5A6ECB846BB6}"/>
+              </a:ext>
+            </a:extLst>
+          </p:cNvPr>
+          <p:cNvSpPr>
+            <a:spLocks noGrp="1"/>
+          </p:cNvSpPr>
+          <p:nvPr>
+            <p:ph idx="1"/>
+          </p:nvPr>
+        </p:nvSpPr>
+        <p:spPr/>
+        <p:txBody>
+          <a:bodyPr/>
+          <a:lstStyle/>
+          <a:p>
+            <a:r>
+              <a:rPr lang="it-IT" dirty="0" err="1"/>
+              <a:t>Pearson</a:t>
+            </a:r>
+            <a:r>
+              <a:rPr lang="it-IT" dirty="0"/>
+              <a:t> </a:t>
+            </a:r>
+            <a:r>
+              <a:rPr lang="it-IT" dirty="0" err="1"/>
+              <a:t>correlation</a:t>
+            </a:r>
+            <a:r>
+              <a:rPr lang="it-IT" dirty="0"/>
+              <a:t> analizza le </a:t>
+            </a:r>
+            <a:r>
+              <a:rPr lang="it-IT"/>
+              <a:t>relazioni monotone</a:t>
+            </a:r>
+            <a:endParaRPr lang="en-US"/>
+          </a:p>
+        </p:txBody>
+      </p:sp>
+    </p:spTree>
+    <p:extLst>
+      <p:ext uri="{BB962C8B-B14F-4D97-AF65-F5344CB8AC3E}">
+        <p14:creationId xmlns:p14="http://schemas.microsoft.com/office/powerpoint/2010/main" val="1226650102"/>
       </p:ext>
     </p:extLst>
   </p:cSld>

</xml_diff>

<commit_message>
Really done with visualization.
</commit_message>
<xml_diff>
--- a/relazione.pptx
+++ b/relazione.pptx
@@ -3592,7 +3592,7 @@
           <p:nvPr>
             <p:extLst>
               <p:ext uri="{D42A27DB-BD31-4B8C-83A1-F6EECF244321}">
-                <p14:modId xmlns:p14="http://schemas.microsoft.com/office/powerpoint/2010/main" val="1233716285"/>
+                <p14:modId xmlns:p14="http://schemas.microsoft.com/office/powerpoint/2010/main" val="2417831910"/>
               </p:ext>
             </p:extLst>
           </p:nvPr>
@@ -3687,12 +3687,12 @@
                     <a:p>
                       <a:pPr algn="l" fontAlgn="b"/>
                       <a:r>
-                        <a:rPr lang="it-IT" sz="800" u="none" strike="noStrike">
+                        <a:rPr lang="it-IT" sz="1050" b="1" u="none" strike="noStrike">
                           <a:effectLst/>
                         </a:rPr>
                         <a:t>coorte</a:t>
                       </a:r>
-                      <a:endParaRPr lang="it-IT" sz="800" b="0" i="0" u="none" strike="noStrike">
+                      <a:endParaRPr lang="it-IT" sz="1050" b="1" i="0" u="none" strike="noStrike">
                         <a:solidFill>
                           <a:srgbClr val="000000"/>
                         </a:solidFill>
@@ -3710,12 +3710,12 @@
                     <a:p>
                       <a:pPr algn="l" fontAlgn="b"/>
                       <a:r>
-                        <a:rPr lang="it-IT" sz="800" u="none" strike="noStrike">
+                        <a:rPr lang="it-IT" sz="1050" b="1" u="none" strike="noStrike" dirty="0">
                           <a:effectLst/>
                         </a:rPr>
                         <a:t>test</a:t>
                       </a:r>
-                      <a:endParaRPr lang="it-IT" sz="800" b="0" i="0" u="none" strike="noStrike">
+                      <a:endParaRPr lang="it-IT" sz="1050" b="1" i="0" u="none" strike="noStrike" dirty="0">
                         <a:solidFill>
                           <a:srgbClr val="000000"/>
                         </a:solidFill>
@@ -3733,12 +3733,12 @@
                     <a:p>
                       <a:pPr algn="l" fontAlgn="b"/>
                       <a:r>
-                        <a:rPr lang="it-IT" sz="800" u="none" strike="noStrike" dirty="0" err="1">
+                        <a:rPr lang="it-IT" sz="1050" b="1" u="none" strike="noStrike" dirty="0" err="1">
                           <a:effectLst/>
                         </a:rPr>
                         <a:t>crediti_totali</a:t>
                       </a:r>
-                      <a:endParaRPr lang="it-IT" sz="800" b="0" i="0" u="none" strike="noStrike" dirty="0">
+                      <a:endParaRPr lang="it-IT" sz="1050" b="1" i="0" u="none" strike="noStrike" dirty="0">
                         <a:solidFill>
                           <a:srgbClr val="000000"/>
                         </a:solidFill>
@@ -3756,12 +3756,12 @@
                     <a:p>
                       <a:pPr algn="l" fontAlgn="b"/>
                       <a:r>
-                        <a:rPr lang="it-IT" sz="800" u="none" strike="noStrike">
+                        <a:rPr lang="it-IT" sz="1050" b="1" u="none" strike="noStrike">
                           <a:effectLst/>
                         </a:rPr>
                         <a:t>crediti_con_voto</a:t>
                       </a:r>
-                      <a:endParaRPr lang="it-IT" sz="800" b="0" i="0" u="none" strike="noStrike">
+                      <a:endParaRPr lang="it-IT" sz="1050" b="1" i="0" u="none" strike="noStrike">
                         <a:solidFill>
                           <a:srgbClr val="000000"/>
                         </a:solidFill>
@@ -3779,12 +3779,12 @@
                     <a:p>
                       <a:pPr algn="l" fontAlgn="b"/>
                       <a:r>
-                        <a:rPr lang="it-IT" sz="800" u="none" strike="noStrike">
+                        <a:rPr lang="it-IT" sz="1050" b="1" u="none" strike="noStrike">
                           <a:effectLst/>
                         </a:rPr>
                         <a:t>voto_medio</a:t>
                       </a:r>
-                      <a:endParaRPr lang="it-IT" sz="800" b="0" i="0" u="none" strike="noStrike">
+                      <a:endParaRPr lang="it-IT" sz="1050" b="1" i="0" u="none" strike="noStrike">
                         <a:solidFill>
                           <a:srgbClr val="000000"/>
                         </a:solidFill>
@@ -3802,12 +3802,12 @@
                     <a:p>
                       <a:pPr algn="l" fontAlgn="b"/>
                       <a:r>
-                        <a:rPr lang="it-IT" sz="800" u="none" strike="noStrike">
+                        <a:rPr lang="it-IT" sz="1050" b="1" u="none" strike="noStrike">
                           <a:effectLst/>
                         </a:rPr>
                         <a:t>ASD</a:t>
                       </a:r>
-                      <a:endParaRPr lang="it-IT" sz="800" b="0" i="0" u="none" strike="noStrike">
+                      <a:endParaRPr lang="it-IT" sz="1050" b="1" i="0" u="none" strike="noStrike">
                         <a:solidFill>
                           <a:srgbClr val="000000"/>
                         </a:solidFill>
@@ -3825,12 +3825,12 @@
                     <a:p>
                       <a:pPr algn="l" fontAlgn="b"/>
                       <a:r>
-                        <a:rPr lang="it-IT" sz="800" u="none" strike="noStrike">
+                        <a:rPr lang="it-IT" sz="1050" b="1" u="none" strike="noStrike">
                           <a:effectLst/>
                         </a:rPr>
                         <a:t>data_ASD</a:t>
                       </a:r>
-                      <a:endParaRPr lang="it-IT" sz="800" b="0" i="0" u="none" strike="noStrike">
+                      <a:endParaRPr lang="it-IT" sz="1050" b="1" i="0" u="none" strike="noStrike">
                         <a:solidFill>
                           <a:srgbClr val="000000"/>
                         </a:solidFill>
@@ -3848,12 +3848,12 @@
                     <a:p>
                       <a:pPr algn="l" fontAlgn="b"/>
                       <a:r>
-                        <a:rPr lang="it-IT" sz="800" u="none" strike="noStrike">
+                        <a:rPr lang="it-IT" sz="1050" b="1" u="none" strike="noStrike">
                           <a:effectLst/>
                         </a:rPr>
                         <a:t>ARC</a:t>
                       </a:r>
-                      <a:endParaRPr lang="it-IT" sz="800" b="0" i="0" u="none" strike="noStrike">
+                      <a:endParaRPr lang="it-IT" sz="1050" b="1" i="0" u="none" strike="noStrike">
                         <a:solidFill>
                           <a:srgbClr val="000000"/>
                         </a:solidFill>
@@ -3871,12 +3871,12 @@
                     <a:p>
                       <a:pPr algn="l" fontAlgn="b"/>
                       <a:r>
-                        <a:rPr lang="it-IT" sz="800" u="none" strike="noStrike">
+                        <a:rPr lang="it-IT" sz="1050" b="1" u="none" strike="noStrike" dirty="0" err="1">
                           <a:effectLst/>
                         </a:rPr>
                         <a:t>data_ARC</a:t>
                       </a:r>
-                      <a:endParaRPr lang="it-IT" sz="800" b="0" i="0" u="none" strike="noStrike">
+                      <a:endParaRPr lang="it-IT" sz="1050" b="1" i="0" u="none" strike="noStrike" dirty="0">
                         <a:solidFill>
                           <a:srgbClr val="000000"/>
                         </a:solidFill>
@@ -4479,12 +4479,12 @@
                     <a:p>
                       <a:pPr algn="r" fontAlgn="b"/>
                       <a:r>
-                        <a:rPr lang="it-IT" sz="800" u="none" strike="noStrike">
+                        <a:rPr lang="it-IT" sz="800" u="none" strike="noStrike" dirty="0">
                           <a:effectLst/>
                         </a:rPr>
                         <a:t>159</a:t>
                       </a:r>
-                      <a:endParaRPr lang="it-IT" sz="800" b="0" i="0" u="none" strike="noStrike">
+                      <a:endParaRPr lang="it-IT" sz="800" b="0" i="0" u="none" strike="noStrike" dirty="0">
                         <a:solidFill>
                           <a:srgbClr val="000000"/>
                         </a:solidFill>
@@ -5159,7 +5159,11 @@
           <a:p>
             <a:pPr algn="ctr"/>
             <a:r>
-              <a:rPr lang="it-IT" sz="1600" dirty="0"/>
+              <a:rPr lang="it-IT" sz="1600" dirty="0">
+                <a:solidFill>
+                  <a:srgbClr val="00B050"/>
+                </a:solidFill>
+              </a:rPr>
               <a:t>Attributi relativi alle prestazioni generali dello studente</a:t>
             </a:r>
           </a:p>
@@ -5179,8 +5183,8 @@
         </p:nvSpPr>
         <p:spPr>
           <a:xfrm>
-            <a:off x="5510579" y="2362200"/>
-            <a:ext cx="1553766" cy="584775"/>
+            <a:off x="5413525" y="2454532"/>
+            <a:ext cx="1807793" cy="646331"/>
           </a:xfrm>
           <a:prstGeom prst="rect">
             <a:avLst/>
@@ -5195,7 +5199,11 @@
           <a:p>
             <a:pPr algn="ctr"/>
             <a:r>
-              <a:rPr lang="it-IT" sz="1600" dirty="0"/>
+              <a:rPr lang="it-IT" dirty="0">
+                <a:solidFill>
+                  <a:srgbClr val="0070C0"/>
+                </a:solidFill>
+              </a:rPr>
               <a:t>Attributi relativi ai singoli esami</a:t>
             </a:r>
           </a:p>
@@ -5224,13 +5232,13 @@
         </p:spPr>
         <p:style>
           <a:lnRef idx="1">
-            <a:schemeClr val="accent1"/>
+            <a:schemeClr val="accent3"/>
           </a:lnRef>
           <a:fillRef idx="0">
-            <a:schemeClr val="accent1"/>
+            <a:schemeClr val="accent3"/>
           </a:fillRef>
           <a:effectRef idx="0">
-            <a:schemeClr val="accent1"/>
+            <a:schemeClr val="accent3"/>
           </a:effectRef>
           <a:fontRef idx="minor">
             <a:schemeClr val="tx1"/>
@@ -5241,7 +5249,11 @@
           <a:lstStyle/>
           <a:p>
             <a:pPr algn="ctr"/>
-            <a:endParaRPr lang="it-IT" sz="1350"/>
+            <a:endParaRPr lang="it-IT" sz="1350" dirty="0">
+              <a:solidFill>
+                <a:srgbClr val="00B050"/>
+              </a:solidFill>
+            </a:endParaRPr>
           </a:p>
         </p:txBody>
       </p:sp>
@@ -5259,8 +5271,8 @@
         </p:nvSpPr>
         <p:spPr>
           <a:xfrm rot="5400000">
-            <a:off x="5609557" y="2838142"/>
-            <a:ext cx="354860" cy="1000949"/>
+            <a:off x="5581753" y="2810339"/>
+            <a:ext cx="354860" cy="1056556"/>
           </a:xfrm>
           <a:prstGeom prst="leftBrace">
             <a:avLst>

</xml_diff>

<commit_message>
Further work on relation.
</commit_message>
<xml_diff>
--- a/relazione.pptx
+++ b/relazione.pptx
@@ -10,7 +10,10 @@
     <p:sldId id="259" r:id="rId4"/>
     <p:sldId id="260" r:id="rId5"/>
     <p:sldId id="261" r:id="rId6"/>
-    <p:sldId id="262" r:id="rId7"/>
+    <p:sldId id="264" r:id="rId7"/>
+    <p:sldId id="263" r:id="rId8"/>
+    <p:sldId id="265" r:id="rId9"/>
+    <p:sldId id="262" r:id="rId10"/>
   </p:sldIdLst>
   <p:sldSz cx="9144000" cy="6858000" type="screen4x3"/>
   <p:notesSz cx="6858000" cy="9144000"/>
@@ -5598,10 +5601,7 @@
             <a:r>
               <a:rPr lang="en-US" sz="1200" dirty="0" err="1">
                 <a:solidFill>
-                  <a:schemeClr val="tx1">
-                    <a:lumMod val="95000"/>
-                    <a:lumOff val="5000"/>
-                  </a:schemeClr>
+                  <a:srgbClr val="002060"/>
                 </a:solidFill>
                 <a:latin typeface="Courier New" panose="02070309020205020404" pitchFamily="49" charset="0"/>
                 <a:cs typeface="Courier New" panose="02070309020205020404" pitchFamily="49" charset="0"/>
@@ -5611,10 +5611,7 @@
             <a:r>
               <a:rPr lang="en-US" sz="1200" dirty="0">
                 <a:solidFill>
-                  <a:schemeClr val="tx1">
-                    <a:lumMod val="95000"/>
-                    <a:lumOff val="5000"/>
-                  </a:schemeClr>
+                  <a:srgbClr val="002060"/>
                 </a:solidFill>
                 <a:latin typeface="Courier New" panose="02070309020205020404" pitchFamily="49" charset="0"/>
                 <a:cs typeface="Courier New" panose="02070309020205020404" pitchFamily="49" charset="0"/>
@@ -5623,10 +5620,7 @@
             </a:r>
             <a:endParaRPr lang="it-IT" sz="1200" dirty="0">
               <a:solidFill>
-                <a:schemeClr val="tx1">
-                  <a:lumMod val="95000"/>
-                  <a:lumOff val="5000"/>
-                </a:schemeClr>
+                <a:srgbClr val="002060"/>
               </a:solidFill>
               <a:latin typeface="Courier New" panose="02070309020205020404" pitchFamily="49" charset="0"/>
               <a:cs typeface="Courier New" panose="02070309020205020404" pitchFamily="49" charset="0"/>
@@ -5636,10 +5630,7 @@
             <a:r>
               <a:rPr lang="it-IT" sz="1200" dirty="0" err="1">
                 <a:solidFill>
-                  <a:schemeClr val="tx1">
-                    <a:lumMod val="95000"/>
-                    <a:lumOff val="5000"/>
-                  </a:schemeClr>
+                  <a:srgbClr val="002060"/>
                 </a:solidFill>
                 <a:latin typeface="Courier New" panose="02070309020205020404" pitchFamily="49" charset="0"/>
                 <a:cs typeface="Courier New" panose="02070309020205020404" pitchFamily="49" charset="0"/>
@@ -5649,10 +5640,7 @@
             <a:r>
               <a:rPr lang="it-IT" sz="1200" dirty="0">
                 <a:solidFill>
-                  <a:schemeClr val="tx1">
-                    <a:lumMod val="95000"/>
-                    <a:lumOff val="5000"/>
-                  </a:schemeClr>
+                  <a:srgbClr val="002060"/>
                 </a:solidFill>
                 <a:latin typeface="Courier New" panose="02070309020205020404" pitchFamily="49" charset="0"/>
                 <a:cs typeface="Courier New" panose="02070309020205020404" pitchFamily="49" charset="0"/>
@@ -5701,10 +5689,7 @@
             <a:r>
               <a:rPr lang="en-US" sz="1200" dirty="0" err="1">
                 <a:solidFill>
-                  <a:schemeClr val="tx1">
-                    <a:lumMod val="95000"/>
-                    <a:lumOff val="5000"/>
-                  </a:schemeClr>
+                  <a:srgbClr val="002060"/>
                 </a:solidFill>
                 <a:latin typeface="Courier New" panose="02070309020205020404" pitchFamily="49" charset="0"/>
                 <a:cs typeface="Courier New" panose="02070309020205020404" pitchFamily="49" charset="0"/>
@@ -5714,10 +5699,7 @@
             <a:r>
               <a:rPr lang="en-US" sz="1200" dirty="0">
                 <a:solidFill>
-                  <a:schemeClr val="tx1">
-                    <a:lumMod val="95000"/>
-                    <a:lumOff val="5000"/>
-                  </a:schemeClr>
+                  <a:srgbClr val="002060"/>
                 </a:solidFill>
                 <a:latin typeface="Courier New" panose="02070309020205020404" pitchFamily="49" charset="0"/>
                 <a:cs typeface="Courier New" panose="02070309020205020404" pitchFamily="49" charset="0"/>
@@ -5726,10 +5708,7 @@
             </a:r>
             <a:endParaRPr lang="it-IT" sz="1200" dirty="0">
               <a:solidFill>
-                <a:schemeClr val="tx1">
-                  <a:lumMod val="95000"/>
-                  <a:lumOff val="5000"/>
-                </a:schemeClr>
+                <a:srgbClr val="002060"/>
               </a:solidFill>
               <a:latin typeface="Courier New" panose="02070309020205020404" pitchFamily="49" charset="0"/>
               <a:cs typeface="Courier New" panose="02070309020205020404" pitchFamily="49" charset="0"/>
@@ -5832,10 +5811,7 @@
             <a:r>
               <a:rPr lang="en-US" sz="1200" dirty="0">
                 <a:solidFill>
-                  <a:schemeClr val="tx1">
-                    <a:lumMod val="95000"/>
-                    <a:lumOff val="5000"/>
-                  </a:schemeClr>
+                  <a:srgbClr val="002060"/>
                 </a:solidFill>
                 <a:latin typeface="Courier New" panose="02070309020205020404" pitchFamily="49" charset="0"/>
                 <a:cs typeface="Courier New" panose="02070309020205020404" pitchFamily="49" charset="0"/>
@@ -5845,10 +5821,7 @@
             <a:r>
               <a:rPr lang="en-US" sz="1200" dirty="0" err="1">
                 <a:solidFill>
-                  <a:schemeClr val="tx1">
-                    <a:lumMod val="95000"/>
-                    <a:lumOff val="5000"/>
-                  </a:schemeClr>
+                  <a:srgbClr val="002060"/>
                 </a:solidFill>
                 <a:latin typeface="Courier New" panose="02070309020205020404" pitchFamily="49" charset="0"/>
                 <a:cs typeface="Courier New" panose="02070309020205020404" pitchFamily="49" charset="0"/>
@@ -5858,10 +5831,7 @@
             <a:r>
               <a:rPr lang="en-US" sz="1200" dirty="0">
                 <a:solidFill>
-                  <a:schemeClr val="tx1">
-                    <a:lumMod val="95000"/>
-                    <a:lumOff val="5000"/>
-                  </a:schemeClr>
+                  <a:srgbClr val="002060"/>
                 </a:solidFill>
                 <a:latin typeface="Courier New" panose="02070309020205020404" pitchFamily="49" charset="0"/>
                 <a:cs typeface="Courier New" panose="02070309020205020404" pitchFamily="49" charset="0"/>
@@ -5870,10 +5840,7 @@
             </a:r>
             <a:endParaRPr lang="it-IT" sz="1200" dirty="0">
               <a:solidFill>
-                <a:schemeClr val="tx1">
-                  <a:lumMod val="95000"/>
-                  <a:lumOff val="5000"/>
-                </a:schemeClr>
+                <a:srgbClr val="002060"/>
               </a:solidFill>
               <a:latin typeface="Courier New" panose="02070309020205020404" pitchFamily="49" charset="0"/>
               <a:cs typeface="Courier New" panose="02070309020205020404" pitchFamily="49" charset="0"/>
@@ -5929,10 +5896,7 @@
             <a:r>
               <a:rPr lang="it-IT" sz="1200" dirty="0" err="1">
                 <a:solidFill>
-                  <a:schemeClr val="tx1">
-                    <a:lumMod val="95000"/>
-                    <a:lumOff val="5000"/>
-                  </a:schemeClr>
+                  <a:srgbClr val="002060"/>
                 </a:solidFill>
                 <a:latin typeface="Courier New" panose="02070309020205020404" pitchFamily="49" charset="0"/>
                 <a:cs typeface="Courier New" panose="02070309020205020404" pitchFamily="49" charset="0"/>
@@ -5942,10 +5906,7 @@
             <a:r>
               <a:rPr lang="it-IT" sz="1200" dirty="0">
                 <a:solidFill>
-                  <a:schemeClr val="tx1">
-                    <a:lumMod val="95000"/>
-                    <a:lumOff val="5000"/>
-                  </a:schemeClr>
+                  <a:srgbClr val="002060"/>
                 </a:solidFill>
                 <a:latin typeface="Courier New" panose="02070309020205020404" pitchFamily="49" charset="0"/>
                 <a:cs typeface="Courier New" panose="02070309020205020404" pitchFamily="49" charset="0"/>
@@ -5955,10 +5916,7 @@
             <a:r>
               <a:rPr lang="it-IT" sz="1200" dirty="0" err="1">
                 <a:solidFill>
-                  <a:schemeClr val="tx1">
-                    <a:lumMod val="95000"/>
-                    <a:lumOff val="5000"/>
-                  </a:schemeClr>
+                  <a:srgbClr val="002060"/>
                 </a:solidFill>
                 <a:latin typeface="Courier New" panose="02070309020205020404" pitchFamily="49" charset="0"/>
                 <a:cs typeface="Courier New" panose="02070309020205020404" pitchFamily="49" charset="0"/>
@@ -5968,10 +5926,7 @@
             <a:r>
               <a:rPr lang="it-IT" sz="1200" dirty="0">
                 <a:solidFill>
-                  <a:schemeClr val="tx1">
-                    <a:lumMod val="95000"/>
-                    <a:lumOff val="5000"/>
-                  </a:schemeClr>
+                  <a:srgbClr val="002060"/>
                 </a:solidFill>
                 <a:latin typeface="Courier New" panose="02070309020205020404" pitchFamily="49" charset="0"/>
                 <a:cs typeface="Courier New" panose="02070309020205020404" pitchFamily="49" charset="0"/>
@@ -5983,10 +5938,7 @@
             <a:r>
               <a:rPr lang="it-IT" sz="1200" dirty="0" err="1">
                 <a:solidFill>
-                  <a:schemeClr val="tx1">
-                    <a:lumMod val="95000"/>
-                    <a:lumOff val="5000"/>
-                  </a:schemeClr>
+                  <a:srgbClr val="002060"/>
                 </a:solidFill>
                 <a:latin typeface="Courier New" panose="02070309020205020404" pitchFamily="49" charset="0"/>
                 <a:cs typeface="Courier New" panose="02070309020205020404" pitchFamily="49" charset="0"/>
@@ -5996,10 +5948,7 @@
             <a:r>
               <a:rPr lang="it-IT" sz="1200" dirty="0">
                 <a:solidFill>
-                  <a:schemeClr val="tx1">
-                    <a:lumMod val="95000"/>
-                    <a:lumOff val="5000"/>
-                  </a:schemeClr>
+                  <a:srgbClr val="002060"/>
                 </a:solidFill>
                 <a:latin typeface="Courier New" panose="02070309020205020404" pitchFamily="49" charset="0"/>
                 <a:cs typeface="Courier New" panose="02070309020205020404" pitchFamily="49" charset="0"/>
@@ -6009,10 +5958,7 @@
             <a:r>
               <a:rPr lang="it-IT" sz="1200" dirty="0" err="1">
                 <a:solidFill>
-                  <a:schemeClr val="tx1">
-                    <a:lumMod val="95000"/>
-                    <a:lumOff val="5000"/>
-                  </a:schemeClr>
+                  <a:srgbClr val="002060"/>
                 </a:solidFill>
                 <a:latin typeface="Courier New" panose="02070309020205020404" pitchFamily="49" charset="0"/>
                 <a:cs typeface="Courier New" panose="02070309020205020404" pitchFamily="49" charset="0"/>
@@ -6022,10 +5968,7 @@
             <a:r>
               <a:rPr lang="it-IT" sz="1200" dirty="0">
                 <a:solidFill>
-                  <a:schemeClr val="tx1">
-                    <a:lumMod val="95000"/>
-                    <a:lumOff val="5000"/>
-                  </a:schemeClr>
+                  <a:srgbClr val="002060"/>
                 </a:solidFill>
                 <a:latin typeface="Courier New" panose="02070309020205020404" pitchFamily="49" charset="0"/>
                 <a:cs typeface="Courier New" panose="02070309020205020404" pitchFamily="49" charset="0"/>
@@ -6173,23 +6116,47 @@
           <a:p>
             <a:pPr lvl="1" algn="just"/>
             <a:r>
+              <a:rPr lang="it-IT" sz="2000" b="1" dirty="0">
+                <a:solidFill>
+                  <a:srgbClr val="0070C0"/>
+                </a:solidFill>
+              </a:rPr>
+              <a:t>Prestazioni generali </a:t>
+            </a:r>
+            <a:r>
               <a:rPr lang="it-IT" sz="2000" dirty="0">
                 <a:solidFill>
                   <a:srgbClr val="0070C0"/>
                 </a:solidFill>
               </a:rPr>
-              <a:t>Prestazioni generali degli studenti durante tutto il periodo esaminato</a:t>
+              <a:t>degli studenti durante tutto il periodo esaminato</a:t>
             </a:r>
           </a:p>
           <a:p>
             <a:pPr lvl="1" algn="just"/>
             <a:r>
+              <a:rPr lang="it-IT" sz="2000" b="1" dirty="0">
+                <a:solidFill>
+                  <a:srgbClr val="0070C0"/>
+                </a:solidFill>
+              </a:rPr>
+              <a:t>Prestazioni</a:t>
+            </a:r>
+            <a:r>
               <a:rPr lang="it-IT" sz="2000" dirty="0">
                 <a:solidFill>
                   <a:srgbClr val="0070C0"/>
                 </a:solidFill>
               </a:rPr>
-              <a:t>Prestazioni nei singoli esami</a:t>
+              <a:t> nei </a:t>
+            </a:r>
+            <a:r>
+              <a:rPr lang="it-IT" sz="2000" b="1" dirty="0">
+                <a:solidFill>
+                  <a:srgbClr val="0070C0"/>
+                </a:solidFill>
+              </a:rPr>
+              <a:t>singoli esami</a:t>
             </a:r>
           </a:p>
           <a:p>
@@ -6200,7 +6167,15 @@
                   <a:srgbClr val="0070C0"/>
                 </a:solidFill>
               </a:rPr>
-              <a:t>Risultati di gruppi di esami</a:t>
+              <a:t>Risultati di </a:t>
+            </a:r>
+            <a:r>
+              <a:rPr lang="it-IT" sz="2000" b="1" dirty="0">
+                <a:solidFill>
+                  <a:srgbClr val="0070C0"/>
+                </a:solidFill>
+              </a:rPr>
+              <a:t>gruppi di esami</a:t>
             </a:r>
           </a:p>
           <a:p>
@@ -6222,6 +6197,1558 @@
 </file>
 
 <file path=ppt/slides/slide6.xml><?xml version="1.0" encoding="utf-8"?>
+<p:sld xmlns:a="http://schemas.openxmlformats.org/drawingml/2006/main" xmlns:r="http://schemas.openxmlformats.org/officeDocument/2006/relationships" xmlns:p="http://schemas.openxmlformats.org/presentationml/2006/main">
+  <p:cSld>
+    <p:spTree>
+      <p:nvGrpSpPr>
+        <p:cNvPr id="1" name=""/>
+        <p:cNvGrpSpPr/>
+        <p:nvPr/>
+      </p:nvGrpSpPr>
+      <p:grpSpPr>
+        <a:xfrm>
+          <a:off x="0" y="0"/>
+          <a:ext cx="0" cy="0"/>
+          <a:chOff x="0" y="0"/>
+          <a:chExt cx="0" cy="0"/>
+        </a:xfrm>
+      </p:grpSpPr>
+      <p:sp>
+        <p:nvSpPr>
+          <p:cNvPr id="4" name="CasellaDiTesto 3">
+            <a:extLst>
+              <a:ext uri="{FF2B5EF4-FFF2-40B4-BE49-F238E27FC236}">
+                <a16:creationId xmlns:a16="http://schemas.microsoft.com/office/drawing/2014/main" id="{B948AE74-754E-4EF7-AC16-36C5BC20D8A2}"/>
+              </a:ext>
+            </a:extLst>
+          </p:cNvPr>
+          <p:cNvSpPr txBox="1"/>
+          <p:nvPr/>
+        </p:nvSpPr>
+        <p:spPr>
+          <a:xfrm>
+            <a:off x="1524000" y="2383810"/>
+            <a:ext cx="6705600" cy="2492990"/>
+          </a:xfrm>
+          <a:prstGeom prst="rect">
+            <a:avLst/>
+          </a:prstGeom>
+          <a:noFill/>
+        </p:spPr>
+        <p:txBody>
+          <a:bodyPr wrap="square" rtlCol="0">
+            <a:spAutoFit/>
+          </a:bodyPr>
+          <a:lstStyle/>
+          <a:p>
+            <a:r>
+              <a:rPr lang="en-US" sz="1200" dirty="0">
+                <a:solidFill>
+                  <a:srgbClr val="002060"/>
+                </a:solidFill>
+                <a:latin typeface="Courier New" panose="02070309020205020404" pitchFamily="49" charset="0"/>
+                <a:cs typeface="Courier New" panose="02070309020205020404" pitchFamily="49" charset="0"/>
+              </a:rPr>
+              <a:t>colors &lt;- c("</a:t>
+            </a:r>
+            <a:r>
+              <a:rPr lang="en-US" sz="1200" dirty="0" err="1">
+                <a:solidFill>
+                  <a:srgbClr val="002060"/>
+                </a:solidFill>
+                <a:latin typeface="Courier New" panose="02070309020205020404" pitchFamily="49" charset="0"/>
+                <a:cs typeface="Courier New" panose="02070309020205020404" pitchFamily="49" charset="0"/>
+              </a:rPr>
+              <a:t>blue","red</a:t>
+            </a:r>
+            <a:r>
+              <a:rPr lang="en-US" sz="1200" dirty="0">
+                <a:solidFill>
+                  <a:srgbClr val="002060"/>
+                </a:solidFill>
+                <a:latin typeface="Courier New" panose="02070309020205020404" pitchFamily="49" charset="0"/>
+                <a:cs typeface="Courier New" panose="02070309020205020404" pitchFamily="49" charset="0"/>
+              </a:rPr>
+              <a:t>", "green", "orange")</a:t>
+            </a:r>
+          </a:p>
+          <a:p>
+            <a:r>
+              <a:rPr lang="en-US" sz="1200" dirty="0" err="1">
+                <a:solidFill>
+                  <a:srgbClr val="002060"/>
+                </a:solidFill>
+                <a:latin typeface="Courier New" panose="02070309020205020404" pitchFamily="49" charset="0"/>
+                <a:cs typeface="Courier New" panose="02070309020205020404" pitchFamily="49" charset="0"/>
+              </a:rPr>
+              <a:t>coorte_labels</a:t>
+            </a:r>
+            <a:r>
+              <a:rPr lang="en-US" sz="1200" dirty="0">
+                <a:solidFill>
+                  <a:srgbClr val="002060"/>
+                </a:solidFill>
+                <a:latin typeface="Courier New" panose="02070309020205020404" pitchFamily="49" charset="0"/>
+                <a:cs typeface="Courier New" panose="02070309020205020404" pitchFamily="49" charset="0"/>
+              </a:rPr>
+              <a:t> &lt;- students[,1]</a:t>
+            </a:r>
+          </a:p>
+          <a:p>
+            <a:r>
+              <a:rPr lang="en-US" sz="1200" dirty="0" err="1">
+                <a:solidFill>
+                  <a:srgbClr val="002060"/>
+                </a:solidFill>
+                <a:latin typeface="Courier New" panose="02070309020205020404" pitchFamily="49" charset="0"/>
+                <a:cs typeface="Courier New" panose="02070309020205020404" pitchFamily="49" charset="0"/>
+              </a:rPr>
+              <a:t>coorte_colors</a:t>
+            </a:r>
+            <a:r>
+              <a:rPr lang="en-US" sz="1200" dirty="0">
+                <a:solidFill>
+                  <a:srgbClr val="002060"/>
+                </a:solidFill>
+                <a:latin typeface="Courier New" panose="02070309020205020404" pitchFamily="49" charset="0"/>
+                <a:cs typeface="Courier New" panose="02070309020205020404" pitchFamily="49" charset="0"/>
+              </a:rPr>
+              <a:t> &lt;- colors[</a:t>
+            </a:r>
+            <a:r>
+              <a:rPr lang="en-US" sz="1200" dirty="0" err="1">
+                <a:solidFill>
+                  <a:srgbClr val="002060"/>
+                </a:solidFill>
+                <a:latin typeface="Courier New" panose="02070309020205020404" pitchFamily="49" charset="0"/>
+                <a:cs typeface="Courier New" panose="02070309020205020404" pitchFamily="49" charset="0"/>
+              </a:rPr>
+              <a:t>as.numeric</a:t>
+            </a:r>
+            <a:r>
+              <a:rPr lang="en-US" sz="1200" dirty="0">
+                <a:solidFill>
+                  <a:srgbClr val="002060"/>
+                </a:solidFill>
+                <a:latin typeface="Courier New" panose="02070309020205020404" pitchFamily="49" charset="0"/>
+                <a:cs typeface="Courier New" panose="02070309020205020404" pitchFamily="49" charset="0"/>
+              </a:rPr>
+              <a:t>(</a:t>
+            </a:r>
+            <a:r>
+              <a:rPr lang="en-US" sz="1200" dirty="0" err="1">
+                <a:solidFill>
+                  <a:srgbClr val="002060"/>
+                </a:solidFill>
+                <a:latin typeface="Courier New" panose="02070309020205020404" pitchFamily="49" charset="0"/>
+                <a:cs typeface="Courier New" panose="02070309020205020404" pitchFamily="49" charset="0"/>
+              </a:rPr>
+              <a:t>coorte_labels</a:t>
+            </a:r>
+            <a:r>
+              <a:rPr lang="en-US" sz="1200" dirty="0">
+                <a:solidFill>
+                  <a:srgbClr val="002060"/>
+                </a:solidFill>
+                <a:latin typeface="Courier New" panose="02070309020205020404" pitchFamily="49" charset="0"/>
+                <a:cs typeface="Courier New" panose="02070309020205020404" pitchFamily="49" charset="0"/>
+              </a:rPr>
+              <a:t>)]</a:t>
+            </a:r>
+          </a:p>
+          <a:p>
+            <a:r>
+              <a:rPr lang="en-US" sz="1200" dirty="0">
+                <a:solidFill>
+                  <a:srgbClr val="002060"/>
+                </a:solidFill>
+                <a:latin typeface="Courier New" panose="02070309020205020404" pitchFamily="49" charset="0"/>
+                <a:cs typeface="Courier New" panose="02070309020205020404" pitchFamily="49" charset="0"/>
+              </a:rPr>
+              <a:t>library(seriation)</a:t>
+            </a:r>
+          </a:p>
+          <a:p>
+            <a:endParaRPr lang="en-US" sz="1200" dirty="0">
+              <a:solidFill>
+                <a:schemeClr val="bg1">
+                  <a:lumMod val="50000"/>
+                </a:schemeClr>
+              </a:solidFill>
+              <a:latin typeface="Courier New" panose="02070309020205020404" pitchFamily="49" charset="0"/>
+              <a:cs typeface="Courier New" panose="02070309020205020404" pitchFamily="49" charset="0"/>
+            </a:endParaRPr>
+          </a:p>
+          <a:p>
+            <a:r>
+              <a:rPr lang="en-US" sz="1200" dirty="0">
+                <a:solidFill>
+                  <a:schemeClr val="bg1">
+                    <a:lumMod val="50000"/>
+                  </a:schemeClr>
+                </a:solidFill>
+                <a:latin typeface="Courier New" panose="02070309020205020404" pitchFamily="49" charset="0"/>
+                <a:cs typeface="Courier New" panose="02070309020205020404" pitchFamily="49" charset="0"/>
+              </a:rPr>
+              <a:t># general attributes</a:t>
+            </a:r>
+          </a:p>
+          <a:p>
+            <a:r>
+              <a:rPr lang="en-US" sz="1200" dirty="0">
+                <a:solidFill>
+                  <a:srgbClr val="002060"/>
+                </a:solidFill>
+                <a:latin typeface="Courier New" panose="02070309020205020404" pitchFamily="49" charset="0"/>
+                <a:cs typeface="Courier New" panose="02070309020205020404" pitchFamily="49" charset="0"/>
+              </a:rPr>
+              <a:t>students_subset1 &lt;- students[,-c(1, 6 : 45)]</a:t>
+            </a:r>
+          </a:p>
+          <a:p>
+            <a:r>
+              <a:rPr lang="en-US" sz="1200" dirty="0">
+                <a:solidFill>
+                  <a:srgbClr val="002060"/>
+                </a:solidFill>
+                <a:latin typeface="Courier New" panose="02070309020205020404" pitchFamily="49" charset="0"/>
+                <a:cs typeface="Courier New" panose="02070309020205020404" pitchFamily="49" charset="0"/>
+              </a:rPr>
+              <a:t>pairs(students_subset1, col = </a:t>
+            </a:r>
+            <a:r>
+              <a:rPr lang="en-US" sz="1200" dirty="0" err="1">
+                <a:solidFill>
+                  <a:srgbClr val="002060"/>
+                </a:solidFill>
+                <a:latin typeface="Courier New" panose="02070309020205020404" pitchFamily="49" charset="0"/>
+                <a:cs typeface="Courier New" panose="02070309020205020404" pitchFamily="49" charset="0"/>
+              </a:rPr>
+              <a:t>coorte_colors,lower.panel</a:t>
+            </a:r>
+            <a:r>
+              <a:rPr lang="en-US" sz="1200" dirty="0">
+                <a:solidFill>
+                  <a:srgbClr val="002060"/>
+                </a:solidFill>
+                <a:latin typeface="Courier New" panose="02070309020205020404" pitchFamily="49" charset="0"/>
+                <a:cs typeface="Courier New" panose="02070309020205020404" pitchFamily="49" charset="0"/>
+              </a:rPr>
+              <a:t> = 	</a:t>
+            </a:r>
+            <a:r>
+              <a:rPr lang="en-US" sz="1200" dirty="0" err="1">
+                <a:solidFill>
+                  <a:srgbClr val="002060"/>
+                </a:solidFill>
+                <a:latin typeface="Courier New" panose="02070309020205020404" pitchFamily="49" charset="0"/>
+                <a:cs typeface="Courier New" panose="02070309020205020404" pitchFamily="49" charset="0"/>
+              </a:rPr>
+              <a:t>NULL,cex.labelsiris</a:t>
+            </a:r>
+            <a:r>
+              <a:rPr lang="en-US" sz="1200" dirty="0">
+                <a:solidFill>
+                  <a:srgbClr val="002060"/>
+                </a:solidFill>
+                <a:latin typeface="Courier New" panose="02070309020205020404" pitchFamily="49" charset="0"/>
+                <a:cs typeface="Courier New" panose="02070309020205020404" pitchFamily="49" charset="0"/>
+              </a:rPr>
+              <a:t>=2, </a:t>
+            </a:r>
+            <a:r>
+              <a:rPr lang="en-US" sz="1200" dirty="0" err="1">
+                <a:solidFill>
+                  <a:srgbClr val="002060"/>
+                </a:solidFill>
+                <a:latin typeface="Courier New" panose="02070309020205020404" pitchFamily="49" charset="0"/>
+                <a:cs typeface="Courier New" panose="02070309020205020404" pitchFamily="49" charset="0"/>
+              </a:rPr>
+              <a:t>pch</a:t>
+            </a:r>
+            <a:r>
+              <a:rPr lang="en-US" sz="1200" dirty="0">
+                <a:solidFill>
+                  <a:srgbClr val="002060"/>
+                </a:solidFill>
+                <a:latin typeface="Courier New" panose="02070309020205020404" pitchFamily="49" charset="0"/>
+                <a:cs typeface="Courier New" panose="02070309020205020404" pitchFamily="49" charset="0"/>
+              </a:rPr>
+              <a:t>=19, </a:t>
+            </a:r>
+            <a:r>
+              <a:rPr lang="en-US" sz="1200" dirty="0" err="1">
+                <a:solidFill>
+                  <a:srgbClr val="002060"/>
+                </a:solidFill>
+                <a:latin typeface="Courier New" panose="02070309020205020404" pitchFamily="49" charset="0"/>
+                <a:cs typeface="Courier New" panose="02070309020205020404" pitchFamily="49" charset="0"/>
+              </a:rPr>
+              <a:t>cex</a:t>
+            </a:r>
+            <a:r>
+              <a:rPr lang="en-US" sz="1200" dirty="0">
+                <a:solidFill>
+                  <a:srgbClr val="002060"/>
+                </a:solidFill>
+                <a:latin typeface="Courier New" panose="02070309020205020404" pitchFamily="49" charset="0"/>
+                <a:cs typeface="Courier New" panose="02070309020205020404" pitchFamily="49" charset="0"/>
+              </a:rPr>
+              <a:t> = 1.2)</a:t>
+            </a:r>
+          </a:p>
+          <a:p>
+            <a:r>
+              <a:rPr lang="en-US" sz="1200" dirty="0">
+                <a:solidFill>
+                  <a:srgbClr val="002060"/>
+                </a:solidFill>
+                <a:latin typeface="Courier New" panose="02070309020205020404" pitchFamily="49" charset="0"/>
+                <a:cs typeface="Courier New" panose="02070309020205020404" pitchFamily="49" charset="0"/>
+              </a:rPr>
+              <a:t>par(</a:t>
+            </a:r>
+            <a:r>
+              <a:rPr lang="en-US" sz="1200" dirty="0" err="1">
+                <a:solidFill>
+                  <a:srgbClr val="002060"/>
+                </a:solidFill>
+                <a:latin typeface="Courier New" panose="02070309020205020404" pitchFamily="49" charset="0"/>
+                <a:cs typeface="Courier New" panose="02070309020205020404" pitchFamily="49" charset="0"/>
+              </a:rPr>
+              <a:t>xpd</a:t>
+            </a:r>
+            <a:r>
+              <a:rPr lang="en-US" sz="1200" dirty="0">
+                <a:solidFill>
+                  <a:srgbClr val="002060"/>
+                </a:solidFill>
+                <a:latin typeface="Courier New" panose="02070309020205020404" pitchFamily="49" charset="0"/>
+                <a:cs typeface="Courier New" panose="02070309020205020404" pitchFamily="49" charset="0"/>
+              </a:rPr>
+              <a:t> = TRUE)</a:t>
+            </a:r>
+          </a:p>
+          <a:p>
+            <a:r>
+              <a:rPr lang="en-US" sz="1200" dirty="0">
+                <a:solidFill>
+                  <a:srgbClr val="002060"/>
+                </a:solidFill>
+                <a:latin typeface="Courier New" panose="02070309020205020404" pitchFamily="49" charset="0"/>
+                <a:cs typeface="Courier New" panose="02070309020205020404" pitchFamily="49" charset="0"/>
+              </a:rPr>
+              <a:t>legend(x = 0.05, y = 0.4, </a:t>
+            </a:r>
+            <a:r>
+              <a:rPr lang="en-US" sz="1200" dirty="0" err="1">
+                <a:solidFill>
+                  <a:srgbClr val="002060"/>
+                </a:solidFill>
+                <a:latin typeface="Courier New" panose="02070309020205020404" pitchFamily="49" charset="0"/>
+                <a:cs typeface="Courier New" panose="02070309020205020404" pitchFamily="49" charset="0"/>
+              </a:rPr>
+              <a:t>cex</a:t>
+            </a:r>
+            <a:r>
+              <a:rPr lang="en-US" sz="1200" dirty="0">
+                <a:solidFill>
+                  <a:srgbClr val="002060"/>
+                </a:solidFill>
+                <a:latin typeface="Courier New" panose="02070309020205020404" pitchFamily="49" charset="0"/>
+                <a:cs typeface="Courier New" panose="02070309020205020404" pitchFamily="49" charset="0"/>
+              </a:rPr>
+              <a:t> = 1,legend = 	</a:t>
+            </a:r>
+            <a:r>
+              <a:rPr lang="en-US" sz="1200" dirty="0" err="1">
+                <a:solidFill>
+                  <a:srgbClr val="002060"/>
+                </a:solidFill>
+                <a:latin typeface="Courier New" panose="02070309020205020404" pitchFamily="49" charset="0"/>
+                <a:cs typeface="Courier New" panose="02070309020205020404" pitchFamily="49" charset="0"/>
+              </a:rPr>
+              <a:t>as.character</a:t>
+            </a:r>
+            <a:r>
+              <a:rPr lang="en-US" sz="1200" dirty="0">
+                <a:solidFill>
+                  <a:srgbClr val="002060"/>
+                </a:solidFill>
+                <a:latin typeface="Courier New" panose="02070309020205020404" pitchFamily="49" charset="0"/>
+                <a:cs typeface="Courier New" panose="02070309020205020404" pitchFamily="49" charset="0"/>
+              </a:rPr>
+              <a:t>(levels(</a:t>
+            </a:r>
+            <a:r>
+              <a:rPr lang="en-US" sz="1200" dirty="0" err="1">
+                <a:solidFill>
+                  <a:srgbClr val="002060"/>
+                </a:solidFill>
+                <a:latin typeface="Courier New" panose="02070309020205020404" pitchFamily="49" charset="0"/>
+                <a:cs typeface="Courier New" panose="02070309020205020404" pitchFamily="49" charset="0"/>
+              </a:rPr>
+              <a:t>coorte_labels</a:t>
+            </a:r>
+            <a:r>
+              <a:rPr lang="en-US" sz="1200" dirty="0">
+                <a:solidFill>
+                  <a:srgbClr val="002060"/>
+                </a:solidFill>
+                <a:latin typeface="Courier New" panose="02070309020205020404" pitchFamily="49" charset="0"/>
+                <a:cs typeface="Courier New" panose="02070309020205020404" pitchFamily="49" charset="0"/>
+              </a:rPr>
+              <a:t>)),fill = unique(</a:t>
+            </a:r>
+            <a:r>
+              <a:rPr lang="en-US" sz="1200" dirty="0" err="1">
+                <a:solidFill>
+                  <a:srgbClr val="002060"/>
+                </a:solidFill>
+                <a:latin typeface="Courier New" panose="02070309020205020404" pitchFamily="49" charset="0"/>
+                <a:cs typeface="Courier New" panose="02070309020205020404" pitchFamily="49" charset="0"/>
+              </a:rPr>
+              <a:t>coorte_colors</a:t>
+            </a:r>
+            <a:r>
+              <a:rPr lang="en-US" sz="1200" dirty="0">
+                <a:solidFill>
+                  <a:srgbClr val="002060"/>
+                </a:solidFill>
+                <a:latin typeface="Courier New" panose="02070309020205020404" pitchFamily="49" charset="0"/>
+                <a:cs typeface="Courier New" panose="02070309020205020404" pitchFamily="49" charset="0"/>
+              </a:rPr>
+              <a:t>))</a:t>
+            </a:r>
+          </a:p>
+          <a:p>
+            <a:r>
+              <a:rPr lang="en-US" sz="1200" dirty="0">
+                <a:solidFill>
+                  <a:srgbClr val="002060"/>
+                </a:solidFill>
+                <a:latin typeface="Courier New" panose="02070309020205020404" pitchFamily="49" charset="0"/>
+                <a:cs typeface="Courier New" panose="02070309020205020404" pitchFamily="49" charset="0"/>
+              </a:rPr>
+              <a:t>par(</a:t>
+            </a:r>
+            <a:r>
+              <a:rPr lang="en-US" sz="1200" dirty="0" err="1">
+                <a:solidFill>
+                  <a:srgbClr val="002060"/>
+                </a:solidFill>
+                <a:latin typeface="Courier New" panose="02070309020205020404" pitchFamily="49" charset="0"/>
+                <a:cs typeface="Courier New" panose="02070309020205020404" pitchFamily="49" charset="0"/>
+              </a:rPr>
+              <a:t>xpd</a:t>
+            </a:r>
+            <a:r>
+              <a:rPr lang="en-US" sz="1200" dirty="0">
+                <a:solidFill>
+                  <a:srgbClr val="002060"/>
+                </a:solidFill>
+                <a:latin typeface="Courier New" panose="02070309020205020404" pitchFamily="49" charset="0"/>
+                <a:cs typeface="Courier New" panose="02070309020205020404" pitchFamily="49" charset="0"/>
+              </a:rPr>
+              <a:t> = NA)</a:t>
+            </a:r>
+            <a:endParaRPr lang="it-IT" sz="900" dirty="0">
+              <a:solidFill>
+                <a:srgbClr val="002060"/>
+              </a:solidFill>
+              <a:latin typeface="Courier New" panose="02070309020205020404" pitchFamily="49" charset="0"/>
+              <a:cs typeface="Courier New" panose="02070309020205020404" pitchFamily="49" charset="0"/>
+            </a:endParaRPr>
+          </a:p>
+        </p:txBody>
+      </p:sp>
+      <p:sp>
+        <p:nvSpPr>
+          <p:cNvPr id="5" name="Titolo 1">
+            <a:extLst>
+              <a:ext uri="{FF2B5EF4-FFF2-40B4-BE49-F238E27FC236}">
+                <a16:creationId xmlns:a16="http://schemas.microsoft.com/office/drawing/2014/main" id="{93988BB5-A413-49BA-BC9C-68388EF5A744}"/>
+              </a:ext>
+            </a:extLst>
+          </p:cNvPr>
+          <p:cNvSpPr txBox="1">
+            <a:spLocks/>
+          </p:cNvSpPr>
+          <p:nvPr/>
+        </p:nvSpPr>
+        <p:spPr>
+          <a:xfrm>
+            <a:off x="1447800" y="152400"/>
+            <a:ext cx="8229600" cy="1143000"/>
+          </a:xfrm>
+          <a:prstGeom prst="rect">
+            <a:avLst/>
+          </a:prstGeom>
+        </p:spPr>
+        <p:txBody>
+          <a:bodyPr>
+            <a:noAutofit/>
+          </a:bodyPr>
+          <a:lstStyle>
+            <a:lvl1pPr algn="ctr" defTabSz="342900" rtl="0" eaLnBrk="1" latinLnBrk="0" hangingPunct="1">
+              <a:spcBef>
+                <a:spcPct val="0"/>
+              </a:spcBef>
+              <a:buNone/>
+              <a:defRPr sz="3300" kern="1200">
+                <a:solidFill>
+                  <a:schemeClr val="tx1"/>
+                </a:solidFill>
+                <a:latin typeface="+mj-lt"/>
+                <a:ea typeface="+mj-ea"/>
+                <a:cs typeface="+mj-cs"/>
+              </a:defRPr>
+            </a:lvl1pPr>
+          </a:lstStyle>
+          <a:p>
+            <a:r>
+              <a:rPr lang="it-IT" sz="2400" b="1" dirty="0">
+                <a:solidFill>
+                  <a:schemeClr val="bg1"/>
+                </a:solidFill>
+              </a:rPr>
+              <a:t>DATA UNDERSTANDING: </a:t>
+            </a:r>
+            <a:r>
+              <a:rPr lang="it-IT" sz="2400" dirty="0">
+                <a:solidFill>
+                  <a:schemeClr val="bg1"/>
+                </a:solidFill>
+              </a:rPr>
+              <a:t>PRESTAZIONI GENERALI</a:t>
+            </a:r>
+            <a:endParaRPr lang="en-US" sz="2400" dirty="0">
+              <a:solidFill>
+                <a:schemeClr val="bg1"/>
+              </a:solidFill>
+            </a:endParaRPr>
+          </a:p>
+        </p:txBody>
+      </p:sp>
+      <p:sp>
+        <p:nvSpPr>
+          <p:cNvPr id="8" name="Segnaposto contenuto 2">
+            <a:extLst>
+              <a:ext uri="{FF2B5EF4-FFF2-40B4-BE49-F238E27FC236}">
+                <a16:creationId xmlns:a16="http://schemas.microsoft.com/office/drawing/2014/main" id="{C2E44FE5-CCA1-4E8F-905A-F2F5CDF25092}"/>
+              </a:ext>
+            </a:extLst>
+          </p:cNvPr>
+          <p:cNvSpPr>
+            <a:spLocks noGrp="1"/>
+          </p:cNvSpPr>
+          <p:nvPr>
+            <p:ph idx="1"/>
+          </p:nvPr>
+        </p:nvSpPr>
+        <p:spPr>
+          <a:xfrm>
+            <a:off x="457200" y="990600"/>
+            <a:ext cx="8229600" cy="1219200"/>
+          </a:xfrm>
+        </p:spPr>
+        <p:txBody>
+          <a:bodyPr>
+            <a:normAutofit/>
+          </a:bodyPr>
+          <a:lstStyle/>
+          <a:p>
+            <a:pPr algn="just"/>
+            <a:r>
+              <a:rPr lang="it-IT" dirty="0"/>
+              <a:t>Lo script </a:t>
+            </a:r>
+            <a:r>
+              <a:rPr lang="it-IT" dirty="0">
+                <a:solidFill>
+                  <a:srgbClr val="FF0000"/>
+                </a:solidFill>
+              </a:rPr>
+              <a:t>R</a:t>
+            </a:r>
+            <a:r>
+              <a:rPr lang="it-IT" dirty="0"/>
+              <a:t> che segue plotta dei grafici di dispersione relativi a coppie di attributi relativi alle prestazioni generali degli studenti. </a:t>
+            </a:r>
+          </a:p>
+          <a:p>
+            <a:pPr marL="0" indent="0" algn="just">
+              <a:buNone/>
+            </a:pPr>
+            <a:endParaRPr lang="it-IT" dirty="0"/>
+          </a:p>
+          <a:p>
+            <a:pPr marL="0" indent="0" algn="just">
+              <a:buNone/>
+            </a:pPr>
+            <a:endParaRPr lang="it-IT" dirty="0"/>
+          </a:p>
+          <a:p>
+            <a:endParaRPr lang="en-US" sz="2000" dirty="0"/>
+          </a:p>
+        </p:txBody>
+      </p:sp>
+      <p:sp>
+        <p:nvSpPr>
+          <p:cNvPr id="9" name="Segnaposto contenuto 2">
+            <a:extLst>
+              <a:ext uri="{FF2B5EF4-FFF2-40B4-BE49-F238E27FC236}">
+                <a16:creationId xmlns:a16="http://schemas.microsoft.com/office/drawing/2014/main" id="{89886170-B615-43F8-AA8E-D5565391C42A}"/>
+              </a:ext>
+            </a:extLst>
+          </p:cNvPr>
+          <p:cNvSpPr txBox="1">
+            <a:spLocks/>
+          </p:cNvSpPr>
+          <p:nvPr/>
+        </p:nvSpPr>
+        <p:spPr>
+          <a:xfrm>
+            <a:off x="457200" y="5029199"/>
+            <a:ext cx="8229600" cy="1074753"/>
+          </a:xfrm>
+          <a:prstGeom prst="rect">
+            <a:avLst/>
+          </a:prstGeom>
+        </p:spPr>
+        <p:txBody>
+          <a:bodyPr vert="horz" lIns="91440" tIns="45720" rIns="91440" bIns="45720" rtlCol="0">
+            <a:normAutofit/>
+          </a:bodyPr>
+          <a:lstStyle>
+            <a:lvl1pPr marL="257175" indent="-257175" algn="l" defTabSz="342900" rtl="0" eaLnBrk="1" latinLnBrk="0" hangingPunct="1">
+              <a:spcBef>
+                <a:spcPct val="20000"/>
+              </a:spcBef>
+              <a:buFont typeface="Arial"/>
+              <a:buChar char="•"/>
+              <a:defRPr sz="2400" kern="1200">
+                <a:solidFill>
+                  <a:schemeClr val="tx1"/>
+                </a:solidFill>
+                <a:latin typeface="+mn-lt"/>
+                <a:ea typeface="+mn-ea"/>
+                <a:cs typeface="+mn-cs"/>
+              </a:defRPr>
+            </a:lvl1pPr>
+            <a:lvl2pPr marL="557213" indent="-214313" algn="l" defTabSz="342900" rtl="0" eaLnBrk="1" latinLnBrk="0" hangingPunct="1">
+              <a:spcBef>
+                <a:spcPct val="20000"/>
+              </a:spcBef>
+              <a:buFont typeface="Arial"/>
+              <a:buChar char="–"/>
+              <a:defRPr sz="2100" kern="1200">
+                <a:solidFill>
+                  <a:schemeClr val="tx1"/>
+                </a:solidFill>
+                <a:latin typeface="+mn-lt"/>
+                <a:ea typeface="+mn-ea"/>
+                <a:cs typeface="+mn-cs"/>
+              </a:defRPr>
+            </a:lvl2pPr>
+            <a:lvl3pPr marL="857250" indent="-171450" algn="l" defTabSz="342900" rtl="0" eaLnBrk="1" latinLnBrk="0" hangingPunct="1">
+              <a:spcBef>
+                <a:spcPct val="20000"/>
+              </a:spcBef>
+              <a:buFont typeface="Arial"/>
+              <a:buChar char="•"/>
+              <a:defRPr sz="1800" kern="1200">
+                <a:solidFill>
+                  <a:schemeClr val="tx1"/>
+                </a:solidFill>
+                <a:latin typeface="+mn-lt"/>
+                <a:ea typeface="+mn-ea"/>
+                <a:cs typeface="+mn-cs"/>
+              </a:defRPr>
+            </a:lvl3pPr>
+            <a:lvl4pPr marL="1200150" indent="-171450" algn="l" defTabSz="342900" rtl="0" eaLnBrk="1" latinLnBrk="0" hangingPunct="1">
+              <a:spcBef>
+                <a:spcPct val="20000"/>
+              </a:spcBef>
+              <a:buFont typeface="Arial"/>
+              <a:buChar char="–"/>
+              <a:defRPr sz="1500" kern="1200">
+                <a:solidFill>
+                  <a:schemeClr val="tx1"/>
+                </a:solidFill>
+                <a:latin typeface="+mn-lt"/>
+                <a:ea typeface="+mn-ea"/>
+                <a:cs typeface="+mn-cs"/>
+              </a:defRPr>
+            </a:lvl4pPr>
+            <a:lvl5pPr marL="1543050" indent="-171450" algn="l" defTabSz="342900" rtl="0" eaLnBrk="1" latinLnBrk="0" hangingPunct="1">
+              <a:spcBef>
+                <a:spcPct val="20000"/>
+              </a:spcBef>
+              <a:buFont typeface="Arial"/>
+              <a:buChar char="»"/>
+              <a:defRPr sz="1500" kern="1200">
+                <a:solidFill>
+                  <a:schemeClr val="tx1"/>
+                </a:solidFill>
+                <a:latin typeface="+mn-lt"/>
+                <a:ea typeface="+mn-ea"/>
+                <a:cs typeface="+mn-cs"/>
+              </a:defRPr>
+            </a:lvl5pPr>
+            <a:lvl6pPr marL="1885950" indent="-171450" algn="l" defTabSz="342900" rtl="0" eaLnBrk="1" latinLnBrk="0" hangingPunct="1">
+              <a:spcBef>
+                <a:spcPct val="20000"/>
+              </a:spcBef>
+              <a:buFont typeface="Arial"/>
+              <a:buChar char="•"/>
+              <a:defRPr sz="1500" kern="1200">
+                <a:solidFill>
+                  <a:schemeClr val="tx1"/>
+                </a:solidFill>
+                <a:latin typeface="+mn-lt"/>
+                <a:ea typeface="+mn-ea"/>
+                <a:cs typeface="+mn-cs"/>
+              </a:defRPr>
+            </a:lvl6pPr>
+            <a:lvl7pPr marL="2228850" indent="-171450" algn="l" defTabSz="342900" rtl="0" eaLnBrk="1" latinLnBrk="0" hangingPunct="1">
+              <a:spcBef>
+                <a:spcPct val="20000"/>
+              </a:spcBef>
+              <a:buFont typeface="Arial"/>
+              <a:buChar char="•"/>
+              <a:defRPr sz="1500" kern="1200">
+                <a:solidFill>
+                  <a:schemeClr val="tx1"/>
+                </a:solidFill>
+                <a:latin typeface="+mn-lt"/>
+                <a:ea typeface="+mn-ea"/>
+                <a:cs typeface="+mn-cs"/>
+              </a:defRPr>
+            </a:lvl7pPr>
+            <a:lvl8pPr marL="2571750" indent="-171450" algn="l" defTabSz="342900" rtl="0" eaLnBrk="1" latinLnBrk="0" hangingPunct="1">
+              <a:spcBef>
+                <a:spcPct val="20000"/>
+              </a:spcBef>
+              <a:buFont typeface="Arial"/>
+              <a:buChar char="•"/>
+              <a:defRPr sz="1500" kern="1200">
+                <a:solidFill>
+                  <a:schemeClr val="tx1"/>
+                </a:solidFill>
+                <a:latin typeface="+mn-lt"/>
+                <a:ea typeface="+mn-ea"/>
+                <a:cs typeface="+mn-cs"/>
+              </a:defRPr>
+            </a:lvl8pPr>
+            <a:lvl9pPr marL="2914650" indent="-171450" algn="l" defTabSz="342900" rtl="0" eaLnBrk="1" latinLnBrk="0" hangingPunct="1">
+              <a:spcBef>
+                <a:spcPct val="20000"/>
+              </a:spcBef>
+              <a:buFont typeface="Arial"/>
+              <a:buChar char="•"/>
+              <a:defRPr sz="1500" kern="1200">
+                <a:solidFill>
+                  <a:schemeClr val="tx1"/>
+                </a:solidFill>
+                <a:latin typeface="+mn-lt"/>
+                <a:ea typeface="+mn-ea"/>
+                <a:cs typeface="+mn-cs"/>
+              </a:defRPr>
+            </a:lvl9pPr>
+          </a:lstStyle>
+          <a:p>
+            <a:pPr marL="0" indent="0" algn="just">
+              <a:buFont typeface="Arial"/>
+              <a:buNone/>
+            </a:pPr>
+            <a:endParaRPr lang="it-IT" dirty="0"/>
+          </a:p>
+          <a:p>
+            <a:pPr marL="0" indent="0" algn="just">
+              <a:buFont typeface="Arial"/>
+              <a:buNone/>
+            </a:pPr>
+            <a:endParaRPr lang="it-IT" dirty="0"/>
+          </a:p>
+          <a:p>
+            <a:endParaRPr lang="en-US" sz="2000" dirty="0"/>
+          </a:p>
+        </p:txBody>
+      </p:sp>
+      <p:sp>
+        <p:nvSpPr>
+          <p:cNvPr id="10" name="Segnaposto contenuto 2">
+            <a:extLst>
+              <a:ext uri="{FF2B5EF4-FFF2-40B4-BE49-F238E27FC236}">
+                <a16:creationId xmlns:a16="http://schemas.microsoft.com/office/drawing/2014/main" id="{7D6E6495-424C-4525-948E-C30098166953}"/>
+              </a:ext>
+            </a:extLst>
+          </p:cNvPr>
+          <p:cNvSpPr txBox="1">
+            <a:spLocks/>
+          </p:cNvSpPr>
+          <p:nvPr/>
+        </p:nvSpPr>
+        <p:spPr>
+          <a:xfrm>
+            <a:off x="609600" y="5181600"/>
+            <a:ext cx="8229600" cy="1219200"/>
+          </a:xfrm>
+          <a:prstGeom prst="rect">
+            <a:avLst/>
+          </a:prstGeom>
+        </p:spPr>
+        <p:txBody>
+          <a:bodyPr vert="horz" lIns="91440" tIns="45720" rIns="91440" bIns="45720" rtlCol="0">
+            <a:normAutofit/>
+          </a:bodyPr>
+          <a:lstStyle>
+            <a:lvl1pPr marL="257175" indent="-257175" algn="l" defTabSz="342900" rtl="0" eaLnBrk="1" latinLnBrk="0" hangingPunct="1">
+              <a:spcBef>
+                <a:spcPct val="20000"/>
+              </a:spcBef>
+              <a:buFont typeface="Arial"/>
+              <a:buChar char="•"/>
+              <a:defRPr sz="2400" kern="1200">
+                <a:solidFill>
+                  <a:schemeClr val="tx1"/>
+                </a:solidFill>
+                <a:latin typeface="+mn-lt"/>
+                <a:ea typeface="+mn-ea"/>
+                <a:cs typeface="+mn-cs"/>
+              </a:defRPr>
+            </a:lvl1pPr>
+            <a:lvl2pPr marL="557213" indent="-214313" algn="l" defTabSz="342900" rtl="0" eaLnBrk="1" latinLnBrk="0" hangingPunct="1">
+              <a:spcBef>
+                <a:spcPct val="20000"/>
+              </a:spcBef>
+              <a:buFont typeface="Arial"/>
+              <a:buChar char="–"/>
+              <a:defRPr sz="2100" kern="1200">
+                <a:solidFill>
+                  <a:schemeClr val="tx1"/>
+                </a:solidFill>
+                <a:latin typeface="+mn-lt"/>
+                <a:ea typeface="+mn-ea"/>
+                <a:cs typeface="+mn-cs"/>
+              </a:defRPr>
+            </a:lvl2pPr>
+            <a:lvl3pPr marL="857250" indent="-171450" algn="l" defTabSz="342900" rtl="0" eaLnBrk="1" latinLnBrk="0" hangingPunct="1">
+              <a:spcBef>
+                <a:spcPct val="20000"/>
+              </a:spcBef>
+              <a:buFont typeface="Arial"/>
+              <a:buChar char="•"/>
+              <a:defRPr sz="1800" kern="1200">
+                <a:solidFill>
+                  <a:schemeClr val="tx1"/>
+                </a:solidFill>
+                <a:latin typeface="+mn-lt"/>
+                <a:ea typeface="+mn-ea"/>
+                <a:cs typeface="+mn-cs"/>
+              </a:defRPr>
+            </a:lvl3pPr>
+            <a:lvl4pPr marL="1200150" indent="-171450" algn="l" defTabSz="342900" rtl="0" eaLnBrk="1" latinLnBrk="0" hangingPunct="1">
+              <a:spcBef>
+                <a:spcPct val="20000"/>
+              </a:spcBef>
+              <a:buFont typeface="Arial"/>
+              <a:buChar char="–"/>
+              <a:defRPr sz="1500" kern="1200">
+                <a:solidFill>
+                  <a:schemeClr val="tx1"/>
+                </a:solidFill>
+                <a:latin typeface="+mn-lt"/>
+                <a:ea typeface="+mn-ea"/>
+                <a:cs typeface="+mn-cs"/>
+              </a:defRPr>
+            </a:lvl4pPr>
+            <a:lvl5pPr marL="1543050" indent="-171450" algn="l" defTabSz="342900" rtl="0" eaLnBrk="1" latinLnBrk="0" hangingPunct="1">
+              <a:spcBef>
+                <a:spcPct val="20000"/>
+              </a:spcBef>
+              <a:buFont typeface="Arial"/>
+              <a:buChar char="»"/>
+              <a:defRPr sz="1500" kern="1200">
+                <a:solidFill>
+                  <a:schemeClr val="tx1"/>
+                </a:solidFill>
+                <a:latin typeface="+mn-lt"/>
+                <a:ea typeface="+mn-ea"/>
+                <a:cs typeface="+mn-cs"/>
+              </a:defRPr>
+            </a:lvl5pPr>
+            <a:lvl6pPr marL="1885950" indent="-171450" algn="l" defTabSz="342900" rtl="0" eaLnBrk="1" latinLnBrk="0" hangingPunct="1">
+              <a:spcBef>
+                <a:spcPct val="20000"/>
+              </a:spcBef>
+              <a:buFont typeface="Arial"/>
+              <a:buChar char="•"/>
+              <a:defRPr sz="1500" kern="1200">
+                <a:solidFill>
+                  <a:schemeClr val="tx1"/>
+                </a:solidFill>
+                <a:latin typeface="+mn-lt"/>
+                <a:ea typeface="+mn-ea"/>
+                <a:cs typeface="+mn-cs"/>
+              </a:defRPr>
+            </a:lvl6pPr>
+            <a:lvl7pPr marL="2228850" indent="-171450" algn="l" defTabSz="342900" rtl="0" eaLnBrk="1" latinLnBrk="0" hangingPunct="1">
+              <a:spcBef>
+                <a:spcPct val="20000"/>
+              </a:spcBef>
+              <a:buFont typeface="Arial"/>
+              <a:buChar char="•"/>
+              <a:defRPr sz="1500" kern="1200">
+                <a:solidFill>
+                  <a:schemeClr val="tx1"/>
+                </a:solidFill>
+                <a:latin typeface="+mn-lt"/>
+                <a:ea typeface="+mn-ea"/>
+                <a:cs typeface="+mn-cs"/>
+              </a:defRPr>
+            </a:lvl7pPr>
+            <a:lvl8pPr marL="2571750" indent="-171450" algn="l" defTabSz="342900" rtl="0" eaLnBrk="1" latinLnBrk="0" hangingPunct="1">
+              <a:spcBef>
+                <a:spcPct val="20000"/>
+              </a:spcBef>
+              <a:buFont typeface="Arial"/>
+              <a:buChar char="•"/>
+              <a:defRPr sz="1500" kern="1200">
+                <a:solidFill>
+                  <a:schemeClr val="tx1"/>
+                </a:solidFill>
+                <a:latin typeface="+mn-lt"/>
+                <a:ea typeface="+mn-ea"/>
+                <a:cs typeface="+mn-cs"/>
+              </a:defRPr>
+            </a:lvl8pPr>
+            <a:lvl9pPr marL="2914650" indent="-171450" algn="l" defTabSz="342900" rtl="0" eaLnBrk="1" latinLnBrk="0" hangingPunct="1">
+              <a:spcBef>
+                <a:spcPct val="20000"/>
+              </a:spcBef>
+              <a:buFont typeface="Arial"/>
+              <a:buChar char="•"/>
+              <a:defRPr sz="1500" kern="1200">
+                <a:solidFill>
+                  <a:schemeClr val="tx1"/>
+                </a:solidFill>
+                <a:latin typeface="+mn-lt"/>
+                <a:ea typeface="+mn-ea"/>
+                <a:cs typeface="+mn-cs"/>
+              </a:defRPr>
+            </a:lvl9pPr>
+          </a:lstStyle>
+          <a:p>
+            <a:pPr algn="just"/>
+            <a:r>
+              <a:rPr lang="it-IT" dirty="0"/>
+              <a:t>Lo scopo è quello di individuare visivamente delle correlazioni significative fra questi attributi.</a:t>
+            </a:r>
+          </a:p>
+          <a:p>
+            <a:pPr marL="0" indent="0" algn="just">
+              <a:buFont typeface="Arial"/>
+              <a:buNone/>
+            </a:pPr>
+            <a:endParaRPr lang="it-IT" dirty="0"/>
+          </a:p>
+          <a:p>
+            <a:endParaRPr lang="en-US" sz="2000" dirty="0"/>
+          </a:p>
+        </p:txBody>
+      </p:sp>
+    </p:spTree>
+    <p:extLst>
+      <p:ext uri="{BB962C8B-B14F-4D97-AF65-F5344CB8AC3E}">
+        <p14:creationId xmlns:p14="http://schemas.microsoft.com/office/powerpoint/2010/main" val="2567167341"/>
+      </p:ext>
+    </p:extLst>
+  </p:cSld>
+  <p:clrMapOvr>
+    <a:masterClrMapping/>
+  </p:clrMapOvr>
+</p:sld>
+</file>
+
+<file path=ppt/slides/slide7.xml><?xml version="1.0" encoding="utf-8"?>
+<p:sld xmlns:a="http://schemas.openxmlformats.org/drawingml/2006/main" xmlns:r="http://schemas.openxmlformats.org/officeDocument/2006/relationships" xmlns:p="http://schemas.openxmlformats.org/presentationml/2006/main">
+  <p:cSld>
+    <p:spTree>
+      <p:nvGrpSpPr>
+        <p:cNvPr id="1" name=""/>
+        <p:cNvGrpSpPr/>
+        <p:nvPr/>
+      </p:nvGrpSpPr>
+      <p:grpSpPr>
+        <a:xfrm>
+          <a:off x="0" y="0"/>
+          <a:ext cx="0" cy="0"/>
+          <a:chOff x="0" y="0"/>
+          <a:chExt cx="0" cy="0"/>
+        </a:xfrm>
+      </p:grpSpPr>
+      <p:sp>
+        <p:nvSpPr>
+          <p:cNvPr id="4" name="Titolo 1">
+            <a:extLst>
+              <a:ext uri="{FF2B5EF4-FFF2-40B4-BE49-F238E27FC236}">
+                <a16:creationId xmlns:a16="http://schemas.microsoft.com/office/drawing/2014/main" id="{9E74EE39-EA32-4246-BC63-84D8E46682AC}"/>
+              </a:ext>
+            </a:extLst>
+          </p:cNvPr>
+          <p:cNvSpPr txBox="1">
+            <a:spLocks/>
+          </p:cNvSpPr>
+          <p:nvPr/>
+        </p:nvSpPr>
+        <p:spPr>
+          <a:xfrm>
+            <a:off x="1447800" y="152400"/>
+            <a:ext cx="8229600" cy="1143000"/>
+          </a:xfrm>
+          <a:prstGeom prst="rect">
+            <a:avLst/>
+          </a:prstGeom>
+        </p:spPr>
+        <p:txBody>
+          <a:bodyPr>
+            <a:noAutofit/>
+          </a:bodyPr>
+          <a:lstStyle>
+            <a:lvl1pPr algn="ctr" defTabSz="342900" rtl="0" eaLnBrk="1" latinLnBrk="0" hangingPunct="1">
+              <a:spcBef>
+                <a:spcPct val="0"/>
+              </a:spcBef>
+              <a:buNone/>
+              <a:defRPr sz="3300" kern="1200">
+                <a:solidFill>
+                  <a:schemeClr val="tx1"/>
+                </a:solidFill>
+                <a:latin typeface="+mj-lt"/>
+                <a:ea typeface="+mj-ea"/>
+                <a:cs typeface="+mj-cs"/>
+              </a:defRPr>
+            </a:lvl1pPr>
+          </a:lstStyle>
+          <a:p>
+            <a:r>
+              <a:rPr lang="it-IT" sz="2400" b="1" dirty="0">
+                <a:solidFill>
+                  <a:schemeClr val="bg1"/>
+                </a:solidFill>
+              </a:rPr>
+              <a:t>DATA UNDERSTANDING: </a:t>
+            </a:r>
+            <a:r>
+              <a:rPr lang="it-IT" sz="2400" dirty="0">
+                <a:solidFill>
+                  <a:schemeClr val="bg1"/>
+                </a:solidFill>
+              </a:rPr>
+              <a:t>GRAFICO DI DISPERSIONE</a:t>
+            </a:r>
+            <a:endParaRPr lang="en-US" sz="2400" dirty="0">
+              <a:solidFill>
+                <a:schemeClr val="bg1"/>
+              </a:solidFill>
+            </a:endParaRPr>
+          </a:p>
+        </p:txBody>
+      </p:sp>
+      <p:pic>
+        <p:nvPicPr>
+          <p:cNvPr id="6" name="Immagine 5">
+            <a:extLst>
+              <a:ext uri="{FF2B5EF4-FFF2-40B4-BE49-F238E27FC236}">
+                <a16:creationId xmlns:a16="http://schemas.microsoft.com/office/drawing/2014/main" id="{66350360-19E7-45DE-B04C-AFFD8C1853A5}"/>
+              </a:ext>
+            </a:extLst>
+          </p:cNvPr>
+          <p:cNvPicPr>
+            <a:picLocks noChangeAspect="1"/>
+          </p:cNvPicPr>
+          <p:nvPr/>
+        </p:nvPicPr>
+        <p:blipFill rotWithShape="1">
+          <a:blip r:embed="rId2"/>
+          <a:srcRect t="2898" r="1887" b="1708"/>
+          <a:stretch/>
+        </p:blipFill>
+        <p:spPr>
+          <a:xfrm>
+            <a:off x="838200" y="838199"/>
+            <a:ext cx="8305800" cy="6019801"/>
+          </a:xfrm>
+          <a:prstGeom prst="rect">
+            <a:avLst/>
+          </a:prstGeom>
+        </p:spPr>
+      </p:pic>
+    </p:spTree>
+    <p:extLst>
+      <p:ext uri="{BB962C8B-B14F-4D97-AF65-F5344CB8AC3E}">
+        <p14:creationId xmlns:p14="http://schemas.microsoft.com/office/powerpoint/2010/main" val="665708985"/>
+      </p:ext>
+    </p:extLst>
+  </p:cSld>
+  <p:clrMapOvr>
+    <a:masterClrMapping/>
+  </p:clrMapOvr>
+</p:sld>
+</file>
+
+<file path=ppt/slides/slide8.xml><?xml version="1.0" encoding="utf-8"?>
+<p:sld xmlns:a="http://schemas.openxmlformats.org/drawingml/2006/main" xmlns:r="http://schemas.openxmlformats.org/officeDocument/2006/relationships" xmlns:p="http://schemas.openxmlformats.org/presentationml/2006/main">
+  <p:cSld>
+    <p:spTree>
+      <p:nvGrpSpPr>
+        <p:cNvPr id="1" name=""/>
+        <p:cNvGrpSpPr/>
+        <p:nvPr/>
+      </p:nvGrpSpPr>
+      <p:grpSpPr>
+        <a:xfrm>
+          <a:off x="0" y="0"/>
+          <a:ext cx="0" cy="0"/>
+          <a:chOff x="0" y="0"/>
+          <a:chExt cx="0" cy="0"/>
+        </a:xfrm>
+      </p:grpSpPr>
+      <p:sp>
+        <p:nvSpPr>
+          <p:cNvPr id="5" name="Titolo 1">
+            <a:extLst>
+              <a:ext uri="{FF2B5EF4-FFF2-40B4-BE49-F238E27FC236}">
+                <a16:creationId xmlns:a16="http://schemas.microsoft.com/office/drawing/2014/main" id="{93988BB5-A413-49BA-BC9C-68388EF5A744}"/>
+              </a:ext>
+            </a:extLst>
+          </p:cNvPr>
+          <p:cNvSpPr txBox="1">
+            <a:spLocks/>
+          </p:cNvSpPr>
+          <p:nvPr/>
+        </p:nvSpPr>
+        <p:spPr>
+          <a:xfrm>
+            <a:off x="1447800" y="152400"/>
+            <a:ext cx="8229600" cy="1143000"/>
+          </a:xfrm>
+          <a:prstGeom prst="rect">
+            <a:avLst/>
+          </a:prstGeom>
+        </p:spPr>
+        <p:txBody>
+          <a:bodyPr>
+            <a:noAutofit/>
+          </a:bodyPr>
+          <a:lstStyle>
+            <a:lvl1pPr algn="ctr" defTabSz="342900" rtl="0" eaLnBrk="1" latinLnBrk="0" hangingPunct="1">
+              <a:spcBef>
+                <a:spcPct val="0"/>
+              </a:spcBef>
+              <a:buNone/>
+              <a:defRPr sz="3300" kern="1200">
+                <a:solidFill>
+                  <a:schemeClr val="tx1"/>
+                </a:solidFill>
+                <a:latin typeface="+mj-lt"/>
+                <a:ea typeface="+mj-ea"/>
+                <a:cs typeface="+mj-cs"/>
+              </a:defRPr>
+            </a:lvl1pPr>
+          </a:lstStyle>
+          <a:p>
+            <a:r>
+              <a:rPr lang="it-IT" sz="2400" b="1" dirty="0">
+                <a:solidFill>
+                  <a:schemeClr val="bg1"/>
+                </a:solidFill>
+              </a:rPr>
+              <a:t>DATA UNDERSTANDING: </a:t>
+            </a:r>
+            <a:r>
+              <a:rPr lang="it-IT" sz="2400" dirty="0">
+                <a:solidFill>
+                  <a:schemeClr val="bg1"/>
+                </a:solidFill>
+              </a:rPr>
+              <a:t>PRESTAZIONI GENERALI</a:t>
+            </a:r>
+            <a:endParaRPr lang="en-US" sz="2400" dirty="0">
+              <a:solidFill>
+                <a:schemeClr val="bg1"/>
+              </a:solidFill>
+            </a:endParaRPr>
+          </a:p>
+        </p:txBody>
+      </p:sp>
+      <p:sp>
+        <p:nvSpPr>
+          <p:cNvPr id="8" name="Segnaposto contenuto 2">
+            <a:extLst>
+              <a:ext uri="{FF2B5EF4-FFF2-40B4-BE49-F238E27FC236}">
+                <a16:creationId xmlns:a16="http://schemas.microsoft.com/office/drawing/2014/main" id="{C2E44FE5-CCA1-4E8F-905A-F2F5CDF25092}"/>
+              </a:ext>
+            </a:extLst>
+          </p:cNvPr>
+          <p:cNvSpPr>
+            <a:spLocks noGrp="1"/>
+          </p:cNvSpPr>
+          <p:nvPr>
+            <p:ph idx="1"/>
+          </p:nvPr>
+        </p:nvSpPr>
+        <p:spPr>
+          <a:xfrm>
+            <a:off x="457200" y="1981200"/>
+            <a:ext cx="8229600" cy="4114800"/>
+          </a:xfrm>
+        </p:spPr>
+        <p:txBody>
+          <a:bodyPr>
+            <a:normAutofit/>
+          </a:bodyPr>
+          <a:lstStyle/>
+          <a:p>
+            <a:pPr algn="just"/>
+            <a:r>
+              <a:rPr lang="it-IT" dirty="0"/>
+              <a:t>La correlazione fra la quantità di </a:t>
+            </a:r>
+            <a:r>
+              <a:rPr lang="it-IT" i="1" dirty="0"/>
+              <a:t>crediti totali </a:t>
+            </a:r>
+            <a:r>
+              <a:rPr lang="it-IT" dirty="0"/>
+              <a:t>e quella dei soli </a:t>
+            </a:r>
+            <a:r>
+              <a:rPr lang="it-IT" i="1" dirty="0"/>
+              <a:t>crediti con voto </a:t>
+            </a:r>
+            <a:r>
+              <a:rPr lang="it-IT" dirty="0"/>
+              <a:t>è tanto palese quanto banale: il primo ammontare contiene il secondo, e la loro differenza è minima.</a:t>
+            </a:r>
+          </a:p>
+          <a:p>
+            <a:pPr lvl="1" algn="just"/>
+            <a:r>
+              <a:rPr lang="it-IT" dirty="0"/>
+              <a:t>Non c’è bisogno di analizzare questo aspetto nel dettaglio.</a:t>
+            </a:r>
+          </a:p>
+          <a:p>
+            <a:pPr marL="0" indent="0" algn="just">
+              <a:buNone/>
+            </a:pPr>
+            <a:endParaRPr lang="it-IT" dirty="0"/>
+          </a:p>
+          <a:p>
+            <a:pPr marL="0" indent="0" algn="just">
+              <a:buNone/>
+            </a:pPr>
+            <a:r>
+              <a:rPr lang="it-IT" dirty="0"/>
+              <a:t>Appare invece più interessante quello che accade fra altri attributi:</a:t>
+            </a:r>
+          </a:p>
+          <a:p>
+            <a:pPr algn="just"/>
+            <a:r>
+              <a:rPr lang="it-IT" dirty="0"/>
+              <a:t>punteggio del </a:t>
+            </a:r>
+            <a:r>
+              <a:rPr lang="it-IT" i="1" dirty="0"/>
+              <a:t>test </a:t>
+            </a:r>
+            <a:r>
+              <a:rPr lang="it-IT" dirty="0"/>
+              <a:t>di ingresso il </a:t>
+            </a:r>
+            <a:r>
+              <a:rPr lang="it-IT" i="1" dirty="0"/>
+              <a:t>valore atteso del voto </a:t>
+            </a:r>
+          </a:p>
+          <a:p>
+            <a:pPr algn="just"/>
+            <a:r>
+              <a:rPr lang="it-IT" dirty="0"/>
+              <a:t>quantità di </a:t>
+            </a:r>
+            <a:r>
+              <a:rPr lang="it-IT" i="1" dirty="0"/>
+              <a:t>crediti</a:t>
+            </a:r>
+            <a:r>
+              <a:rPr lang="it-IT" dirty="0"/>
+              <a:t> ottenuti e il </a:t>
+            </a:r>
+            <a:r>
+              <a:rPr lang="it-IT" i="1" dirty="0"/>
+              <a:t>valore atteso del voto </a:t>
+            </a:r>
+            <a:endParaRPr lang="it-IT" dirty="0"/>
+          </a:p>
+          <a:p>
+            <a:pPr algn="just"/>
+            <a:endParaRPr lang="it-IT" dirty="0"/>
+          </a:p>
+          <a:p>
+            <a:pPr marL="0" indent="0" algn="just">
+              <a:buNone/>
+            </a:pPr>
+            <a:endParaRPr lang="it-IT" dirty="0"/>
+          </a:p>
+          <a:p>
+            <a:pPr marL="0" indent="0" algn="just">
+              <a:buNone/>
+            </a:pPr>
+            <a:endParaRPr lang="it-IT" dirty="0"/>
+          </a:p>
+          <a:p>
+            <a:endParaRPr lang="en-US" sz="2000" dirty="0"/>
+          </a:p>
+        </p:txBody>
+      </p:sp>
+      <p:sp>
+        <p:nvSpPr>
+          <p:cNvPr id="9" name="Segnaposto contenuto 2">
+            <a:extLst>
+              <a:ext uri="{FF2B5EF4-FFF2-40B4-BE49-F238E27FC236}">
+                <a16:creationId xmlns:a16="http://schemas.microsoft.com/office/drawing/2014/main" id="{89886170-B615-43F8-AA8E-D5565391C42A}"/>
+              </a:ext>
+            </a:extLst>
+          </p:cNvPr>
+          <p:cNvSpPr txBox="1">
+            <a:spLocks/>
+          </p:cNvSpPr>
+          <p:nvPr/>
+        </p:nvSpPr>
+        <p:spPr>
+          <a:xfrm>
+            <a:off x="457200" y="5029199"/>
+            <a:ext cx="8229600" cy="1074753"/>
+          </a:xfrm>
+          <a:prstGeom prst="rect">
+            <a:avLst/>
+          </a:prstGeom>
+        </p:spPr>
+        <p:txBody>
+          <a:bodyPr vert="horz" lIns="91440" tIns="45720" rIns="91440" bIns="45720" rtlCol="0">
+            <a:normAutofit/>
+          </a:bodyPr>
+          <a:lstStyle>
+            <a:lvl1pPr marL="257175" indent="-257175" algn="l" defTabSz="342900" rtl="0" eaLnBrk="1" latinLnBrk="0" hangingPunct="1">
+              <a:spcBef>
+                <a:spcPct val="20000"/>
+              </a:spcBef>
+              <a:buFont typeface="Arial"/>
+              <a:buChar char="•"/>
+              <a:defRPr sz="2400" kern="1200">
+                <a:solidFill>
+                  <a:schemeClr val="tx1"/>
+                </a:solidFill>
+                <a:latin typeface="+mn-lt"/>
+                <a:ea typeface="+mn-ea"/>
+                <a:cs typeface="+mn-cs"/>
+              </a:defRPr>
+            </a:lvl1pPr>
+            <a:lvl2pPr marL="557213" indent="-214313" algn="l" defTabSz="342900" rtl="0" eaLnBrk="1" latinLnBrk="0" hangingPunct="1">
+              <a:spcBef>
+                <a:spcPct val="20000"/>
+              </a:spcBef>
+              <a:buFont typeface="Arial"/>
+              <a:buChar char="–"/>
+              <a:defRPr sz="2100" kern="1200">
+                <a:solidFill>
+                  <a:schemeClr val="tx1"/>
+                </a:solidFill>
+                <a:latin typeface="+mn-lt"/>
+                <a:ea typeface="+mn-ea"/>
+                <a:cs typeface="+mn-cs"/>
+              </a:defRPr>
+            </a:lvl2pPr>
+            <a:lvl3pPr marL="857250" indent="-171450" algn="l" defTabSz="342900" rtl="0" eaLnBrk="1" latinLnBrk="0" hangingPunct="1">
+              <a:spcBef>
+                <a:spcPct val="20000"/>
+              </a:spcBef>
+              <a:buFont typeface="Arial"/>
+              <a:buChar char="•"/>
+              <a:defRPr sz="1800" kern="1200">
+                <a:solidFill>
+                  <a:schemeClr val="tx1"/>
+                </a:solidFill>
+                <a:latin typeface="+mn-lt"/>
+                <a:ea typeface="+mn-ea"/>
+                <a:cs typeface="+mn-cs"/>
+              </a:defRPr>
+            </a:lvl3pPr>
+            <a:lvl4pPr marL="1200150" indent="-171450" algn="l" defTabSz="342900" rtl="0" eaLnBrk="1" latinLnBrk="0" hangingPunct="1">
+              <a:spcBef>
+                <a:spcPct val="20000"/>
+              </a:spcBef>
+              <a:buFont typeface="Arial"/>
+              <a:buChar char="–"/>
+              <a:defRPr sz="1500" kern="1200">
+                <a:solidFill>
+                  <a:schemeClr val="tx1"/>
+                </a:solidFill>
+                <a:latin typeface="+mn-lt"/>
+                <a:ea typeface="+mn-ea"/>
+                <a:cs typeface="+mn-cs"/>
+              </a:defRPr>
+            </a:lvl4pPr>
+            <a:lvl5pPr marL="1543050" indent="-171450" algn="l" defTabSz="342900" rtl="0" eaLnBrk="1" latinLnBrk="0" hangingPunct="1">
+              <a:spcBef>
+                <a:spcPct val="20000"/>
+              </a:spcBef>
+              <a:buFont typeface="Arial"/>
+              <a:buChar char="»"/>
+              <a:defRPr sz="1500" kern="1200">
+                <a:solidFill>
+                  <a:schemeClr val="tx1"/>
+                </a:solidFill>
+                <a:latin typeface="+mn-lt"/>
+                <a:ea typeface="+mn-ea"/>
+                <a:cs typeface="+mn-cs"/>
+              </a:defRPr>
+            </a:lvl5pPr>
+            <a:lvl6pPr marL="1885950" indent="-171450" algn="l" defTabSz="342900" rtl="0" eaLnBrk="1" latinLnBrk="0" hangingPunct="1">
+              <a:spcBef>
+                <a:spcPct val="20000"/>
+              </a:spcBef>
+              <a:buFont typeface="Arial"/>
+              <a:buChar char="•"/>
+              <a:defRPr sz="1500" kern="1200">
+                <a:solidFill>
+                  <a:schemeClr val="tx1"/>
+                </a:solidFill>
+                <a:latin typeface="+mn-lt"/>
+                <a:ea typeface="+mn-ea"/>
+                <a:cs typeface="+mn-cs"/>
+              </a:defRPr>
+            </a:lvl6pPr>
+            <a:lvl7pPr marL="2228850" indent="-171450" algn="l" defTabSz="342900" rtl="0" eaLnBrk="1" latinLnBrk="0" hangingPunct="1">
+              <a:spcBef>
+                <a:spcPct val="20000"/>
+              </a:spcBef>
+              <a:buFont typeface="Arial"/>
+              <a:buChar char="•"/>
+              <a:defRPr sz="1500" kern="1200">
+                <a:solidFill>
+                  <a:schemeClr val="tx1"/>
+                </a:solidFill>
+                <a:latin typeface="+mn-lt"/>
+                <a:ea typeface="+mn-ea"/>
+                <a:cs typeface="+mn-cs"/>
+              </a:defRPr>
+            </a:lvl7pPr>
+            <a:lvl8pPr marL="2571750" indent="-171450" algn="l" defTabSz="342900" rtl="0" eaLnBrk="1" latinLnBrk="0" hangingPunct="1">
+              <a:spcBef>
+                <a:spcPct val="20000"/>
+              </a:spcBef>
+              <a:buFont typeface="Arial"/>
+              <a:buChar char="•"/>
+              <a:defRPr sz="1500" kern="1200">
+                <a:solidFill>
+                  <a:schemeClr val="tx1"/>
+                </a:solidFill>
+                <a:latin typeface="+mn-lt"/>
+                <a:ea typeface="+mn-ea"/>
+                <a:cs typeface="+mn-cs"/>
+              </a:defRPr>
+            </a:lvl8pPr>
+            <a:lvl9pPr marL="2914650" indent="-171450" algn="l" defTabSz="342900" rtl="0" eaLnBrk="1" latinLnBrk="0" hangingPunct="1">
+              <a:spcBef>
+                <a:spcPct val="20000"/>
+              </a:spcBef>
+              <a:buFont typeface="Arial"/>
+              <a:buChar char="•"/>
+              <a:defRPr sz="1500" kern="1200">
+                <a:solidFill>
+                  <a:schemeClr val="tx1"/>
+                </a:solidFill>
+                <a:latin typeface="+mn-lt"/>
+                <a:ea typeface="+mn-ea"/>
+                <a:cs typeface="+mn-cs"/>
+              </a:defRPr>
+            </a:lvl9pPr>
+          </a:lstStyle>
+          <a:p>
+            <a:pPr marL="0" indent="0" algn="just">
+              <a:buFont typeface="Arial"/>
+              <a:buNone/>
+            </a:pPr>
+            <a:endParaRPr lang="it-IT" dirty="0"/>
+          </a:p>
+          <a:p>
+            <a:pPr marL="0" indent="0" algn="just">
+              <a:buFont typeface="Arial"/>
+              <a:buNone/>
+            </a:pPr>
+            <a:endParaRPr lang="it-IT" dirty="0"/>
+          </a:p>
+          <a:p>
+            <a:endParaRPr lang="en-US" sz="2000" dirty="0"/>
+          </a:p>
+        </p:txBody>
+      </p:sp>
+      <p:sp>
+        <p:nvSpPr>
+          <p:cNvPr id="7" name="Titolo 1">
+            <a:extLst>
+              <a:ext uri="{FF2B5EF4-FFF2-40B4-BE49-F238E27FC236}">
+                <a16:creationId xmlns:a16="http://schemas.microsoft.com/office/drawing/2014/main" id="{588E765D-4A18-43EC-9070-BBB19613F406}"/>
+              </a:ext>
+            </a:extLst>
+          </p:cNvPr>
+          <p:cNvSpPr>
+            <a:spLocks noGrp="1"/>
+          </p:cNvSpPr>
+          <p:nvPr>
+            <p:ph type="title"/>
+          </p:nvPr>
+        </p:nvSpPr>
+        <p:spPr>
+          <a:xfrm>
+            <a:off x="457200" y="762000"/>
+            <a:ext cx="8229600" cy="1143000"/>
+          </a:xfrm>
+        </p:spPr>
+        <p:txBody>
+          <a:bodyPr>
+            <a:noAutofit/>
+          </a:bodyPr>
+          <a:lstStyle/>
+          <a:p>
+            <a:r>
+              <a:rPr lang="it-IT" sz="2700" dirty="0"/>
+              <a:t>CONSIDERAZIONI</a:t>
+            </a:r>
+            <a:endParaRPr lang="en-US" sz="2700" dirty="0"/>
+          </a:p>
+        </p:txBody>
+      </p:sp>
+    </p:spTree>
+    <p:extLst>
+      <p:ext uri="{BB962C8B-B14F-4D97-AF65-F5344CB8AC3E}">
+        <p14:creationId xmlns:p14="http://schemas.microsoft.com/office/powerpoint/2010/main" val="1292023402"/>
+      </p:ext>
+    </p:extLst>
+  </p:cSld>
+  <p:clrMapOvr>
+    <a:masterClrMapping/>
+  </p:clrMapOvr>
+</p:sld>
+</file>
+
+<file path=ppt/slides/slide9.xml><?xml version="1.0" encoding="utf-8"?>
 <p:sld xmlns:a="http://schemas.openxmlformats.org/drawingml/2006/main" xmlns:r="http://schemas.openxmlformats.org/officeDocument/2006/relationships" xmlns:p="http://schemas.openxmlformats.org/presentationml/2006/main">
   <p:cSld>
     <p:spTree>

</xml_diff>

<commit_message>
Near the end of the Data Understanding phase!
</commit_message>
<xml_diff>
--- a/relazione.pptx
+++ b/relazione.pptx
@@ -26,7 +26,13 @@
     <p:sldId id="276" r:id="rId20"/>
     <p:sldId id="277" r:id="rId21"/>
     <p:sldId id="279" r:id="rId22"/>
-    <p:sldId id="278" r:id="rId23"/>
+    <p:sldId id="284" r:id="rId23"/>
+    <p:sldId id="280" r:id="rId24"/>
+    <p:sldId id="281" r:id="rId25"/>
+    <p:sldId id="282" r:id="rId26"/>
+    <p:sldId id="283" r:id="rId27"/>
+    <p:sldId id="285" r:id="rId28"/>
+    <p:sldId id="278" r:id="rId29"/>
   </p:sldIdLst>
   <p:sldSz cx="9144000" cy="6858000" type="screen4x3"/>
   <p:notesSz cx="6858000" cy="9144000"/>
@@ -328,7 +334,7 @@
             <a:fld id="{657198A3-6BD0-1345-BB48-4E51D4346A8E}" type="datetimeFigureOut">
               <a:rPr lang="it-IT" smtClean="0"/>
               <a:pPr/>
-              <a:t>09/01/2018</a:t>
+              <a:t>11/01/2018</a:t>
             </a:fld>
             <a:endParaRPr lang="it-IT" dirty="0"/>
           </a:p>
@@ -493,7 +499,7 @@
             <a:fld id="{657198A3-6BD0-1345-BB48-4E51D4346A8E}" type="datetimeFigureOut">
               <a:rPr lang="it-IT" smtClean="0"/>
               <a:pPr/>
-              <a:t>09/01/2018</a:t>
+              <a:t>11/01/2018</a:t>
             </a:fld>
             <a:endParaRPr lang="it-IT" dirty="0"/>
           </a:p>
@@ -668,7 +674,7 @@
             <a:fld id="{657198A3-6BD0-1345-BB48-4E51D4346A8E}" type="datetimeFigureOut">
               <a:rPr lang="it-IT" smtClean="0"/>
               <a:pPr/>
-              <a:t>09/01/2018</a:t>
+              <a:t>11/01/2018</a:t>
             </a:fld>
             <a:endParaRPr lang="it-IT" dirty="0"/>
           </a:p>
@@ -843,7 +849,7 @@
             <a:fld id="{657198A3-6BD0-1345-BB48-4E51D4346A8E}" type="datetimeFigureOut">
               <a:rPr lang="it-IT" smtClean="0"/>
               <a:pPr/>
-              <a:t>09/01/2018</a:t>
+              <a:t>11/01/2018</a:t>
             </a:fld>
             <a:endParaRPr lang="it-IT" dirty="0"/>
           </a:p>
@@ -1085,7 +1091,7 @@
             <a:fld id="{657198A3-6BD0-1345-BB48-4E51D4346A8E}" type="datetimeFigureOut">
               <a:rPr lang="it-IT" smtClean="0"/>
               <a:pPr/>
-              <a:t>09/01/2018</a:t>
+              <a:t>11/01/2018</a:t>
             </a:fld>
             <a:endParaRPr lang="it-IT" dirty="0"/>
           </a:p>
@@ -1367,7 +1373,7 @@
             <a:fld id="{657198A3-6BD0-1345-BB48-4E51D4346A8E}" type="datetimeFigureOut">
               <a:rPr lang="it-IT" smtClean="0"/>
               <a:pPr/>
-              <a:t>09/01/2018</a:t>
+              <a:t>11/01/2018</a:t>
             </a:fld>
             <a:endParaRPr lang="it-IT" dirty="0"/>
           </a:p>
@@ -1783,7 +1789,7 @@
             <a:fld id="{657198A3-6BD0-1345-BB48-4E51D4346A8E}" type="datetimeFigureOut">
               <a:rPr lang="it-IT" smtClean="0"/>
               <a:pPr/>
-              <a:t>09/01/2018</a:t>
+              <a:t>11/01/2018</a:t>
             </a:fld>
             <a:endParaRPr lang="it-IT" dirty="0"/>
           </a:p>
@@ -1897,7 +1903,7 @@
             <a:fld id="{657198A3-6BD0-1345-BB48-4E51D4346A8E}" type="datetimeFigureOut">
               <a:rPr lang="it-IT" smtClean="0"/>
               <a:pPr/>
-              <a:t>09/01/2018</a:t>
+              <a:t>11/01/2018</a:t>
             </a:fld>
             <a:endParaRPr lang="it-IT" dirty="0"/>
           </a:p>
@@ -1989,7 +1995,7 @@
             <a:fld id="{657198A3-6BD0-1345-BB48-4E51D4346A8E}" type="datetimeFigureOut">
               <a:rPr lang="it-IT" smtClean="0"/>
               <a:pPr/>
-              <a:t>09/01/2018</a:t>
+              <a:t>11/01/2018</a:t>
             </a:fld>
             <a:endParaRPr lang="it-IT" dirty="0"/>
           </a:p>
@@ -2261,7 +2267,7 @@
             <a:fld id="{657198A3-6BD0-1345-BB48-4E51D4346A8E}" type="datetimeFigureOut">
               <a:rPr lang="it-IT" smtClean="0"/>
               <a:pPr/>
-              <a:t>09/01/2018</a:t>
+              <a:t>11/01/2018</a:t>
             </a:fld>
             <a:endParaRPr lang="it-IT" dirty="0"/>
           </a:p>
@@ -2513,7 +2519,7 @@
             <a:fld id="{657198A3-6BD0-1345-BB48-4E51D4346A8E}" type="datetimeFigureOut">
               <a:rPr lang="it-IT" smtClean="0"/>
               <a:pPr/>
-              <a:t>09/01/2018</a:t>
+              <a:t>11/01/2018</a:t>
             </a:fld>
             <a:endParaRPr lang="it-IT" dirty="0"/>
           </a:p>
@@ -2721,7 +2727,7 @@
             <a:fld id="{657198A3-6BD0-1345-BB48-4E51D4346A8E}" type="datetimeFigureOut">
               <a:rPr lang="it-IT" smtClean="0"/>
               <a:pPr/>
-              <a:t>09/01/2018</a:t>
+              <a:t>11/01/2018</a:t>
             </a:fld>
             <a:endParaRPr lang="it-IT" dirty="0"/>
           </a:p>
@@ -4536,7 +4542,7 @@
         <p:spPr>
           <a:xfrm>
             <a:off x="142844" y="829283"/>
-            <a:ext cx="2857520" cy="4247317"/>
+            <a:ext cx="2857520" cy="4031873"/>
           </a:xfrm>
           <a:prstGeom prst="rect">
             <a:avLst/>
@@ -4579,22 +4585,16 @@
           </a:p>
           <a:p>
             <a:r>
-              <a:rPr lang="it-IT" sz="1600" i="1" dirty="0"/>
+              <a:rPr lang="it-IT" sz="1400" i="1" dirty="0"/>
               <a:t>Un </a:t>
             </a:r>
             <a:r>
-              <a:rPr lang="it-IT" sz="1600" i="1" u="sng" dirty="0"/>
+              <a:rPr lang="it-IT" sz="1400" i="1" u="sng" dirty="0"/>
               <a:t>voto medio</a:t>
             </a:r>
             <a:r>
-              <a:rPr lang="it-IT" sz="1600" i="1" dirty="0"/>
+              <a:rPr lang="it-IT" sz="1400" i="1" dirty="0"/>
               <a:t> di 30 e lode!? </a:t>
-            </a:r>
-          </a:p>
-          <a:p>
-            <a:r>
-              <a:rPr lang="it-IT" sz="1400" i="1" dirty="0"/>
-              <a:t>I dati sono corretti???</a:t>
             </a:r>
           </a:p>
         </p:txBody>
@@ -4811,26 +4811,26 @@
                   <a:srgbClr val="0070C0"/>
                 </a:solidFill>
               </a:rPr>
+              <a:t>argomenti principalmente informatici</a:t>
+            </a:r>
+          </a:p>
+          <a:p>
+            <a:pPr lvl="1" algn="just"/>
+            <a:r>
+              <a:rPr lang="it-IT" dirty="0">
+                <a:solidFill>
+                  <a:srgbClr val="0070C0"/>
+                </a:solidFill>
+              </a:rPr>
+              <a:t>esami su </a:t>
+            </a:r>
+            <a:r>
+              <a:rPr lang="it-IT" b="1" dirty="0">
+                <a:solidFill>
+                  <a:srgbClr val="0070C0"/>
+                </a:solidFill>
+              </a:rPr>
               <a:t>argomenti principalmente matematici</a:t>
-            </a:r>
-          </a:p>
-          <a:p>
-            <a:pPr lvl="1" algn="just"/>
-            <a:r>
-              <a:rPr lang="it-IT" dirty="0">
-                <a:solidFill>
-                  <a:srgbClr val="0070C0"/>
-                </a:solidFill>
-              </a:rPr>
-              <a:t>esami su </a:t>
-            </a:r>
-            <a:r>
-              <a:rPr lang="it-IT" b="1" dirty="0">
-                <a:solidFill>
-                  <a:srgbClr val="0070C0"/>
-                </a:solidFill>
-              </a:rPr>
-              <a:t>argomenti principalmente informatici</a:t>
             </a:r>
           </a:p>
           <a:p>
@@ -9213,7 +9213,7 @@
         <p:spPr>
           <a:xfrm>
             <a:off x="179512" y="830474"/>
-            <a:ext cx="2376264" cy="6063198"/>
+            <a:ext cx="2376264" cy="5632311"/>
           </a:xfrm>
           <a:prstGeom prst="rect">
             <a:avLst/>
@@ -9245,7 +9245,7 @@
           </a:p>
           <a:p>
             <a:r>
-              <a:rPr lang="it-IT" sz="1400" dirty="0">
+              <a:rPr lang="it-IT" sz="1200" dirty="0">
                 <a:solidFill>
                   <a:srgbClr val="FF0000"/>
                 </a:solidFill>
@@ -9253,7 +9253,7 @@
               <a:t>Come è possibile ottenere 150 CFU senza dare MDL? Propedeuticità?? I dati </a:t>
             </a:r>
             <a:r>
-              <a:rPr lang="it-IT" sz="1400" u="sng" dirty="0">
+              <a:rPr lang="it-IT" sz="1200" u="sng" dirty="0">
                 <a:solidFill>
                   <a:srgbClr val="FF0000"/>
                 </a:solidFill>
@@ -9261,14 +9261,14 @@
               <a:t>sono</a:t>
             </a:r>
             <a:r>
-              <a:rPr lang="it-IT" sz="1400" dirty="0">
+              <a:rPr lang="it-IT" sz="1200" dirty="0">
                 <a:solidFill>
                   <a:srgbClr val="FF0000"/>
                 </a:solidFill>
               </a:rPr>
               <a:t> corretti???</a:t>
             </a:r>
-            <a:endParaRPr lang="en-US" sz="1400" dirty="0">
+            <a:endParaRPr lang="en-US" sz="1200" dirty="0">
               <a:solidFill>
                 <a:srgbClr val="FF0000"/>
               </a:solidFill>
@@ -9290,6 +9290,1194 @@
 </file>
 
 <file path=ppt/slides/slide22.xml><?xml version="1.0" encoding="utf-8"?>
+<p:sld xmlns:a="http://schemas.openxmlformats.org/drawingml/2006/main" xmlns:r="http://schemas.openxmlformats.org/officeDocument/2006/relationships" xmlns:p="http://schemas.openxmlformats.org/presentationml/2006/main">
+  <p:cSld>
+    <p:spTree>
+      <p:nvGrpSpPr>
+        <p:cNvPr id="1" name=""/>
+        <p:cNvGrpSpPr/>
+        <p:nvPr/>
+      </p:nvGrpSpPr>
+      <p:grpSpPr>
+        <a:xfrm>
+          <a:off x="0" y="0"/>
+          <a:ext cx="0" cy="0"/>
+          <a:chOff x="0" y="0"/>
+          <a:chExt cx="0" cy="0"/>
+        </a:xfrm>
+      </p:grpSpPr>
+      <p:sp>
+        <p:nvSpPr>
+          <p:cNvPr id="2" name="Titolo 1">
+            <a:extLst>
+              <a:ext uri="{FF2B5EF4-FFF2-40B4-BE49-F238E27FC236}">
+                <a16:creationId xmlns:a16="http://schemas.microsoft.com/office/drawing/2014/main" id="{C344F19F-376F-4BFE-8DCC-729DB34448C6}"/>
+              </a:ext>
+            </a:extLst>
+          </p:cNvPr>
+          <p:cNvSpPr txBox="1">
+            <a:spLocks/>
+          </p:cNvSpPr>
+          <p:nvPr/>
+        </p:nvSpPr>
+        <p:spPr>
+          <a:xfrm>
+            <a:off x="1447800" y="152400"/>
+            <a:ext cx="8229600" cy="1143000"/>
+          </a:xfrm>
+          <a:prstGeom prst="rect">
+            <a:avLst/>
+          </a:prstGeom>
+        </p:spPr>
+        <p:txBody>
+          <a:bodyPr>
+            <a:noAutofit/>
+          </a:bodyPr>
+          <a:lstStyle>
+            <a:lvl1pPr algn="ctr" defTabSz="342900" rtl="0" eaLnBrk="1" latinLnBrk="0" hangingPunct="1">
+              <a:spcBef>
+                <a:spcPct val="0"/>
+              </a:spcBef>
+              <a:buNone/>
+              <a:defRPr sz="3300" kern="1200">
+                <a:solidFill>
+                  <a:schemeClr val="tx1"/>
+                </a:solidFill>
+                <a:latin typeface="+mj-lt"/>
+                <a:ea typeface="+mj-ea"/>
+                <a:cs typeface="+mj-cs"/>
+              </a:defRPr>
+            </a:lvl1pPr>
+          </a:lstStyle>
+          <a:p>
+            <a:r>
+              <a:rPr lang="it-IT" sz="2400" b="1" dirty="0">
+                <a:solidFill>
+                  <a:schemeClr val="bg1"/>
+                </a:solidFill>
+              </a:rPr>
+              <a:t>DATA UNDERSTANDING: </a:t>
+            </a:r>
+            <a:r>
+              <a:rPr lang="it-IT" sz="2400" dirty="0">
+                <a:solidFill>
+                  <a:schemeClr val="bg1"/>
+                </a:solidFill>
+              </a:rPr>
+              <a:t>DETTAGLIO M.D.L.</a:t>
+            </a:r>
+            <a:endParaRPr lang="en-US" sz="2400" dirty="0">
+              <a:solidFill>
+                <a:schemeClr val="bg1"/>
+              </a:solidFill>
+            </a:endParaRPr>
+          </a:p>
+        </p:txBody>
+      </p:sp>
+      <p:sp>
+        <p:nvSpPr>
+          <p:cNvPr id="5" name="CasellaDiTesto 4">
+            <a:extLst>
+              <a:ext uri="{FF2B5EF4-FFF2-40B4-BE49-F238E27FC236}">
+                <a16:creationId xmlns:a16="http://schemas.microsoft.com/office/drawing/2014/main" id="{7874969C-F4FA-477B-8991-D590C8411ED4}"/>
+              </a:ext>
+            </a:extLst>
+          </p:cNvPr>
+          <p:cNvSpPr txBox="1"/>
+          <p:nvPr/>
+        </p:nvSpPr>
+        <p:spPr>
+          <a:xfrm>
+            <a:off x="107504" y="860519"/>
+            <a:ext cx="2376264" cy="4862870"/>
+          </a:xfrm>
+          <a:prstGeom prst="rect">
+            <a:avLst/>
+          </a:prstGeom>
+          <a:noFill/>
+        </p:spPr>
+        <p:txBody>
+          <a:bodyPr wrap="square" rtlCol="0">
+            <a:spAutoFit/>
+          </a:bodyPr>
+          <a:lstStyle/>
+          <a:p>
+            <a:r>
+              <a:rPr lang="it-IT" sz="1600" dirty="0"/>
+              <a:t>Incrociando il voto conseguito in M.D.L. e la data in cui l’esame è stato superato, si riescono a notare due aspetti:</a:t>
+            </a:r>
+          </a:p>
+          <a:p>
+            <a:endParaRPr lang="it-IT" sz="1600" dirty="0"/>
+          </a:p>
+          <a:p>
+            <a:pPr marL="285750" indent="-285750">
+              <a:buFont typeface="Arial" panose="020B0604020202020204" pitchFamily="34" charset="0"/>
+              <a:buChar char="•"/>
+            </a:pPr>
+            <a:r>
+              <a:rPr lang="it-IT" sz="1600" dirty="0"/>
+              <a:t>Chi ha dato </a:t>
+            </a:r>
+            <a:r>
+              <a:rPr lang="it-IT" sz="1600" dirty="0">
+                <a:solidFill>
+                  <a:srgbClr val="00B050"/>
+                </a:solidFill>
+              </a:rPr>
+              <a:t>l’esame al primo appello </a:t>
+            </a:r>
+            <a:r>
+              <a:rPr lang="it-IT" sz="1600" dirty="0"/>
+              <a:t>del suo anno, ha conseguito </a:t>
+            </a:r>
+            <a:r>
+              <a:rPr lang="it-IT" sz="1600" dirty="0">
+                <a:solidFill>
+                  <a:srgbClr val="00B050"/>
+                </a:solidFill>
+              </a:rPr>
+              <a:t>un voto alto </a:t>
+            </a:r>
+            <a:r>
+              <a:rPr lang="it-IT" sz="1400" dirty="0"/>
+              <a:t>(si vedano ad esempio gli studenti dell’annata 2010)</a:t>
+            </a:r>
+            <a:endParaRPr lang="it-IT" sz="1600" dirty="0"/>
+          </a:p>
+          <a:p>
+            <a:pPr marL="285750" indent="-285750">
+              <a:buFont typeface="Arial" panose="020B0604020202020204" pitchFamily="34" charset="0"/>
+              <a:buChar char="•"/>
+            </a:pPr>
+            <a:r>
+              <a:rPr lang="it-IT" sz="1600" dirty="0"/>
+              <a:t>La maggioranza degli studenti ha </a:t>
+            </a:r>
+            <a:r>
+              <a:rPr lang="it-IT" sz="1600" dirty="0">
+                <a:solidFill>
+                  <a:srgbClr val="00B050"/>
+                </a:solidFill>
+              </a:rPr>
+              <a:t>superato M.D.L. qualche anno dopo </a:t>
+            </a:r>
+            <a:r>
+              <a:rPr lang="it-IT" sz="1600" dirty="0"/>
+              <a:t>il suo anno di immatricolazione </a:t>
+            </a:r>
+            <a:r>
+              <a:rPr lang="it-IT" sz="1400" dirty="0"/>
+              <a:t>(comportamento estremizzato dagli studenti di coorte 2012)</a:t>
+            </a:r>
+            <a:endParaRPr lang="en-US" sz="1600" dirty="0"/>
+          </a:p>
+        </p:txBody>
+      </p:sp>
+      <p:pic>
+        <p:nvPicPr>
+          <p:cNvPr id="6" name="Immagine 5">
+            <a:extLst>
+              <a:ext uri="{FF2B5EF4-FFF2-40B4-BE49-F238E27FC236}">
+                <a16:creationId xmlns:a16="http://schemas.microsoft.com/office/drawing/2014/main" id="{9458EE13-47D6-4D9A-8717-496F591F06B8}"/>
+              </a:ext>
+            </a:extLst>
+          </p:cNvPr>
+          <p:cNvPicPr>
+            <a:picLocks noChangeAspect="1"/>
+          </p:cNvPicPr>
+          <p:nvPr/>
+        </p:nvPicPr>
+        <p:blipFill rotWithShape="1">
+          <a:blip r:embed="rId2"/>
+          <a:srcRect l="5001" t="10567" r="5001" b="8314"/>
+          <a:stretch/>
+        </p:blipFill>
+        <p:spPr>
+          <a:xfrm>
+            <a:off x="2411760" y="795082"/>
+            <a:ext cx="6732240" cy="6059016"/>
+          </a:xfrm>
+          <a:prstGeom prst="rect">
+            <a:avLst/>
+          </a:prstGeom>
+        </p:spPr>
+      </p:pic>
+    </p:spTree>
+    <p:extLst>
+      <p:ext uri="{BB962C8B-B14F-4D97-AF65-F5344CB8AC3E}">
+        <p14:creationId xmlns:p14="http://schemas.microsoft.com/office/powerpoint/2010/main" val="3744216129"/>
+      </p:ext>
+    </p:extLst>
+  </p:cSld>
+  <p:clrMapOvr>
+    <a:masterClrMapping/>
+  </p:clrMapOvr>
+</p:sld>
+</file>
+
+<file path=ppt/slides/slide23.xml><?xml version="1.0" encoding="utf-8"?>
+<p:sld xmlns:a="http://schemas.openxmlformats.org/drawingml/2006/main" xmlns:r="http://schemas.openxmlformats.org/officeDocument/2006/relationships" xmlns:p="http://schemas.openxmlformats.org/presentationml/2006/main">
+  <p:cSld>
+    <p:spTree>
+      <p:nvGrpSpPr>
+        <p:cNvPr id="1" name=""/>
+        <p:cNvGrpSpPr/>
+        <p:nvPr/>
+      </p:nvGrpSpPr>
+      <p:grpSpPr>
+        <a:xfrm>
+          <a:off x="0" y="0"/>
+          <a:ext cx="0" cy="0"/>
+          <a:chOff x="0" y="0"/>
+          <a:chExt cx="0" cy="0"/>
+        </a:xfrm>
+      </p:grpSpPr>
+      <p:sp>
+        <p:nvSpPr>
+          <p:cNvPr id="2" name="Titolo 1">
+            <a:extLst>
+              <a:ext uri="{FF2B5EF4-FFF2-40B4-BE49-F238E27FC236}">
+                <a16:creationId xmlns:a16="http://schemas.microsoft.com/office/drawing/2014/main" id="{C344F19F-376F-4BFE-8DCC-729DB34448C6}"/>
+              </a:ext>
+            </a:extLst>
+          </p:cNvPr>
+          <p:cNvSpPr txBox="1">
+            <a:spLocks/>
+          </p:cNvSpPr>
+          <p:nvPr/>
+        </p:nvSpPr>
+        <p:spPr>
+          <a:xfrm>
+            <a:off x="1447800" y="152400"/>
+            <a:ext cx="8229600" cy="1143000"/>
+          </a:xfrm>
+          <a:prstGeom prst="rect">
+            <a:avLst/>
+          </a:prstGeom>
+        </p:spPr>
+        <p:txBody>
+          <a:bodyPr>
+            <a:noAutofit/>
+          </a:bodyPr>
+          <a:lstStyle>
+            <a:lvl1pPr algn="ctr" defTabSz="342900" rtl="0" eaLnBrk="1" latinLnBrk="0" hangingPunct="1">
+              <a:spcBef>
+                <a:spcPct val="0"/>
+              </a:spcBef>
+              <a:buNone/>
+              <a:defRPr sz="3300" kern="1200">
+                <a:solidFill>
+                  <a:schemeClr val="tx1"/>
+                </a:solidFill>
+                <a:latin typeface="+mj-lt"/>
+                <a:ea typeface="+mj-ea"/>
+                <a:cs typeface="+mj-cs"/>
+              </a:defRPr>
+            </a:lvl1pPr>
+          </a:lstStyle>
+          <a:p>
+            <a:r>
+              <a:rPr lang="it-IT" sz="2400" b="1" dirty="0">
+                <a:solidFill>
+                  <a:schemeClr val="bg1"/>
+                </a:solidFill>
+              </a:rPr>
+              <a:t>DATA UNDERSTANDING: </a:t>
+            </a:r>
+            <a:r>
+              <a:rPr lang="it-IT" sz="2400" dirty="0">
+                <a:solidFill>
+                  <a:schemeClr val="bg1"/>
+                </a:solidFill>
+              </a:rPr>
+              <a:t>DETTAGLIO A.D.E.</a:t>
+            </a:r>
+            <a:endParaRPr lang="en-US" sz="2400" dirty="0">
+              <a:solidFill>
+                <a:schemeClr val="bg1"/>
+              </a:solidFill>
+            </a:endParaRPr>
+          </a:p>
+        </p:txBody>
+      </p:sp>
+      <p:sp>
+        <p:nvSpPr>
+          <p:cNvPr id="5" name="CasellaDiTesto 4">
+            <a:extLst>
+              <a:ext uri="{FF2B5EF4-FFF2-40B4-BE49-F238E27FC236}">
+                <a16:creationId xmlns:a16="http://schemas.microsoft.com/office/drawing/2014/main" id="{7874969C-F4FA-477B-8991-D590C8411ED4}"/>
+              </a:ext>
+            </a:extLst>
+          </p:cNvPr>
+          <p:cNvSpPr txBox="1"/>
+          <p:nvPr/>
+        </p:nvSpPr>
+        <p:spPr>
+          <a:xfrm>
+            <a:off x="179512" y="1000467"/>
+            <a:ext cx="2376264" cy="5170646"/>
+          </a:xfrm>
+          <a:prstGeom prst="rect">
+            <a:avLst/>
+          </a:prstGeom>
+          <a:noFill/>
+        </p:spPr>
+        <p:txBody>
+          <a:bodyPr wrap="square" rtlCol="0">
+            <a:spAutoFit/>
+          </a:bodyPr>
+          <a:lstStyle/>
+          <a:p>
+            <a:r>
+              <a:rPr lang="it-IT" dirty="0"/>
+              <a:t>Nel caso di </a:t>
+            </a:r>
+            <a:r>
+              <a:rPr lang="it-IT" i="1" dirty="0"/>
+              <a:t>Architetture degli Elaboratori</a:t>
+            </a:r>
+            <a:r>
+              <a:rPr lang="it-IT" dirty="0"/>
+              <a:t>, le tendenze evidenziate prima sono mitigate.</a:t>
+            </a:r>
+          </a:p>
+          <a:p>
+            <a:endParaRPr lang="it-IT" dirty="0"/>
+          </a:p>
+          <a:p>
+            <a:r>
+              <a:rPr lang="it-IT" dirty="0"/>
+              <a:t>Rimane comunque importante la quantità di studenti che hanno conseguito molti crediti senza superare l’esame di </a:t>
+            </a:r>
+            <a:r>
+              <a:rPr lang="it-IT" dirty="0" err="1"/>
+              <a:t>A.d.E</a:t>
+            </a:r>
+            <a:r>
+              <a:rPr lang="it-IT" dirty="0"/>
+              <a:t>: si potrebbe speculare che l’ignorare esami difficili sia una pratica comune nel pool di studenti descritti dal dataset.</a:t>
+            </a:r>
+          </a:p>
+          <a:p>
+            <a:endParaRPr lang="it-IT" sz="1200" dirty="0">
+              <a:solidFill>
+                <a:srgbClr val="FF0000"/>
+              </a:solidFill>
+            </a:endParaRPr>
+          </a:p>
+          <a:p>
+            <a:endParaRPr lang="it-IT" sz="1200" dirty="0">
+              <a:solidFill>
+                <a:srgbClr val="FF0000"/>
+              </a:solidFill>
+            </a:endParaRPr>
+          </a:p>
+        </p:txBody>
+      </p:sp>
+      <p:pic>
+        <p:nvPicPr>
+          <p:cNvPr id="7" name="Immagine 6">
+            <a:extLst>
+              <a:ext uri="{FF2B5EF4-FFF2-40B4-BE49-F238E27FC236}">
+                <a16:creationId xmlns:a16="http://schemas.microsoft.com/office/drawing/2014/main" id="{620D3825-6CEE-4DC3-80C0-2B4DE9BAFB11}"/>
+              </a:ext>
+            </a:extLst>
+          </p:cNvPr>
+          <p:cNvPicPr>
+            <a:picLocks noChangeAspect="1"/>
+          </p:cNvPicPr>
+          <p:nvPr/>
+        </p:nvPicPr>
+        <p:blipFill rotWithShape="1">
+          <a:blip r:embed="rId2"/>
+          <a:srcRect t="10567" r="5001" b="2532"/>
+          <a:stretch/>
+        </p:blipFill>
+        <p:spPr>
+          <a:xfrm>
+            <a:off x="2555776" y="862748"/>
+            <a:ext cx="6554398" cy="5986717"/>
+          </a:xfrm>
+          <a:prstGeom prst="rect">
+            <a:avLst/>
+          </a:prstGeom>
+        </p:spPr>
+      </p:pic>
+    </p:spTree>
+    <p:extLst>
+      <p:ext uri="{BB962C8B-B14F-4D97-AF65-F5344CB8AC3E}">
+        <p14:creationId xmlns:p14="http://schemas.microsoft.com/office/powerpoint/2010/main" val="610790509"/>
+      </p:ext>
+    </p:extLst>
+  </p:cSld>
+  <p:clrMapOvr>
+    <a:masterClrMapping/>
+  </p:clrMapOvr>
+</p:sld>
+</file>
+
+<file path=ppt/slides/slide24.xml><?xml version="1.0" encoding="utf-8"?>
+<p:sld xmlns:a="http://schemas.openxmlformats.org/drawingml/2006/main" xmlns:r="http://schemas.openxmlformats.org/officeDocument/2006/relationships" xmlns:p="http://schemas.openxmlformats.org/presentationml/2006/main">
+  <p:cSld>
+    <p:spTree>
+      <p:nvGrpSpPr>
+        <p:cNvPr id="1" name=""/>
+        <p:cNvGrpSpPr/>
+        <p:nvPr/>
+      </p:nvGrpSpPr>
+      <p:grpSpPr>
+        <a:xfrm>
+          <a:off x="0" y="0"/>
+          <a:ext cx="0" cy="0"/>
+          <a:chOff x="0" y="0"/>
+          <a:chExt cx="0" cy="0"/>
+        </a:xfrm>
+      </p:grpSpPr>
+      <p:sp>
+        <p:nvSpPr>
+          <p:cNvPr id="3" name="Titolo 1">
+            <a:extLst>
+              <a:ext uri="{FF2B5EF4-FFF2-40B4-BE49-F238E27FC236}">
+                <a16:creationId xmlns:a16="http://schemas.microsoft.com/office/drawing/2014/main" id="{9E74EE39-EA32-4246-BC63-84D8E46682AC}"/>
+              </a:ext>
+            </a:extLst>
+          </p:cNvPr>
+          <p:cNvSpPr txBox="1">
+            <a:spLocks/>
+          </p:cNvSpPr>
+          <p:nvPr/>
+        </p:nvSpPr>
+        <p:spPr>
+          <a:xfrm>
+            <a:off x="1447800" y="152400"/>
+            <a:ext cx="8229600" cy="1143000"/>
+          </a:xfrm>
+          <a:prstGeom prst="rect">
+            <a:avLst/>
+          </a:prstGeom>
+        </p:spPr>
+        <p:txBody>
+          <a:bodyPr>
+            <a:noAutofit/>
+          </a:bodyPr>
+          <a:lstStyle>
+            <a:lvl1pPr algn="ctr" defTabSz="342900" rtl="0" eaLnBrk="1" latinLnBrk="0" hangingPunct="1">
+              <a:spcBef>
+                <a:spcPct val="0"/>
+              </a:spcBef>
+              <a:buNone/>
+              <a:defRPr sz="3300" kern="1200">
+                <a:solidFill>
+                  <a:schemeClr val="tx1"/>
+                </a:solidFill>
+                <a:latin typeface="+mj-lt"/>
+                <a:ea typeface="+mj-ea"/>
+                <a:cs typeface="+mj-cs"/>
+              </a:defRPr>
+            </a:lvl1pPr>
+          </a:lstStyle>
+          <a:p>
+            <a:r>
+              <a:rPr lang="it-IT" sz="2400" b="1" dirty="0">
+                <a:solidFill>
+                  <a:schemeClr val="bg1"/>
+                </a:solidFill>
+              </a:rPr>
+              <a:t>DATA UNDERSTANDING: </a:t>
+            </a:r>
+            <a:r>
+              <a:rPr lang="it-IT" sz="2400" dirty="0">
+                <a:solidFill>
+                  <a:schemeClr val="bg1"/>
+                </a:solidFill>
+              </a:rPr>
+              <a:t>ESAMI DI INFORAMTICA</a:t>
+            </a:r>
+            <a:endParaRPr lang="en-US" sz="2400" dirty="0">
+              <a:solidFill>
+                <a:schemeClr val="bg1"/>
+              </a:solidFill>
+            </a:endParaRPr>
+          </a:p>
+        </p:txBody>
+      </p:sp>
+      <p:pic>
+        <p:nvPicPr>
+          <p:cNvPr id="4" name="Immagine 3">
+            <a:extLst>
+              <a:ext uri="{FF2B5EF4-FFF2-40B4-BE49-F238E27FC236}">
+                <a16:creationId xmlns:a16="http://schemas.microsoft.com/office/drawing/2014/main" id="{DDAB6CB2-835E-4883-A81D-1C56D77A1786}"/>
+              </a:ext>
+            </a:extLst>
+          </p:cNvPr>
+          <p:cNvPicPr>
+            <a:picLocks noChangeAspect="1"/>
+          </p:cNvPicPr>
+          <p:nvPr/>
+        </p:nvPicPr>
+        <p:blipFill rotWithShape="1">
+          <a:blip r:embed="rId2"/>
+          <a:srcRect l="1963" t="1928" r="1963" b="2461"/>
+          <a:stretch/>
+        </p:blipFill>
+        <p:spPr>
+          <a:xfrm>
+            <a:off x="0" y="797096"/>
+            <a:ext cx="9141804" cy="6060904"/>
+          </a:xfrm>
+          <a:prstGeom prst="rect">
+            <a:avLst/>
+          </a:prstGeom>
+        </p:spPr>
+      </p:pic>
+    </p:spTree>
+    <p:extLst>
+      <p:ext uri="{BB962C8B-B14F-4D97-AF65-F5344CB8AC3E}">
+        <p14:creationId xmlns:p14="http://schemas.microsoft.com/office/powerpoint/2010/main" val="2780798289"/>
+      </p:ext>
+    </p:extLst>
+  </p:cSld>
+  <p:clrMapOvr>
+    <a:masterClrMapping/>
+  </p:clrMapOvr>
+</p:sld>
+</file>
+
+<file path=ppt/slides/slide25.xml><?xml version="1.0" encoding="utf-8"?>
+<p:sld xmlns:a="http://schemas.openxmlformats.org/drawingml/2006/main" xmlns:r="http://schemas.openxmlformats.org/officeDocument/2006/relationships" xmlns:p="http://schemas.openxmlformats.org/presentationml/2006/main">
+  <p:cSld>
+    <p:spTree>
+      <p:nvGrpSpPr>
+        <p:cNvPr id="1" name=""/>
+        <p:cNvGrpSpPr/>
+        <p:nvPr/>
+      </p:nvGrpSpPr>
+      <p:grpSpPr>
+        <a:xfrm>
+          <a:off x="0" y="0"/>
+          <a:ext cx="0" cy="0"/>
+          <a:chOff x="0" y="0"/>
+          <a:chExt cx="0" cy="0"/>
+        </a:xfrm>
+      </p:grpSpPr>
+      <p:sp>
+        <p:nvSpPr>
+          <p:cNvPr id="5" name="Titolo 1">
+            <a:extLst>
+              <a:ext uri="{FF2B5EF4-FFF2-40B4-BE49-F238E27FC236}">
+                <a16:creationId xmlns:a16="http://schemas.microsoft.com/office/drawing/2014/main" id="{C10C2703-479C-4CF4-AAB8-5A2255C45AF9}"/>
+              </a:ext>
+            </a:extLst>
+          </p:cNvPr>
+          <p:cNvSpPr txBox="1">
+            <a:spLocks/>
+          </p:cNvSpPr>
+          <p:nvPr/>
+        </p:nvSpPr>
+        <p:spPr>
+          <a:xfrm>
+            <a:off x="1447800" y="152400"/>
+            <a:ext cx="8229600" cy="1143000"/>
+          </a:xfrm>
+          <a:prstGeom prst="rect">
+            <a:avLst/>
+          </a:prstGeom>
+        </p:spPr>
+        <p:txBody>
+          <a:bodyPr>
+            <a:noAutofit/>
+          </a:bodyPr>
+          <a:lstStyle>
+            <a:lvl1pPr algn="ctr" defTabSz="342900" rtl="0" eaLnBrk="1" latinLnBrk="0" hangingPunct="1">
+              <a:spcBef>
+                <a:spcPct val="0"/>
+              </a:spcBef>
+              <a:buNone/>
+              <a:defRPr sz="3300" kern="1200">
+                <a:solidFill>
+                  <a:schemeClr val="tx1"/>
+                </a:solidFill>
+                <a:latin typeface="+mj-lt"/>
+                <a:ea typeface="+mj-ea"/>
+                <a:cs typeface="+mj-cs"/>
+              </a:defRPr>
+            </a:lvl1pPr>
+          </a:lstStyle>
+          <a:p>
+            <a:r>
+              <a:rPr lang="it-IT" sz="2400" b="1" dirty="0">
+                <a:solidFill>
+                  <a:schemeClr val="bg1"/>
+                </a:solidFill>
+              </a:rPr>
+              <a:t>DATA UNDERSTANDING: </a:t>
+            </a:r>
+            <a:r>
+              <a:rPr lang="it-IT" sz="2400" dirty="0">
+                <a:solidFill>
+                  <a:schemeClr val="bg1"/>
+                </a:solidFill>
+              </a:rPr>
+              <a:t>ESAMI DI INFORAMTICA</a:t>
+            </a:r>
+            <a:endParaRPr lang="en-US" sz="2400" dirty="0">
+              <a:solidFill>
+                <a:schemeClr val="bg1"/>
+              </a:solidFill>
+            </a:endParaRPr>
+          </a:p>
+        </p:txBody>
+      </p:sp>
+      <p:pic>
+        <p:nvPicPr>
+          <p:cNvPr id="6" name="Immagine 5">
+            <a:extLst>
+              <a:ext uri="{FF2B5EF4-FFF2-40B4-BE49-F238E27FC236}">
+                <a16:creationId xmlns:a16="http://schemas.microsoft.com/office/drawing/2014/main" id="{7B230C2C-FFE4-446A-9950-E9347D7D05AB}"/>
+              </a:ext>
+            </a:extLst>
+          </p:cNvPr>
+          <p:cNvPicPr>
+            <a:picLocks noChangeAspect="1"/>
+          </p:cNvPicPr>
+          <p:nvPr/>
+        </p:nvPicPr>
+        <p:blipFill rotWithShape="1">
+          <a:blip r:embed="rId2"/>
+          <a:srcRect l="9838" t="1567" r="5901" b="6360"/>
+          <a:stretch/>
+        </p:blipFill>
+        <p:spPr>
+          <a:xfrm>
+            <a:off x="1809564" y="836712"/>
+            <a:ext cx="7344816" cy="5937857"/>
+          </a:xfrm>
+          <a:prstGeom prst="rect">
+            <a:avLst/>
+          </a:prstGeom>
+        </p:spPr>
+      </p:pic>
+      <p:sp>
+        <p:nvSpPr>
+          <p:cNvPr id="8" name="CasellaDiTesto 7">
+            <a:extLst>
+              <a:ext uri="{FF2B5EF4-FFF2-40B4-BE49-F238E27FC236}">
+                <a16:creationId xmlns:a16="http://schemas.microsoft.com/office/drawing/2014/main" id="{8834E3B8-21D8-45DE-8FE9-9B887BB61C46}"/>
+              </a:ext>
+            </a:extLst>
+          </p:cNvPr>
+          <p:cNvSpPr txBox="1"/>
+          <p:nvPr/>
+        </p:nvSpPr>
+        <p:spPr>
+          <a:xfrm>
+            <a:off x="35496" y="980728"/>
+            <a:ext cx="1863198" cy="4247317"/>
+          </a:xfrm>
+          <a:prstGeom prst="rect">
+            <a:avLst/>
+          </a:prstGeom>
+          <a:noFill/>
+        </p:spPr>
+        <p:txBody>
+          <a:bodyPr wrap="square" rtlCol="0">
+            <a:spAutoFit/>
+          </a:bodyPr>
+          <a:lstStyle/>
+          <a:p>
+            <a:r>
+              <a:rPr lang="it-IT" dirty="0"/>
+              <a:t>Si nota che le correlazioni sono meno spostate verso valori estremi dello spettro di analisi: gli item del dataset, rispetto a questo gruppo di esami, sono più «sparsi» rispetto a quelli presenti nell’insieme di esami del primo anno.</a:t>
+            </a:r>
+            <a:endParaRPr lang="en-US" dirty="0"/>
+          </a:p>
+        </p:txBody>
+      </p:sp>
+    </p:spTree>
+    <p:extLst>
+      <p:ext uri="{BB962C8B-B14F-4D97-AF65-F5344CB8AC3E}">
+        <p14:creationId xmlns:p14="http://schemas.microsoft.com/office/powerpoint/2010/main" val="3418713670"/>
+      </p:ext>
+    </p:extLst>
+  </p:cSld>
+  <p:clrMapOvr>
+    <a:masterClrMapping/>
+  </p:clrMapOvr>
+</p:sld>
+</file>
+
+<file path=ppt/slides/slide26.xml><?xml version="1.0" encoding="utf-8"?>
+<p:sld xmlns:a="http://schemas.openxmlformats.org/drawingml/2006/main" xmlns:r="http://schemas.openxmlformats.org/officeDocument/2006/relationships" xmlns:p="http://schemas.openxmlformats.org/presentationml/2006/main">
+  <p:cSld>
+    <p:spTree>
+      <p:nvGrpSpPr>
+        <p:cNvPr id="1" name=""/>
+        <p:cNvGrpSpPr/>
+        <p:nvPr/>
+      </p:nvGrpSpPr>
+      <p:grpSpPr>
+        <a:xfrm>
+          <a:off x="0" y="0"/>
+          <a:ext cx="0" cy="0"/>
+          <a:chOff x="0" y="0"/>
+          <a:chExt cx="0" cy="0"/>
+        </a:xfrm>
+      </p:grpSpPr>
+      <p:sp>
+        <p:nvSpPr>
+          <p:cNvPr id="5" name="Titolo 1">
+            <a:extLst>
+              <a:ext uri="{FF2B5EF4-FFF2-40B4-BE49-F238E27FC236}">
+                <a16:creationId xmlns:a16="http://schemas.microsoft.com/office/drawing/2014/main" id="{C10C2703-479C-4CF4-AAB8-5A2255C45AF9}"/>
+              </a:ext>
+            </a:extLst>
+          </p:cNvPr>
+          <p:cNvSpPr txBox="1">
+            <a:spLocks/>
+          </p:cNvSpPr>
+          <p:nvPr/>
+        </p:nvSpPr>
+        <p:spPr>
+          <a:xfrm>
+            <a:off x="1447800" y="152400"/>
+            <a:ext cx="8229600" cy="1143000"/>
+          </a:xfrm>
+          <a:prstGeom prst="rect">
+            <a:avLst/>
+          </a:prstGeom>
+        </p:spPr>
+        <p:txBody>
+          <a:bodyPr>
+            <a:noAutofit/>
+          </a:bodyPr>
+          <a:lstStyle>
+            <a:lvl1pPr algn="ctr" defTabSz="342900" rtl="0" eaLnBrk="1" latinLnBrk="0" hangingPunct="1">
+              <a:spcBef>
+                <a:spcPct val="0"/>
+              </a:spcBef>
+              <a:buNone/>
+              <a:defRPr sz="3300" kern="1200">
+                <a:solidFill>
+                  <a:schemeClr val="tx1"/>
+                </a:solidFill>
+                <a:latin typeface="+mj-lt"/>
+                <a:ea typeface="+mj-ea"/>
+                <a:cs typeface="+mj-cs"/>
+              </a:defRPr>
+            </a:lvl1pPr>
+          </a:lstStyle>
+          <a:p>
+            <a:r>
+              <a:rPr lang="it-IT" sz="2400" b="1" dirty="0">
+                <a:solidFill>
+                  <a:schemeClr val="bg1"/>
+                </a:solidFill>
+              </a:rPr>
+              <a:t>DATA UNDERSTANDING: </a:t>
+            </a:r>
+            <a:r>
+              <a:rPr lang="it-IT" sz="2400" dirty="0">
+                <a:solidFill>
+                  <a:schemeClr val="bg1"/>
+                </a:solidFill>
+              </a:rPr>
+              <a:t>ESAMI DI INFORAMTICA</a:t>
+            </a:r>
+            <a:endParaRPr lang="en-US" sz="2400" dirty="0">
+              <a:solidFill>
+                <a:schemeClr val="bg1"/>
+              </a:solidFill>
+            </a:endParaRPr>
+          </a:p>
+        </p:txBody>
+      </p:sp>
+      <p:sp>
+        <p:nvSpPr>
+          <p:cNvPr id="8" name="CasellaDiTesto 7">
+            <a:extLst>
+              <a:ext uri="{FF2B5EF4-FFF2-40B4-BE49-F238E27FC236}">
+                <a16:creationId xmlns:a16="http://schemas.microsoft.com/office/drawing/2014/main" id="{8834E3B8-21D8-45DE-8FE9-9B887BB61C46}"/>
+              </a:ext>
+            </a:extLst>
+          </p:cNvPr>
+          <p:cNvSpPr txBox="1"/>
+          <p:nvPr/>
+        </p:nvSpPr>
+        <p:spPr>
+          <a:xfrm>
+            <a:off x="251518" y="908720"/>
+            <a:ext cx="2736306" cy="3539430"/>
+          </a:xfrm>
+          <a:prstGeom prst="rect">
+            <a:avLst/>
+          </a:prstGeom>
+          <a:noFill/>
+        </p:spPr>
+        <p:txBody>
+          <a:bodyPr wrap="square" rtlCol="0">
+            <a:spAutoFit/>
+          </a:bodyPr>
+          <a:lstStyle/>
+          <a:p>
+            <a:r>
+              <a:rPr lang="it-IT" sz="1600" dirty="0"/>
+              <a:t>Con l’avvicinarsi agli esami del terzo anno – eccezione fatta per </a:t>
+            </a:r>
+            <a:r>
+              <a:rPr lang="it-IT" sz="1600" i="1" dirty="0"/>
+              <a:t>Architetture degli Elaboratori </a:t>
+            </a:r>
+            <a:r>
+              <a:rPr lang="it-IT" sz="1600" dirty="0"/>
+              <a:t>– si nota che il voto  conseguito da ogni studente tende a discostarsi sempre meno dalla media.</a:t>
+            </a:r>
+          </a:p>
+          <a:p>
+            <a:endParaRPr lang="it-IT" sz="1600" dirty="0"/>
+          </a:p>
+          <a:p>
+            <a:r>
+              <a:rPr lang="it-IT" sz="1600" dirty="0"/>
+              <a:t>Si noti come per </a:t>
+            </a:r>
+            <a:r>
+              <a:rPr lang="it-IT" sz="1600" i="1" dirty="0"/>
+              <a:t>Informatica Teorica</a:t>
+            </a:r>
+            <a:r>
+              <a:rPr lang="it-IT" sz="1600" dirty="0"/>
+              <a:t>, notoriamente l’esame più ostico dell’intero </a:t>
+            </a:r>
+            <a:r>
+              <a:rPr lang="it-IT" sz="1600" dirty="0" err="1"/>
+              <a:t>CdL</a:t>
+            </a:r>
+            <a:r>
+              <a:rPr lang="it-IT" sz="1600" dirty="0"/>
+              <a:t>, i pochi studenti che lo superano risultano ampiamente </a:t>
+            </a:r>
+            <a:r>
+              <a:rPr lang="it-IT" sz="1600" u="sng" dirty="0"/>
+              <a:t>sopra la media</a:t>
+            </a:r>
+            <a:r>
+              <a:rPr lang="it-IT" sz="1600" b="1" u="sng" dirty="0"/>
+              <a:t>*</a:t>
+            </a:r>
+            <a:r>
+              <a:rPr lang="it-IT" sz="1600" dirty="0"/>
+              <a:t>:</a:t>
+            </a:r>
+            <a:endParaRPr lang="en-US" sz="1600" dirty="0"/>
+          </a:p>
+        </p:txBody>
+      </p:sp>
+      <p:pic>
+        <p:nvPicPr>
+          <p:cNvPr id="3" name="Immagine 2">
+            <a:extLst>
+              <a:ext uri="{FF2B5EF4-FFF2-40B4-BE49-F238E27FC236}">
+                <a16:creationId xmlns:a16="http://schemas.microsoft.com/office/drawing/2014/main" id="{46AE51FB-8A1D-4822-A152-48C2F3ACE934}"/>
+              </a:ext>
+            </a:extLst>
+          </p:cNvPr>
+          <p:cNvPicPr>
+            <a:picLocks noChangeAspect="1"/>
+          </p:cNvPicPr>
+          <p:nvPr/>
+        </p:nvPicPr>
+        <p:blipFill rotWithShape="1">
+          <a:blip r:embed="rId2"/>
+          <a:srcRect l="14873" t="9187" r="11207" b="3806"/>
+          <a:stretch/>
+        </p:blipFill>
+        <p:spPr>
+          <a:xfrm>
+            <a:off x="3059833" y="842147"/>
+            <a:ext cx="6084168" cy="6014111"/>
+          </a:xfrm>
+          <a:prstGeom prst="rect">
+            <a:avLst/>
+          </a:prstGeom>
+        </p:spPr>
+      </p:pic>
+      <p:pic>
+        <p:nvPicPr>
+          <p:cNvPr id="4" name="Immagine 3">
+            <a:extLst>
+              <a:ext uri="{FF2B5EF4-FFF2-40B4-BE49-F238E27FC236}">
+                <a16:creationId xmlns:a16="http://schemas.microsoft.com/office/drawing/2014/main" id="{385FEB4C-BBD5-48F4-848A-17A28F5B1A67}"/>
+              </a:ext>
+            </a:extLst>
+          </p:cNvPr>
+          <p:cNvPicPr>
+            <a:picLocks noChangeAspect="1"/>
+          </p:cNvPicPr>
+          <p:nvPr/>
+        </p:nvPicPr>
+        <p:blipFill>
+          <a:blip r:embed="rId3"/>
+          <a:stretch>
+            <a:fillRect/>
+          </a:stretch>
+        </p:blipFill>
+        <p:spPr>
+          <a:xfrm>
+            <a:off x="792562" y="4448150"/>
+            <a:ext cx="1789784" cy="1827332"/>
+          </a:xfrm>
+          <a:prstGeom prst="rect">
+            <a:avLst/>
+          </a:prstGeom>
+        </p:spPr>
+      </p:pic>
+      <p:sp>
+        <p:nvSpPr>
+          <p:cNvPr id="7" name="CasellaDiTesto 6">
+            <a:extLst>
+              <a:ext uri="{FF2B5EF4-FFF2-40B4-BE49-F238E27FC236}">
+                <a16:creationId xmlns:a16="http://schemas.microsoft.com/office/drawing/2014/main" id="{326F753B-F4BC-49D8-A98B-ADE5E730E776}"/>
+              </a:ext>
+            </a:extLst>
+          </p:cNvPr>
+          <p:cNvSpPr txBox="1"/>
+          <p:nvPr/>
+        </p:nvSpPr>
+        <p:spPr>
+          <a:xfrm>
+            <a:off x="156792" y="6396335"/>
+            <a:ext cx="2664297" cy="461665"/>
+          </a:xfrm>
+          <a:prstGeom prst="rect">
+            <a:avLst/>
+          </a:prstGeom>
+          <a:noFill/>
+        </p:spPr>
+        <p:txBody>
+          <a:bodyPr wrap="square" rtlCol="0">
+            <a:spAutoFit/>
+          </a:bodyPr>
+          <a:lstStyle/>
+          <a:p>
+            <a:r>
+              <a:rPr lang="it-IT" sz="1200" b="1" dirty="0">
+                <a:solidFill>
+                  <a:srgbClr val="FF0000"/>
+                </a:solidFill>
+              </a:rPr>
+              <a:t>*</a:t>
+            </a:r>
+            <a:r>
+              <a:rPr lang="it-IT" sz="1200" dirty="0">
+                <a:solidFill>
+                  <a:srgbClr val="FF0000"/>
+                </a:solidFill>
+              </a:rPr>
+              <a:t> calcolata considerando pari a 0 il voto di chi non ha dato/superato l’esame!</a:t>
+            </a:r>
+            <a:endParaRPr lang="en-US" sz="1200" dirty="0">
+              <a:solidFill>
+                <a:srgbClr val="FF0000"/>
+              </a:solidFill>
+            </a:endParaRPr>
+          </a:p>
+        </p:txBody>
+      </p:sp>
+    </p:spTree>
+    <p:extLst>
+      <p:ext uri="{BB962C8B-B14F-4D97-AF65-F5344CB8AC3E}">
+        <p14:creationId xmlns:p14="http://schemas.microsoft.com/office/powerpoint/2010/main" val="230562184"/>
+      </p:ext>
+    </p:extLst>
+  </p:cSld>
+  <p:clrMapOvr>
+    <a:masterClrMapping/>
+  </p:clrMapOvr>
+</p:sld>
+</file>
+
+<file path=ppt/slides/slide27.xml><?xml version="1.0" encoding="utf-8"?>
+<p:sld xmlns:a="http://schemas.openxmlformats.org/drawingml/2006/main" xmlns:r="http://schemas.openxmlformats.org/officeDocument/2006/relationships" xmlns:p="http://schemas.openxmlformats.org/presentationml/2006/main">
+  <p:cSld>
+    <p:spTree>
+      <p:nvGrpSpPr>
+        <p:cNvPr id="1" name=""/>
+        <p:cNvGrpSpPr/>
+        <p:nvPr/>
+      </p:nvGrpSpPr>
+      <p:grpSpPr>
+        <a:xfrm>
+          <a:off x="0" y="0"/>
+          <a:ext cx="0" cy="0"/>
+          <a:chOff x="0" y="0"/>
+          <a:chExt cx="0" cy="0"/>
+        </a:xfrm>
+      </p:grpSpPr>
+      <p:sp>
+        <p:nvSpPr>
+          <p:cNvPr id="3" name="Titolo 1">
+            <a:extLst>
+              <a:ext uri="{FF2B5EF4-FFF2-40B4-BE49-F238E27FC236}">
+                <a16:creationId xmlns:a16="http://schemas.microsoft.com/office/drawing/2014/main" id="{9E74EE39-EA32-4246-BC63-84D8E46682AC}"/>
+              </a:ext>
+            </a:extLst>
+          </p:cNvPr>
+          <p:cNvSpPr txBox="1">
+            <a:spLocks/>
+          </p:cNvSpPr>
+          <p:nvPr/>
+        </p:nvSpPr>
+        <p:spPr>
+          <a:xfrm>
+            <a:off x="1447800" y="152400"/>
+            <a:ext cx="8229600" cy="1143000"/>
+          </a:xfrm>
+          <a:prstGeom prst="rect">
+            <a:avLst/>
+          </a:prstGeom>
+        </p:spPr>
+        <p:txBody>
+          <a:bodyPr>
+            <a:noAutofit/>
+          </a:bodyPr>
+          <a:lstStyle>
+            <a:lvl1pPr algn="ctr" defTabSz="342900" rtl="0" eaLnBrk="1" latinLnBrk="0" hangingPunct="1">
+              <a:spcBef>
+                <a:spcPct val="0"/>
+              </a:spcBef>
+              <a:buNone/>
+              <a:defRPr sz="3300" kern="1200">
+                <a:solidFill>
+                  <a:schemeClr val="tx1"/>
+                </a:solidFill>
+                <a:latin typeface="+mj-lt"/>
+                <a:ea typeface="+mj-ea"/>
+                <a:cs typeface="+mj-cs"/>
+              </a:defRPr>
+            </a:lvl1pPr>
+          </a:lstStyle>
+          <a:p>
+            <a:r>
+              <a:rPr lang="it-IT" sz="2400" b="1" dirty="0">
+                <a:solidFill>
+                  <a:schemeClr val="bg1"/>
+                </a:solidFill>
+              </a:rPr>
+              <a:t>DATA UNDERSTANDING: </a:t>
+            </a:r>
+            <a:r>
+              <a:rPr lang="it-IT" sz="2400" dirty="0">
+                <a:solidFill>
+                  <a:schemeClr val="bg1"/>
+                </a:solidFill>
+              </a:rPr>
+              <a:t>ESAMI DI MATEMATICA</a:t>
+            </a:r>
+            <a:endParaRPr lang="en-US" sz="2400" dirty="0">
+              <a:solidFill>
+                <a:schemeClr val="bg1"/>
+              </a:solidFill>
+            </a:endParaRPr>
+          </a:p>
+        </p:txBody>
+      </p:sp>
+      <p:pic>
+        <p:nvPicPr>
+          <p:cNvPr id="5" name="Immagine 4">
+            <a:extLst>
+              <a:ext uri="{FF2B5EF4-FFF2-40B4-BE49-F238E27FC236}">
+                <a16:creationId xmlns:a16="http://schemas.microsoft.com/office/drawing/2014/main" id="{B4B3C881-0701-4521-8412-982149D31A0D}"/>
+              </a:ext>
+            </a:extLst>
+          </p:cNvPr>
+          <p:cNvPicPr>
+            <a:picLocks noChangeAspect="1"/>
+          </p:cNvPicPr>
+          <p:nvPr/>
+        </p:nvPicPr>
+        <p:blipFill rotWithShape="1">
+          <a:blip r:embed="rId2"/>
+          <a:srcRect l="2750" t="3343" r="1963" b="3343"/>
+          <a:stretch/>
+        </p:blipFill>
+        <p:spPr>
+          <a:xfrm>
+            <a:off x="1288" y="764704"/>
+            <a:ext cx="9144000" cy="6093296"/>
+          </a:xfrm>
+          <a:prstGeom prst="rect">
+            <a:avLst/>
+          </a:prstGeom>
+        </p:spPr>
+      </p:pic>
+      <p:sp>
+        <p:nvSpPr>
+          <p:cNvPr id="6" name="CasellaDiTesto 5">
+            <a:extLst>
+              <a:ext uri="{FF2B5EF4-FFF2-40B4-BE49-F238E27FC236}">
+                <a16:creationId xmlns:a16="http://schemas.microsoft.com/office/drawing/2014/main" id="{08DE6B2F-C638-43AA-B074-2F2BE8803629}"/>
+              </a:ext>
+            </a:extLst>
+          </p:cNvPr>
+          <p:cNvSpPr txBox="1"/>
+          <p:nvPr/>
+        </p:nvSpPr>
+        <p:spPr>
+          <a:xfrm>
+            <a:off x="35496" y="5517232"/>
+            <a:ext cx="5904656" cy="1354217"/>
+          </a:xfrm>
+          <a:prstGeom prst="rect">
+            <a:avLst/>
+          </a:prstGeom>
+          <a:noFill/>
+        </p:spPr>
+        <p:txBody>
+          <a:bodyPr wrap="square" rtlCol="0">
+            <a:spAutoFit/>
+          </a:bodyPr>
+          <a:lstStyle/>
+          <a:p>
+            <a:r>
+              <a:rPr lang="it-IT" dirty="0"/>
+              <a:t>Un aspetto che balza immediatamente alla vista è l’enorme quantità di studenti che ha conseguito 18 ad </a:t>
+            </a:r>
+            <a:r>
+              <a:rPr lang="it-IT" i="1" dirty="0"/>
+              <a:t>Analisi 2</a:t>
+            </a:r>
+            <a:r>
+              <a:rPr lang="it-IT" dirty="0"/>
+              <a:t>.</a:t>
+            </a:r>
+          </a:p>
+          <a:p>
+            <a:endParaRPr lang="it-IT" dirty="0"/>
+          </a:p>
+          <a:p>
+            <a:r>
+              <a:rPr lang="it-IT" sz="1400" i="1" dirty="0"/>
+              <a:t>N.d.A. : se il dataset comprendesse dati della coorte 2015, anche l’autore sarebbe fra quei 18.</a:t>
+            </a:r>
+            <a:endParaRPr lang="en-US" sz="1400" i="1" dirty="0"/>
+          </a:p>
+        </p:txBody>
+      </p:sp>
+    </p:spTree>
+    <p:extLst>
+      <p:ext uri="{BB962C8B-B14F-4D97-AF65-F5344CB8AC3E}">
+        <p14:creationId xmlns:p14="http://schemas.microsoft.com/office/powerpoint/2010/main" val="1638393315"/>
+      </p:ext>
+    </p:extLst>
+  </p:cSld>
+  <p:clrMapOvr>
+    <a:masterClrMapping/>
+  </p:clrMapOvr>
+</p:sld>
+</file>
+
+<file path=ppt/slides/slide28.xml><?xml version="1.0" encoding="utf-8"?>
 <p:sld xmlns:a="http://schemas.openxmlformats.org/drawingml/2006/main" xmlns:r="http://schemas.openxmlformats.org/officeDocument/2006/relationships" xmlns:p="http://schemas.openxmlformats.org/presentationml/2006/main">
   <p:cSld>
     <p:spTree>
@@ -9378,26 +10566,14 @@
             </a:r>
           </a:p>
           <a:p>
-            <a:pPr lvl="1" algn="just"/>
-            <a:r>
-              <a:rPr lang="it-IT" dirty="0">
-                <a:solidFill>
-                  <a:srgbClr val="00B0F0"/>
-                </a:solidFill>
-              </a:rPr>
-              <a:t>Risultati degli esami del primo anno</a:t>
-            </a:r>
-          </a:p>
-          <a:p>
-            <a:pPr lvl="1" algn="just"/>
-            <a:r>
-              <a:rPr lang="it-IT" dirty="0">
-                <a:solidFill>
-                  <a:srgbClr val="00B0F0"/>
-                </a:solidFill>
-              </a:rPr>
-              <a:t>…</a:t>
-            </a:r>
+            <a:pPr marL="342900" lvl="1" indent="0" algn="just">
+              <a:buNone/>
+            </a:pPr>
+            <a:endParaRPr lang="it-IT" dirty="0">
+              <a:solidFill>
+                <a:srgbClr val="00B0F0"/>
+              </a:solidFill>
+            </a:endParaRPr>
           </a:p>
           <a:p>
             <a:pPr marL="0" indent="0" algn="just">

</xml_diff>

<commit_message>
Done data understanding! To be reread...
</commit_message>
<xml_diff>
--- a/relazione.pptx
+++ b/relazione.pptx
@@ -32,7 +32,10 @@
     <p:sldId id="282" r:id="rId26"/>
     <p:sldId id="283" r:id="rId27"/>
     <p:sldId id="285" r:id="rId28"/>
-    <p:sldId id="278" r:id="rId29"/>
+    <p:sldId id="286" r:id="rId29"/>
+    <p:sldId id="287" r:id="rId30"/>
+    <p:sldId id="278" r:id="rId31"/>
+    <p:sldId id="288" r:id="rId32"/>
   </p:sldIdLst>
   <p:sldSz cx="9144000" cy="6858000" type="screen4x3"/>
   <p:notesSz cx="6858000" cy="9144000"/>
@@ -334,7 +337,7 @@
             <a:fld id="{657198A3-6BD0-1345-BB48-4E51D4346A8E}" type="datetimeFigureOut">
               <a:rPr lang="it-IT" smtClean="0"/>
               <a:pPr/>
-              <a:t>11/01/2018</a:t>
+              <a:t>14/01/2018</a:t>
             </a:fld>
             <a:endParaRPr lang="it-IT" dirty="0"/>
           </a:p>
@@ -499,7 +502,7 @@
             <a:fld id="{657198A3-6BD0-1345-BB48-4E51D4346A8E}" type="datetimeFigureOut">
               <a:rPr lang="it-IT" smtClean="0"/>
               <a:pPr/>
-              <a:t>11/01/2018</a:t>
+              <a:t>14/01/2018</a:t>
             </a:fld>
             <a:endParaRPr lang="it-IT" dirty="0"/>
           </a:p>
@@ -674,7 +677,7 @@
             <a:fld id="{657198A3-6BD0-1345-BB48-4E51D4346A8E}" type="datetimeFigureOut">
               <a:rPr lang="it-IT" smtClean="0"/>
               <a:pPr/>
-              <a:t>11/01/2018</a:t>
+              <a:t>14/01/2018</a:t>
             </a:fld>
             <a:endParaRPr lang="it-IT" dirty="0"/>
           </a:p>
@@ -849,7 +852,7 @@
             <a:fld id="{657198A3-6BD0-1345-BB48-4E51D4346A8E}" type="datetimeFigureOut">
               <a:rPr lang="it-IT" smtClean="0"/>
               <a:pPr/>
-              <a:t>11/01/2018</a:t>
+              <a:t>14/01/2018</a:t>
             </a:fld>
             <a:endParaRPr lang="it-IT" dirty="0"/>
           </a:p>
@@ -1091,7 +1094,7 @@
             <a:fld id="{657198A3-6BD0-1345-BB48-4E51D4346A8E}" type="datetimeFigureOut">
               <a:rPr lang="it-IT" smtClean="0"/>
               <a:pPr/>
-              <a:t>11/01/2018</a:t>
+              <a:t>14/01/2018</a:t>
             </a:fld>
             <a:endParaRPr lang="it-IT" dirty="0"/>
           </a:p>
@@ -1373,7 +1376,7 @@
             <a:fld id="{657198A3-6BD0-1345-BB48-4E51D4346A8E}" type="datetimeFigureOut">
               <a:rPr lang="it-IT" smtClean="0"/>
               <a:pPr/>
-              <a:t>11/01/2018</a:t>
+              <a:t>14/01/2018</a:t>
             </a:fld>
             <a:endParaRPr lang="it-IT" dirty="0"/>
           </a:p>
@@ -1789,7 +1792,7 @@
             <a:fld id="{657198A3-6BD0-1345-BB48-4E51D4346A8E}" type="datetimeFigureOut">
               <a:rPr lang="it-IT" smtClean="0"/>
               <a:pPr/>
-              <a:t>11/01/2018</a:t>
+              <a:t>14/01/2018</a:t>
             </a:fld>
             <a:endParaRPr lang="it-IT" dirty="0"/>
           </a:p>
@@ -1903,7 +1906,7 @@
             <a:fld id="{657198A3-6BD0-1345-BB48-4E51D4346A8E}" type="datetimeFigureOut">
               <a:rPr lang="it-IT" smtClean="0"/>
               <a:pPr/>
-              <a:t>11/01/2018</a:t>
+              <a:t>14/01/2018</a:t>
             </a:fld>
             <a:endParaRPr lang="it-IT" dirty="0"/>
           </a:p>
@@ -1995,7 +1998,7 @@
             <a:fld id="{657198A3-6BD0-1345-BB48-4E51D4346A8E}" type="datetimeFigureOut">
               <a:rPr lang="it-IT" smtClean="0"/>
               <a:pPr/>
-              <a:t>11/01/2018</a:t>
+              <a:t>14/01/2018</a:t>
             </a:fld>
             <a:endParaRPr lang="it-IT" dirty="0"/>
           </a:p>
@@ -2267,7 +2270,7 @@
             <a:fld id="{657198A3-6BD0-1345-BB48-4E51D4346A8E}" type="datetimeFigureOut">
               <a:rPr lang="it-IT" smtClean="0"/>
               <a:pPr/>
-              <a:t>11/01/2018</a:t>
+              <a:t>14/01/2018</a:t>
             </a:fld>
             <a:endParaRPr lang="it-IT" dirty="0"/>
           </a:p>
@@ -2519,7 +2522,7 @@
             <a:fld id="{657198A3-6BD0-1345-BB48-4E51D4346A8E}" type="datetimeFigureOut">
               <a:rPr lang="it-IT" smtClean="0"/>
               <a:pPr/>
-              <a:t>11/01/2018</a:t>
+              <a:t>14/01/2018</a:t>
             </a:fld>
             <a:endParaRPr lang="it-IT" dirty="0"/>
           </a:p>
@@ -2727,7 +2730,7 @@
             <a:fld id="{657198A3-6BD0-1345-BB48-4E51D4346A8E}" type="datetimeFigureOut">
               <a:rPr lang="it-IT" smtClean="0"/>
               <a:pPr/>
-              <a:t>11/01/2018</a:t>
+              <a:t>14/01/2018</a:t>
             </a:fld>
             <a:endParaRPr lang="it-IT" dirty="0"/>
           </a:p>
@@ -4738,8 +4741,12 @@
           <a:p>
             <a:pPr algn="just"/>
             <a:r>
+              <a:rPr lang="it-IT" dirty="0" smtClean="0"/>
+              <a:t>Una </a:t>
+            </a:r>
+            <a:r>
               <a:rPr lang="it-IT" dirty="0"/>
-              <a:t>Una scelta significativa nell’ambito di questa analisi è stata la suddivisione degli esami in vari gruppi.</a:t>
+              <a:t>scelta significativa nell’ambito di questa analisi è stata la suddivisione degli esami in vari gruppi.</a:t>
             </a:r>
           </a:p>
           <a:p>
@@ -6613,13 +6620,13 @@
         </p:nvPicPr>
         <p:blipFill rotWithShape="1">
           <a:blip r:embed="rId2"/>
-          <a:srcRect l="8206" t="9877" r="12468" b="3924"/>
+          <a:srcRect l="15104" t="9877" r="12468" b="3924"/>
           <a:stretch/>
         </p:blipFill>
         <p:spPr bwMode="auto">
           <a:xfrm>
-            <a:off x="2483768" y="812538"/>
-            <a:ext cx="6624736" cy="6045462"/>
+            <a:off x="2771800" y="812538"/>
+            <a:ext cx="6048672" cy="6045462"/>
           </a:xfrm>
           <a:prstGeom prst="rect">
             <a:avLst/>
@@ -6753,6 +6760,36 @@
               <a:t>Perché studenti di vari anni tendono a convergere verso lo stesso voto in quei due esami?</a:t>
             </a:r>
             <a:endParaRPr lang="en-US" dirty="0"/>
+          </a:p>
+        </p:txBody>
+      </p:sp>
+      <p:sp>
+        <p:nvSpPr>
+          <p:cNvPr id="3" name="CasellaDiTesto 2"/>
+          <p:cNvSpPr txBox="1"/>
+          <p:nvPr/>
+        </p:nvSpPr>
+        <p:spPr>
+          <a:xfrm rot="16200000">
+            <a:off x="7853010" y="3268727"/>
+            <a:ext cx="2160240" cy="369332"/>
+          </a:xfrm>
+          <a:prstGeom prst="rect">
+            <a:avLst/>
+          </a:prstGeom>
+          <a:noFill/>
+        </p:spPr>
+        <p:txBody>
+          <a:bodyPr wrap="square" rtlCol="0">
+            <a:spAutoFit/>
+          </a:bodyPr>
+          <a:lstStyle/>
+          <a:p>
+            <a:r>
+              <a:rPr lang="it-IT" dirty="0" smtClean="0"/>
+              <a:t>Deviazione Standard</a:t>
+            </a:r>
+            <a:endParaRPr lang="it-IT" dirty="0"/>
           </a:p>
         </p:txBody>
       </p:sp>
@@ -7343,8 +7380,8 @@
         </p:blipFill>
         <p:spPr bwMode="auto">
           <a:xfrm>
-            <a:off x="6804248" y="4189259"/>
-            <a:ext cx="1329056" cy="1601404"/>
+            <a:off x="6804247" y="4185450"/>
+            <a:ext cx="1332217" cy="1605213"/>
           </a:xfrm>
           <a:prstGeom prst="rect">
             <a:avLst/>
@@ -8153,6 +8190,13 @@
                 <a:cs typeface="Courier New" panose="02070309020205020404" pitchFamily="49" charset="0"/>
               </a:rPr>
               <a:t>immatricolati coorte 2013 - produttività fino ad aprile 2017</a:t>
+            </a:r>
+            <a:r>
+              <a:rPr lang="it-IT" dirty="0">
+                <a:latin typeface="Courier New" panose="02070309020205020404" pitchFamily="49" charset="0"/>
+                <a:cs typeface="Courier New" panose="02070309020205020404" pitchFamily="49" charset="0"/>
+              </a:rPr>
+              <a:t/>
             </a:r>
             <a:br>
               <a:rPr lang="it-IT" dirty="0">
@@ -10106,7 +10150,7 @@
         </p:nvSpPr>
         <p:spPr>
           <a:xfrm>
-            <a:off x="251518" y="908720"/>
+            <a:off x="179512" y="908720"/>
             <a:ext cx="2736306" cy="3539430"/>
           </a:xfrm>
           <a:prstGeom prst="rect">
@@ -10194,7 +10238,7 @@
         </p:blipFill>
         <p:spPr>
           <a:xfrm>
-            <a:off x="3059833" y="842147"/>
+            <a:off x="2843808" y="842147"/>
             <a:ext cx="6084168" cy="6014111"/>
           </a:xfrm>
           <a:prstGeom prst="rect">
@@ -10281,6 +10325,36 @@
                 <a:srgbClr val="FF0000"/>
               </a:solidFill>
             </a:endParaRPr>
+          </a:p>
+        </p:txBody>
+      </p:sp>
+      <p:sp>
+        <p:nvSpPr>
+          <p:cNvPr id="9" name="CasellaDiTesto 8"/>
+          <p:cNvSpPr txBox="1"/>
+          <p:nvPr/>
+        </p:nvSpPr>
+        <p:spPr>
+          <a:xfrm rot="16200000">
+            <a:off x="7853010" y="3268727"/>
+            <a:ext cx="2160240" cy="369332"/>
+          </a:xfrm>
+          <a:prstGeom prst="rect">
+            <a:avLst/>
+          </a:prstGeom>
+          <a:noFill/>
+        </p:spPr>
+        <p:txBody>
+          <a:bodyPr wrap="square" rtlCol="0">
+            <a:spAutoFit/>
+          </a:bodyPr>
+          <a:lstStyle/>
+          <a:p>
+            <a:r>
+              <a:rPr lang="it-IT" dirty="0" smtClean="0"/>
+              <a:t>Deviazione Standard</a:t>
+            </a:r>
+            <a:endParaRPr lang="it-IT" dirty="0"/>
           </a:p>
         </p:txBody>
       </p:sp>
@@ -10496,324 +10570,10 @@
       </p:grpSpPr>
       <p:sp>
         <p:nvSpPr>
-          <p:cNvPr id="8" name="Segnaposto contenuto 2">
+          <p:cNvPr id="3" name="Titolo 1">
             <a:extLst>
               <a:ext uri="{FF2B5EF4-FFF2-40B4-BE49-F238E27FC236}">
-                <a16:creationId xmlns:a16="http://schemas.microsoft.com/office/drawing/2014/main" id="{C2E44FE5-CCA1-4E8F-905A-F2F5CDF25092}"/>
-              </a:ext>
-            </a:extLst>
-          </p:cNvPr>
-          <p:cNvSpPr>
-            <a:spLocks noGrp="1"/>
-          </p:cNvSpPr>
-          <p:nvPr>
-            <p:ph idx="1"/>
-          </p:nvPr>
-        </p:nvSpPr>
-        <p:spPr>
-          <a:xfrm>
-            <a:off x="457200" y="1700808"/>
-            <a:ext cx="8229600" cy="4114800"/>
-          </a:xfrm>
-        </p:spPr>
-        <p:txBody>
-          <a:bodyPr>
-            <a:normAutofit/>
-          </a:bodyPr>
-          <a:lstStyle/>
-          <a:p>
-            <a:pPr marL="0" indent="0" algn="just">
-              <a:buNone/>
-            </a:pPr>
-            <a:r>
-              <a:rPr lang="it-IT" dirty="0"/>
-              <a:t>A seguito di questa lunga fase di data </a:t>
-            </a:r>
-            <a:r>
-              <a:rPr lang="it-IT" dirty="0" err="1"/>
-              <a:t>understanding</a:t>
-            </a:r>
-            <a:r>
-              <a:rPr lang="it-IT" dirty="0"/>
-              <a:t>, si è in grado di rispondere alla domanda fondamentale di questo intero progetto:</a:t>
-            </a:r>
-          </a:p>
-          <a:p>
-            <a:pPr algn="just"/>
-            <a:r>
-              <a:rPr lang="it-IT" dirty="0">
-                <a:solidFill>
-                  <a:srgbClr val="FF0000"/>
-                </a:solidFill>
-              </a:rPr>
-              <a:t>Quale aspetto del dataset vale la pena analizzare con le tecniche di </a:t>
-            </a:r>
-            <a:r>
-              <a:rPr lang="it-IT" dirty="0" err="1">
-                <a:solidFill>
-                  <a:srgbClr val="FF0000"/>
-                </a:solidFill>
-              </a:rPr>
-              <a:t>clustering</a:t>
-            </a:r>
-            <a:r>
-              <a:rPr lang="it-IT" dirty="0">
-                <a:solidFill>
-                  <a:srgbClr val="FF0000"/>
-                </a:solidFill>
-              </a:rPr>
-              <a:t>?</a:t>
-            </a:r>
-          </a:p>
-          <a:p>
-            <a:pPr marL="342900" lvl="1" indent="0" algn="just">
-              <a:buNone/>
-            </a:pPr>
-            <a:endParaRPr lang="it-IT" dirty="0">
-              <a:solidFill>
-                <a:srgbClr val="00B0F0"/>
-              </a:solidFill>
-            </a:endParaRPr>
-          </a:p>
-          <a:p>
-            <a:pPr marL="0" indent="0" algn="just">
-              <a:buNone/>
-            </a:pPr>
-            <a:endParaRPr lang="it-IT" sz="2000" dirty="0"/>
-          </a:p>
-          <a:p>
-            <a:pPr marL="0" indent="0" algn="just">
-              <a:buNone/>
-            </a:pPr>
-            <a:endParaRPr lang="it-IT" dirty="0"/>
-          </a:p>
-        </p:txBody>
-      </p:sp>
-      <p:sp>
-        <p:nvSpPr>
-          <p:cNvPr id="9" name="Segnaposto contenuto 2">
-            <a:extLst>
-              <a:ext uri="{FF2B5EF4-FFF2-40B4-BE49-F238E27FC236}">
-                <a16:creationId xmlns:a16="http://schemas.microsoft.com/office/drawing/2014/main" id="{89886170-B615-43F8-AA8E-D5565391C42A}"/>
-              </a:ext>
-            </a:extLst>
-          </p:cNvPr>
-          <p:cNvSpPr txBox="1">
-            <a:spLocks/>
-          </p:cNvSpPr>
-          <p:nvPr/>
-        </p:nvSpPr>
-        <p:spPr>
-          <a:xfrm>
-            <a:off x="457200" y="5029199"/>
-            <a:ext cx="8229600" cy="1074753"/>
-          </a:xfrm>
-          <a:prstGeom prst="rect">
-            <a:avLst/>
-          </a:prstGeom>
-        </p:spPr>
-        <p:txBody>
-          <a:bodyPr vert="horz" lIns="91440" tIns="45720" rIns="91440" bIns="45720" rtlCol="0">
-            <a:normAutofit/>
-          </a:bodyPr>
-          <a:lstStyle>
-            <a:lvl1pPr marL="257175" indent="-257175" algn="l" defTabSz="342900" rtl="0" eaLnBrk="1" latinLnBrk="0" hangingPunct="1">
-              <a:spcBef>
-                <a:spcPct val="20000"/>
-              </a:spcBef>
-              <a:buFont typeface="Arial"/>
-              <a:buChar char="•"/>
-              <a:defRPr sz="2400" kern="1200">
-                <a:solidFill>
-                  <a:schemeClr val="tx1"/>
-                </a:solidFill>
-                <a:latin typeface="+mn-lt"/>
-                <a:ea typeface="+mn-ea"/>
-                <a:cs typeface="+mn-cs"/>
-              </a:defRPr>
-            </a:lvl1pPr>
-            <a:lvl2pPr marL="557213" indent="-214313" algn="l" defTabSz="342900" rtl="0" eaLnBrk="1" latinLnBrk="0" hangingPunct="1">
-              <a:spcBef>
-                <a:spcPct val="20000"/>
-              </a:spcBef>
-              <a:buFont typeface="Arial"/>
-              <a:buChar char="–"/>
-              <a:defRPr sz="2100" kern="1200">
-                <a:solidFill>
-                  <a:schemeClr val="tx1"/>
-                </a:solidFill>
-                <a:latin typeface="+mn-lt"/>
-                <a:ea typeface="+mn-ea"/>
-                <a:cs typeface="+mn-cs"/>
-              </a:defRPr>
-            </a:lvl2pPr>
-            <a:lvl3pPr marL="857250" indent="-171450" algn="l" defTabSz="342900" rtl="0" eaLnBrk="1" latinLnBrk="0" hangingPunct="1">
-              <a:spcBef>
-                <a:spcPct val="20000"/>
-              </a:spcBef>
-              <a:buFont typeface="Arial"/>
-              <a:buChar char="•"/>
-              <a:defRPr sz="1800" kern="1200">
-                <a:solidFill>
-                  <a:schemeClr val="tx1"/>
-                </a:solidFill>
-                <a:latin typeface="+mn-lt"/>
-                <a:ea typeface="+mn-ea"/>
-                <a:cs typeface="+mn-cs"/>
-              </a:defRPr>
-            </a:lvl3pPr>
-            <a:lvl4pPr marL="1200150" indent="-171450" algn="l" defTabSz="342900" rtl="0" eaLnBrk="1" latinLnBrk="0" hangingPunct="1">
-              <a:spcBef>
-                <a:spcPct val="20000"/>
-              </a:spcBef>
-              <a:buFont typeface="Arial"/>
-              <a:buChar char="–"/>
-              <a:defRPr sz="1500" kern="1200">
-                <a:solidFill>
-                  <a:schemeClr val="tx1"/>
-                </a:solidFill>
-                <a:latin typeface="+mn-lt"/>
-                <a:ea typeface="+mn-ea"/>
-                <a:cs typeface="+mn-cs"/>
-              </a:defRPr>
-            </a:lvl4pPr>
-            <a:lvl5pPr marL="1543050" indent="-171450" algn="l" defTabSz="342900" rtl="0" eaLnBrk="1" latinLnBrk="0" hangingPunct="1">
-              <a:spcBef>
-                <a:spcPct val="20000"/>
-              </a:spcBef>
-              <a:buFont typeface="Arial"/>
-              <a:buChar char="»"/>
-              <a:defRPr sz="1500" kern="1200">
-                <a:solidFill>
-                  <a:schemeClr val="tx1"/>
-                </a:solidFill>
-                <a:latin typeface="+mn-lt"/>
-                <a:ea typeface="+mn-ea"/>
-                <a:cs typeface="+mn-cs"/>
-              </a:defRPr>
-            </a:lvl5pPr>
-            <a:lvl6pPr marL="1885950" indent="-171450" algn="l" defTabSz="342900" rtl="0" eaLnBrk="1" latinLnBrk="0" hangingPunct="1">
-              <a:spcBef>
-                <a:spcPct val="20000"/>
-              </a:spcBef>
-              <a:buFont typeface="Arial"/>
-              <a:buChar char="•"/>
-              <a:defRPr sz="1500" kern="1200">
-                <a:solidFill>
-                  <a:schemeClr val="tx1"/>
-                </a:solidFill>
-                <a:latin typeface="+mn-lt"/>
-                <a:ea typeface="+mn-ea"/>
-                <a:cs typeface="+mn-cs"/>
-              </a:defRPr>
-            </a:lvl6pPr>
-            <a:lvl7pPr marL="2228850" indent="-171450" algn="l" defTabSz="342900" rtl="0" eaLnBrk="1" latinLnBrk="0" hangingPunct="1">
-              <a:spcBef>
-                <a:spcPct val="20000"/>
-              </a:spcBef>
-              <a:buFont typeface="Arial"/>
-              <a:buChar char="•"/>
-              <a:defRPr sz="1500" kern="1200">
-                <a:solidFill>
-                  <a:schemeClr val="tx1"/>
-                </a:solidFill>
-                <a:latin typeface="+mn-lt"/>
-                <a:ea typeface="+mn-ea"/>
-                <a:cs typeface="+mn-cs"/>
-              </a:defRPr>
-            </a:lvl7pPr>
-            <a:lvl8pPr marL="2571750" indent="-171450" algn="l" defTabSz="342900" rtl="0" eaLnBrk="1" latinLnBrk="0" hangingPunct="1">
-              <a:spcBef>
-                <a:spcPct val="20000"/>
-              </a:spcBef>
-              <a:buFont typeface="Arial"/>
-              <a:buChar char="•"/>
-              <a:defRPr sz="1500" kern="1200">
-                <a:solidFill>
-                  <a:schemeClr val="tx1"/>
-                </a:solidFill>
-                <a:latin typeface="+mn-lt"/>
-                <a:ea typeface="+mn-ea"/>
-                <a:cs typeface="+mn-cs"/>
-              </a:defRPr>
-            </a:lvl8pPr>
-            <a:lvl9pPr marL="2914650" indent="-171450" algn="l" defTabSz="342900" rtl="0" eaLnBrk="1" latinLnBrk="0" hangingPunct="1">
-              <a:spcBef>
-                <a:spcPct val="20000"/>
-              </a:spcBef>
-              <a:buFont typeface="Arial"/>
-              <a:buChar char="•"/>
-              <a:defRPr sz="1500" kern="1200">
-                <a:solidFill>
-                  <a:schemeClr val="tx1"/>
-                </a:solidFill>
-                <a:latin typeface="+mn-lt"/>
-                <a:ea typeface="+mn-ea"/>
-                <a:cs typeface="+mn-cs"/>
-              </a:defRPr>
-            </a:lvl9pPr>
-          </a:lstStyle>
-          <a:p>
-            <a:pPr marL="0" indent="0" algn="just">
-              <a:buFont typeface="Arial"/>
-              <a:buNone/>
-            </a:pPr>
-            <a:endParaRPr lang="it-IT" dirty="0"/>
-          </a:p>
-          <a:p>
-            <a:pPr marL="0" indent="0" algn="just">
-              <a:buFont typeface="Arial"/>
-              <a:buNone/>
-            </a:pPr>
-            <a:endParaRPr lang="it-IT" dirty="0"/>
-          </a:p>
-          <a:p>
-            <a:endParaRPr lang="en-US" sz="2000" dirty="0"/>
-          </a:p>
-        </p:txBody>
-      </p:sp>
-      <p:sp>
-        <p:nvSpPr>
-          <p:cNvPr id="7" name="Titolo 1">
-            <a:extLst>
-              <a:ext uri="{FF2B5EF4-FFF2-40B4-BE49-F238E27FC236}">
-                <a16:creationId xmlns:a16="http://schemas.microsoft.com/office/drawing/2014/main" id="{588E765D-4A18-43EC-9070-BBB19613F406}"/>
-              </a:ext>
-            </a:extLst>
-          </p:cNvPr>
-          <p:cNvSpPr>
-            <a:spLocks noGrp="1"/>
-          </p:cNvSpPr>
-          <p:nvPr>
-            <p:ph type="title"/>
-          </p:nvPr>
-        </p:nvSpPr>
-        <p:spPr>
-          <a:xfrm>
-            <a:off x="457200" y="692696"/>
-            <a:ext cx="8229600" cy="1143000"/>
-          </a:xfrm>
-        </p:spPr>
-        <p:txBody>
-          <a:bodyPr>
-            <a:noAutofit/>
-          </a:bodyPr>
-          <a:lstStyle/>
-          <a:p>
-            <a:r>
-              <a:rPr lang="it-IT" sz="2700" dirty="0"/>
-              <a:t>CONCLUSIONI</a:t>
-            </a:r>
-            <a:endParaRPr lang="en-US" sz="2700" dirty="0"/>
-          </a:p>
-        </p:txBody>
-      </p:sp>
-      <p:sp>
-        <p:nvSpPr>
-          <p:cNvPr id="6" name="Titolo 1">
-            <a:extLst>
-              <a:ext uri="{FF2B5EF4-FFF2-40B4-BE49-F238E27FC236}">
-                <a16:creationId xmlns:a16="http://schemas.microsoft.com/office/drawing/2014/main" id="{32602169-0966-4893-B032-33CFCD986CA0}"/>
+                <a16:creationId xmlns:a16="http://schemas.microsoft.com/office/drawing/2014/main" id="{9E74EE39-EA32-4246-BC63-84D8E46682AC}"/>
               </a:ext>
             </a:extLst>
           </p:cNvPr>
@@ -10866,7 +10626,7 @@
                   <a:schemeClr val="bg1"/>
                 </a:solidFill>
               </a:rPr>
-              <a:t>CONCLUSIONI</a:t>
+              <a:t>ESAMI DI MATEMATICA</a:t>
             </a:r>
             <a:endParaRPr lang="en-US" sz="2400" dirty="0">
               <a:solidFill>
@@ -10876,515 +10636,304 @@
           </a:p>
         </p:txBody>
       </p:sp>
+      <p:pic>
+        <p:nvPicPr>
+          <p:cNvPr id="2" name="Immagine 1"/>
+          <p:cNvPicPr>
+            <a:picLocks noChangeAspect="1"/>
+          </p:cNvPicPr>
+          <p:nvPr/>
+        </p:nvPicPr>
+        <p:blipFill rotWithShape="1">
+          <a:blip r:embed="rId2">
+            <a:extLst>
+              <a:ext uri="{28A0092B-C50C-407E-A947-70E740481C1C}">
+                <a14:useLocalDpi xmlns:a14="http://schemas.microsoft.com/office/drawing/2010/main" val="0"/>
+              </a:ext>
+            </a:extLst>
+          </a:blip>
+          <a:srcRect l="9051" t="1130" r="6688" b="6360"/>
+          <a:stretch/>
+        </p:blipFill>
+        <p:spPr>
+          <a:xfrm>
+            <a:off x="1691680" y="818784"/>
+            <a:ext cx="7460976" cy="6060353"/>
+          </a:xfrm>
+          <a:prstGeom prst="rect">
+            <a:avLst/>
+          </a:prstGeom>
+        </p:spPr>
+      </p:pic>
       <p:sp>
         <p:nvSpPr>
-          <p:cNvPr id="2" name="Rectangle 6">
+          <p:cNvPr id="7" name="CasellaDiTesto 6">
             <a:extLst>
               <a:ext uri="{FF2B5EF4-FFF2-40B4-BE49-F238E27FC236}">
-                <a16:creationId xmlns:a16="http://schemas.microsoft.com/office/drawing/2014/main" id="{FC5724C9-24A0-4B40-9A3A-FE717EF7AA55}"/>
+                <a16:creationId xmlns:a16="http://schemas.microsoft.com/office/drawing/2014/main" id="{8834E3B8-21D8-45DE-8FE9-9B887BB61C46}"/>
               </a:ext>
             </a:extLst>
           </p:cNvPr>
-          <p:cNvSpPr>
-            <a:spLocks noChangeArrowheads="1"/>
-          </p:cNvSpPr>
+          <p:cNvSpPr txBox="1"/>
           <p:nvPr/>
         </p:nvSpPr>
-        <p:spPr bwMode="auto">
+        <p:spPr>
           <a:xfrm>
-            <a:off x="0" y="0"/>
-            <a:ext cx="9144000" cy="457200"/>
+            <a:off x="35496" y="1037049"/>
+            <a:ext cx="1863198" cy="5632311"/>
           </a:xfrm>
           <a:prstGeom prst="rect">
             <a:avLst/>
           </a:prstGeom>
           <a:noFill/>
-          <a:ln>
-            <a:noFill/>
-          </a:ln>
-          <a:effectLst/>
-          <a:extLst>
-            <a:ext uri="{909E8E84-426E-40DD-AFC4-6F175D3DCCD1}">
-              <a14:hiddenFill xmlns:a14="http://schemas.microsoft.com/office/drawing/2010/main">
-                <a:solidFill>
-                  <a:schemeClr val="accent1"/>
-                </a:solidFill>
-              </a14:hiddenFill>
-            </a:ext>
-            <a:ext uri="{91240B29-F687-4F45-9708-019B960494DF}">
-              <a14:hiddenLine xmlns:a14="http://schemas.microsoft.com/office/drawing/2010/main" w="9525">
-                <a:solidFill>
-                  <a:schemeClr val="tx1"/>
-                </a:solidFill>
-                <a:miter lim="800000"/>
-                <a:headEnd/>
-                <a:tailEnd/>
-              </a14:hiddenLine>
-            </a:ext>
-            <a:ext uri="{AF507438-7753-43E0-B8FC-AC1667EBCBE1}">
-              <a14:hiddenEffects xmlns:a14="http://schemas.microsoft.com/office/drawing/2010/main">
-                <a:effectLst>
-                  <a:outerShdw dist="35921" dir="2700000" algn="ctr" rotWithShape="0">
-                    <a:schemeClr val="bg2"/>
-                  </a:outerShdw>
-                </a:effectLst>
-              </a14:hiddenEffects>
-            </a:ext>
-          </a:extLst>
         </p:spPr>
         <p:txBody>
-          <a:bodyPr vert="horz" wrap="none" lIns="91440" tIns="45720" rIns="91440" bIns="45720" numCol="1" anchor="ctr" anchorCtr="0" compatLnSpc="1">
-            <a:prstTxWarp prst="textNoShape">
-              <a:avLst/>
-            </a:prstTxWarp>
+          <a:bodyPr wrap="square" rtlCol="0">
             <a:spAutoFit/>
           </a:bodyPr>
           <a:lstStyle/>
           <a:p>
-            <a:endParaRPr lang="en-US"/>
+            <a:r>
+              <a:rPr lang="it-IT" dirty="0" smtClean="0"/>
+              <a:t>Due aspetti interessanti: una fascia di studenti con correlazione nulla ed una «casella» di forti correlazioni all’incirca nel centro della matrice.</a:t>
+            </a:r>
+          </a:p>
+          <a:p>
+            <a:endParaRPr lang="it-IT" dirty="0"/>
+          </a:p>
+          <a:p>
+            <a:r>
+              <a:rPr lang="it-IT" dirty="0" smtClean="0"/>
+              <a:t>Dei </a:t>
+            </a:r>
+            <a:r>
+              <a:rPr lang="it-IT" dirty="0" smtClean="0"/>
+              <a:t>due, il primo è sicuramente il più inusuale. </a:t>
+            </a:r>
+            <a:r>
+              <a:rPr lang="it-IT" dirty="0" smtClean="0"/>
+              <a:t>Quale aspetto reale può generare una osservazione come questa?</a:t>
+            </a:r>
+            <a:endParaRPr lang="it-IT" dirty="0"/>
+          </a:p>
+          <a:p>
+            <a:r>
+              <a:rPr lang="it-IT" dirty="0" smtClean="0"/>
+              <a:t> </a:t>
+            </a:r>
+            <a:endParaRPr lang="en-US" dirty="0"/>
           </a:p>
         </p:txBody>
       </p:sp>
+    </p:spTree>
+    <p:extLst>
+      <p:ext uri="{BB962C8B-B14F-4D97-AF65-F5344CB8AC3E}">
+        <p14:creationId xmlns:p14="http://schemas.microsoft.com/office/powerpoint/2010/main" val="82586595"/>
+      </p:ext>
+    </p:extLst>
+  </p:cSld>
+  <p:clrMapOvr>
+    <a:masterClrMapping/>
+  </p:clrMapOvr>
+</p:sld>
+</file>
+
+<file path=ppt/slides/slide29.xml><?xml version="1.0" encoding="utf-8"?>
+<p:sld xmlns:a="http://schemas.openxmlformats.org/drawingml/2006/main" xmlns:r="http://schemas.openxmlformats.org/officeDocument/2006/relationships" xmlns:p="http://schemas.openxmlformats.org/presentationml/2006/main">
+  <p:cSld>
+    <p:spTree>
+      <p:nvGrpSpPr>
+        <p:cNvPr id="1" name=""/>
+        <p:cNvGrpSpPr/>
+        <p:nvPr/>
+      </p:nvGrpSpPr>
+      <p:grpSpPr>
+        <a:xfrm>
+          <a:off x="0" y="0"/>
+          <a:ext cx="0" cy="0"/>
+          <a:chOff x="0" y="0"/>
+          <a:chExt cx="0" cy="0"/>
+        </a:xfrm>
+      </p:grpSpPr>
       <p:sp>
         <p:nvSpPr>
-          <p:cNvPr id="3" name="Rectangle 7">
+          <p:cNvPr id="3" name="Titolo 1">
             <a:extLst>
               <a:ext uri="{FF2B5EF4-FFF2-40B4-BE49-F238E27FC236}">
-                <a16:creationId xmlns:a16="http://schemas.microsoft.com/office/drawing/2014/main" id="{C08042F5-96DB-4FE6-B699-C1DFAB71C0C5}"/>
+                <a16:creationId xmlns:a16="http://schemas.microsoft.com/office/drawing/2014/main" id="{9E74EE39-EA32-4246-BC63-84D8E46682AC}"/>
               </a:ext>
             </a:extLst>
           </p:cNvPr>
-          <p:cNvSpPr>
-            <a:spLocks noChangeArrowheads="1"/>
+          <p:cNvSpPr txBox="1">
+            <a:spLocks/>
           </p:cNvSpPr>
           <p:nvPr/>
         </p:nvSpPr>
-        <p:spPr bwMode="auto">
+        <p:spPr>
           <a:xfrm>
-            <a:off x="0" y="1838325"/>
-            <a:ext cx="9144000" cy="0"/>
+            <a:off x="1447800" y="152400"/>
+            <a:ext cx="8229600" cy="1143000"/>
+          </a:xfrm>
+          <a:prstGeom prst="rect">
+            <a:avLst/>
+          </a:prstGeom>
+        </p:spPr>
+        <p:txBody>
+          <a:bodyPr>
+            <a:noAutofit/>
+          </a:bodyPr>
+          <a:lstStyle>
+            <a:lvl1pPr algn="ctr" defTabSz="342900" rtl="0" eaLnBrk="1" latinLnBrk="0" hangingPunct="1">
+              <a:spcBef>
+                <a:spcPct val="0"/>
+              </a:spcBef>
+              <a:buNone/>
+              <a:defRPr sz="3300" kern="1200">
+                <a:solidFill>
+                  <a:schemeClr val="tx1"/>
+                </a:solidFill>
+                <a:latin typeface="+mj-lt"/>
+                <a:ea typeface="+mj-ea"/>
+                <a:cs typeface="+mj-cs"/>
+              </a:defRPr>
+            </a:lvl1pPr>
+          </a:lstStyle>
+          <a:p>
+            <a:r>
+              <a:rPr lang="it-IT" sz="2400" b="1" dirty="0">
+                <a:solidFill>
+                  <a:schemeClr val="bg1"/>
+                </a:solidFill>
+              </a:rPr>
+              <a:t>DATA UNDERSTANDING: </a:t>
+            </a:r>
+            <a:r>
+              <a:rPr lang="it-IT" sz="2400" dirty="0">
+                <a:solidFill>
+                  <a:schemeClr val="bg1"/>
+                </a:solidFill>
+              </a:rPr>
+              <a:t>ESAMI DI MATEMATICA</a:t>
+            </a:r>
+            <a:endParaRPr lang="en-US" sz="2400" dirty="0">
+              <a:solidFill>
+                <a:schemeClr val="bg1"/>
+              </a:solidFill>
+            </a:endParaRPr>
+          </a:p>
+        </p:txBody>
+      </p:sp>
+      <p:pic>
+        <p:nvPicPr>
+          <p:cNvPr id="4" name="Immagine 3"/>
+          <p:cNvPicPr>
+            <a:picLocks noChangeAspect="1"/>
+          </p:cNvPicPr>
+          <p:nvPr/>
+        </p:nvPicPr>
+        <p:blipFill rotWithShape="1">
+          <a:blip r:embed="rId2">
+            <a:extLst>
+              <a:ext uri="{28A0092B-C50C-407E-A947-70E740481C1C}">
+                <a14:useLocalDpi xmlns:a14="http://schemas.microsoft.com/office/drawing/2010/main" val="0"/>
+              </a:ext>
+            </a:extLst>
+          </a:blip>
+          <a:srcRect l="15938" t="10567" r="12153" b="4933"/>
+          <a:stretch/>
+        </p:blipFill>
+        <p:spPr>
+          <a:xfrm>
+            <a:off x="2771800" y="836712"/>
+            <a:ext cx="6094372" cy="6014183"/>
+          </a:xfrm>
+          <a:prstGeom prst="rect">
+            <a:avLst/>
+          </a:prstGeom>
+        </p:spPr>
+      </p:pic>
+      <p:sp>
+        <p:nvSpPr>
+          <p:cNvPr id="5" name="CasellaDiTesto 4"/>
+          <p:cNvSpPr txBox="1"/>
+          <p:nvPr/>
+        </p:nvSpPr>
+        <p:spPr>
+          <a:xfrm>
+            <a:off x="215112" y="908720"/>
+            <a:ext cx="2412672" cy="5724644"/>
           </a:xfrm>
           <a:prstGeom prst="rect">
             <a:avLst/>
           </a:prstGeom>
           <a:noFill/>
-          <a:ln>
-            <a:noFill/>
-          </a:ln>
-          <a:effectLst/>
-          <a:extLst>
-            <a:ext uri="{909E8E84-426E-40DD-AFC4-6F175D3DCCD1}">
-              <a14:hiddenFill xmlns:a14="http://schemas.microsoft.com/office/drawing/2010/main">
-                <a:solidFill>
-                  <a:schemeClr val="accent1"/>
-                </a:solidFill>
-              </a14:hiddenFill>
-            </a:ext>
-            <a:ext uri="{91240B29-F687-4F45-9708-019B960494DF}">
-              <a14:hiddenLine xmlns:a14="http://schemas.microsoft.com/office/drawing/2010/main" w="9525">
-                <a:solidFill>
-                  <a:schemeClr val="tx1"/>
-                </a:solidFill>
-                <a:miter lim="800000"/>
-                <a:headEnd/>
-                <a:tailEnd/>
-              </a14:hiddenLine>
-            </a:ext>
-            <a:ext uri="{AF507438-7753-43E0-B8FC-AC1667EBCBE1}">
-              <a14:hiddenEffects xmlns:a14="http://schemas.microsoft.com/office/drawing/2010/main">
-                <a:effectLst>
-                  <a:outerShdw dist="35921" dir="2700000" algn="ctr" rotWithShape="0">
-                    <a:schemeClr val="bg2"/>
-                  </a:outerShdw>
-                </a:effectLst>
-              </a14:hiddenEffects>
-            </a:ext>
-          </a:extLst>
         </p:spPr>
         <p:txBody>
-          <a:bodyPr vert="horz" wrap="none" lIns="91440" tIns="45720" rIns="91440" bIns="45720" numCol="1" anchor="ctr" anchorCtr="0" compatLnSpc="1">
-            <a:prstTxWarp prst="textNoShape">
-              <a:avLst/>
-            </a:prstTxWarp>
+          <a:bodyPr wrap="square" rtlCol="0">
             <a:spAutoFit/>
           </a:bodyPr>
           <a:lstStyle/>
           <a:p>
-            <a:pPr marL="0" marR="0" lvl="0" indent="0" algn="l" defTabSz="914400" rtl="0" eaLnBrk="0" fontAlgn="base" latinLnBrk="0" hangingPunct="0">
-              <a:lnSpc>
-                <a:spcPct val="100000"/>
-              </a:lnSpc>
-              <a:spcBef>
-                <a:spcPct val="0"/>
-              </a:spcBef>
-              <a:spcAft>
-                <a:spcPct val="0"/>
-              </a:spcAft>
-              <a:buClrTx/>
-              <a:buSzTx/>
-              <a:buFontTx/>
-              <a:buNone/>
-              <a:tabLst/>
-            </a:pPr>
-            <a:r>
-              <a:rPr kumimoji="0" lang="it-IT" altLang="en-US" sz="1100" b="0" i="0" u="none" strike="noStrike" cap="none" normalizeH="0" baseline="0">
-                <a:ln>
-                  <a:noFill/>
-                </a:ln>
-                <a:solidFill>
-                  <a:schemeClr val="tx1"/>
-                </a:solidFill>
-                <a:effectLst/>
-                <a:latin typeface="Calibri" panose="020F0502020204030204" pitchFamily="34" charset="0"/>
-                <a:ea typeface="Times New Roman" panose="02020603050405020304" pitchFamily="18" charset="0"/>
-                <a:cs typeface="Times New Roman" panose="02020603050405020304" pitchFamily="18" charset="0"/>
-              </a:rPr>
-              <a:t> </a:t>
-            </a:r>
-            <a:endParaRPr kumimoji="0" lang="it-IT" altLang="en-US" sz="1800" b="0" i="0" u="none" strike="noStrike" cap="none" normalizeH="0" baseline="0">
-              <a:ln>
-                <a:noFill/>
-              </a:ln>
-              <a:solidFill>
-                <a:schemeClr val="tx1"/>
-              </a:solidFill>
-              <a:effectLst/>
-              <a:latin typeface="Arial" panose="020B0604020202020204" pitchFamily="34" charset="0"/>
-            </a:endParaRPr>
+            <a:r>
+              <a:rPr lang="it-IT" dirty="0" smtClean="0"/>
+              <a:t>Si possono notare le stesse caratteristiche evidenziate per quanto riguarda gli esami a tema principalmente informatico. </a:t>
+            </a:r>
+          </a:p>
+          <a:p>
+            <a:endParaRPr lang="it-IT" dirty="0"/>
+          </a:p>
+          <a:p>
+            <a:r>
+              <a:rPr lang="it-IT" dirty="0" smtClean="0"/>
+              <a:t>In questo caso, il ruolo del «cattivo» non lo interpreta più Informatica Teorica ma è condiviso da Fisica Generale e Calcolo Numerico.</a:t>
+            </a:r>
+          </a:p>
+          <a:p>
+            <a:endParaRPr lang="it-IT" dirty="0"/>
+          </a:p>
+          <a:p>
+            <a:r>
+              <a:rPr lang="it-IT" sz="1600" dirty="0" smtClean="0"/>
+              <a:t>N.B. – Calcolo Numerico tratta argomenti che trascendono i confini fra l’informatica e la matematica: è saggio inserirlo in questo gruppo?</a:t>
+            </a:r>
+            <a:endParaRPr lang="it-IT" sz="1600" dirty="0"/>
           </a:p>
         </p:txBody>
       </p:sp>
       <p:sp>
         <p:nvSpPr>
-          <p:cNvPr id="4" name="Rectangle 8">
-            <a:extLst>
-              <a:ext uri="{FF2B5EF4-FFF2-40B4-BE49-F238E27FC236}">
-                <a16:creationId xmlns:a16="http://schemas.microsoft.com/office/drawing/2014/main" id="{E0CBE371-8058-4503-A250-42442AAE21EC}"/>
-              </a:ext>
-            </a:extLst>
-          </p:cNvPr>
-          <p:cNvSpPr>
-            <a:spLocks noChangeArrowheads="1"/>
-          </p:cNvSpPr>
+          <p:cNvPr id="8" name="CasellaDiTesto 7"/>
+          <p:cNvSpPr txBox="1"/>
           <p:nvPr/>
         </p:nvSpPr>
-        <p:spPr bwMode="auto">
-          <a:xfrm>
-            <a:off x="0" y="3219450"/>
-            <a:ext cx="9144000" cy="0"/>
+        <p:spPr>
+          <a:xfrm rot="16200000">
+            <a:off x="7853010" y="3268727"/>
+            <a:ext cx="2160240" cy="369332"/>
           </a:xfrm>
           <a:prstGeom prst="rect">
             <a:avLst/>
           </a:prstGeom>
           <a:noFill/>
-          <a:ln>
-            <a:noFill/>
-          </a:ln>
-          <a:effectLst/>
-          <a:extLst>
-            <a:ext uri="{909E8E84-426E-40DD-AFC4-6F175D3DCCD1}">
-              <a14:hiddenFill xmlns:a14="http://schemas.microsoft.com/office/drawing/2010/main">
-                <a:solidFill>
-                  <a:schemeClr val="accent1"/>
-                </a:solidFill>
-              </a14:hiddenFill>
-            </a:ext>
-            <a:ext uri="{91240B29-F687-4F45-9708-019B960494DF}">
-              <a14:hiddenLine xmlns:a14="http://schemas.microsoft.com/office/drawing/2010/main" w="9525">
-                <a:solidFill>
-                  <a:schemeClr val="tx1"/>
-                </a:solidFill>
-                <a:miter lim="800000"/>
-                <a:headEnd/>
-                <a:tailEnd/>
-              </a14:hiddenLine>
-            </a:ext>
-            <a:ext uri="{AF507438-7753-43E0-B8FC-AC1667EBCBE1}">
-              <a14:hiddenEffects xmlns:a14="http://schemas.microsoft.com/office/drawing/2010/main">
-                <a:effectLst>
-                  <a:outerShdw dist="35921" dir="2700000" algn="ctr" rotWithShape="0">
-                    <a:schemeClr val="bg2"/>
-                  </a:outerShdw>
-                </a:effectLst>
-              </a14:hiddenEffects>
-            </a:ext>
-          </a:extLst>
         </p:spPr>
         <p:txBody>
-          <a:bodyPr vert="horz" wrap="none" lIns="91440" tIns="45720" rIns="91440" bIns="45720" numCol="1" anchor="ctr" anchorCtr="0" compatLnSpc="1">
-            <a:prstTxWarp prst="textNoShape">
-              <a:avLst/>
-            </a:prstTxWarp>
+          <a:bodyPr wrap="square" rtlCol="0">
             <a:spAutoFit/>
           </a:bodyPr>
           <a:lstStyle/>
           <a:p>
-            <a:pPr marL="0" marR="0" lvl="0" indent="0" algn="l" defTabSz="914400" rtl="0" eaLnBrk="0" fontAlgn="base" latinLnBrk="0" hangingPunct="0">
-              <a:lnSpc>
-                <a:spcPct val="100000"/>
-              </a:lnSpc>
-              <a:spcBef>
-                <a:spcPct val="0"/>
-              </a:spcBef>
-              <a:spcAft>
-                <a:spcPct val="0"/>
-              </a:spcAft>
-              <a:buClrTx/>
-              <a:buSzTx/>
-              <a:buFontTx/>
-              <a:buNone/>
-              <a:tabLst/>
-            </a:pPr>
-            <a:r>
-              <a:rPr kumimoji="0" lang="it-IT" altLang="en-US" sz="1100" b="0" i="0" u="none" strike="noStrike" cap="none" normalizeH="0" baseline="0">
-                <a:ln>
-                  <a:noFill/>
-                </a:ln>
-                <a:solidFill>
-                  <a:schemeClr val="tx1"/>
-                </a:solidFill>
-                <a:effectLst/>
-                <a:latin typeface="Calibri" panose="020F0502020204030204" pitchFamily="34" charset="0"/>
-                <a:ea typeface="Times New Roman" panose="02020603050405020304" pitchFamily="18" charset="0"/>
-                <a:cs typeface="Times New Roman" panose="02020603050405020304" pitchFamily="18" charset="0"/>
-              </a:rPr>
-              <a:t> </a:t>
-            </a:r>
-            <a:endParaRPr kumimoji="0" lang="it-IT" altLang="en-US" sz="1800" b="0" i="0" u="none" strike="noStrike" cap="none" normalizeH="0" baseline="0">
-              <a:ln>
-                <a:noFill/>
-              </a:ln>
-              <a:solidFill>
-                <a:schemeClr val="tx1"/>
-              </a:solidFill>
-              <a:effectLst/>
-              <a:latin typeface="Arial" panose="020B0604020202020204" pitchFamily="34" charset="0"/>
-            </a:endParaRPr>
-          </a:p>
-        </p:txBody>
-      </p:sp>
-      <p:sp>
-        <p:nvSpPr>
-          <p:cNvPr id="10" name="Rectangle 9">
-            <a:extLst>
-              <a:ext uri="{FF2B5EF4-FFF2-40B4-BE49-F238E27FC236}">
-                <a16:creationId xmlns:a16="http://schemas.microsoft.com/office/drawing/2014/main" id="{99468FB6-6461-4A91-9E0B-2B3FC25F715E}"/>
-              </a:ext>
-            </a:extLst>
-          </p:cNvPr>
-          <p:cNvSpPr>
-            <a:spLocks noChangeArrowheads="1"/>
-          </p:cNvSpPr>
-          <p:nvPr/>
-        </p:nvSpPr>
-        <p:spPr bwMode="auto">
-          <a:xfrm>
-            <a:off x="0" y="4600575"/>
-            <a:ext cx="9144000" cy="0"/>
-          </a:xfrm>
-          <a:prstGeom prst="rect">
-            <a:avLst/>
-          </a:prstGeom>
-          <a:noFill/>
-          <a:ln>
-            <a:noFill/>
-          </a:ln>
-          <a:effectLst/>
-          <a:extLst>
-            <a:ext uri="{909E8E84-426E-40DD-AFC4-6F175D3DCCD1}">
-              <a14:hiddenFill xmlns:a14="http://schemas.microsoft.com/office/drawing/2010/main">
-                <a:solidFill>
-                  <a:schemeClr val="accent1"/>
-                </a:solidFill>
-              </a14:hiddenFill>
-            </a:ext>
-            <a:ext uri="{91240B29-F687-4F45-9708-019B960494DF}">
-              <a14:hiddenLine xmlns:a14="http://schemas.microsoft.com/office/drawing/2010/main" w="9525">
-                <a:solidFill>
-                  <a:schemeClr val="tx1"/>
-                </a:solidFill>
-                <a:miter lim="800000"/>
-                <a:headEnd/>
-                <a:tailEnd/>
-              </a14:hiddenLine>
-            </a:ext>
-            <a:ext uri="{AF507438-7753-43E0-B8FC-AC1667EBCBE1}">
-              <a14:hiddenEffects xmlns:a14="http://schemas.microsoft.com/office/drawing/2010/main">
-                <a:effectLst>
-                  <a:outerShdw dist="35921" dir="2700000" algn="ctr" rotWithShape="0">
-                    <a:schemeClr val="bg2"/>
-                  </a:outerShdw>
-                </a:effectLst>
-              </a14:hiddenEffects>
-            </a:ext>
-          </a:extLst>
-        </p:spPr>
-        <p:txBody>
-          <a:bodyPr vert="horz" wrap="none" lIns="91440" tIns="45720" rIns="91440" bIns="45720" numCol="1" anchor="ctr" anchorCtr="0" compatLnSpc="1">
-            <a:prstTxWarp prst="textNoShape">
-              <a:avLst/>
-            </a:prstTxWarp>
-            <a:spAutoFit/>
-          </a:bodyPr>
-          <a:lstStyle/>
-          <a:p>
-            <a:pPr marL="0" marR="0" lvl="0" indent="0" algn="l" defTabSz="914400" rtl="0" eaLnBrk="0" fontAlgn="base" latinLnBrk="0" hangingPunct="0">
-              <a:lnSpc>
-                <a:spcPct val="100000"/>
-              </a:lnSpc>
-              <a:spcBef>
-                <a:spcPct val="0"/>
-              </a:spcBef>
-              <a:spcAft>
-                <a:spcPct val="0"/>
-              </a:spcAft>
-              <a:buClrTx/>
-              <a:buSzTx/>
-              <a:buFontTx/>
-              <a:buNone/>
-              <a:tabLst/>
-            </a:pPr>
-            <a:r>
-              <a:rPr kumimoji="0" lang="it-IT" altLang="en-US" sz="1100" b="0" i="0" u="none" strike="noStrike" cap="none" normalizeH="0" baseline="0">
-                <a:ln>
-                  <a:noFill/>
-                </a:ln>
-                <a:solidFill>
-                  <a:schemeClr val="tx1"/>
-                </a:solidFill>
-                <a:effectLst/>
-                <a:latin typeface="Calibri" panose="020F0502020204030204" pitchFamily="34" charset="0"/>
-                <a:ea typeface="Times New Roman" panose="02020603050405020304" pitchFamily="18" charset="0"/>
-                <a:cs typeface="Times New Roman" panose="02020603050405020304" pitchFamily="18" charset="0"/>
-              </a:rPr>
-              <a:t> </a:t>
-            </a:r>
-            <a:endParaRPr kumimoji="0" lang="it-IT" altLang="en-US" sz="1800" b="0" i="0" u="none" strike="noStrike" cap="none" normalizeH="0" baseline="0">
-              <a:ln>
-                <a:noFill/>
-              </a:ln>
-              <a:solidFill>
-                <a:schemeClr val="tx1"/>
-              </a:solidFill>
-              <a:effectLst/>
-              <a:latin typeface="Arial" panose="020B0604020202020204" pitchFamily="34" charset="0"/>
-            </a:endParaRPr>
-          </a:p>
-        </p:txBody>
-      </p:sp>
-      <p:sp>
-        <p:nvSpPr>
-          <p:cNvPr id="11" name="Rectangle 10">
-            <a:extLst>
-              <a:ext uri="{FF2B5EF4-FFF2-40B4-BE49-F238E27FC236}">
-                <a16:creationId xmlns:a16="http://schemas.microsoft.com/office/drawing/2014/main" id="{E4D9815E-FC57-48D4-9710-C34FDAE236EF}"/>
-              </a:ext>
-            </a:extLst>
-          </p:cNvPr>
-          <p:cNvSpPr>
-            <a:spLocks noChangeArrowheads="1"/>
-          </p:cNvSpPr>
-          <p:nvPr/>
-        </p:nvSpPr>
-        <p:spPr bwMode="auto">
-          <a:xfrm>
-            <a:off x="0" y="6000750"/>
-            <a:ext cx="9144000" cy="0"/>
-          </a:xfrm>
-          <a:prstGeom prst="rect">
-            <a:avLst/>
-          </a:prstGeom>
-          <a:noFill/>
-          <a:ln>
-            <a:noFill/>
-          </a:ln>
-          <a:effectLst/>
-          <a:extLst>
-            <a:ext uri="{909E8E84-426E-40DD-AFC4-6F175D3DCCD1}">
-              <a14:hiddenFill xmlns:a14="http://schemas.microsoft.com/office/drawing/2010/main">
-                <a:solidFill>
-                  <a:schemeClr val="accent1"/>
-                </a:solidFill>
-              </a14:hiddenFill>
-            </a:ext>
-            <a:ext uri="{91240B29-F687-4F45-9708-019B960494DF}">
-              <a14:hiddenLine xmlns:a14="http://schemas.microsoft.com/office/drawing/2010/main" w="9525">
-                <a:solidFill>
-                  <a:schemeClr val="tx1"/>
-                </a:solidFill>
-                <a:miter lim="800000"/>
-                <a:headEnd/>
-                <a:tailEnd/>
-              </a14:hiddenLine>
-            </a:ext>
-            <a:ext uri="{AF507438-7753-43E0-B8FC-AC1667EBCBE1}">
-              <a14:hiddenEffects xmlns:a14="http://schemas.microsoft.com/office/drawing/2010/main">
-                <a:effectLst>
-                  <a:outerShdw dist="35921" dir="2700000" algn="ctr" rotWithShape="0">
-                    <a:schemeClr val="bg2"/>
-                  </a:outerShdw>
-                </a:effectLst>
-              </a14:hiddenEffects>
-            </a:ext>
-          </a:extLst>
-        </p:spPr>
-        <p:txBody>
-          <a:bodyPr vert="horz" wrap="none" lIns="91440" tIns="45720" rIns="91440" bIns="45720" numCol="1" anchor="ctr" anchorCtr="0" compatLnSpc="1">
-            <a:prstTxWarp prst="textNoShape">
-              <a:avLst/>
-            </a:prstTxWarp>
-            <a:spAutoFit/>
-          </a:bodyPr>
-          <a:lstStyle/>
-          <a:p>
-            <a:pPr marL="0" marR="0" lvl="0" indent="0" algn="l" defTabSz="914400" rtl="0" eaLnBrk="0" fontAlgn="base" latinLnBrk="0" hangingPunct="0">
-              <a:lnSpc>
-                <a:spcPct val="100000"/>
-              </a:lnSpc>
-              <a:spcBef>
-                <a:spcPct val="0"/>
-              </a:spcBef>
-              <a:spcAft>
-                <a:spcPct val="0"/>
-              </a:spcAft>
-              <a:buClrTx/>
-              <a:buSzTx/>
-              <a:buFontTx/>
-              <a:buNone/>
-              <a:tabLst/>
-            </a:pPr>
-            <a:r>
-              <a:rPr kumimoji="0" lang="it-IT" altLang="en-US" sz="1100" b="0" i="0" u="none" strike="noStrike" cap="none" normalizeH="0" baseline="0">
-                <a:ln>
-                  <a:noFill/>
-                </a:ln>
-                <a:solidFill>
-                  <a:schemeClr val="tx1"/>
-                </a:solidFill>
-                <a:effectLst/>
-                <a:latin typeface="Calibri" panose="020F0502020204030204" pitchFamily="34" charset="0"/>
-                <a:ea typeface="Times New Roman" panose="02020603050405020304" pitchFamily="18" charset="0"/>
-                <a:cs typeface="Times New Roman" panose="02020603050405020304" pitchFamily="18" charset="0"/>
-              </a:rPr>
-              <a:t> </a:t>
-            </a:r>
-            <a:endParaRPr kumimoji="0" lang="it-IT" altLang="en-US" sz="1800" b="0" i="0" u="none" strike="noStrike" cap="none" normalizeH="0" baseline="0">
-              <a:ln>
-                <a:noFill/>
-              </a:ln>
-              <a:solidFill>
-                <a:schemeClr val="tx1"/>
-              </a:solidFill>
-              <a:effectLst/>
-              <a:latin typeface="Arial" panose="020B0604020202020204" pitchFamily="34" charset="0"/>
-            </a:endParaRPr>
+            <a:r>
+              <a:rPr lang="it-IT" dirty="0" smtClean="0"/>
+              <a:t>Deviazione Standard</a:t>
+            </a:r>
+            <a:endParaRPr lang="it-IT" dirty="0"/>
           </a:p>
         </p:txBody>
       </p:sp>
     </p:spTree>
     <p:extLst>
       <p:ext uri="{BB962C8B-B14F-4D97-AF65-F5344CB8AC3E}">
-        <p14:creationId xmlns:p14="http://schemas.microsoft.com/office/powerpoint/2010/main" val="1056726952"/>
+        <p14:creationId xmlns:p14="http://schemas.microsoft.com/office/powerpoint/2010/main" val="2219589939"/>
       </p:ext>
     </p:extLst>
   </p:cSld>
@@ -13258,6 +12807,1899 @@
 </p:sld>
 </file>
 
+<file path=ppt/slides/slide30.xml><?xml version="1.0" encoding="utf-8"?>
+<p:sld xmlns:a="http://schemas.openxmlformats.org/drawingml/2006/main" xmlns:r="http://schemas.openxmlformats.org/officeDocument/2006/relationships" xmlns:p="http://schemas.openxmlformats.org/presentationml/2006/main">
+  <p:cSld>
+    <p:spTree>
+      <p:nvGrpSpPr>
+        <p:cNvPr id="1" name=""/>
+        <p:cNvGrpSpPr/>
+        <p:nvPr/>
+      </p:nvGrpSpPr>
+      <p:grpSpPr>
+        <a:xfrm>
+          <a:off x="0" y="0"/>
+          <a:ext cx="0" cy="0"/>
+          <a:chOff x="0" y="0"/>
+          <a:chExt cx="0" cy="0"/>
+        </a:xfrm>
+      </p:grpSpPr>
+      <p:sp>
+        <p:nvSpPr>
+          <p:cNvPr id="8" name="Segnaposto contenuto 2">
+            <a:extLst>
+              <a:ext uri="{FF2B5EF4-FFF2-40B4-BE49-F238E27FC236}">
+                <a16:creationId xmlns:a16="http://schemas.microsoft.com/office/drawing/2014/main" id="{C2E44FE5-CCA1-4E8F-905A-F2F5CDF25092}"/>
+              </a:ext>
+            </a:extLst>
+          </p:cNvPr>
+          <p:cNvSpPr>
+            <a:spLocks noGrp="1"/>
+          </p:cNvSpPr>
+          <p:nvPr>
+            <p:ph idx="1"/>
+          </p:nvPr>
+        </p:nvSpPr>
+        <p:spPr>
+          <a:xfrm>
+            <a:off x="457200" y="1618456"/>
+            <a:ext cx="8229600" cy="4114800"/>
+          </a:xfrm>
+        </p:spPr>
+        <p:txBody>
+          <a:bodyPr>
+            <a:normAutofit fontScale="92500" lnSpcReduction="20000"/>
+          </a:bodyPr>
+          <a:lstStyle/>
+          <a:p>
+            <a:pPr marL="0" indent="0" algn="just">
+              <a:buNone/>
+            </a:pPr>
+            <a:r>
+              <a:rPr lang="it-IT" dirty="0"/>
+              <a:t>A seguito di questa lunga fase di data </a:t>
+            </a:r>
+            <a:r>
+              <a:rPr lang="it-IT" dirty="0" err="1"/>
+              <a:t>understanding</a:t>
+            </a:r>
+            <a:r>
+              <a:rPr lang="it-IT" dirty="0"/>
+              <a:t>, si è in grado di rispondere alla domanda fondamentale di questo intero progetto</a:t>
+            </a:r>
+            <a:r>
+              <a:rPr lang="it-IT" dirty="0" smtClean="0"/>
+              <a:t>:</a:t>
+            </a:r>
+          </a:p>
+          <a:p>
+            <a:pPr marL="0" indent="0" algn="just">
+              <a:buNone/>
+            </a:pPr>
+            <a:endParaRPr lang="it-IT" dirty="0" smtClean="0"/>
+          </a:p>
+          <a:p>
+            <a:pPr algn="just"/>
+            <a:r>
+              <a:rPr lang="it-IT" dirty="0" smtClean="0">
+                <a:solidFill>
+                  <a:srgbClr val="FF0000"/>
+                </a:solidFill>
+              </a:rPr>
+              <a:t>Quale </a:t>
+            </a:r>
+            <a:r>
+              <a:rPr lang="it-IT" dirty="0">
+                <a:solidFill>
+                  <a:srgbClr val="FF0000"/>
+                </a:solidFill>
+              </a:rPr>
+              <a:t>aspetto del dataset vale la pena analizzare con le tecniche di </a:t>
+            </a:r>
+            <a:r>
+              <a:rPr lang="it-IT" dirty="0" err="1">
+                <a:solidFill>
+                  <a:srgbClr val="FF0000"/>
+                </a:solidFill>
+              </a:rPr>
+              <a:t>clustering</a:t>
+            </a:r>
+            <a:r>
+              <a:rPr lang="it-IT" dirty="0" smtClean="0">
+                <a:solidFill>
+                  <a:srgbClr val="FF0000"/>
+                </a:solidFill>
+              </a:rPr>
+              <a:t>?</a:t>
+            </a:r>
+          </a:p>
+          <a:p>
+            <a:pPr marL="0" indent="0" algn="just">
+              <a:buNone/>
+            </a:pPr>
+            <a:endParaRPr lang="it-IT" dirty="0" smtClean="0">
+              <a:solidFill>
+                <a:srgbClr val="FF0000"/>
+              </a:solidFill>
+            </a:endParaRPr>
+          </a:p>
+          <a:p>
+            <a:pPr marL="0" indent="0" algn="just">
+              <a:buNone/>
+            </a:pPr>
+            <a:r>
+              <a:rPr lang="it-IT" dirty="0" smtClean="0"/>
+              <a:t>Fra quelli esaminati con le tecniche di visualizzazione, è stato scelto non considerare la suddivisione degli esami riguardo all’argomento, ma di concentrarsi su:</a:t>
+            </a:r>
+          </a:p>
+          <a:p>
+            <a:pPr marL="0" indent="0" algn="just">
+              <a:buNone/>
+            </a:pPr>
+            <a:endParaRPr lang="it-IT" dirty="0" smtClean="0"/>
+          </a:p>
+          <a:p>
+            <a:r>
+              <a:rPr lang="it-IT" dirty="0" smtClean="0">
+                <a:solidFill>
+                  <a:srgbClr val="00B050"/>
+                </a:solidFill>
+              </a:rPr>
+              <a:t>Prestazioni generali</a:t>
+            </a:r>
+          </a:p>
+          <a:p>
+            <a:r>
+              <a:rPr lang="it-IT" dirty="0" smtClean="0">
+                <a:solidFill>
+                  <a:srgbClr val="00B050"/>
+                </a:solidFill>
+              </a:rPr>
+              <a:t>Esami del primo anno</a:t>
+            </a:r>
+          </a:p>
+          <a:p>
+            <a:r>
+              <a:rPr lang="it-IT" dirty="0" smtClean="0">
+                <a:solidFill>
+                  <a:srgbClr val="00B050"/>
+                </a:solidFill>
+              </a:rPr>
+              <a:t>Totalità degli esami con voto</a:t>
+            </a:r>
+            <a:endParaRPr lang="it-IT" dirty="0" smtClean="0">
+              <a:solidFill>
+                <a:srgbClr val="00B050"/>
+              </a:solidFill>
+            </a:endParaRPr>
+          </a:p>
+        </p:txBody>
+      </p:sp>
+      <p:sp>
+        <p:nvSpPr>
+          <p:cNvPr id="9" name="Segnaposto contenuto 2">
+            <a:extLst>
+              <a:ext uri="{FF2B5EF4-FFF2-40B4-BE49-F238E27FC236}">
+                <a16:creationId xmlns:a16="http://schemas.microsoft.com/office/drawing/2014/main" id="{89886170-B615-43F8-AA8E-D5565391C42A}"/>
+              </a:ext>
+            </a:extLst>
+          </p:cNvPr>
+          <p:cNvSpPr txBox="1">
+            <a:spLocks/>
+          </p:cNvSpPr>
+          <p:nvPr/>
+        </p:nvSpPr>
+        <p:spPr>
+          <a:xfrm>
+            <a:off x="457200" y="5029199"/>
+            <a:ext cx="8229600" cy="1074753"/>
+          </a:xfrm>
+          <a:prstGeom prst="rect">
+            <a:avLst/>
+          </a:prstGeom>
+        </p:spPr>
+        <p:txBody>
+          <a:bodyPr vert="horz" lIns="91440" tIns="45720" rIns="91440" bIns="45720" rtlCol="0">
+            <a:normAutofit/>
+          </a:bodyPr>
+          <a:lstStyle>
+            <a:lvl1pPr marL="257175" indent="-257175" algn="l" defTabSz="342900" rtl="0" eaLnBrk="1" latinLnBrk="0" hangingPunct="1">
+              <a:spcBef>
+                <a:spcPct val="20000"/>
+              </a:spcBef>
+              <a:buFont typeface="Arial"/>
+              <a:buChar char="•"/>
+              <a:defRPr sz="2400" kern="1200">
+                <a:solidFill>
+                  <a:schemeClr val="tx1"/>
+                </a:solidFill>
+                <a:latin typeface="+mn-lt"/>
+                <a:ea typeface="+mn-ea"/>
+                <a:cs typeface="+mn-cs"/>
+              </a:defRPr>
+            </a:lvl1pPr>
+            <a:lvl2pPr marL="557213" indent="-214313" algn="l" defTabSz="342900" rtl="0" eaLnBrk="1" latinLnBrk="0" hangingPunct="1">
+              <a:spcBef>
+                <a:spcPct val="20000"/>
+              </a:spcBef>
+              <a:buFont typeface="Arial"/>
+              <a:buChar char="–"/>
+              <a:defRPr sz="2100" kern="1200">
+                <a:solidFill>
+                  <a:schemeClr val="tx1"/>
+                </a:solidFill>
+                <a:latin typeface="+mn-lt"/>
+                <a:ea typeface="+mn-ea"/>
+                <a:cs typeface="+mn-cs"/>
+              </a:defRPr>
+            </a:lvl2pPr>
+            <a:lvl3pPr marL="857250" indent="-171450" algn="l" defTabSz="342900" rtl="0" eaLnBrk="1" latinLnBrk="0" hangingPunct="1">
+              <a:spcBef>
+                <a:spcPct val="20000"/>
+              </a:spcBef>
+              <a:buFont typeface="Arial"/>
+              <a:buChar char="•"/>
+              <a:defRPr sz="1800" kern="1200">
+                <a:solidFill>
+                  <a:schemeClr val="tx1"/>
+                </a:solidFill>
+                <a:latin typeface="+mn-lt"/>
+                <a:ea typeface="+mn-ea"/>
+                <a:cs typeface="+mn-cs"/>
+              </a:defRPr>
+            </a:lvl3pPr>
+            <a:lvl4pPr marL="1200150" indent="-171450" algn="l" defTabSz="342900" rtl="0" eaLnBrk="1" latinLnBrk="0" hangingPunct="1">
+              <a:spcBef>
+                <a:spcPct val="20000"/>
+              </a:spcBef>
+              <a:buFont typeface="Arial"/>
+              <a:buChar char="–"/>
+              <a:defRPr sz="1500" kern="1200">
+                <a:solidFill>
+                  <a:schemeClr val="tx1"/>
+                </a:solidFill>
+                <a:latin typeface="+mn-lt"/>
+                <a:ea typeface="+mn-ea"/>
+                <a:cs typeface="+mn-cs"/>
+              </a:defRPr>
+            </a:lvl4pPr>
+            <a:lvl5pPr marL="1543050" indent="-171450" algn="l" defTabSz="342900" rtl="0" eaLnBrk="1" latinLnBrk="0" hangingPunct="1">
+              <a:spcBef>
+                <a:spcPct val="20000"/>
+              </a:spcBef>
+              <a:buFont typeface="Arial"/>
+              <a:buChar char="»"/>
+              <a:defRPr sz="1500" kern="1200">
+                <a:solidFill>
+                  <a:schemeClr val="tx1"/>
+                </a:solidFill>
+                <a:latin typeface="+mn-lt"/>
+                <a:ea typeface="+mn-ea"/>
+                <a:cs typeface="+mn-cs"/>
+              </a:defRPr>
+            </a:lvl5pPr>
+            <a:lvl6pPr marL="1885950" indent="-171450" algn="l" defTabSz="342900" rtl="0" eaLnBrk="1" latinLnBrk="0" hangingPunct="1">
+              <a:spcBef>
+                <a:spcPct val="20000"/>
+              </a:spcBef>
+              <a:buFont typeface="Arial"/>
+              <a:buChar char="•"/>
+              <a:defRPr sz="1500" kern="1200">
+                <a:solidFill>
+                  <a:schemeClr val="tx1"/>
+                </a:solidFill>
+                <a:latin typeface="+mn-lt"/>
+                <a:ea typeface="+mn-ea"/>
+                <a:cs typeface="+mn-cs"/>
+              </a:defRPr>
+            </a:lvl6pPr>
+            <a:lvl7pPr marL="2228850" indent="-171450" algn="l" defTabSz="342900" rtl="0" eaLnBrk="1" latinLnBrk="0" hangingPunct="1">
+              <a:spcBef>
+                <a:spcPct val="20000"/>
+              </a:spcBef>
+              <a:buFont typeface="Arial"/>
+              <a:buChar char="•"/>
+              <a:defRPr sz="1500" kern="1200">
+                <a:solidFill>
+                  <a:schemeClr val="tx1"/>
+                </a:solidFill>
+                <a:latin typeface="+mn-lt"/>
+                <a:ea typeface="+mn-ea"/>
+                <a:cs typeface="+mn-cs"/>
+              </a:defRPr>
+            </a:lvl7pPr>
+            <a:lvl8pPr marL="2571750" indent="-171450" algn="l" defTabSz="342900" rtl="0" eaLnBrk="1" latinLnBrk="0" hangingPunct="1">
+              <a:spcBef>
+                <a:spcPct val="20000"/>
+              </a:spcBef>
+              <a:buFont typeface="Arial"/>
+              <a:buChar char="•"/>
+              <a:defRPr sz="1500" kern="1200">
+                <a:solidFill>
+                  <a:schemeClr val="tx1"/>
+                </a:solidFill>
+                <a:latin typeface="+mn-lt"/>
+                <a:ea typeface="+mn-ea"/>
+                <a:cs typeface="+mn-cs"/>
+              </a:defRPr>
+            </a:lvl8pPr>
+            <a:lvl9pPr marL="2914650" indent="-171450" algn="l" defTabSz="342900" rtl="0" eaLnBrk="1" latinLnBrk="0" hangingPunct="1">
+              <a:spcBef>
+                <a:spcPct val="20000"/>
+              </a:spcBef>
+              <a:buFont typeface="Arial"/>
+              <a:buChar char="•"/>
+              <a:defRPr sz="1500" kern="1200">
+                <a:solidFill>
+                  <a:schemeClr val="tx1"/>
+                </a:solidFill>
+                <a:latin typeface="+mn-lt"/>
+                <a:ea typeface="+mn-ea"/>
+                <a:cs typeface="+mn-cs"/>
+              </a:defRPr>
+            </a:lvl9pPr>
+          </a:lstStyle>
+          <a:p>
+            <a:pPr marL="0" indent="0" algn="just">
+              <a:buFont typeface="Arial"/>
+              <a:buNone/>
+            </a:pPr>
+            <a:endParaRPr lang="it-IT" dirty="0"/>
+          </a:p>
+          <a:p>
+            <a:pPr marL="0" indent="0" algn="just">
+              <a:buFont typeface="Arial"/>
+              <a:buNone/>
+            </a:pPr>
+            <a:endParaRPr lang="it-IT" dirty="0"/>
+          </a:p>
+          <a:p>
+            <a:endParaRPr lang="en-US" sz="2000" dirty="0"/>
+          </a:p>
+        </p:txBody>
+      </p:sp>
+      <p:sp>
+        <p:nvSpPr>
+          <p:cNvPr id="7" name="Titolo 1">
+            <a:extLst>
+              <a:ext uri="{FF2B5EF4-FFF2-40B4-BE49-F238E27FC236}">
+                <a16:creationId xmlns:a16="http://schemas.microsoft.com/office/drawing/2014/main" id="{588E765D-4A18-43EC-9070-BBB19613F406}"/>
+              </a:ext>
+            </a:extLst>
+          </p:cNvPr>
+          <p:cNvSpPr>
+            <a:spLocks noGrp="1"/>
+          </p:cNvSpPr>
+          <p:nvPr>
+            <p:ph type="title"/>
+          </p:nvPr>
+        </p:nvSpPr>
+        <p:spPr>
+          <a:xfrm>
+            <a:off x="457200" y="548680"/>
+            <a:ext cx="8229600" cy="1143000"/>
+          </a:xfrm>
+        </p:spPr>
+        <p:txBody>
+          <a:bodyPr>
+            <a:noAutofit/>
+          </a:bodyPr>
+          <a:lstStyle/>
+          <a:p>
+            <a:r>
+              <a:rPr lang="it-IT" sz="2700" dirty="0"/>
+              <a:t>CONCLUSIONI</a:t>
+            </a:r>
+            <a:endParaRPr lang="en-US" sz="2700" dirty="0"/>
+          </a:p>
+        </p:txBody>
+      </p:sp>
+      <p:sp>
+        <p:nvSpPr>
+          <p:cNvPr id="6" name="Titolo 1">
+            <a:extLst>
+              <a:ext uri="{FF2B5EF4-FFF2-40B4-BE49-F238E27FC236}">
+                <a16:creationId xmlns:a16="http://schemas.microsoft.com/office/drawing/2014/main" id="{32602169-0966-4893-B032-33CFCD986CA0}"/>
+              </a:ext>
+            </a:extLst>
+          </p:cNvPr>
+          <p:cNvSpPr txBox="1">
+            <a:spLocks/>
+          </p:cNvSpPr>
+          <p:nvPr/>
+        </p:nvSpPr>
+        <p:spPr>
+          <a:xfrm>
+            <a:off x="1447800" y="152400"/>
+            <a:ext cx="8229600" cy="1143000"/>
+          </a:xfrm>
+          <a:prstGeom prst="rect">
+            <a:avLst/>
+          </a:prstGeom>
+        </p:spPr>
+        <p:txBody>
+          <a:bodyPr>
+            <a:noAutofit/>
+          </a:bodyPr>
+          <a:lstStyle>
+            <a:lvl1pPr algn="ctr" defTabSz="342900" rtl="0" eaLnBrk="1" latinLnBrk="0" hangingPunct="1">
+              <a:spcBef>
+                <a:spcPct val="0"/>
+              </a:spcBef>
+              <a:buNone/>
+              <a:defRPr sz="3300" kern="1200">
+                <a:solidFill>
+                  <a:schemeClr val="tx1"/>
+                </a:solidFill>
+                <a:latin typeface="+mj-lt"/>
+                <a:ea typeface="+mj-ea"/>
+                <a:cs typeface="+mj-cs"/>
+              </a:defRPr>
+            </a:lvl1pPr>
+          </a:lstStyle>
+          <a:p>
+            <a:r>
+              <a:rPr lang="it-IT" sz="2400" b="1" dirty="0">
+                <a:solidFill>
+                  <a:schemeClr val="bg1"/>
+                </a:solidFill>
+              </a:rPr>
+              <a:t>DATA UNDERSTANDING: </a:t>
+            </a:r>
+            <a:r>
+              <a:rPr lang="it-IT" sz="2400" dirty="0">
+                <a:solidFill>
+                  <a:schemeClr val="bg1"/>
+                </a:solidFill>
+              </a:rPr>
+              <a:t>CONCLUSIONI</a:t>
+            </a:r>
+            <a:endParaRPr lang="en-US" sz="2400" dirty="0">
+              <a:solidFill>
+                <a:schemeClr val="bg1"/>
+              </a:solidFill>
+            </a:endParaRPr>
+          </a:p>
+        </p:txBody>
+      </p:sp>
+      <p:sp>
+        <p:nvSpPr>
+          <p:cNvPr id="2" name="Rectangle 6">
+            <a:extLst>
+              <a:ext uri="{FF2B5EF4-FFF2-40B4-BE49-F238E27FC236}">
+                <a16:creationId xmlns:a16="http://schemas.microsoft.com/office/drawing/2014/main" id="{FC5724C9-24A0-4B40-9A3A-FE717EF7AA55}"/>
+              </a:ext>
+            </a:extLst>
+          </p:cNvPr>
+          <p:cNvSpPr>
+            <a:spLocks noChangeArrowheads="1"/>
+          </p:cNvSpPr>
+          <p:nvPr/>
+        </p:nvSpPr>
+        <p:spPr bwMode="auto">
+          <a:xfrm>
+            <a:off x="0" y="0"/>
+            <a:ext cx="9144000" cy="457200"/>
+          </a:xfrm>
+          <a:prstGeom prst="rect">
+            <a:avLst/>
+          </a:prstGeom>
+          <a:noFill/>
+          <a:ln>
+            <a:noFill/>
+          </a:ln>
+          <a:effectLst/>
+          <a:extLst>
+            <a:ext uri="{909E8E84-426E-40DD-AFC4-6F175D3DCCD1}">
+              <a14:hiddenFill xmlns:a14="http://schemas.microsoft.com/office/drawing/2010/main">
+                <a:solidFill>
+                  <a:schemeClr val="accent1"/>
+                </a:solidFill>
+              </a14:hiddenFill>
+            </a:ext>
+            <a:ext uri="{91240B29-F687-4F45-9708-019B960494DF}">
+              <a14:hiddenLine xmlns:a14="http://schemas.microsoft.com/office/drawing/2010/main" w="9525">
+                <a:solidFill>
+                  <a:schemeClr val="tx1"/>
+                </a:solidFill>
+                <a:miter lim="800000"/>
+                <a:headEnd/>
+                <a:tailEnd/>
+              </a14:hiddenLine>
+            </a:ext>
+            <a:ext uri="{AF507438-7753-43E0-B8FC-AC1667EBCBE1}">
+              <a14:hiddenEffects xmlns:a14="http://schemas.microsoft.com/office/drawing/2010/main">
+                <a:effectLst>
+                  <a:outerShdw dist="35921" dir="2700000" algn="ctr" rotWithShape="0">
+                    <a:schemeClr val="bg2"/>
+                  </a:outerShdw>
+                </a:effectLst>
+              </a14:hiddenEffects>
+            </a:ext>
+          </a:extLst>
+        </p:spPr>
+        <p:txBody>
+          <a:bodyPr vert="horz" wrap="none" lIns="91440" tIns="45720" rIns="91440" bIns="45720" numCol="1" anchor="ctr" anchorCtr="0" compatLnSpc="1">
+            <a:prstTxWarp prst="textNoShape">
+              <a:avLst/>
+            </a:prstTxWarp>
+            <a:spAutoFit/>
+          </a:bodyPr>
+          <a:lstStyle/>
+          <a:p>
+            <a:endParaRPr lang="en-US"/>
+          </a:p>
+        </p:txBody>
+      </p:sp>
+      <p:sp>
+        <p:nvSpPr>
+          <p:cNvPr id="3" name="Rectangle 7">
+            <a:extLst>
+              <a:ext uri="{FF2B5EF4-FFF2-40B4-BE49-F238E27FC236}">
+                <a16:creationId xmlns:a16="http://schemas.microsoft.com/office/drawing/2014/main" id="{C08042F5-96DB-4FE6-B699-C1DFAB71C0C5}"/>
+              </a:ext>
+            </a:extLst>
+          </p:cNvPr>
+          <p:cNvSpPr>
+            <a:spLocks noChangeArrowheads="1"/>
+          </p:cNvSpPr>
+          <p:nvPr/>
+        </p:nvSpPr>
+        <p:spPr bwMode="auto">
+          <a:xfrm>
+            <a:off x="0" y="1838325"/>
+            <a:ext cx="9144000" cy="0"/>
+          </a:xfrm>
+          <a:prstGeom prst="rect">
+            <a:avLst/>
+          </a:prstGeom>
+          <a:noFill/>
+          <a:ln>
+            <a:noFill/>
+          </a:ln>
+          <a:effectLst/>
+          <a:extLst>
+            <a:ext uri="{909E8E84-426E-40DD-AFC4-6F175D3DCCD1}">
+              <a14:hiddenFill xmlns:a14="http://schemas.microsoft.com/office/drawing/2010/main">
+                <a:solidFill>
+                  <a:schemeClr val="accent1"/>
+                </a:solidFill>
+              </a14:hiddenFill>
+            </a:ext>
+            <a:ext uri="{91240B29-F687-4F45-9708-019B960494DF}">
+              <a14:hiddenLine xmlns:a14="http://schemas.microsoft.com/office/drawing/2010/main" w="9525">
+                <a:solidFill>
+                  <a:schemeClr val="tx1"/>
+                </a:solidFill>
+                <a:miter lim="800000"/>
+                <a:headEnd/>
+                <a:tailEnd/>
+              </a14:hiddenLine>
+            </a:ext>
+            <a:ext uri="{AF507438-7753-43E0-B8FC-AC1667EBCBE1}">
+              <a14:hiddenEffects xmlns:a14="http://schemas.microsoft.com/office/drawing/2010/main">
+                <a:effectLst>
+                  <a:outerShdw dist="35921" dir="2700000" algn="ctr" rotWithShape="0">
+                    <a:schemeClr val="bg2"/>
+                  </a:outerShdw>
+                </a:effectLst>
+              </a14:hiddenEffects>
+            </a:ext>
+          </a:extLst>
+        </p:spPr>
+        <p:txBody>
+          <a:bodyPr vert="horz" wrap="none" lIns="91440" tIns="45720" rIns="91440" bIns="45720" numCol="1" anchor="ctr" anchorCtr="0" compatLnSpc="1">
+            <a:prstTxWarp prst="textNoShape">
+              <a:avLst/>
+            </a:prstTxWarp>
+            <a:spAutoFit/>
+          </a:bodyPr>
+          <a:lstStyle/>
+          <a:p>
+            <a:pPr marL="0" marR="0" lvl="0" indent="0" algn="l" defTabSz="914400" rtl="0" eaLnBrk="0" fontAlgn="base" latinLnBrk="0" hangingPunct="0">
+              <a:lnSpc>
+                <a:spcPct val="100000"/>
+              </a:lnSpc>
+              <a:spcBef>
+                <a:spcPct val="0"/>
+              </a:spcBef>
+              <a:spcAft>
+                <a:spcPct val="0"/>
+              </a:spcAft>
+              <a:buClrTx/>
+              <a:buSzTx/>
+              <a:buFontTx/>
+              <a:buNone/>
+              <a:tabLst/>
+            </a:pPr>
+            <a:r>
+              <a:rPr kumimoji="0" lang="it-IT" altLang="en-US" sz="1100" b="0" i="0" u="none" strike="noStrike" cap="none" normalizeH="0" baseline="0">
+                <a:ln>
+                  <a:noFill/>
+                </a:ln>
+                <a:solidFill>
+                  <a:schemeClr val="tx1"/>
+                </a:solidFill>
+                <a:effectLst/>
+                <a:latin typeface="Calibri" panose="020F0502020204030204" pitchFamily="34" charset="0"/>
+                <a:ea typeface="Times New Roman" panose="02020603050405020304" pitchFamily="18" charset="0"/>
+                <a:cs typeface="Times New Roman" panose="02020603050405020304" pitchFamily="18" charset="0"/>
+              </a:rPr>
+              <a:t> </a:t>
+            </a:r>
+            <a:endParaRPr kumimoji="0" lang="it-IT" altLang="en-US" sz="1800" b="0" i="0" u="none" strike="noStrike" cap="none" normalizeH="0" baseline="0">
+              <a:ln>
+                <a:noFill/>
+              </a:ln>
+              <a:solidFill>
+                <a:schemeClr val="tx1"/>
+              </a:solidFill>
+              <a:effectLst/>
+              <a:latin typeface="Arial" panose="020B0604020202020204" pitchFamily="34" charset="0"/>
+            </a:endParaRPr>
+          </a:p>
+        </p:txBody>
+      </p:sp>
+      <p:sp>
+        <p:nvSpPr>
+          <p:cNvPr id="4" name="Rectangle 8">
+            <a:extLst>
+              <a:ext uri="{FF2B5EF4-FFF2-40B4-BE49-F238E27FC236}">
+                <a16:creationId xmlns:a16="http://schemas.microsoft.com/office/drawing/2014/main" id="{E0CBE371-8058-4503-A250-42442AAE21EC}"/>
+              </a:ext>
+            </a:extLst>
+          </p:cNvPr>
+          <p:cNvSpPr>
+            <a:spLocks noChangeArrowheads="1"/>
+          </p:cNvSpPr>
+          <p:nvPr/>
+        </p:nvSpPr>
+        <p:spPr bwMode="auto">
+          <a:xfrm>
+            <a:off x="0" y="3219450"/>
+            <a:ext cx="9144000" cy="0"/>
+          </a:xfrm>
+          <a:prstGeom prst="rect">
+            <a:avLst/>
+          </a:prstGeom>
+          <a:noFill/>
+          <a:ln>
+            <a:noFill/>
+          </a:ln>
+          <a:effectLst/>
+          <a:extLst>
+            <a:ext uri="{909E8E84-426E-40DD-AFC4-6F175D3DCCD1}">
+              <a14:hiddenFill xmlns:a14="http://schemas.microsoft.com/office/drawing/2010/main">
+                <a:solidFill>
+                  <a:schemeClr val="accent1"/>
+                </a:solidFill>
+              </a14:hiddenFill>
+            </a:ext>
+            <a:ext uri="{91240B29-F687-4F45-9708-019B960494DF}">
+              <a14:hiddenLine xmlns:a14="http://schemas.microsoft.com/office/drawing/2010/main" w="9525">
+                <a:solidFill>
+                  <a:schemeClr val="tx1"/>
+                </a:solidFill>
+                <a:miter lim="800000"/>
+                <a:headEnd/>
+                <a:tailEnd/>
+              </a14:hiddenLine>
+            </a:ext>
+            <a:ext uri="{AF507438-7753-43E0-B8FC-AC1667EBCBE1}">
+              <a14:hiddenEffects xmlns:a14="http://schemas.microsoft.com/office/drawing/2010/main">
+                <a:effectLst>
+                  <a:outerShdw dist="35921" dir="2700000" algn="ctr" rotWithShape="0">
+                    <a:schemeClr val="bg2"/>
+                  </a:outerShdw>
+                </a:effectLst>
+              </a14:hiddenEffects>
+            </a:ext>
+          </a:extLst>
+        </p:spPr>
+        <p:txBody>
+          <a:bodyPr vert="horz" wrap="none" lIns="91440" tIns="45720" rIns="91440" bIns="45720" numCol="1" anchor="ctr" anchorCtr="0" compatLnSpc="1">
+            <a:prstTxWarp prst="textNoShape">
+              <a:avLst/>
+            </a:prstTxWarp>
+            <a:spAutoFit/>
+          </a:bodyPr>
+          <a:lstStyle/>
+          <a:p>
+            <a:pPr marL="0" marR="0" lvl="0" indent="0" algn="l" defTabSz="914400" rtl="0" eaLnBrk="0" fontAlgn="base" latinLnBrk="0" hangingPunct="0">
+              <a:lnSpc>
+                <a:spcPct val="100000"/>
+              </a:lnSpc>
+              <a:spcBef>
+                <a:spcPct val="0"/>
+              </a:spcBef>
+              <a:spcAft>
+                <a:spcPct val="0"/>
+              </a:spcAft>
+              <a:buClrTx/>
+              <a:buSzTx/>
+              <a:buFontTx/>
+              <a:buNone/>
+              <a:tabLst/>
+            </a:pPr>
+            <a:r>
+              <a:rPr kumimoji="0" lang="it-IT" altLang="en-US" sz="1100" b="0" i="0" u="none" strike="noStrike" cap="none" normalizeH="0" baseline="0">
+                <a:ln>
+                  <a:noFill/>
+                </a:ln>
+                <a:solidFill>
+                  <a:schemeClr val="tx1"/>
+                </a:solidFill>
+                <a:effectLst/>
+                <a:latin typeface="Calibri" panose="020F0502020204030204" pitchFamily="34" charset="0"/>
+                <a:ea typeface="Times New Roman" panose="02020603050405020304" pitchFamily="18" charset="0"/>
+                <a:cs typeface="Times New Roman" panose="02020603050405020304" pitchFamily="18" charset="0"/>
+              </a:rPr>
+              <a:t> </a:t>
+            </a:r>
+            <a:endParaRPr kumimoji="0" lang="it-IT" altLang="en-US" sz="1800" b="0" i="0" u="none" strike="noStrike" cap="none" normalizeH="0" baseline="0">
+              <a:ln>
+                <a:noFill/>
+              </a:ln>
+              <a:solidFill>
+                <a:schemeClr val="tx1"/>
+              </a:solidFill>
+              <a:effectLst/>
+              <a:latin typeface="Arial" panose="020B0604020202020204" pitchFamily="34" charset="0"/>
+            </a:endParaRPr>
+          </a:p>
+        </p:txBody>
+      </p:sp>
+      <p:sp>
+        <p:nvSpPr>
+          <p:cNvPr id="10" name="Rectangle 9">
+            <a:extLst>
+              <a:ext uri="{FF2B5EF4-FFF2-40B4-BE49-F238E27FC236}">
+                <a16:creationId xmlns:a16="http://schemas.microsoft.com/office/drawing/2014/main" id="{99468FB6-6461-4A91-9E0B-2B3FC25F715E}"/>
+              </a:ext>
+            </a:extLst>
+          </p:cNvPr>
+          <p:cNvSpPr>
+            <a:spLocks noChangeArrowheads="1"/>
+          </p:cNvSpPr>
+          <p:nvPr/>
+        </p:nvSpPr>
+        <p:spPr bwMode="auto">
+          <a:xfrm>
+            <a:off x="0" y="4600575"/>
+            <a:ext cx="9144000" cy="0"/>
+          </a:xfrm>
+          <a:prstGeom prst="rect">
+            <a:avLst/>
+          </a:prstGeom>
+          <a:noFill/>
+          <a:ln>
+            <a:noFill/>
+          </a:ln>
+          <a:effectLst/>
+          <a:extLst>
+            <a:ext uri="{909E8E84-426E-40DD-AFC4-6F175D3DCCD1}">
+              <a14:hiddenFill xmlns:a14="http://schemas.microsoft.com/office/drawing/2010/main">
+                <a:solidFill>
+                  <a:schemeClr val="accent1"/>
+                </a:solidFill>
+              </a14:hiddenFill>
+            </a:ext>
+            <a:ext uri="{91240B29-F687-4F45-9708-019B960494DF}">
+              <a14:hiddenLine xmlns:a14="http://schemas.microsoft.com/office/drawing/2010/main" w="9525">
+                <a:solidFill>
+                  <a:schemeClr val="tx1"/>
+                </a:solidFill>
+                <a:miter lim="800000"/>
+                <a:headEnd/>
+                <a:tailEnd/>
+              </a14:hiddenLine>
+            </a:ext>
+            <a:ext uri="{AF507438-7753-43E0-B8FC-AC1667EBCBE1}">
+              <a14:hiddenEffects xmlns:a14="http://schemas.microsoft.com/office/drawing/2010/main">
+                <a:effectLst>
+                  <a:outerShdw dist="35921" dir="2700000" algn="ctr" rotWithShape="0">
+                    <a:schemeClr val="bg2"/>
+                  </a:outerShdw>
+                </a:effectLst>
+              </a14:hiddenEffects>
+            </a:ext>
+          </a:extLst>
+        </p:spPr>
+        <p:txBody>
+          <a:bodyPr vert="horz" wrap="none" lIns="91440" tIns="45720" rIns="91440" bIns="45720" numCol="1" anchor="ctr" anchorCtr="0" compatLnSpc="1">
+            <a:prstTxWarp prst="textNoShape">
+              <a:avLst/>
+            </a:prstTxWarp>
+            <a:spAutoFit/>
+          </a:bodyPr>
+          <a:lstStyle/>
+          <a:p>
+            <a:pPr marL="0" marR="0" lvl="0" indent="0" algn="l" defTabSz="914400" rtl="0" eaLnBrk="0" fontAlgn="base" latinLnBrk="0" hangingPunct="0">
+              <a:lnSpc>
+                <a:spcPct val="100000"/>
+              </a:lnSpc>
+              <a:spcBef>
+                <a:spcPct val="0"/>
+              </a:spcBef>
+              <a:spcAft>
+                <a:spcPct val="0"/>
+              </a:spcAft>
+              <a:buClrTx/>
+              <a:buSzTx/>
+              <a:buFontTx/>
+              <a:buNone/>
+              <a:tabLst/>
+            </a:pPr>
+            <a:r>
+              <a:rPr kumimoji="0" lang="it-IT" altLang="en-US" sz="1100" b="0" i="0" u="none" strike="noStrike" cap="none" normalizeH="0" baseline="0">
+                <a:ln>
+                  <a:noFill/>
+                </a:ln>
+                <a:solidFill>
+                  <a:schemeClr val="tx1"/>
+                </a:solidFill>
+                <a:effectLst/>
+                <a:latin typeface="Calibri" panose="020F0502020204030204" pitchFamily="34" charset="0"/>
+                <a:ea typeface="Times New Roman" panose="02020603050405020304" pitchFamily="18" charset="0"/>
+                <a:cs typeface="Times New Roman" panose="02020603050405020304" pitchFamily="18" charset="0"/>
+              </a:rPr>
+              <a:t> </a:t>
+            </a:r>
+            <a:endParaRPr kumimoji="0" lang="it-IT" altLang="en-US" sz="1800" b="0" i="0" u="none" strike="noStrike" cap="none" normalizeH="0" baseline="0">
+              <a:ln>
+                <a:noFill/>
+              </a:ln>
+              <a:solidFill>
+                <a:schemeClr val="tx1"/>
+              </a:solidFill>
+              <a:effectLst/>
+              <a:latin typeface="Arial" panose="020B0604020202020204" pitchFamily="34" charset="0"/>
+            </a:endParaRPr>
+          </a:p>
+        </p:txBody>
+      </p:sp>
+      <p:sp>
+        <p:nvSpPr>
+          <p:cNvPr id="11" name="Rectangle 10">
+            <a:extLst>
+              <a:ext uri="{FF2B5EF4-FFF2-40B4-BE49-F238E27FC236}">
+                <a16:creationId xmlns:a16="http://schemas.microsoft.com/office/drawing/2014/main" id="{E4D9815E-FC57-48D4-9710-C34FDAE236EF}"/>
+              </a:ext>
+            </a:extLst>
+          </p:cNvPr>
+          <p:cNvSpPr>
+            <a:spLocks noChangeArrowheads="1"/>
+          </p:cNvSpPr>
+          <p:nvPr/>
+        </p:nvSpPr>
+        <p:spPr bwMode="auto">
+          <a:xfrm>
+            <a:off x="0" y="6000750"/>
+            <a:ext cx="9144000" cy="0"/>
+          </a:xfrm>
+          <a:prstGeom prst="rect">
+            <a:avLst/>
+          </a:prstGeom>
+          <a:noFill/>
+          <a:ln>
+            <a:noFill/>
+          </a:ln>
+          <a:effectLst/>
+          <a:extLst>
+            <a:ext uri="{909E8E84-426E-40DD-AFC4-6F175D3DCCD1}">
+              <a14:hiddenFill xmlns:a14="http://schemas.microsoft.com/office/drawing/2010/main">
+                <a:solidFill>
+                  <a:schemeClr val="accent1"/>
+                </a:solidFill>
+              </a14:hiddenFill>
+            </a:ext>
+            <a:ext uri="{91240B29-F687-4F45-9708-019B960494DF}">
+              <a14:hiddenLine xmlns:a14="http://schemas.microsoft.com/office/drawing/2010/main" w="9525">
+                <a:solidFill>
+                  <a:schemeClr val="tx1"/>
+                </a:solidFill>
+                <a:miter lim="800000"/>
+                <a:headEnd/>
+                <a:tailEnd/>
+              </a14:hiddenLine>
+            </a:ext>
+            <a:ext uri="{AF507438-7753-43E0-B8FC-AC1667EBCBE1}">
+              <a14:hiddenEffects xmlns:a14="http://schemas.microsoft.com/office/drawing/2010/main">
+                <a:effectLst>
+                  <a:outerShdw dist="35921" dir="2700000" algn="ctr" rotWithShape="0">
+                    <a:schemeClr val="bg2"/>
+                  </a:outerShdw>
+                </a:effectLst>
+              </a14:hiddenEffects>
+            </a:ext>
+          </a:extLst>
+        </p:spPr>
+        <p:txBody>
+          <a:bodyPr vert="horz" wrap="none" lIns="91440" tIns="45720" rIns="91440" bIns="45720" numCol="1" anchor="ctr" anchorCtr="0" compatLnSpc="1">
+            <a:prstTxWarp prst="textNoShape">
+              <a:avLst/>
+            </a:prstTxWarp>
+            <a:spAutoFit/>
+          </a:bodyPr>
+          <a:lstStyle/>
+          <a:p>
+            <a:pPr marL="0" marR="0" lvl="0" indent="0" algn="l" defTabSz="914400" rtl="0" eaLnBrk="0" fontAlgn="base" latinLnBrk="0" hangingPunct="0">
+              <a:lnSpc>
+                <a:spcPct val="100000"/>
+              </a:lnSpc>
+              <a:spcBef>
+                <a:spcPct val="0"/>
+              </a:spcBef>
+              <a:spcAft>
+                <a:spcPct val="0"/>
+              </a:spcAft>
+              <a:buClrTx/>
+              <a:buSzTx/>
+              <a:buFontTx/>
+              <a:buNone/>
+              <a:tabLst/>
+            </a:pPr>
+            <a:r>
+              <a:rPr kumimoji="0" lang="it-IT" altLang="en-US" sz="1100" b="0" i="0" u="none" strike="noStrike" cap="none" normalizeH="0" baseline="0">
+                <a:ln>
+                  <a:noFill/>
+                </a:ln>
+                <a:solidFill>
+                  <a:schemeClr val="tx1"/>
+                </a:solidFill>
+                <a:effectLst/>
+                <a:latin typeface="Calibri" panose="020F0502020204030204" pitchFamily="34" charset="0"/>
+                <a:ea typeface="Times New Roman" panose="02020603050405020304" pitchFamily="18" charset="0"/>
+                <a:cs typeface="Times New Roman" panose="02020603050405020304" pitchFamily="18" charset="0"/>
+              </a:rPr>
+              <a:t> </a:t>
+            </a:r>
+            <a:endParaRPr kumimoji="0" lang="it-IT" altLang="en-US" sz="1800" b="0" i="0" u="none" strike="noStrike" cap="none" normalizeH="0" baseline="0">
+              <a:ln>
+                <a:noFill/>
+              </a:ln>
+              <a:solidFill>
+                <a:schemeClr val="tx1"/>
+              </a:solidFill>
+              <a:effectLst/>
+              <a:latin typeface="Arial" panose="020B0604020202020204" pitchFamily="34" charset="0"/>
+            </a:endParaRPr>
+          </a:p>
+        </p:txBody>
+      </p:sp>
+    </p:spTree>
+    <p:extLst>
+      <p:ext uri="{BB962C8B-B14F-4D97-AF65-F5344CB8AC3E}">
+        <p14:creationId xmlns:p14="http://schemas.microsoft.com/office/powerpoint/2010/main" val="1056726952"/>
+      </p:ext>
+    </p:extLst>
+  </p:cSld>
+  <p:clrMapOvr>
+    <a:masterClrMapping/>
+  </p:clrMapOvr>
+</p:sld>
+</file>
+
+<file path=ppt/slides/slide31.xml><?xml version="1.0" encoding="utf-8"?>
+<p:sld xmlns:a="http://schemas.openxmlformats.org/drawingml/2006/main" xmlns:r="http://schemas.openxmlformats.org/officeDocument/2006/relationships" xmlns:p="http://schemas.openxmlformats.org/presentationml/2006/main">
+  <p:cSld>
+    <p:spTree>
+      <p:nvGrpSpPr>
+        <p:cNvPr id="1" name=""/>
+        <p:cNvGrpSpPr/>
+        <p:nvPr/>
+      </p:nvGrpSpPr>
+      <p:grpSpPr>
+        <a:xfrm>
+          <a:off x="0" y="0"/>
+          <a:ext cx="0" cy="0"/>
+          <a:chOff x="0" y="0"/>
+          <a:chExt cx="0" cy="0"/>
+        </a:xfrm>
+      </p:grpSpPr>
+      <p:sp>
+        <p:nvSpPr>
+          <p:cNvPr id="8" name="Segnaposto contenuto 2">
+            <a:extLst>
+              <a:ext uri="{FF2B5EF4-FFF2-40B4-BE49-F238E27FC236}">
+                <a16:creationId xmlns:a16="http://schemas.microsoft.com/office/drawing/2014/main" id="{C2E44FE5-CCA1-4E8F-905A-F2F5CDF25092}"/>
+              </a:ext>
+            </a:extLst>
+          </p:cNvPr>
+          <p:cNvSpPr>
+            <a:spLocks noGrp="1"/>
+          </p:cNvSpPr>
+          <p:nvPr>
+            <p:ph idx="1"/>
+          </p:nvPr>
+        </p:nvSpPr>
+        <p:spPr>
+          <a:xfrm>
+            <a:off x="457200" y="1700808"/>
+            <a:ext cx="8229600" cy="4114800"/>
+          </a:xfrm>
+        </p:spPr>
+        <p:txBody>
+          <a:bodyPr>
+            <a:normAutofit/>
+          </a:bodyPr>
+          <a:lstStyle/>
+          <a:p>
+            <a:pPr algn="just"/>
+            <a:r>
+              <a:rPr lang="it-IT" dirty="0" smtClean="0"/>
+              <a:t>Nel valutare gli esami si </a:t>
+            </a:r>
+            <a:r>
+              <a:rPr lang="it-IT" dirty="0"/>
+              <a:t>è considerato come risultato </a:t>
+            </a:r>
+            <a:r>
+              <a:rPr lang="it-IT" dirty="0" smtClean="0"/>
+              <a:t>– a parte nel singolo caso di M.D.L</a:t>
+            </a:r>
+            <a:r>
+              <a:rPr lang="it-IT" dirty="0"/>
+              <a:t>. </a:t>
+            </a:r>
+            <a:r>
+              <a:rPr lang="it-IT" dirty="0" smtClean="0"/>
+              <a:t>– </a:t>
+            </a:r>
+            <a:r>
+              <a:rPr lang="it-IT" dirty="0" smtClean="0"/>
+              <a:t>soltanto il voto conseguito, ignorando la data in cui è stato superato. Questo per evitare di raddoppiare il numero di </a:t>
+            </a:r>
+            <a:r>
+              <a:rPr lang="it-IT" dirty="0" err="1" smtClean="0"/>
+              <a:t>scatter</a:t>
+            </a:r>
+            <a:r>
+              <a:rPr lang="it-IT" dirty="0" smtClean="0"/>
+              <a:t> plot necessari a descrivere le varie situazioni che si sono analizzate visivamente.</a:t>
+            </a:r>
+          </a:p>
+          <a:p>
+            <a:pPr algn="just"/>
+            <a:r>
+              <a:rPr lang="it-IT" dirty="0" smtClean="0"/>
+              <a:t>Nell’analisi con tecniche di </a:t>
+            </a:r>
+            <a:r>
+              <a:rPr lang="it-IT" dirty="0" err="1" smtClean="0"/>
+              <a:t>clustering</a:t>
+            </a:r>
+            <a:r>
+              <a:rPr lang="it-IT" dirty="0" smtClean="0"/>
+              <a:t>, potrebbe rivelarsi utile </a:t>
+            </a:r>
+            <a:endParaRPr lang="it-IT" dirty="0" smtClean="0"/>
+          </a:p>
+          <a:p>
+            <a:pPr marL="342900" lvl="1" indent="0" algn="just">
+              <a:buNone/>
+            </a:pPr>
+            <a:endParaRPr lang="it-IT" dirty="0"/>
+          </a:p>
+          <a:p>
+            <a:pPr marL="0" indent="0" algn="just">
+              <a:buNone/>
+            </a:pPr>
+            <a:endParaRPr lang="it-IT" sz="2000" dirty="0"/>
+          </a:p>
+          <a:p>
+            <a:pPr marL="0" indent="0" algn="just">
+              <a:buNone/>
+            </a:pPr>
+            <a:endParaRPr lang="it-IT" dirty="0"/>
+          </a:p>
+        </p:txBody>
+      </p:sp>
+      <p:sp>
+        <p:nvSpPr>
+          <p:cNvPr id="9" name="Segnaposto contenuto 2">
+            <a:extLst>
+              <a:ext uri="{FF2B5EF4-FFF2-40B4-BE49-F238E27FC236}">
+                <a16:creationId xmlns:a16="http://schemas.microsoft.com/office/drawing/2014/main" id="{89886170-B615-43F8-AA8E-D5565391C42A}"/>
+              </a:ext>
+            </a:extLst>
+          </p:cNvPr>
+          <p:cNvSpPr txBox="1">
+            <a:spLocks/>
+          </p:cNvSpPr>
+          <p:nvPr/>
+        </p:nvSpPr>
+        <p:spPr>
+          <a:xfrm>
+            <a:off x="457200" y="5029199"/>
+            <a:ext cx="8229600" cy="1074753"/>
+          </a:xfrm>
+          <a:prstGeom prst="rect">
+            <a:avLst/>
+          </a:prstGeom>
+        </p:spPr>
+        <p:txBody>
+          <a:bodyPr vert="horz" lIns="91440" tIns="45720" rIns="91440" bIns="45720" rtlCol="0">
+            <a:normAutofit/>
+          </a:bodyPr>
+          <a:lstStyle>
+            <a:lvl1pPr marL="257175" indent="-257175" algn="l" defTabSz="342900" rtl="0" eaLnBrk="1" latinLnBrk="0" hangingPunct="1">
+              <a:spcBef>
+                <a:spcPct val="20000"/>
+              </a:spcBef>
+              <a:buFont typeface="Arial"/>
+              <a:buChar char="•"/>
+              <a:defRPr sz="2400" kern="1200">
+                <a:solidFill>
+                  <a:schemeClr val="tx1"/>
+                </a:solidFill>
+                <a:latin typeface="+mn-lt"/>
+                <a:ea typeface="+mn-ea"/>
+                <a:cs typeface="+mn-cs"/>
+              </a:defRPr>
+            </a:lvl1pPr>
+            <a:lvl2pPr marL="557213" indent="-214313" algn="l" defTabSz="342900" rtl="0" eaLnBrk="1" latinLnBrk="0" hangingPunct="1">
+              <a:spcBef>
+                <a:spcPct val="20000"/>
+              </a:spcBef>
+              <a:buFont typeface="Arial"/>
+              <a:buChar char="–"/>
+              <a:defRPr sz="2100" kern="1200">
+                <a:solidFill>
+                  <a:schemeClr val="tx1"/>
+                </a:solidFill>
+                <a:latin typeface="+mn-lt"/>
+                <a:ea typeface="+mn-ea"/>
+                <a:cs typeface="+mn-cs"/>
+              </a:defRPr>
+            </a:lvl2pPr>
+            <a:lvl3pPr marL="857250" indent="-171450" algn="l" defTabSz="342900" rtl="0" eaLnBrk="1" latinLnBrk="0" hangingPunct="1">
+              <a:spcBef>
+                <a:spcPct val="20000"/>
+              </a:spcBef>
+              <a:buFont typeface="Arial"/>
+              <a:buChar char="•"/>
+              <a:defRPr sz="1800" kern="1200">
+                <a:solidFill>
+                  <a:schemeClr val="tx1"/>
+                </a:solidFill>
+                <a:latin typeface="+mn-lt"/>
+                <a:ea typeface="+mn-ea"/>
+                <a:cs typeface="+mn-cs"/>
+              </a:defRPr>
+            </a:lvl3pPr>
+            <a:lvl4pPr marL="1200150" indent="-171450" algn="l" defTabSz="342900" rtl="0" eaLnBrk="1" latinLnBrk="0" hangingPunct="1">
+              <a:spcBef>
+                <a:spcPct val="20000"/>
+              </a:spcBef>
+              <a:buFont typeface="Arial"/>
+              <a:buChar char="–"/>
+              <a:defRPr sz="1500" kern="1200">
+                <a:solidFill>
+                  <a:schemeClr val="tx1"/>
+                </a:solidFill>
+                <a:latin typeface="+mn-lt"/>
+                <a:ea typeface="+mn-ea"/>
+                <a:cs typeface="+mn-cs"/>
+              </a:defRPr>
+            </a:lvl4pPr>
+            <a:lvl5pPr marL="1543050" indent="-171450" algn="l" defTabSz="342900" rtl="0" eaLnBrk="1" latinLnBrk="0" hangingPunct="1">
+              <a:spcBef>
+                <a:spcPct val="20000"/>
+              </a:spcBef>
+              <a:buFont typeface="Arial"/>
+              <a:buChar char="»"/>
+              <a:defRPr sz="1500" kern="1200">
+                <a:solidFill>
+                  <a:schemeClr val="tx1"/>
+                </a:solidFill>
+                <a:latin typeface="+mn-lt"/>
+                <a:ea typeface="+mn-ea"/>
+                <a:cs typeface="+mn-cs"/>
+              </a:defRPr>
+            </a:lvl5pPr>
+            <a:lvl6pPr marL="1885950" indent="-171450" algn="l" defTabSz="342900" rtl="0" eaLnBrk="1" latinLnBrk="0" hangingPunct="1">
+              <a:spcBef>
+                <a:spcPct val="20000"/>
+              </a:spcBef>
+              <a:buFont typeface="Arial"/>
+              <a:buChar char="•"/>
+              <a:defRPr sz="1500" kern="1200">
+                <a:solidFill>
+                  <a:schemeClr val="tx1"/>
+                </a:solidFill>
+                <a:latin typeface="+mn-lt"/>
+                <a:ea typeface="+mn-ea"/>
+                <a:cs typeface="+mn-cs"/>
+              </a:defRPr>
+            </a:lvl6pPr>
+            <a:lvl7pPr marL="2228850" indent="-171450" algn="l" defTabSz="342900" rtl="0" eaLnBrk="1" latinLnBrk="0" hangingPunct="1">
+              <a:spcBef>
+                <a:spcPct val="20000"/>
+              </a:spcBef>
+              <a:buFont typeface="Arial"/>
+              <a:buChar char="•"/>
+              <a:defRPr sz="1500" kern="1200">
+                <a:solidFill>
+                  <a:schemeClr val="tx1"/>
+                </a:solidFill>
+                <a:latin typeface="+mn-lt"/>
+                <a:ea typeface="+mn-ea"/>
+                <a:cs typeface="+mn-cs"/>
+              </a:defRPr>
+            </a:lvl7pPr>
+            <a:lvl8pPr marL="2571750" indent="-171450" algn="l" defTabSz="342900" rtl="0" eaLnBrk="1" latinLnBrk="0" hangingPunct="1">
+              <a:spcBef>
+                <a:spcPct val="20000"/>
+              </a:spcBef>
+              <a:buFont typeface="Arial"/>
+              <a:buChar char="•"/>
+              <a:defRPr sz="1500" kern="1200">
+                <a:solidFill>
+                  <a:schemeClr val="tx1"/>
+                </a:solidFill>
+                <a:latin typeface="+mn-lt"/>
+                <a:ea typeface="+mn-ea"/>
+                <a:cs typeface="+mn-cs"/>
+              </a:defRPr>
+            </a:lvl8pPr>
+            <a:lvl9pPr marL="2914650" indent="-171450" algn="l" defTabSz="342900" rtl="0" eaLnBrk="1" latinLnBrk="0" hangingPunct="1">
+              <a:spcBef>
+                <a:spcPct val="20000"/>
+              </a:spcBef>
+              <a:buFont typeface="Arial"/>
+              <a:buChar char="•"/>
+              <a:defRPr sz="1500" kern="1200">
+                <a:solidFill>
+                  <a:schemeClr val="tx1"/>
+                </a:solidFill>
+                <a:latin typeface="+mn-lt"/>
+                <a:ea typeface="+mn-ea"/>
+                <a:cs typeface="+mn-cs"/>
+              </a:defRPr>
+            </a:lvl9pPr>
+          </a:lstStyle>
+          <a:p>
+            <a:pPr marL="0" indent="0" algn="just">
+              <a:buFont typeface="Arial"/>
+              <a:buNone/>
+            </a:pPr>
+            <a:endParaRPr lang="it-IT" dirty="0"/>
+          </a:p>
+          <a:p>
+            <a:pPr marL="0" indent="0" algn="just">
+              <a:buFont typeface="Arial"/>
+              <a:buNone/>
+            </a:pPr>
+            <a:endParaRPr lang="it-IT" dirty="0"/>
+          </a:p>
+          <a:p>
+            <a:endParaRPr lang="en-US" sz="2000" dirty="0"/>
+          </a:p>
+        </p:txBody>
+      </p:sp>
+      <p:sp>
+        <p:nvSpPr>
+          <p:cNvPr id="7" name="Titolo 1">
+            <a:extLst>
+              <a:ext uri="{FF2B5EF4-FFF2-40B4-BE49-F238E27FC236}">
+                <a16:creationId xmlns:a16="http://schemas.microsoft.com/office/drawing/2014/main" id="{588E765D-4A18-43EC-9070-BBB19613F406}"/>
+              </a:ext>
+            </a:extLst>
+          </p:cNvPr>
+          <p:cNvSpPr>
+            <a:spLocks noGrp="1"/>
+          </p:cNvSpPr>
+          <p:nvPr>
+            <p:ph type="title"/>
+          </p:nvPr>
+        </p:nvSpPr>
+        <p:spPr>
+          <a:xfrm>
+            <a:off x="457200" y="692696"/>
+            <a:ext cx="8229600" cy="1143000"/>
+          </a:xfrm>
+        </p:spPr>
+        <p:txBody>
+          <a:bodyPr>
+            <a:noAutofit/>
+          </a:bodyPr>
+          <a:lstStyle/>
+          <a:p>
+            <a:r>
+              <a:rPr lang="it-IT" sz="2700" dirty="0" err="1" smtClean="0"/>
+              <a:t>aaaa</a:t>
+            </a:r>
+            <a:endParaRPr lang="en-US" sz="2700" dirty="0"/>
+          </a:p>
+        </p:txBody>
+      </p:sp>
+      <p:sp>
+        <p:nvSpPr>
+          <p:cNvPr id="6" name="Titolo 1">
+            <a:extLst>
+              <a:ext uri="{FF2B5EF4-FFF2-40B4-BE49-F238E27FC236}">
+                <a16:creationId xmlns:a16="http://schemas.microsoft.com/office/drawing/2014/main" id="{32602169-0966-4893-B032-33CFCD986CA0}"/>
+              </a:ext>
+            </a:extLst>
+          </p:cNvPr>
+          <p:cNvSpPr txBox="1">
+            <a:spLocks/>
+          </p:cNvSpPr>
+          <p:nvPr/>
+        </p:nvSpPr>
+        <p:spPr>
+          <a:xfrm>
+            <a:off x="1447800" y="152400"/>
+            <a:ext cx="8229600" cy="1143000"/>
+          </a:xfrm>
+          <a:prstGeom prst="rect">
+            <a:avLst/>
+          </a:prstGeom>
+        </p:spPr>
+        <p:txBody>
+          <a:bodyPr>
+            <a:noAutofit/>
+          </a:bodyPr>
+          <a:lstStyle>
+            <a:lvl1pPr algn="ctr" defTabSz="342900" rtl="0" eaLnBrk="1" latinLnBrk="0" hangingPunct="1">
+              <a:spcBef>
+                <a:spcPct val="0"/>
+              </a:spcBef>
+              <a:buNone/>
+              <a:defRPr sz="3300" kern="1200">
+                <a:solidFill>
+                  <a:schemeClr val="tx1"/>
+                </a:solidFill>
+                <a:latin typeface="+mj-lt"/>
+                <a:ea typeface="+mj-ea"/>
+                <a:cs typeface="+mj-cs"/>
+              </a:defRPr>
+            </a:lvl1pPr>
+          </a:lstStyle>
+          <a:p>
+            <a:r>
+              <a:rPr lang="it-IT" sz="2400" b="1" dirty="0">
+                <a:solidFill>
+                  <a:schemeClr val="bg1"/>
+                </a:solidFill>
+              </a:rPr>
+              <a:t>DATA UNDERSTANDING: </a:t>
+            </a:r>
+            <a:r>
+              <a:rPr lang="it-IT" sz="2400" dirty="0" smtClean="0">
+                <a:solidFill>
+                  <a:schemeClr val="bg1"/>
+                </a:solidFill>
+              </a:rPr>
+              <a:t>PREPROCESSING</a:t>
+            </a:r>
+            <a:endParaRPr lang="en-US" sz="2400" dirty="0">
+              <a:solidFill>
+                <a:schemeClr val="bg1"/>
+              </a:solidFill>
+            </a:endParaRPr>
+          </a:p>
+        </p:txBody>
+      </p:sp>
+      <p:sp>
+        <p:nvSpPr>
+          <p:cNvPr id="2" name="Rectangle 6">
+            <a:extLst>
+              <a:ext uri="{FF2B5EF4-FFF2-40B4-BE49-F238E27FC236}">
+                <a16:creationId xmlns:a16="http://schemas.microsoft.com/office/drawing/2014/main" id="{FC5724C9-24A0-4B40-9A3A-FE717EF7AA55}"/>
+              </a:ext>
+            </a:extLst>
+          </p:cNvPr>
+          <p:cNvSpPr>
+            <a:spLocks noChangeArrowheads="1"/>
+          </p:cNvSpPr>
+          <p:nvPr/>
+        </p:nvSpPr>
+        <p:spPr bwMode="auto">
+          <a:xfrm>
+            <a:off x="0" y="0"/>
+            <a:ext cx="9144000" cy="457200"/>
+          </a:xfrm>
+          <a:prstGeom prst="rect">
+            <a:avLst/>
+          </a:prstGeom>
+          <a:noFill/>
+          <a:ln>
+            <a:noFill/>
+          </a:ln>
+          <a:effectLst/>
+          <a:extLst>
+            <a:ext uri="{909E8E84-426E-40DD-AFC4-6F175D3DCCD1}">
+              <a14:hiddenFill xmlns:a14="http://schemas.microsoft.com/office/drawing/2010/main">
+                <a:solidFill>
+                  <a:schemeClr val="accent1"/>
+                </a:solidFill>
+              </a14:hiddenFill>
+            </a:ext>
+            <a:ext uri="{91240B29-F687-4F45-9708-019B960494DF}">
+              <a14:hiddenLine xmlns:a14="http://schemas.microsoft.com/office/drawing/2010/main" w="9525">
+                <a:solidFill>
+                  <a:schemeClr val="tx1"/>
+                </a:solidFill>
+                <a:miter lim="800000"/>
+                <a:headEnd/>
+                <a:tailEnd/>
+              </a14:hiddenLine>
+            </a:ext>
+            <a:ext uri="{AF507438-7753-43E0-B8FC-AC1667EBCBE1}">
+              <a14:hiddenEffects xmlns:a14="http://schemas.microsoft.com/office/drawing/2010/main">
+                <a:effectLst>
+                  <a:outerShdw dist="35921" dir="2700000" algn="ctr" rotWithShape="0">
+                    <a:schemeClr val="bg2"/>
+                  </a:outerShdw>
+                </a:effectLst>
+              </a14:hiddenEffects>
+            </a:ext>
+          </a:extLst>
+        </p:spPr>
+        <p:txBody>
+          <a:bodyPr vert="horz" wrap="none" lIns="91440" tIns="45720" rIns="91440" bIns="45720" numCol="1" anchor="ctr" anchorCtr="0" compatLnSpc="1">
+            <a:prstTxWarp prst="textNoShape">
+              <a:avLst/>
+            </a:prstTxWarp>
+            <a:spAutoFit/>
+          </a:bodyPr>
+          <a:lstStyle/>
+          <a:p>
+            <a:endParaRPr lang="en-US"/>
+          </a:p>
+        </p:txBody>
+      </p:sp>
+      <p:sp>
+        <p:nvSpPr>
+          <p:cNvPr id="3" name="Rectangle 7">
+            <a:extLst>
+              <a:ext uri="{FF2B5EF4-FFF2-40B4-BE49-F238E27FC236}">
+                <a16:creationId xmlns:a16="http://schemas.microsoft.com/office/drawing/2014/main" id="{C08042F5-96DB-4FE6-B699-C1DFAB71C0C5}"/>
+              </a:ext>
+            </a:extLst>
+          </p:cNvPr>
+          <p:cNvSpPr>
+            <a:spLocks noChangeArrowheads="1"/>
+          </p:cNvSpPr>
+          <p:nvPr/>
+        </p:nvSpPr>
+        <p:spPr bwMode="auto">
+          <a:xfrm>
+            <a:off x="0" y="1838325"/>
+            <a:ext cx="9144000" cy="0"/>
+          </a:xfrm>
+          <a:prstGeom prst="rect">
+            <a:avLst/>
+          </a:prstGeom>
+          <a:noFill/>
+          <a:ln>
+            <a:noFill/>
+          </a:ln>
+          <a:effectLst/>
+          <a:extLst>
+            <a:ext uri="{909E8E84-426E-40DD-AFC4-6F175D3DCCD1}">
+              <a14:hiddenFill xmlns:a14="http://schemas.microsoft.com/office/drawing/2010/main">
+                <a:solidFill>
+                  <a:schemeClr val="accent1"/>
+                </a:solidFill>
+              </a14:hiddenFill>
+            </a:ext>
+            <a:ext uri="{91240B29-F687-4F45-9708-019B960494DF}">
+              <a14:hiddenLine xmlns:a14="http://schemas.microsoft.com/office/drawing/2010/main" w="9525">
+                <a:solidFill>
+                  <a:schemeClr val="tx1"/>
+                </a:solidFill>
+                <a:miter lim="800000"/>
+                <a:headEnd/>
+                <a:tailEnd/>
+              </a14:hiddenLine>
+            </a:ext>
+            <a:ext uri="{AF507438-7753-43E0-B8FC-AC1667EBCBE1}">
+              <a14:hiddenEffects xmlns:a14="http://schemas.microsoft.com/office/drawing/2010/main">
+                <a:effectLst>
+                  <a:outerShdw dist="35921" dir="2700000" algn="ctr" rotWithShape="0">
+                    <a:schemeClr val="bg2"/>
+                  </a:outerShdw>
+                </a:effectLst>
+              </a14:hiddenEffects>
+            </a:ext>
+          </a:extLst>
+        </p:spPr>
+        <p:txBody>
+          <a:bodyPr vert="horz" wrap="none" lIns="91440" tIns="45720" rIns="91440" bIns="45720" numCol="1" anchor="ctr" anchorCtr="0" compatLnSpc="1">
+            <a:prstTxWarp prst="textNoShape">
+              <a:avLst/>
+            </a:prstTxWarp>
+            <a:spAutoFit/>
+          </a:bodyPr>
+          <a:lstStyle/>
+          <a:p>
+            <a:pPr marL="0" marR="0" lvl="0" indent="0" algn="l" defTabSz="914400" rtl="0" eaLnBrk="0" fontAlgn="base" latinLnBrk="0" hangingPunct="0">
+              <a:lnSpc>
+                <a:spcPct val="100000"/>
+              </a:lnSpc>
+              <a:spcBef>
+                <a:spcPct val="0"/>
+              </a:spcBef>
+              <a:spcAft>
+                <a:spcPct val="0"/>
+              </a:spcAft>
+              <a:buClrTx/>
+              <a:buSzTx/>
+              <a:buFontTx/>
+              <a:buNone/>
+              <a:tabLst/>
+            </a:pPr>
+            <a:r>
+              <a:rPr kumimoji="0" lang="it-IT" altLang="en-US" sz="1100" b="0" i="0" u="none" strike="noStrike" cap="none" normalizeH="0" baseline="0">
+                <a:ln>
+                  <a:noFill/>
+                </a:ln>
+                <a:solidFill>
+                  <a:schemeClr val="tx1"/>
+                </a:solidFill>
+                <a:effectLst/>
+                <a:latin typeface="Calibri" panose="020F0502020204030204" pitchFamily="34" charset="0"/>
+                <a:ea typeface="Times New Roman" panose="02020603050405020304" pitchFamily="18" charset="0"/>
+                <a:cs typeface="Times New Roman" panose="02020603050405020304" pitchFamily="18" charset="0"/>
+              </a:rPr>
+              <a:t> </a:t>
+            </a:r>
+            <a:endParaRPr kumimoji="0" lang="it-IT" altLang="en-US" sz="1800" b="0" i="0" u="none" strike="noStrike" cap="none" normalizeH="0" baseline="0">
+              <a:ln>
+                <a:noFill/>
+              </a:ln>
+              <a:solidFill>
+                <a:schemeClr val="tx1"/>
+              </a:solidFill>
+              <a:effectLst/>
+              <a:latin typeface="Arial" panose="020B0604020202020204" pitchFamily="34" charset="0"/>
+            </a:endParaRPr>
+          </a:p>
+        </p:txBody>
+      </p:sp>
+      <p:sp>
+        <p:nvSpPr>
+          <p:cNvPr id="4" name="Rectangle 8">
+            <a:extLst>
+              <a:ext uri="{FF2B5EF4-FFF2-40B4-BE49-F238E27FC236}">
+                <a16:creationId xmlns:a16="http://schemas.microsoft.com/office/drawing/2014/main" id="{E0CBE371-8058-4503-A250-42442AAE21EC}"/>
+              </a:ext>
+            </a:extLst>
+          </p:cNvPr>
+          <p:cNvSpPr>
+            <a:spLocks noChangeArrowheads="1"/>
+          </p:cNvSpPr>
+          <p:nvPr/>
+        </p:nvSpPr>
+        <p:spPr bwMode="auto">
+          <a:xfrm>
+            <a:off x="0" y="3219450"/>
+            <a:ext cx="9144000" cy="0"/>
+          </a:xfrm>
+          <a:prstGeom prst="rect">
+            <a:avLst/>
+          </a:prstGeom>
+          <a:noFill/>
+          <a:ln>
+            <a:noFill/>
+          </a:ln>
+          <a:effectLst/>
+          <a:extLst>
+            <a:ext uri="{909E8E84-426E-40DD-AFC4-6F175D3DCCD1}">
+              <a14:hiddenFill xmlns:a14="http://schemas.microsoft.com/office/drawing/2010/main">
+                <a:solidFill>
+                  <a:schemeClr val="accent1"/>
+                </a:solidFill>
+              </a14:hiddenFill>
+            </a:ext>
+            <a:ext uri="{91240B29-F687-4F45-9708-019B960494DF}">
+              <a14:hiddenLine xmlns:a14="http://schemas.microsoft.com/office/drawing/2010/main" w="9525">
+                <a:solidFill>
+                  <a:schemeClr val="tx1"/>
+                </a:solidFill>
+                <a:miter lim="800000"/>
+                <a:headEnd/>
+                <a:tailEnd/>
+              </a14:hiddenLine>
+            </a:ext>
+            <a:ext uri="{AF507438-7753-43E0-B8FC-AC1667EBCBE1}">
+              <a14:hiddenEffects xmlns:a14="http://schemas.microsoft.com/office/drawing/2010/main">
+                <a:effectLst>
+                  <a:outerShdw dist="35921" dir="2700000" algn="ctr" rotWithShape="0">
+                    <a:schemeClr val="bg2"/>
+                  </a:outerShdw>
+                </a:effectLst>
+              </a14:hiddenEffects>
+            </a:ext>
+          </a:extLst>
+        </p:spPr>
+        <p:txBody>
+          <a:bodyPr vert="horz" wrap="none" lIns="91440" tIns="45720" rIns="91440" bIns="45720" numCol="1" anchor="ctr" anchorCtr="0" compatLnSpc="1">
+            <a:prstTxWarp prst="textNoShape">
+              <a:avLst/>
+            </a:prstTxWarp>
+            <a:spAutoFit/>
+          </a:bodyPr>
+          <a:lstStyle/>
+          <a:p>
+            <a:pPr marL="0" marR="0" lvl="0" indent="0" algn="l" defTabSz="914400" rtl="0" eaLnBrk="0" fontAlgn="base" latinLnBrk="0" hangingPunct="0">
+              <a:lnSpc>
+                <a:spcPct val="100000"/>
+              </a:lnSpc>
+              <a:spcBef>
+                <a:spcPct val="0"/>
+              </a:spcBef>
+              <a:spcAft>
+                <a:spcPct val="0"/>
+              </a:spcAft>
+              <a:buClrTx/>
+              <a:buSzTx/>
+              <a:buFontTx/>
+              <a:buNone/>
+              <a:tabLst/>
+            </a:pPr>
+            <a:r>
+              <a:rPr kumimoji="0" lang="it-IT" altLang="en-US" sz="1100" b="0" i="0" u="none" strike="noStrike" cap="none" normalizeH="0" baseline="0">
+                <a:ln>
+                  <a:noFill/>
+                </a:ln>
+                <a:solidFill>
+                  <a:schemeClr val="tx1"/>
+                </a:solidFill>
+                <a:effectLst/>
+                <a:latin typeface="Calibri" panose="020F0502020204030204" pitchFamily="34" charset="0"/>
+                <a:ea typeface="Times New Roman" panose="02020603050405020304" pitchFamily="18" charset="0"/>
+                <a:cs typeface="Times New Roman" panose="02020603050405020304" pitchFamily="18" charset="0"/>
+              </a:rPr>
+              <a:t> </a:t>
+            </a:r>
+            <a:endParaRPr kumimoji="0" lang="it-IT" altLang="en-US" sz="1800" b="0" i="0" u="none" strike="noStrike" cap="none" normalizeH="0" baseline="0">
+              <a:ln>
+                <a:noFill/>
+              </a:ln>
+              <a:solidFill>
+                <a:schemeClr val="tx1"/>
+              </a:solidFill>
+              <a:effectLst/>
+              <a:latin typeface="Arial" panose="020B0604020202020204" pitchFamily="34" charset="0"/>
+            </a:endParaRPr>
+          </a:p>
+        </p:txBody>
+      </p:sp>
+      <p:sp>
+        <p:nvSpPr>
+          <p:cNvPr id="10" name="Rectangle 9">
+            <a:extLst>
+              <a:ext uri="{FF2B5EF4-FFF2-40B4-BE49-F238E27FC236}">
+                <a16:creationId xmlns:a16="http://schemas.microsoft.com/office/drawing/2014/main" id="{99468FB6-6461-4A91-9E0B-2B3FC25F715E}"/>
+              </a:ext>
+            </a:extLst>
+          </p:cNvPr>
+          <p:cNvSpPr>
+            <a:spLocks noChangeArrowheads="1"/>
+          </p:cNvSpPr>
+          <p:nvPr/>
+        </p:nvSpPr>
+        <p:spPr bwMode="auto">
+          <a:xfrm>
+            <a:off x="0" y="4600575"/>
+            <a:ext cx="9144000" cy="0"/>
+          </a:xfrm>
+          <a:prstGeom prst="rect">
+            <a:avLst/>
+          </a:prstGeom>
+          <a:noFill/>
+          <a:ln>
+            <a:noFill/>
+          </a:ln>
+          <a:effectLst/>
+          <a:extLst>
+            <a:ext uri="{909E8E84-426E-40DD-AFC4-6F175D3DCCD1}">
+              <a14:hiddenFill xmlns:a14="http://schemas.microsoft.com/office/drawing/2010/main">
+                <a:solidFill>
+                  <a:schemeClr val="accent1"/>
+                </a:solidFill>
+              </a14:hiddenFill>
+            </a:ext>
+            <a:ext uri="{91240B29-F687-4F45-9708-019B960494DF}">
+              <a14:hiddenLine xmlns:a14="http://schemas.microsoft.com/office/drawing/2010/main" w="9525">
+                <a:solidFill>
+                  <a:schemeClr val="tx1"/>
+                </a:solidFill>
+                <a:miter lim="800000"/>
+                <a:headEnd/>
+                <a:tailEnd/>
+              </a14:hiddenLine>
+            </a:ext>
+            <a:ext uri="{AF507438-7753-43E0-B8FC-AC1667EBCBE1}">
+              <a14:hiddenEffects xmlns:a14="http://schemas.microsoft.com/office/drawing/2010/main">
+                <a:effectLst>
+                  <a:outerShdw dist="35921" dir="2700000" algn="ctr" rotWithShape="0">
+                    <a:schemeClr val="bg2"/>
+                  </a:outerShdw>
+                </a:effectLst>
+              </a14:hiddenEffects>
+            </a:ext>
+          </a:extLst>
+        </p:spPr>
+        <p:txBody>
+          <a:bodyPr vert="horz" wrap="none" lIns="91440" tIns="45720" rIns="91440" bIns="45720" numCol="1" anchor="ctr" anchorCtr="0" compatLnSpc="1">
+            <a:prstTxWarp prst="textNoShape">
+              <a:avLst/>
+            </a:prstTxWarp>
+            <a:spAutoFit/>
+          </a:bodyPr>
+          <a:lstStyle/>
+          <a:p>
+            <a:pPr marL="0" marR="0" lvl="0" indent="0" algn="l" defTabSz="914400" rtl="0" eaLnBrk="0" fontAlgn="base" latinLnBrk="0" hangingPunct="0">
+              <a:lnSpc>
+                <a:spcPct val="100000"/>
+              </a:lnSpc>
+              <a:spcBef>
+                <a:spcPct val="0"/>
+              </a:spcBef>
+              <a:spcAft>
+                <a:spcPct val="0"/>
+              </a:spcAft>
+              <a:buClrTx/>
+              <a:buSzTx/>
+              <a:buFontTx/>
+              <a:buNone/>
+              <a:tabLst/>
+            </a:pPr>
+            <a:r>
+              <a:rPr kumimoji="0" lang="it-IT" altLang="en-US" sz="1100" b="0" i="0" u="none" strike="noStrike" cap="none" normalizeH="0" baseline="0">
+                <a:ln>
+                  <a:noFill/>
+                </a:ln>
+                <a:solidFill>
+                  <a:schemeClr val="tx1"/>
+                </a:solidFill>
+                <a:effectLst/>
+                <a:latin typeface="Calibri" panose="020F0502020204030204" pitchFamily="34" charset="0"/>
+                <a:ea typeface="Times New Roman" panose="02020603050405020304" pitchFamily="18" charset="0"/>
+                <a:cs typeface="Times New Roman" panose="02020603050405020304" pitchFamily="18" charset="0"/>
+              </a:rPr>
+              <a:t> </a:t>
+            </a:r>
+            <a:endParaRPr kumimoji="0" lang="it-IT" altLang="en-US" sz="1800" b="0" i="0" u="none" strike="noStrike" cap="none" normalizeH="0" baseline="0">
+              <a:ln>
+                <a:noFill/>
+              </a:ln>
+              <a:solidFill>
+                <a:schemeClr val="tx1"/>
+              </a:solidFill>
+              <a:effectLst/>
+              <a:latin typeface="Arial" panose="020B0604020202020204" pitchFamily="34" charset="0"/>
+            </a:endParaRPr>
+          </a:p>
+        </p:txBody>
+      </p:sp>
+      <p:sp>
+        <p:nvSpPr>
+          <p:cNvPr id="11" name="Rectangle 10">
+            <a:extLst>
+              <a:ext uri="{FF2B5EF4-FFF2-40B4-BE49-F238E27FC236}">
+                <a16:creationId xmlns:a16="http://schemas.microsoft.com/office/drawing/2014/main" id="{E4D9815E-FC57-48D4-9710-C34FDAE236EF}"/>
+              </a:ext>
+            </a:extLst>
+          </p:cNvPr>
+          <p:cNvSpPr>
+            <a:spLocks noChangeArrowheads="1"/>
+          </p:cNvSpPr>
+          <p:nvPr/>
+        </p:nvSpPr>
+        <p:spPr bwMode="auto">
+          <a:xfrm>
+            <a:off x="0" y="6000750"/>
+            <a:ext cx="9144000" cy="0"/>
+          </a:xfrm>
+          <a:prstGeom prst="rect">
+            <a:avLst/>
+          </a:prstGeom>
+          <a:noFill/>
+          <a:ln>
+            <a:noFill/>
+          </a:ln>
+          <a:effectLst/>
+          <a:extLst>
+            <a:ext uri="{909E8E84-426E-40DD-AFC4-6F175D3DCCD1}">
+              <a14:hiddenFill xmlns:a14="http://schemas.microsoft.com/office/drawing/2010/main">
+                <a:solidFill>
+                  <a:schemeClr val="accent1"/>
+                </a:solidFill>
+              </a14:hiddenFill>
+            </a:ext>
+            <a:ext uri="{91240B29-F687-4F45-9708-019B960494DF}">
+              <a14:hiddenLine xmlns:a14="http://schemas.microsoft.com/office/drawing/2010/main" w="9525">
+                <a:solidFill>
+                  <a:schemeClr val="tx1"/>
+                </a:solidFill>
+                <a:miter lim="800000"/>
+                <a:headEnd/>
+                <a:tailEnd/>
+              </a14:hiddenLine>
+            </a:ext>
+            <a:ext uri="{AF507438-7753-43E0-B8FC-AC1667EBCBE1}">
+              <a14:hiddenEffects xmlns:a14="http://schemas.microsoft.com/office/drawing/2010/main">
+                <a:effectLst>
+                  <a:outerShdw dist="35921" dir="2700000" algn="ctr" rotWithShape="0">
+                    <a:schemeClr val="bg2"/>
+                  </a:outerShdw>
+                </a:effectLst>
+              </a14:hiddenEffects>
+            </a:ext>
+          </a:extLst>
+        </p:spPr>
+        <p:txBody>
+          <a:bodyPr vert="horz" wrap="none" lIns="91440" tIns="45720" rIns="91440" bIns="45720" numCol="1" anchor="ctr" anchorCtr="0" compatLnSpc="1">
+            <a:prstTxWarp prst="textNoShape">
+              <a:avLst/>
+            </a:prstTxWarp>
+            <a:spAutoFit/>
+          </a:bodyPr>
+          <a:lstStyle/>
+          <a:p>
+            <a:pPr marL="0" marR="0" lvl="0" indent="0" algn="l" defTabSz="914400" rtl="0" eaLnBrk="0" fontAlgn="base" latinLnBrk="0" hangingPunct="0">
+              <a:lnSpc>
+                <a:spcPct val="100000"/>
+              </a:lnSpc>
+              <a:spcBef>
+                <a:spcPct val="0"/>
+              </a:spcBef>
+              <a:spcAft>
+                <a:spcPct val="0"/>
+              </a:spcAft>
+              <a:buClrTx/>
+              <a:buSzTx/>
+              <a:buFontTx/>
+              <a:buNone/>
+              <a:tabLst/>
+            </a:pPr>
+            <a:r>
+              <a:rPr kumimoji="0" lang="it-IT" altLang="en-US" sz="1100" b="0" i="0" u="none" strike="noStrike" cap="none" normalizeH="0" baseline="0">
+                <a:ln>
+                  <a:noFill/>
+                </a:ln>
+                <a:solidFill>
+                  <a:schemeClr val="tx1"/>
+                </a:solidFill>
+                <a:effectLst/>
+                <a:latin typeface="Calibri" panose="020F0502020204030204" pitchFamily="34" charset="0"/>
+                <a:ea typeface="Times New Roman" panose="02020603050405020304" pitchFamily="18" charset="0"/>
+                <a:cs typeface="Times New Roman" panose="02020603050405020304" pitchFamily="18" charset="0"/>
+              </a:rPr>
+              <a:t> </a:t>
+            </a:r>
+            <a:endParaRPr kumimoji="0" lang="it-IT" altLang="en-US" sz="1800" b="0" i="0" u="none" strike="noStrike" cap="none" normalizeH="0" baseline="0">
+              <a:ln>
+                <a:noFill/>
+              </a:ln>
+              <a:solidFill>
+                <a:schemeClr val="tx1"/>
+              </a:solidFill>
+              <a:effectLst/>
+              <a:latin typeface="Arial" panose="020B0604020202020204" pitchFamily="34" charset="0"/>
+            </a:endParaRPr>
+          </a:p>
+        </p:txBody>
+      </p:sp>
+    </p:spTree>
+    <p:extLst>
+      <p:ext uri="{BB962C8B-B14F-4D97-AF65-F5344CB8AC3E}">
+        <p14:creationId xmlns:p14="http://schemas.microsoft.com/office/powerpoint/2010/main" val="1180049712"/>
+      </p:ext>
+    </p:extLst>
+  </p:cSld>
+  <p:clrMapOvr>
+    <a:masterClrMapping/>
+  </p:clrMapOvr>
+</p:sld>
+</file>
+
 <file path=ppt/slides/slide4.xml><?xml version="1.0" encoding="utf-8"?>
 <p:sld xmlns:a="http://schemas.openxmlformats.org/drawingml/2006/main" xmlns:r="http://schemas.openxmlformats.org/officeDocument/2006/relationships" xmlns:p="http://schemas.openxmlformats.org/presentationml/2006/main">
   <p:cSld>

</xml_diff>

<commit_message>
Attempt at hierarchical clustering.
</commit_message>
<xml_diff>
--- a/relazione.pptx
+++ b/relazione.pptx
@@ -56,6 +56,7 @@
     <p:sldId id="299" r:id="rId50"/>
     <p:sldId id="308" r:id="rId51"/>
     <p:sldId id="309" r:id="rId52"/>
+    <p:sldId id="310" r:id="rId53"/>
   </p:sldIdLst>
   <p:sldSz cx="9144000" cy="6858000" type="screen4x3"/>
   <p:notesSz cx="6858000" cy="9144000"/>
@@ -26588,8 +26589,8 @@
         </p:blipFill>
         <p:spPr>
           <a:xfrm>
-            <a:off x="2838970" y="1052736"/>
-            <a:ext cx="6116735" cy="5610597"/>
+            <a:off x="2699792" y="925074"/>
+            <a:ext cx="6255913" cy="5738259"/>
           </a:xfrm>
           <a:prstGeom prst="rect">
             <a:avLst/>
@@ -29676,8 +29677,8 @@
         </p:blipFill>
         <p:spPr>
           <a:xfrm>
-            <a:off x="2612951" y="1412776"/>
-            <a:ext cx="6372225" cy="5295900"/>
+            <a:off x="3197881" y="1295400"/>
+            <a:ext cx="5787295" cy="4953786"/>
           </a:xfrm>
           <a:prstGeom prst="rect">
             <a:avLst/>
@@ -29767,8 +29768,265 @@
         </p:nvSpPr>
         <p:spPr>
           <a:xfrm>
-            <a:off x="251520" y="3140968"/>
-            <a:ext cx="6250429" cy="2862322"/>
+            <a:off x="170768" y="908720"/>
+            <a:ext cx="3027114" cy="5447645"/>
+          </a:xfrm>
+          <a:prstGeom prst="rect">
+            <a:avLst/>
+          </a:prstGeom>
+          <a:noFill/>
+        </p:spPr>
+        <p:txBody>
+          <a:bodyPr wrap="square" rtlCol="0">
+            <a:spAutoFit/>
+          </a:bodyPr>
+          <a:lstStyle/>
+          <a:p>
+            <a:r>
+              <a:rPr lang="it-IT" sz="1600" dirty="0"/>
+              <a:t>Il raggruppamento con DBSCAN risulta abbastanza netto: il cluster 1 include gli studenti che non hanno ottenuto alcun risultato, il 2 quelli che ne hanno ottenuti di bassi mentre il cluster 0 racchiude i migliori.</a:t>
+            </a:r>
+          </a:p>
+          <a:p>
+            <a:endParaRPr lang="it-IT" sz="1600" dirty="0"/>
+          </a:p>
+          <a:p>
+            <a:r>
+              <a:rPr lang="it-IT" sz="1600" dirty="0"/>
+              <a:t>Si noti come DBSCAN considera rumore le istanze che sono state proficue in un tipo di risultato, ma scarse in un altro</a:t>
+            </a:r>
+            <a:r>
+              <a:rPr lang="it-IT" sz="1400" dirty="0"/>
+              <a:t> (I.E. voto medio alto ma pochi crediti ottenuti).</a:t>
+            </a:r>
+            <a:endParaRPr lang="it-IT" sz="1600" dirty="0"/>
+          </a:p>
+          <a:p>
+            <a:endParaRPr lang="en-US" sz="1400" dirty="0">
+              <a:solidFill>
+                <a:srgbClr val="7030A0"/>
+              </a:solidFill>
+              <a:latin typeface="Courier New" panose="02070309020205020404" pitchFamily="49" charset="0"/>
+              <a:cs typeface="Courier New" panose="02070309020205020404" pitchFamily="49" charset="0"/>
+            </a:endParaRPr>
+          </a:p>
+          <a:p>
+            <a:endParaRPr lang="en-US" sz="1400" dirty="0">
+              <a:solidFill>
+                <a:srgbClr val="7030A0"/>
+              </a:solidFill>
+              <a:latin typeface="Courier New" panose="02070309020205020404" pitchFamily="49" charset="0"/>
+              <a:cs typeface="Courier New" panose="02070309020205020404" pitchFamily="49" charset="0"/>
+            </a:endParaRPr>
+          </a:p>
+          <a:p>
+            <a:r>
+              <a:rPr lang="en-US" sz="1400" dirty="0">
+                <a:solidFill>
+                  <a:srgbClr val="7030A0"/>
+                </a:solidFill>
+                <a:latin typeface="Courier New" panose="02070309020205020404" pitchFamily="49" charset="0"/>
+                <a:cs typeface="Courier New" panose="02070309020205020404" pitchFamily="49" charset="0"/>
+              </a:rPr>
+              <a:t>Clustered Instances</a:t>
+            </a:r>
+          </a:p>
+          <a:p>
+            <a:endParaRPr lang="en-US" sz="1400" dirty="0">
+              <a:solidFill>
+                <a:srgbClr val="7030A0"/>
+              </a:solidFill>
+              <a:latin typeface="Courier New" panose="02070309020205020404" pitchFamily="49" charset="0"/>
+              <a:cs typeface="Courier New" panose="02070309020205020404" pitchFamily="49" charset="0"/>
+            </a:endParaRPr>
+          </a:p>
+          <a:p>
+            <a:r>
+              <a:rPr lang="en-US" sz="1400" dirty="0">
+                <a:solidFill>
+                  <a:srgbClr val="7030A0"/>
+                </a:solidFill>
+                <a:latin typeface="Courier New" panose="02070309020205020404" pitchFamily="49" charset="0"/>
+                <a:cs typeface="Courier New" panose="02070309020205020404" pitchFamily="49" charset="0"/>
+              </a:rPr>
+              <a:t>0      108 ( 61%)</a:t>
+            </a:r>
+          </a:p>
+          <a:p>
+            <a:r>
+              <a:rPr lang="en-US" sz="1400" dirty="0">
+                <a:solidFill>
+                  <a:srgbClr val="7030A0"/>
+                </a:solidFill>
+                <a:latin typeface="Courier New" panose="02070309020205020404" pitchFamily="49" charset="0"/>
+                <a:cs typeface="Courier New" panose="02070309020205020404" pitchFamily="49" charset="0"/>
+              </a:rPr>
+              <a:t>1       20 ( 11%)</a:t>
+            </a:r>
+          </a:p>
+          <a:p>
+            <a:r>
+              <a:rPr lang="en-US" sz="1400" dirty="0">
+                <a:solidFill>
+                  <a:srgbClr val="7030A0"/>
+                </a:solidFill>
+                <a:latin typeface="Courier New" panose="02070309020205020404" pitchFamily="49" charset="0"/>
+                <a:cs typeface="Courier New" panose="02070309020205020404" pitchFamily="49" charset="0"/>
+              </a:rPr>
+              <a:t>2       48 ( 27%)</a:t>
+            </a:r>
+          </a:p>
+          <a:p>
+            <a:endParaRPr lang="en-US" sz="1400" dirty="0">
+              <a:solidFill>
+                <a:srgbClr val="7030A0"/>
+              </a:solidFill>
+              <a:latin typeface="Courier New" panose="02070309020205020404" pitchFamily="49" charset="0"/>
+              <a:cs typeface="Courier New" panose="02070309020205020404" pitchFamily="49" charset="0"/>
+            </a:endParaRPr>
+          </a:p>
+          <a:p>
+            <a:r>
+              <a:rPr lang="en-US" sz="1400" dirty="0" err="1">
+                <a:solidFill>
+                  <a:srgbClr val="7030A0"/>
+                </a:solidFill>
+                <a:latin typeface="Courier New" panose="02070309020205020404" pitchFamily="49" charset="0"/>
+                <a:cs typeface="Courier New" panose="02070309020205020404" pitchFamily="49" charset="0"/>
+              </a:rPr>
+              <a:t>Unclustered</a:t>
+            </a:r>
+            <a:r>
+              <a:rPr lang="en-US" sz="1400" dirty="0">
+                <a:solidFill>
+                  <a:srgbClr val="7030A0"/>
+                </a:solidFill>
+                <a:latin typeface="Courier New" panose="02070309020205020404" pitchFamily="49" charset="0"/>
+                <a:cs typeface="Courier New" panose="02070309020205020404" pitchFamily="49" charset="0"/>
+              </a:rPr>
+              <a:t> instances : 36</a:t>
+            </a:r>
+          </a:p>
+          <a:p>
+            <a:endParaRPr lang="en-US" sz="1400" dirty="0"/>
+          </a:p>
+        </p:txBody>
+      </p:sp>
+    </p:spTree>
+    <p:extLst>
+      <p:ext uri="{BB962C8B-B14F-4D97-AF65-F5344CB8AC3E}">
+        <p14:creationId xmlns:p14="http://schemas.microsoft.com/office/powerpoint/2010/main" val="3267863494"/>
+      </p:ext>
+    </p:extLst>
+  </p:cSld>
+  <p:clrMapOvr>
+    <a:masterClrMapping/>
+  </p:clrMapOvr>
+</p:sld>
+</file>
+
+<file path=ppt/slides/slide52.xml><?xml version="1.0" encoding="utf-8"?>
+<p:sld xmlns:a="http://schemas.openxmlformats.org/drawingml/2006/main" xmlns:r="http://schemas.openxmlformats.org/officeDocument/2006/relationships" xmlns:p="http://schemas.openxmlformats.org/presentationml/2006/main">
+  <p:cSld>
+    <p:spTree>
+      <p:nvGrpSpPr>
+        <p:cNvPr id="1" name=""/>
+        <p:cNvGrpSpPr/>
+        <p:nvPr/>
+      </p:nvGrpSpPr>
+      <p:grpSpPr>
+        <a:xfrm>
+          <a:off x="0" y="0"/>
+          <a:ext cx="0" cy="0"/>
+          <a:chOff x="0" y="0"/>
+          <a:chExt cx="0" cy="0"/>
+        </a:xfrm>
+      </p:grpSpPr>
+      <p:sp>
+        <p:nvSpPr>
+          <p:cNvPr id="2" name="Titolo 1">
+            <a:extLst>
+              <a:ext uri="{FF2B5EF4-FFF2-40B4-BE49-F238E27FC236}">
+                <a16:creationId xmlns:a16="http://schemas.microsoft.com/office/drawing/2014/main" id="{A490F4C1-B771-44D1-87E7-7B1A928721C0}"/>
+              </a:ext>
+            </a:extLst>
+          </p:cNvPr>
+          <p:cNvSpPr txBox="1">
+            <a:spLocks/>
+          </p:cNvSpPr>
+          <p:nvPr/>
+        </p:nvSpPr>
+        <p:spPr>
+          <a:xfrm>
+            <a:off x="755576" y="152400"/>
+            <a:ext cx="8229600" cy="1143000"/>
+          </a:xfrm>
+          <a:prstGeom prst="rect">
+            <a:avLst/>
+          </a:prstGeom>
+        </p:spPr>
+        <p:txBody>
+          <a:bodyPr>
+            <a:noAutofit/>
+          </a:bodyPr>
+          <a:lstStyle>
+            <a:lvl1pPr algn="ctr" defTabSz="342900" rtl="0" eaLnBrk="1" latinLnBrk="0" hangingPunct="1">
+              <a:spcBef>
+                <a:spcPct val="0"/>
+              </a:spcBef>
+              <a:buNone/>
+              <a:defRPr sz="3300" kern="1200">
+                <a:solidFill>
+                  <a:schemeClr val="tx1"/>
+                </a:solidFill>
+                <a:latin typeface="+mj-lt"/>
+                <a:ea typeface="+mj-ea"/>
+                <a:cs typeface="+mj-cs"/>
+              </a:defRPr>
+            </a:lvl1pPr>
+          </a:lstStyle>
+          <a:p>
+            <a:pPr algn="r"/>
+            <a:r>
+              <a:rPr lang="it-IT" sz="2400" b="1" dirty="0">
+                <a:solidFill>
+                  <a:schemeClr val="bg1"/>
+                </a:solidFill>
+              </a:rPr>
+              <a:t>CLUSTER ANALYSIS</a:t>
+            </a:r>
+            <a:r>
+              <a:rPr lang="it-IT" sz="2400" dirty="0">
+                <a:solidFill>
+                  <a:schemeClr val="bg1"/>
+                </a:solidFill>
+              </a:rPr>
+              <a:t>: SUBSET GEN </a:t>
+            </a:r>
+            <a:endParaRPr lang="en-US" sz="2400" dirty="0">
+              <a:solidFill>
+                <a:schemeClr val="bg1"/>
+              </a:solidFill>
+            </a:endParaRPr>
+          </a:p>
+        </p:txBody>
+      </p:sp>
+      <p:sp>
+        <p:nvSpPr>
+          <p:cNvPr id="5" name="CasellaDiTesto 4">
+            <a:extLst>
+              <a:ext uri="{FF2B5EF4-FFF2-40B4-BE49-F238E27FC236}">
+                <a16:creationId xmlns:a16="http://schemas.microsoft.com/office/drawing/2014/main" id="{951B41F6-93D5-48F6-8CDE-BC7CE47E6E3E}"/>
+              </a:ext>
+            </a:extLst>
+          </p:cNvPr>
+          <p:cNvSpPr txBox="1"/>
+          <p:nvPr/>
+        </p:nvSpPr>
+        <p:spPr>
+          <a:xfrm>
+            <a:off x="177396" y="940658"/>
+            <a:ext cx="8586902" cy="707886"/>
           </a:xfrm>
           <a:prstGeom prst="rect">
             <a:avLst/>
@@ -29782,18 +30040,110 @@
           <a:lstStyle/>
           <a:p>
             <a:r>
-              <a:rPr lang="en-US" dirty="0">
+              <a:rPr lang="it-IT" sz="2000" b="1" dirty="0"/>
+              <a:t>CLUSTERING GERARCHICO:</a:t>
+            </a:r>
+            <a:r>
+              <a:rPr lang="it-IT" sz="2000" dirty="0"/>
+              <a:t> 2 cluster, </a:t>
+            </a:r>
+            <a:r>
+              <a:rPr lang="it-IT" sz="1600" dirty="0"/>
+              <a:t>distanza definita col metodo </a:t>
+            </a:r>
+            <a:r>
+              <a:rPr lang="it-IT" sz="2000" dirty="0"/>
+              <a:t>COMPLETE LINKAGE</a:t>
+            </a:r>
+          </a:p>
+          <a:p>
+            <a:r>
+              <a:rPr lang="it-IT" sz="2000">
+                <a:solidFill>
+                  <a:srgbClr val="FF0000"/>
+                </a:solidFill>
+              </a:rPr>
+              <a:t>…</a:t>
+            </a:r>
+            <a:endParaRPr lang="en-US" dirty="0">
+              <a:solidFill>
+                <a:srgbClr val="FF0000"/>
+              </a:solidFill>
+            </a:endParaRPr>
+          </a:p>
+        </p:txBody>
+      </p:sp>
+      <p:pic>
+        <p:nvPicPr>
+          <p:cNvPr id="6" name="Immagine 5">
+            <a:extLst>
+              <a:ext uri="{FF2B5EF4-FFF2-40B4-BE49-F238E27FC236}">
+                <a16:creationId xmlns:a16="http://schemas.microsoft.com/office/drawing/2014/main" id="{2AECC886-D79F-4427-ACBA-01D78B26E783}"/>
+              </a:ext>
+            </a:extLst>
+          </p:cNvPr>
+          <p:cNvPicPr>
+            <a:picLocks noChangeAspect="1"/>
+          </p:cNvPicPr>
+          <p:nvPr/>
+        </p:nvPicPr>
+        <p:blipFill>
+          <a:blip r:embed="rId2"/>
+          <a:stretch>
+            <a:fillRect/>
+          </a:stretch>
+        </p:blipFill>
+        <p:spPr>
+          <a:xfrm>
+            <a:off x="4382696" y="2708920"/>
+            <a:ext cx="4653800" cy="4032448"/>
+          </a:xfrm>
+          <a:prstGeom prst="rect">
+            <a:avLst/>
+          </a:prstGeom>
+        </p:spPr>
+      </p:pic>
+      <p:sp>
+        <p:nvSpPr>
+          <p:cNvPr id="7" name="CasellaDiTesto 6">
+            <a:extLst>
+              <a:ext uri="{FF2B5EF4-FFF2-40B4-BE49-F238E27FC236}">
+                <a16:creationId xmlns:a16="http://schemas.microsoft.com/office/drawing/2014/main" id="{F96353AB-D6C1-4AB1-800F-2A6FB1A96608}"/>
+              </a:ext>
+            </a:extLst>
+          </p:cNvPr>
+          <p:cNvSpPr txBox="1"/>
+          <p:nvPr/>
+        </p:nvSpPr>
+        <p:spPr>
+          <a:xfrm>
+            <a:off x="251520" y="2255961"/>
+            <a:ext cx="6336704" cy="3693319"/>
+          </a:xfrm>
+          <a:prstGeom prst="rect">
+            <a:avLst/>
+          </a:prstGeom>
+          <a:noFill/>
+        </p:spPr>
+        <p:txBody>
+          <a:bodyPr wrap="square" rtlCol="0">
+            <a:spAutoFit/>
+          </a:bodyPr>
+          <a:lstStyle/>
+          <a:p>
+            <a:r>
+              <a:rPr lang="en-US" sz="1300" dirty="0">
                 <a:solidFill>
                   <a:srgbClr val="7030A0"/>
                 </a:solidFill>
                 <a:latin typeface="Courier New" panose="02070309020205020404" pitchFamily="49" charset="0"/>
                 <a:cs typeface="Courier New" panose="02070309020205020404" pitchFamily="49" charset="0"/>
               </a:rPr>
-              <a:t>=== Model and evaluation on training set ===</a:t>
-            </a:r>
-          </a:p>
-          <a:p>
-            <a:endParaRPr lang="en-US" dirty="0">
+              <a:t>=== Clustering model (full training set) ===</a:t>
+            </a:r>
+          </a:p>
+          <a:p>
+            <a:endParaRPr lang="en-US" sz="1300" dirty="0">
               <a:solidFill>
                 <a:srgbClr val="7030A0"/>
               </a:solidFill>
@@ -29803,18 +30153,30 @@
           </a:p>
           <a:p>
             <a:r>
-              <a:rPr lang="en-US" dirty="0">
+              <a:rPr lang="en-US" sz="1300" dirty="0">
                 <a:solidFill>
                   <a:srgbClr val="7030A0"/>
                 </a:solidFill>
                 <a:latin typeface="Courier New" panose="02070309020205020404" pitchFamily="49" charset="0"/>
                 <a:cs typeface="Courier New" panose="02070309020205020404" pitchFamily="49" charset="0"/>
               </a:rPr>
-              <a:t>Clustered Instances</a:t>
-            </a:r>
-          </a:p>
-          <a:p>
-            <a:endParaRPr lang="en-US" dirty="0">
+              <a:t>Cluster 0</a:t>
+            </a:r>
+          </a:p>
+          <a:p>
+            <a:r>
+              <a:rPr lang="en-US" sz="1300" dirty="0">
+                <a:solidFill>
+                  <a:srgbClr val="7030A0"/>
+                </a:solidFill>
+                <a:latin typeface="Courier New" panose="02070309020205020404" pitchFamily="49" charset="0"/>
+                <a:cs typeface="Courier New" panose="02070309020205020404" pitchFamily="49" charset="0"/>
+              </a:rPr>
+              <a:t>[...]</a:t>
+            </a:r>
+          </a:p>
+          <a:p>
+            <a:endParaRPr lang="en-US" sz="1300" dirty="0">
               <a:solidFill>
                 <a:srgbClr val="7030A0"/>
               </a:solidFill>
@@ -29824,42 +30186,30 @@
           </a:p>
           <a:p>
             <a:r>
-              <a:rPr lang="en-US" dirty="0">
+              <a:rPr lang="en-US" sz="1300" dirty="0">
                 <a:solidFill>
                   <a:srgbClr val="7030A0"/>
                 </a:solidFill>
                 <a:latin typeface="Courier New" panose="02070309020205020404" pitchFamily="49" charset="0"/>
                 <a:cs typeface="Courier New" panose="02070309020205020404" pitchFamily="49" charset="0"/>
               </a:rPr>
-              <a:t>0      108 ( 61%)</a:t>
-            </a:r>
-          </a:p>
-          <a:p>
-            <a:r>
-              <a:rPr lang="en-US" dirty="0">
+              <a:t>Cluster 1</a:t>
+            </a:r>
+          </a:p>
+          <a:p>
+            <a:r>
+              <a:rPr lang="en-US" sz="1300" dirty="0">
                 <a:solidFill>
                   <a:srgbClr val="7030A0"/>
                 </a:solidFill>
                 <a:latin typeface="Courier New" panose="02070309020205020404" pitchFamily="49" charset="0"/>
                 <a:cs typeface="Courier New" panose="02070309020205020404" pitchFamily="49" charset="0"/>
               </a:rPr>
-              <a:t>1       20 ( 11%)</a:t>
-            </a:r>
-          </a:p>
-          <a:p>
-            <a:r>
-              <a:rPr lang="en-US" dirty="0">
-                <a:solidFill>
-                  <a:srgbClr val="7030A0"/>
-                </a:solidFill>
-                <a:latin typeface="Courier New" panose="02070309020205020404" pitchFamily="49" charset="0"/>
-                <a:cs typeface="Courier New" panose="02070309020205020404" pitchFamily="49" charset="0"/>
-              </a:rPr>
-              <a:t>2       48 ( 27%)</a:t>
-            </a:r>
-          </a:p>
-          <a:p>
-            <a:endParaRPr lang="en-US" dirty="0">
+              <a:t>[...]</a:t>
+            </a:r>
+          </a:p>
+          <a:p>
+            <a:endParaRPr lang="en-US" sz="1300" dirty="0">
               <a:solidFill>
                 <a:srgbClr val="7030A0"/>
               </a:solidFill>
@@ -29868,36 +30218,116 @@
             </a:endParaRPr>
           </a:p>
           <a:p>
-            <a:r>
-              <a:rPr lang="en-US" dirty="0" err="1">
+            <a:endParaRPr lang="en-US" sz="1300" dirty="0">
+              <a:solidFill>
+                <a:srgbClr val="7030A0"/>
+              </a:solidFill>
+              <a:latin typeface="Courier New" panose="02070309020205020404" pitchFamily="49" charset="0"/>
+              <a:cs typeface="Courier New" panose="02070309020205020404" pitchFamily="49" charset="0"/>
+            </a:endParaRPr>
+          </a:p>
+          <a:p>
+            <a:r>
+              <a:rPr lang="en-US" sz="1300" dirty="0">
                 <a:solidFill>
                   <a:srgbClr val="7030A0"/>
                 </a:solidFill>
                 <a:latin typeface="Courier New" panose="02070309020205020404" pitchFamily="49" charset="0"/>
                 <a:cs typeface="Courier New" panose="02070309020205020404" pitchFamily="49" charset="0"/>
               </a:rPr>
-              <a:t>Unclustered</a:t>
-            </a:r>
-            <a:r>
-              <a:rPr lang="en-US" dirty="0">
+              <a:t>Time taken to build model (full training data) : 0.04 seconds</a:t>
+            </a:r>
+          </a:p>
+          <a:p>
+            <a:endParaRPr lang="en-US" sz="1300" dirty="0">
+              <a:solidFill>
+                <a:srgbClr val="7030A0"/>
+              </a:solidFill>
+              <a:latin typeface="Courier New" panose="02070309020205020404" pitchFamily="49" charset="0"/>
+              <a:cs typeface="Courier New" panose="02070309020205020404" pitchFamily="49" charset="0"/>
+            </a:endParaRPr>
+          </a:p>
+          <a:p>
+            <a:r>
+              <a:rPr lang="en-US" sz="1300" dirty="0">
                 <a:solidFill>
                   <a:srgbClr val="7030A0"/>
                 </a:solidFill>
                 <a:latin typeface="Courier New" panose="02070309020205020404" pitchFamily="49" charset="0"/>
                 <a:cs typeface="Courier New" panose="02070309020205020404" pitchFamily="49" charset="0"/>
               </a:rPr>
-              <a:t> instances : 36</a:t>
-            </a:r>
-          </a:p>
-          <a:p>
-            <a:endParaRPr lang="en-US" dirty="0"/>
+              <a:t>=== Model and evaluation on training set ===</a:t>
+            </a:r>
+          </a:p>
+          <a:p>
+            <a:endParaRPr lang="en-US" sz="1300" dirty="0">
+              <a:solidFill>
+                <a:srgbClr val="7030A0"/>
+              </a:solidFill>
+              <a:latin typeface="Courier New" panose="02070309020205020404" pitchFamily="49" charset="0"/>
+              <a:cs typeface="Courier New" panose="02070309020205020404" pitchFamily="49" charset="0"/>
+            </a:endParaRPr>
+          </a:p>
+          <a:p>
+            <a:r>
+              <a:rPr lang="en-US" sz="1300" dirty="0">
+                <a:solidFill>
+                  <a:srgbClr val="7030A0"/>
+                </a:solidFill>
+                <a:latin typeface="Courier New" panose="02070309020205020404" pitchFamily="49" charset="0"/>
+                <a:cs typeface="Courier New" panose="02070309020205020404" pitchFamily="49" charset="0"/>
+              </a:rPr>
+              <a:t>Clustered Instances</a:t>
+            </a:r>
+          </a:p>
+          <a:p>
+            <a:endParaRPr lang="en-US" sz="1300" dirty="0">
+              <a:solidFill>
+                <a:srgbClr val="7030A0"/>
+              </a:solidFill>
+              <a:latin typeface="Courier New" panose="02070309020205020404" pitchFamily="49" charset="0"/>
+              <a:cs typeface="Courier New" panose="02070309020205020404" pitchFamily="49" charset="0"/>
+            </a:endParaRPr>
+          </a:p>
+          <a:p>
+            <a:r>
+              <a:rPr lang="en-US" sz="1300" dirty="0">
+                <a:solidFill>
+                  <a:srgbClr val="7030A0"/>
+                </a:solidFill>
+                <a:latin typeface="Courier New" panose="02070309020205020404" pitchFamily="49" charset="0"/>
+                <a:cs typeface="Courier New" panose="02070309020205020404" pitchFamily="49" charset="0"/>
+              </a:rPr>
+              <a:t>0      121 ( 57%)</a:t>
+            </a:r>
+          </a:p>
+          <a:p>
+            <a:r>
+              <a:rPr lang="en-US" sz="1300" dirty="0">
+                <a:solidFill>
+                  <a:srgbClr val="7030A0"/>
+                </a:solidFill>
+                <a:latin typeface="Courier New" panose="02070309020205020404" pitchFamily="49" charset="0"/>
+                <a:cs typeface="Courier New" panose="02070309020205020404" pitchFamily="49" charset="0"/>
+              </a:rPr>
+              <a:t>1       91 ( 43%)</a:t>
+            </a:r>
+          </a:p>
+          <a:p>
+            <a:endParaRPr lang="en-US" sz="1300" dirty="0">
+              <a:solidFill>
+                <a:srgbClr val="7030A0"/>
+              </a:solidFill>
+              <a:latin typeface="Courier New" panose="02070309020205020404" pitchFamily="49" charset="0"/>
+              <a:cs typeface="Courier New" panose="02070309020205020404" pitchFamily="49" charset="0"/>
+            </a:endParaRPr>
           </a:p>
         </p:txBody>
       </p:sp>
     </p:spTree>
     <p:extLst>
       <p:ext uri="{BB962C8B-B14F-4D97-AF65-F5344CB8AC3E}">
-        <p14:creationId xmlns:p14="http://schemas.microsoft.com/office/powerpoint/2010/main" val="3267863494"/>
+        <p14:creationId xmlns:p14="http://schemas.microsoft.com/office/powerpoint/2010/main" val="3392579643"/>
       </p:ext>
     </p:extLst>
   </p:cSld>

</xml_diff>

<commit_message>
Almost finished second dataset!
</commit_message>
<xml_diff>
--- a/relazione.pptx
+++ b/relazione.pptx
@@ -70,6 +70,10 @@
     <p:sldId id="319" r:id="rId64"/>
     <p:sldId id="320" r:id="rId65"/>
     <p:sldId id="321" r:id="rId66"/>
+    <p:sldId id="327" r:id="rId67"/>
+    <p:sldId id="328" r:id="rId68"/>
+    <p:sldId id="325" r:id="rId69"/>
+    <p:sldId id="326" r:id="rId70"/>
   </p:sldIdLst>
   <p:sldSz cx="9144000" cy="6858000" type="screen4x3"/>
   <p:notesSz cx="6858000" cy="9144000"/>
@@ -32451,7 +32455,7 @@
         </p:nvSpPr>
         <p:spPr>
           <a:xfrm>
-            <a:off x="312337" y="1028626"/>
+            <a:off x="312337" y="980728"/>
             <a:ext cx="6188489" cy="400110"/>
           </a:xfrm>
           <a:prstGeom prst="rect">
@@ -36105,7 +36109,7 @@
         </p:nvSpPr>
         <p:spPr>
           <a:xfrm>
-            <a:off x="457200" y="807577"/>
+            <a:off x="457200" y="862261"/>
             <a:ext cx="8229600" cy="1846659"/>
           </a:xfrm>
           <a:prstGeom prst="rect">
@@ -36141,7 +36145,7 @@
             <a:pPr algn="just"/>
             <a:r>
               <a:rPr lang="it-IT" sz="1600" dirty="0"/>
-              <a:t>Si potrebbe inoltre intuire che non ci siano correlazioni fra i voti ottenuti e la coorte di immatricolazione.</a:t>
+              <a:t>Si potrebbe inoltre intuire che non ci siano correlazioni fra i voti ottenuti e la coorte di immatricolazione…</a:t>
             </a:r>
           </a:p>
           <a:p>
@@ -36164,8 +36168,8 @@
         </p:nvSpPr>
         <p:spPr>
           <a:xfrm>
-            <a:off x="2967136" y="6444044"/>
-            <a:ext cx="8229600" cy="369332"/>
+            <a:off x="3111152" y="6444044"/>
+            <a:ext cx="8229600" cy="338554"/>
           </a:xfrm>
           <a:prstGeom prst="rect">
             <a:avLst/>
@@ -36180,10 +36184,18 @@
           <a:p>
             <a:pPr algn="ctr"/>
             <a:r>
-              <a:rPr lang="it-IT" i="1" dirty="0"/>
-              <a:t>Tanto vale togliersi comunque il dubbio…</a:t>
-            </a:r>
-            <a:endParaRPr lang="en-US" i="1" dirty="0"/>
+              <a:rPr lang="it-IT" sz="1600" i="1" dirty="0">
+                <a:solidFill>
+                  <a:srgbClr val="00B050"/>
+                </a:solidFill>
+              </a:rPr>
+              <a:t>… ma tanto vale togliersi comunque il dubbio</a:t>
+            </a:r>
+            <a:endParaRPr lang="en-US" sz="1600" i="1" dirty="0">
+              <a:solidFill>
+                <a:srgbClr val="00B050"/>
+              </a:solidFill>
+            </a:endParaRPr>
           </a:p>
         </p:txBody>
       </p:sp>
@@ -37109,6 +37121,1440 @@
     <p:extLst>
       <p:ext uri="{BB962C8B-B14F-4D97-AF65-F5344CB8AC3E}">
         <p14:creationId xmlns:p14="http://schemas.microsoft.com/office/powerpoint/2010/main" val="3421947600"/>
+      </p:ext>
+    </p:extLst>
+  </p:cSld>
+  <p:clrMapOvr>
+    <a:masterClrMapping/>
+  </p:clrMapOvr>
+</p:sld>
+</file>
+
+<file path=ppt/slides/slide66.xml><?xml version="1.0" encoding="utf-8"?>
+<p:sld xmlns:a="http://schemas.openxmlformats.org/drawingml/2006/main" xmlns:r="http://schemas.openxmlformats.org/officeDocument/2006/relationships" xmlns:p="http://schemas.openxmlformats.org/presentationml/2006/main">
+  <p:cSld>
+    <p:spTree>
+      <p:nvGrpSpPr>
+        <p:cNvPr id="1" name=""/>
+        <p:cNvGrpSpPr/>
+        <p:nvPr/>
+      </p:nvGrpSpPr>
+      <p:grpSpPr>
+        <a:xfrm>
+          <a:off x="0" y="0"/>
+          <a:ext cx="0" cy="0"/>
+          <a:chOff x="0" y="0"/>
+          <a:chExt cx="0" cy="0"/>
+        </a:xfrm>
+      </p:grpSpPr>
+      <p:sp>
+        <p:nvSpPr>
+          <p:cNvPr id="2" name="Titolo 1">
+            <a:extLst>
+              <a:ext uri="{FF2B5EF4-FFF2-40B4-BE49-F238E27FC236}">
+                <a16:creationId xmlns:a16="http://schemas.microsoft.com/office/drawing/2014/main" id="{7E84CF1E-FCD9-4E84-90E4-204A4ED4AD6D}"/>
+              </a:ext>
+            </a:extLst>
+          </p:cNvPr>
+          <p:cNvSpPr txBox="1">
+            <a:spLocks/>
+          </p:cNvSpPr>
+          <p:nvPr/>
+        </p:nvSpPr>
+        <p:spPr>
+          <a:xfrm>
+            <a:off x="755576" y="152400"/>
+            <a:ext cx="8229600" cy="1143000"/>
+          </a:xfrm>
+          <a:prstGeom prst="rect">
+            <a:avLst/>
+          </a:prstGeom>
+        </p:spPr>
+        <p:txBody>
+          <a:bodyPr>
+            <a:noAutofit/>
+          </a:bodyPr>
+          <a:lstStyle>
+            <a:lvl1pPr algn="ctr" defTabSz="342900" rtl="0" eaLnBrk="1" latinLnBrk="0" hangingPunct="1">
+              <a:spcBef>
+                <a:spcPct val="0"/>
+              </a:spcBef>
+              <a:buNone/>
+              <a:defRPr sz="3300" kern="1200">
+                <a:solidFill>
+                  <a:schemeClr val="tx1"/>
+                </a:solidFill>
+                <a:latin typeface="+mj-lt"/>
+                <a:ea typeface="+mj-ea"/>
+                <a:cs typeface="+mj-cs"/>
+              </a:defRPr>
+            </a:lvl1pPr>
+          </a:lstStyle>
+          <a:p>
+            <a:pPr algn="r"/>
+            <a:r>
+              <a:rPr lang="it-IT" sz="2400" b="1" dirty="0">
+                <a:solidFill>
+                  <a:schemeClr val="bg1"/>
+                </a:solidFill>
+              </a:rPr>
+              <a:t>CLUSTER ANALYSIS</a:t>
+            </a:r>
+            <a:r>
+              <a:rPr lang="it-IT" sz="2400" dirty="0">
+                <a:solidFill>
+                  <a:schemeClr val="bg1"/>
+                </a:solidFill>
+              </a:rPr>
+              <a:t>: ESAMI DEL PRIMO ANNO </a:t>
+            </a:r>
+            <a:endParaRPr lang="en-US" sz="2400" dirty="0">
+              <a:solidFill>
+                <a:schemeClr val="bg1"/>
+              </a:solidFill>
+            </a:endParaRPr>
+          </a:p>
+        </p:txBody>
+      </p:sp>
+      <p:sp>
+        <p:nvSpPr>
+          <p:cNvPr id="3" name="CasellaDiTesto 2">
+            <a:extLst>
+              <a:ext uri="{FF2B5EF4-FFF2-40B4-BE49-F238E27FC236}">
+                <a16:creationId xmlns:a16="http://schemas.microsoft.com/office/drawing/2014/main" id="{3CF26DA8-87E4-45B9-90DB-71C7D507C80A}"/>
+              </a:ext>
+            </a:extLst>
+          </p:cNvPr>
+          <p:cNvSpPr txBox="1"/>
+          <p:nvPr/>
+        </p:nvSpPr>
+        <p:spPr>
+          <a:xfrm>
+            <a:off x="35496" y="868650"/>
+            <a:ext cx="8925520" cy="677108"/>
+          </a:xfrm>
+          <a:prstGeom prst="rect">
+            <a:avLst/>
+          </a:prstGeom>
+          <a:noFill/>
+        </p:spPr>
+        <p:txBody>
+          <a:bodyPr wrap="none" rtlCol="0">
+            <a:spAutoFit/>
+          </a:bodyPr>
+          <a:lstStyle/>
+          <a:p>
+            <a:r>
+              <a:rPr lang="it-IT" sz="2000" b="1" dirty="0"/>
+              <a:t>Clustering gerarchico: 4 cluster,  MEAN  </a:t>
+            </a:r>
+            <a:r>
+              <a:rPr lang="it-IT" sz="2000" dirty="0">
+                <a:solidFill>
+                  <a:srgbClr val="00B050"/>
+                </a:solidFill>
+              </a:rPr>
+              <a:t>–  Racchiudere ogni coorte di in un cluster? </a:t>
+            </a:r>
+            <a:endParaRPr lang="it-IT" dirty="0">
+              <a:solidFill>
+                <a:srgbClr val="00B050"/>
+              </a:solidFill>
+            </a:endParaRPr>
+          </a:p>
+          <a:p>
+            <a:endParaRPr lang="en-US" dirty="0">
+              <a:solidFill>
+                <a:srgbClr val="92D050"/>
+              </a:solidFill>
+            </a:endParaRPr>
+          </a:p>
+        </p:txBody>
+      </p:sp>
+      <p:sp>
+        <p:nvSpPr>
+          <p:cNvPr id="6" name="Rettangolo 5">
+            <a:extLst>
+              <a:ext uri="{FF2B5EF4-FFF2-40B4-BE49-F238E27FC236}">
+                <a16:creationId xmlns:a16="http://schemas.microsoft.com/office/drawing/2014/main" id="{38850E37-17D4-4562-9BBF-FCB3E5A1C332}"/>
+              </a:ext>
+            </a:extLst>
+          </p:cNvPr>
+          <p:cNvSpPr/>
+          <p:nvPr/>
+        </p:nvSpPr>
+        <p:spPr>
+          <a:xfrm>
+            <a:off x="2267744" y="1262365"/>
+            <a:ext cx="8262664" cy="5262979"/>
+          </a:xfrm>
+          <a:prstGeom prst="rect">
+            <a:avLst/>
+          </a:prstGeom>
+        </p:spPr>
+        <p:txBody>
+          <a:bodyPr wrap="square">
+            <a:spAutoFit/>
+          </a:bodyPr>
+          <a:lstStyle/>
+          <a:p>
+            <a:endParaRPr lang="en-US" sz="1400" dirty="0">
+              <a:solidFill>
+                <a:srgbClr val="7030A0"/>
+              </a:solidFill>
+              <a:latin typeface="Courier New" panose="02070309020205020404" pitchFamily="49" charset="0"/>
+              <a:cs typeface="Courier New" panose="02070309020205020404" pitchFamily="49" charset="0"/>
+            </a:endParaRPr>
+          </a:p>
+          <a:p>
+            <a:r>
+              <a:rPr lang="en-US" sz="1400" dirty="0">
+                <a:solidFill>
+                  <a:srgbClr val="7030A0"/>
+                </a:solidFill>
+                <a:latin typeface="Courier New" panose="02070309020205020404" pitchFamily="49" charset="0"/>
+                <a:cs typeface="Courier New" panose="02070309020205020404" pitchFamily="49" charset="0"/>
+              </a:rPr>
+              <a:t>Clustered Instances</a:t>
+            </a:r>
+          </a:p>
+          <a:p>
+            <a:endParaRPr lang="en-US" sz="1400" dirty="0">
+              <a:solidFill>
+                <a:srgbClr val="7030A0"/>
+              </a:solidFill>
+              <a:latin typeface="Courier New" panose="02070309020205020404" pitchFamily="49" charset="0"/>
+              <a:cs typeface="Courier New" panose="02070309020205020404" pitchFamily="49" charset="0"/>
+            </a:endParaRPr>
+          </a:p>
+          <a:p>
+            <a:r>
+              <a:rPr lang="en-US" sz="1400" dirty="0">
+                <a:solidFill>
+                  <a:srgbClr val="7030A0"/>
+                </a:solidFill>
+                <a:latin typeface="Courier New" panose="02070309020205020404" pitchFamily="49" charset="0"/>
+                <a:cs typeface="Courier New" panose="02070309020205020404" pitchFamily="49" charset="0"/>
+              </a:rPr>
+              <a:t>0       13 ( 11%)</a:t>
+            </a:r>
+          </a:p>
+          <a:p>
+            <a:r>
+              <a:rPr lang="en-US" sz="1400" dirty="0">
+                <a:solidFill>
+                  <a:srgbClr val="7030A0"/>
+                </a:solidFill>
+                <a:latin typeface="Courier New" panose="02070309020205020404" pitchFamily="49" charset="0"/>
+                <a:cs typeface="Courier New" panose="02070309020205020404" pitchFamily="49" charset="0"/>
+              </a:rPr>
+              <a:t>1       48 ( 41%)</a:t>
+            </a:r>
+          </a:p>
+          <a:p>
+            <a:r>
+              <a:rPr lang="en-US" sz="1400" dirty="0">
+                <a:solidFill>
+                  <a:srgbClr val="7030A0"/>
+                </a:solidFill>
+                <a:latin typeface="Courier New" panose="02070309020205020404" pitchFamily="49" charset="0"/>
+                <a:cs typeface="Courier New" panose="02070309020205020404" pitchFamily="49" charset="0"/>
+              </a:rPr>
+              <a:t>2       39 ( 34%)</a:t>
+            </a:r>
+          </a:p>
+          <a:p>
+            <a:r>
+              <a:rPr lang="en-US" sz="1400" dirty="0">
+                <a:solidFill>
+                  <a:srgbClr val="7030A0"/>
+                </a:solidFill>
+                <a:latin typeface="Courier New" panose="02070309020205020404" pitchFamily="49" charset="0"/>
+                <a:cs typeface="Courier New" panose="02070309020205020404" pitchFamily="49" charset="0"/>
+              </a:rPr>
+              <a:t>3       16 ( 14%)</a:t>
+            </a:r>
+          </a:p>
+          <a:p>
+            <a:endParaRPr lang="en-US" sz="1400" dirty="0">
+              <a:solidFill>
+                <a:srgbClr val="7030A0"/>
+              </a:solidFill>
+              <a:latin typeface="Courier New" panose="02070309020205020404" pitchFamily="49" charset="0"/>
+              <a:cs typeface="Courier New" panose="02070309020205020404" pitchFamily="49" charset="0"/>
+            </a:endParaRPr>
+          </a:p>
+          <a:p>
+            <a:endParaRPr lang="en-US" sz="1400" dirty="0">
+              <a:solidFill>
+                <a:srgbClr val="7030A0"/>
+              </a:solidFill>
+              <a:latin typeface="Courier New" panose="02070309020205020404" pitchFamily="49" charset="0"/>
+              <a:cs typeface="Courier New" panose="02070309020205020404" pitchFamily="49" charset="0"/>
+            </a:endParaRPr>
+          </a:p>
+          <a:p>
+            <a:r>
+              <a:rPr lang="en-US" sz="1400" dirty="0">
+                <a:solidFill>
+                  <a:srgbClr val="7030A0"/>
+                </a:solidFill>
+                <a:latin typeface="Courier New" panose="02070309020205020404" pitchFamily="49" charset="0"/>
+                <a:cs typeface="Courier New" panose="02070309020205020404" pitchFamily="49" charset="0"/>
+              </a:rPr>
+              <a:t>Class attribute: </a:t>
+            </a:r>
+            <a:r>
+              <a:rPr lang="en-US" sz="1400" dirty="0" err="1">
+                <a:solidFill>
+                  <a:srgbClr val="7030A0"/>
+                </a:solidFill>
+                <a:latin typeface="Courier New" panose="02070309020205020404" pitchFamily="49" charset="0"/>
+                <a:cs typeface="Courier New" panose="02070309020205020404" pitchFamily="49" charset="0"/>
+              </a:rPr>
+              <a:t>coorte</a:t>
+            </a:r>
+            <a:endParaRPr lang="en-US" sz="1400" dirty="0">
+              <a:solidFill>
+                <a:srgbClr val="7030A0"/>
+              </a:solidFill>
+              <a:latin typeface="Courier New" panose="02070309020205020404" pitchFamily="49" charset="0"/>
+              <a:cs typeface="Courier New" panose="02070309020205020404" pitchFamily="49" charset="0"/>
+            </a:endParaRPr>
+          </a:p>
+          <a:p>
+            <a:r>
+              <a:rPr lang="en-US" sz="1400" dirty="0">
+                <a:solidFill>
+                  <a:srgbClr val="7030A0"/>
+                </a:solidFill>
+                <a:latin typeface="Courier New" panose="02070309020205020404" pitchFamily="49" charset="0"/>
+                <a:cs typeface="Courier New" panose="02070309020205020404" pitchFamily="49" charset="0"/>
+              </a:rPr>
+              <a:t>Classes to Clusters:</a:t>
+            </a:r>
+          </a:p>
+          <a:p>
+            <a:endParaRPr lang="en-US" sz="1400" dirty="0">
+              <a:solidFill>
+                <a:srgbClr val="7030A0"/>
+              </a:solidFill>
+              <a:latin typeface="Courier New" panose="02070309020205020404" pitchFamily="49" charset="0"/>
+              <a:cs typeface="Courier New" panose="02070309020205020404" pitchFamily="49" charset="0"/>
+            </a:endParaRPr>
+          </a:p>
+          <a:p>
+            <a:r>
+              <a:rPr lang="en-US" sz="1400" dirty="0">
+                <a:solidFill>
+                  <a:srgbClr val="7030A0"/>
+                </a:solidFill>
+                <a:latin typeface="Courier New" panose="02070309020205020404" pitchFamily="49" charset="0"/>
+                <a:cs typeface="Courier New" panose="02070309020205020404" pitchFamily="49" charset="0"/>
+              </a:rPr>
+              <a:t>  0  1  2  3  &lt;-- assigned to cluster</a:t>
+            </a:r>
+          </a:p>
+          <a:p>
+            <a:r>
+              <a:rPr lang="en-US" sz="1400" dirty="0">
+                <a:solidFill>
+                  <a:srgbClr val="7030A0"/>
+                </a:solidFill>
+                <a:latin typeface="Courier New" panose="02070309020205020404" pitchFamily="49" charset="0"/>
+                <a:cs typeface="Courier New" panose="02070309020205020404" pitchFamily="49" charset="0"/>
+              </a:rPr>
+              <a:t> 13  1  0  0 | 2010</a:t>
+            </a:r>
+          </a:p>
+          <a:p>
+            <a:r>
+              <a:rPr lang="en-US" sz="1400" dirty="0">
+                <a:solidFill>
+                  <a:srgbClr val="7030A0"/>
+                </a:solidFill>
+                <a:latin typeface="Courier New" panose="02070309020205020404" pitchFamily="49" charset="0"/>
+                <a:cs typeface="Courier New" panose="02070309020205020404" pitchFamily="49" charset="0"/>
+              </a:rPr>
+              <a:t>  0  0 11  8 | 2011</a:t>
+            </a:r>
+          </a:p>
+          <a:p>
+            <a:r>
+              <a:rPr lang="en-US" sz="1400" dirty="0">
+                <a:solidFill>
+                  <a:srgbClr val="7030A0"/>
+                </a:solidFill>
+                <a:latin typeface="Courier New" panose="02070309020205020404" pitchFamily="49" charset="0"/>
+                <a:cs typeface="Courier New" panose="02070309020205020404" pitchFamily="49" charset="0"/>
+              </a:rPr>
+              <a:t>  0  1 28  8 | 2012</a:t>
+            </a:r>
+          </a:p>
+          <a:p>
+            <a:r>
+              <a:rPr lang="en-US" sz="1400" dirty="0">
+                <a:solidFill>
+                  <a:srgbClr val="7030A0"/>
+                </a:solidFill>
+                <a:latin typeface="Courier New" panose="02070309020205020404" pitchFamily="49" charset="0"/>
+                <a:cs typeface="Courier New" panose="02070309020205020404" pitchFamily="49" charset="0"/>
+              </a:rPr>
+              <a:t>  0 46  0  0 | 2013</a:t>
+            </a:r>
+          </a:p>
+          <a:p>
+            <a:endParaRPr lang="en-US" sz="1400" dirty="0">
+              <a:solidFill>
+                <a:srgbClr val="7030A0"/>
+              </a:solidFill>
+              <a:latin typeface="Courier New" panose="02070309020205020404" pitchFamily="49" charset="0"/>
+              <a:cs typeface="Courier New" panose="02070309020205020404" pitchFamily="49" charset="0"/>
+            </a:endParaRPr>
+          </a:p>
+          <a:p>
+            <a:r>
+              <a:rPr lang="en-US" sz="1400" dirty="0">
+                <a:solidFill>
+                  <a:srgbClr val="7030A0"/>
+                </a:solidFill>
+                <a:latin typeface="Courier New" panose="02070309020205020404" pitchFamily="49" charset="0"/>
+                <a:cs typeface="Courier New" panose="02070309020205020404" pitchFamily="49" charset="0"/>
+              </a:rPr>
+              <a:t>Cluster 0 &lt;-- 2010</a:t>
+            </a:r>
+          </a:p>
+          <a:p>
+            <a:r>
+              <a:rPr lang="en-US" sz="1400" dirty="0">
+                <a:solidFill>
+                  <a:srgbClr val="7030A0"/>
+                </a:solidFill>
+                <a:latin typeface="Courier New" panose="02070309020205020404" pitchFamily="49" charset="0"/>
+                <a:cs typeface="Courier New" panose="02070309020205020404" pitchFamily="49" charset="0"/>
+              </a:rPr>
+              <a:t>Cluster 1 &lt;-- 2013</a:t>
+            </a:r>
+          </a:p>
+          <a:p>
+            <a:r>
+              <a:rPr lang="en-US" sz="1400" dirty="0">
+                <a:solidFill>
+                  <a:srgbClr val="7030A0"/>
+                </a:solidFill>
+                <a:latin typeface="Courier New" panose="02070309020205020404" pitchFamily="49" charset="0"/>
+                <a:cs typeface="Courier New" panose="02070309020205020404" pitchFamily="49" charset="0"/>
+              </a:rPr>
+              <a:t>Cluster 2 &lt;-- 2012</a:t>
+            </a:r>
+          </a:p>
+          <a:p>
+            <a:r>
+              <a:rPr lang="en-US" sz="1400" dirty="0">
+                <a:solidFill>
+                  <a:srgbClr val="7030A0"/>
+                </a:solidFill>
+                <a:latin typeface="Courier New" panose="02070309020205020404" pitchFamily="49" charset="0"/>
+                <a:cs typeface="Courier New" panose="02070309020205020404" pitchFamily="49" charset="0"/>
+              </a:rPr>
+              <a:t>Cluster 3 &lt;-- 2011</a:t>
+            </a:r>
+          </a:p>
+          <a:p>
+            <a:endParaRPr lang="en-US" sz="1400" dirty="0">
+              <a:solidFill>
+                <a:srgbClr val="7030A0"/>
+              </a:solidFill>
+              <a:latin typeface="Courier New" panose="02070309020205020404" pitchFamily="49" charset="0"/>
+              <a:cs typeface="Courier New" panose="02070309020205020404" pitchFamily="49" charset="0"/>
+            </a:endParaRPr>
+          </a:p>
+          <a:p>
+            <a:r>
+              <a:rPr lang="en-US" sz="1400" b="1" dirty="0">
+                <a:solidFill>
+                  <a:srgbClr val="7030A0"/>
+                </a:solidFill>
+                <a:latin typeface="Courier New" panose="02070309020205020404" pitchFamily="49" charset="0"/>
+                <a:cs typeface="Courier New" panose="02070309020205020404" pitchFamily="49" charset="0"/>
+              </a:rPr>
+              <a:t>Incorrectly clustered instances :	21.0	 </a:t>
+            </a:r>
+            <a:r>
+              <a:rPr lang="en-US" sz="1400" b="1" dirty="0">
+                <a:solidFill>
+                  <a:srgbClr val="FF0000"/>
+                </a:solidFill>
+                <a:latin typeface="Courier New" panose="02070309020205020404" pitchFamily="49" charset="0"/>
+                <a:cs typeface="Courier New" panose="02070309020205020404" pitchFamily="49" charset="0"/>
+              </a:rPr>
+              <a:t>18.1034 %</a:t>
+            </a:r>
+          </a:p>
+        </p:txBody>
+      </p:sp>
+    </p:spTree>
+    <p:extLst>
+      <p:ext uri="{BB962C8B-B14F-4D97-AF65-F5344CB8AC3E}">
+        <p14:creationId xmlns:p14="http://schemas.microsoft.com/office/powerpoint/2010/main" val="3670508915"/>
+      </p:ext>
+    </p:extLst>
+  </p:cSld>
+  <p:clrMapOvr>
+    <a:masterClrMapping/>
+  </p:clrMapOvr>
+</p:sld>
+</file>
+
+<file path=ppt/slides/slide67.xml><?xml version="1.0" encoding="utf-8"?>
+<p:sld xmlns:a="http://schemas.openxmlformats.org/drawingml/2006/main" xmlns:r="http://schemas.openxmlformats.org/officeDocument/2006/relationships" xmlns:p="http://schemas.openxmlformats.org/presentationml/2006/main">
+  <p:cSld>
+    <p:spTree>
+      <p:nvGrpSpPr>
+        <p:cNvPr id="1" name=""/>
+        <p:cNvGrpSpPr/>
+        <p:nvPr/>
+      </p:nvGrpSpPr>
+      <p:grpSpPr>
+        <a:xfrm>
+          <a:off x="0" y="0"/>
+          <a:ext cx="0" cy="0"/>
+          <a:chOff x="0" y="0"/>
+          <a:chExt cx="0" cy="0"/>
+        </a:xfrm>
+      </p:grpSpPr>
+      <p:sp>
+        <p:nvSpPr>
+          <p:cNvPr id="2" name="Titolo 1">
+            <a:extLst>
+              <a:ext uri="{FF2B5EF4-FFF2-40B4-BE49-F238E27FC236}">
+                <a16:creationId xmlns:a16="http://schemas.microsoft.com/office/drawing/2014/main" id="{7E84CF1E-FCD9-4E84-90E4-204A4ED4AD6D}"/>
+              </a:ext>
+            </a:extLst>
+          </p:cNvPr>
+          <p:cNvSpPr txBox="1">
+            <a:spLocks/>
+          </p:cNvSpPr>
+          <p:nvPr/>
+        </p:nvSpPr>
+        <p:spPr>
+          <a:xfrm>
+            <a:off x="755576" y="152400"/>
+            <a:ext cx="8229600" cy="1143000"/>
+          </a:xfrm>
+          <a:prstGeom prst="rect">
+            <a:avLst/>
+          </a:prstGeom>
+        </p:spPr>
+        <p:txBody>
+          <a:bodyPr>
+            <a:noAutofit/>
+          </a:bodyPr>
+          <a:lstStyle>
+            <a:lvl1pPr algn="ctr" defTabSz="342900" rtl="0" eaLnBrk="1" latinLnBrk="0" hangingPunct="1">
+              <a:spcBef>
+                <a:spcPct val="0"/>
+              </a:spcBef>
+              <a:buNone/>
+              <a:defRPr sz="3300" kern="1200">
+                <a:solidFill>
+                  <a:schemeClr val="tx1"/>
+                </a:solidFill>
+                <a:latin typeface="+mj-lt"/>
+                <a:ea typeface="+mj-ea"/>
+                <a:cs typeface="+mj-cs"/>
+              </a:defRPr>
+            </a:lvl1pPr>
+          </a:lstStyle>
+          <a:p>
+            <a:pPr algn="r"/>
+            <a:r>
+              <a:rPr lang="it-IT" sz="2400" b="1" dirty="0">
+                <a:solidFill>
+                  <a:schemeClr val="bg1"/>
+                </a:solidFill>
+              </a:rPr>
+              <a:t>CLUSTER ANALYSIS</a:t>
+            </a:r>
+            <a:r>
+              <a:rPr lang="it-IT" sz="2400" dirty="0">
+                <a:solidFill>
+                  <a:schemeClr val="bg1"/>
+                </a:solidFill>
+              </a:rPr>
+              <a:t>: ESAMI DEL PRIMO ANNO </a:t>
+            </a:r>
+            <a:endParaRPr lang="en-US" sz="2400" dirty="0">
+              <a:solidFill>
+                <a:schemeClr val="bg1"/>
+              </a:solidFill>
+            </a:endParaRPr>
+          </a:p>
+        </p:txBody>
+      </p:sp>
+      <p:sp>
+        <p:nvSpPr>
+          <p:cNvPr id="3" name="CasellaDiTesto 2">
+            <a:extLst>
+              <a:ext uri="{FF2B5EF4-FFF2-40B4-BE49-F238E27FC236}">
+                <a16:creationId xmlns:a16="http://schemas.microsoft.com/office/drawing/2014/main" id="{3CF26DA8-87E4-45B9-90DB-71C7D507C80A}"/>
+              </a:ext>
+            </a:extLst>
+          </p:cNvPr>
+          <p:cNvSpPr txBox="1"/>
+          <p:nvPr/>
+        </p:nvSpPr>
+        <p:spPr>
+          <a:xfrm>
+            <a:off x="35496" y="868650"/>
+            <a:ext cx="8925520" cy="677108"/>
+          </a:xfrm>
+          <a:prstGeom prst="rect">
+            <a:avLst/>
+          </a:prstGeom>
+          <a:noFill/>
+        </p:spPr>
+        <p:txBody>
+          <a:bodyPr wrap="none" rtlCol="0">
+            <a:spAutoFit/>
+          </a:bodyPr>
+          <a:lstStyle/>
+          <a:p>
+            <a:r>
+              <a:rPr lang="it-IT" sz="2000" b="1" dirty="0"/>
+              <a:t>Clustering gerarchico: 4 cluster,  MEAN  </a:t>
+            </a:r>
+            <a:r>
+              <a:rPr lang="it-IT" sz="2000" dirty="0">
+                <a:solidFill>
+                  <a:srgbClr val="00B050"/>
+                </a:solidFill>
+              </a:rPr>
+              <a:t>–  Racchiudere ogni coorte di in un cluster? </a:t>
+            </a:r>
+            <a:endParaRPr lang="it-IT" dirty="0">
+              <a:solidFill>
+                <a:srgbClr val="00B050"/>
+              </a:solidFill>
+            </a:endParaRPr>
+          </a:p>
+          <a:p>
+            <a:endParaRPr lang="en-US" dirty="0">
+              <a:solidFill>
+                <a:srgbClr val="92D050"/>
+              </a:solidFill>
+            </a:endParaRPr>
+          </a:p>
+        </p:txBody>
+      </p:sp>
+      <p:pic>
+        <p:nvPicPr>
+          <p:cNvPr id="5" name="Immagine 4">
+            <a:extLst>
+              <a:ext uri="{FF2B5EF4-FFF2-40B4-BE49-F238E27FC236}">
+                <a16:creationId xmlns:a16="http://schemas.microsoft.com/office/drawing/2014/main" id="{8BFFACC6-58B1-4702-B9E4-4AC512DC686C}"/>
+              </a:ext>
+            </a:extLst>
+          </p:cNvPr>
+          <p:cNvPicPr>
+            <a:picLocks noChangeAspect="1"/>
+          </p:cNvPicPr>
+          <p:nvPr/>
+        </p:nvPicPr>
+        <p:blipFill>
+          <a:blip r:embed="rId2"/>
+          <a:stretch>
+            <a:fillRect/>
+          </a:stretch>
+        </p:blipFill>
+        <p:spPr>
+          <a:xfrm>
+            <a:off x="2699792" y="3501008"/>
+            <a:ext cx="4725013" cy="2717928"/>
+          </a:xfrm>
+          <a:prstGeom prst="rect">
+            <a:avLst/>
+          </a:prstGeom>
+        </p:spPr>
+      </p:pic>
+      <p:pic>
+        <p:nvPicPr>
+          <p:cNvPr id="7" name="Immagine 6">
+            <a:extLst>
+              <a:ext uri="{FF2B5EF4-FFF2-40B4-BE49-F238E27FC236}">
+                <a16:creationId xmlns:a16="http://schemas.microsoft.com/office/drawing/2014/main" id="{AD2D9DDD-64F1-4DA4-A728-A02BB108A6ED}"/>
+              </a:ext>
+            </a:extLst>
+          </p:cNvPr>
+          <p:cNvPicPr>
+            <a:picLocks noChangeAspect="1"/>
+          </p:cNvPicPr>
+          <p:nvPr/>
+        </p:nvPicPr>
+        <p:blipFill>
+          <a:blip r:embed="rId3"/>
+          <a:stretch>
+            <a:fillRect/>
+          </a:stretch>
+        </p:blipFill>
+        <p:spPr>
+          <a:xfrm>
+            <a:off x="1403648" y="1641204"/>
+            <a:ext cx="4781458" cy="3287559"/>
+          </a:xfrm>
+          <a:prstGeom prst="rect">
+            <a:avLst/>
+          </a:prstGeom>
+        </p:spPr>
+      </p:pic>
+    </p:spTree>
+    <p:extLst>
+      <p:ext uri="{BB962C8B-B14F-4D97-AF65-F5344CB8AC3E}">
+        <p14:creationId xmlns:p14="http://schemas.microsoft.com/office/powerpoint/2010/main" val="1441092965"/>
+      </p:ext>
+    </p:extLst>
+  </p:cSld>
+  <p:clrMapOvr>
+    <a:masterClrMapping/>
+  </p:clrMapOvr>
+</p:sld>
+</file>
+
+<file path=ppt/slides/slide68.xml><?xml version="1.0" encoding="utf-8"?>
+<p:sld xmlns:a="http://schemas.openxmlformats.org/drawingml/2006/main" xmlns:r="http://schemas.openxmlformats.org/officeDocument/2006/relationships" xmlns:p="http://schemas.openxmlformats.org/presentationml/2006/main">
+  <p:cSld>
+    <p:spTree>
+      <p:nvGrpSpPr>
+        <p:cNvPr id="1" name=""/>
+        <p:cNvGrpSpPr/>
+        <p:nvPr/>
+      </p:nvGrpSpPr>
+      <p:grpSpPr>
+        <a:xfrm>
+          <a:off x="0" y="0"/>
+          <a:ext cx="0" cy="0"/>
+          <a:chOff x="0" y="0"/>
+          <a:chExt cx="0" cy="0"/>
+        </a:xfrm>
+      </p:grpSpPr>
+      <p:sp>
+        <p:nvSpPr>
+          <p:cNvPr id="2" name="Titolo 1">
+            <a:extLst>
+              <a:ext uri="{FF2B5EF4-FFF2-40B4-BE49-F238E27FC236}">
+                <a16:creationId xmlns:a16="http://schemas.microsoft.com/office/drawing/2014/main" id="{A9EE90F1-2530-4502-82B1-0FB3D946B69B}"/>
+              </a:ext>
+            </a:extLst>
+          </p:cNvPr>
+          <p:cNvSpPr txBox="1">
+            <a:spLocks/>
+          </p:cNvSpPr>
+          <p:nvPr/>
+        </p:nvSpPr>
+        <p:spPr>
+          <a:xfrm>
+            <a:off x="755576" y="152400"/>
+            <a:ext cx="8229600" cy="1143000"/>
+          </a:xfrm>
+          <a:prstGeom prst="rect">
+            <a:avLst/>
+          </a:prstGeom>
+        </p:spPr>
+        <p:txBody>
+          <a:bodyPr>
+            <a:noAutofit/>
+          </a:bodyPr>
+          <a:lstStyle>
+            <a:lvl1pPr algn="ctr" defTabSz="342900" rtl="0" eaLnBrk="1" latinLnBrk="0" hangingPunct="1">
+              <a:spcBef>
+                <a:spcPct val="0"/>
+              </a:spcBef>
+              <a:buNone/>
+              <a:defRPr sz="3300" kern="1200">
+                <a:solidFill>
+                  <a:schemeClr val="tx1"/>
+                </a:solidFill>
+                <a:latin typeface="+mj-lt"/>
+                <a:ea typeface="+mj-ea"/>
+                <a:cs typeface="+mj-cs"/>
+              </a:defRPr>
+            </a:lvl1pPr>
+          </a:lstStyle>
+          <a:p>
+            <a:pPr algn="r"/>
+            <a:r>
+              <a:rPr lang="it-IT" sz="2400" b="1" dirty="0">
+                <a:solidFill>
+                  <a:schemeClr val="bg1"/>
+                </a:solidFill>
+              </a:rPr>
+              <a:t>CLUSTER ANALYSIS</a:t>
+            </a:r>
+            <a:r>
+              <a:rPr lang="it-IT" sz="2400" dirty="0">
+                <a:solidFill>
+                  <a:schemeClr val="bg1"/>
+                </a:solidFill>
+              </a:rPr>
+              <a:t>: ESAMI DEL PRIMO ANNO </a:t>
+            </a:r>
+            <a:endParaRPr lang="en-US" sz="2400" dirty="0">
+              <a:solidFill>
+                <a:schemeClr val="bg1"/>
+              </a:solidFill>
+            </a:endParaRPr>
+          </a:p>
+        </p:txBody>
+      </p:sp>
+      <p:sp>
+        <p:nvSpPr>
+          <p:cNvPr id="4" name="CasellaDiTesto 3">
+            <a:extLst>
+              <a:ext uri="{FF2B5EF4-FFF2-40B4-BE49-F238E27FC236}">
+                <a16:creationId xmlns:a16="http://schemas.microsoft.com/office/drawing/2014/main" id="{AE2B6B7C-7603-4DF2-A5B7-C47F0529B323}"/>
+              </a:ext>
+            </a:extLst>
+          </p:cNvPr>
+          <p:cNvSpPr txBox="1"/>
+          <p:nvPr/>
+        </p:nvSpPr>
+        <p:spPr>
+          <a:xfrm>
+            <a:off x="429933" y="1484784"/>
+            <a:ext cx="8390539" cy="5447645"/>
+          </a:xfrm>
+          <a:prstGeom prst="rect">
+            <a:avLst/>
+          </a:prstGeom>
+          <a:noFill/>
+        </p:spPr>
+        <p:txBody>
+          <a:bodyPr wrap="square" rtlCol="0">
+            <a:spAutoFit/>
+          </a:bodyPr>
+          <a:lstStyle/>
+          <a:p>
+            <a:r>
+              <a:rPr lang="en-US" sz="1200" dirty="0">
+                <a:solidFill>
+                  <a:srgbClr val="7030A0"/>
+                </a:solidFill>
+                <a:latin typeface="Courier New" panose="02070309020205020404" pitchFamily="49" charset="0"/>
+                <a:cs typeface="Courier New" panose="02070309020205020404" pitchFamily="49" charset="0"/>
+              </a:rPr>
+              <a:t>DBSCAN clustering results</a:t>
+            </a:r>
+          </a:p>
+          <a:p>
+            <a:r>
+              <a:rPr lang="en-US" sz="1200" dirty="0">
+                <a:solidFill>
+                  <a:srgbClr val="7030A0"/>
+                </a:solidFill>
+                <a:latin typeface="Courier New" panose="02070309020205020404" pitchFamily="49" charset="0"/>
+                <a:cs typeface="Courier New" panose="02070309020205020404" pitchFamily="49" charset="0"/>
+              </a:rPr>
+              <a:t>========================================================================================</a:t>
+            </a:r>
+          </a:p>
+          <a:p>
+            <a:endParaRPr lang="en-US" sz="1200" dirty="0">
+              <a:solidFill>
+                <a:srgbClr val="7030A0"/>
+              </a:solidFill>
+              <a:latin typeface="Courier New" panose="02070309020205020404" pitchFamily="49" charset="0"/>
+              <a:cs typeface="Courier New" panose="02070309020205020404" pitchFamily="49" charset="0"/>
+            </a:endParaRPr>
+          </a:p>
+          <a:p>
+            <a:r>
+              <a:rPr lang="en-US" sz="1200" dirty="0">
+                <a:solidFill>
+                  <a:srgbClr val="7030A0"/>
+                </a:solidFill>
+                <a:latin typeface="Courier New" panose="02070309020205020404" pitchFamily="49" charset="0"/>
+                <a:cs typeface="Courier New" panose="02070309020205020404" pitchFamily="49" charset="0"/>
+              </a:rPr>
+              <a:t>Clustered </a:t>
+            </a:r>
+            <a:r>
+              <a:rPr lang="en-US" sz="1200" dirty="0" err="1">
+                <a:solidFill>
+                  <a:srgbClr val="7030A0"/>
+                </a:solidFill>
+                <a:latin typeface="Courier New" panose="02070309020205020404" pitchFamily="49" charset="0"/>
+                <a:cs typeface="Courier New" panose="02070309020205020404" pitchFamily="49" charset="0"/>
+              </a:rPr>
+              <a:t>DataObjects</a:t>
+            </a:r>
+            <a:r>
+              <a:rPr lang="en-US" sz="1200" dirty="0">
+                <a:solidFill>
+                  <a:srgbClr val="7030A0"/>
+                </a:solidFill>
+                <a:latin typeface="Courier New" panose="02070309020205020404" pitchFamily="49" charset="0"/>
+                <a:cs typeface="Courier New" panose="02070309020205020404" pitchFamily="49" charset="0"/>
+              </a:rPr>
+              <a:t>: 116</a:t>
+            </a:r>
+          </a:p>
+          <a:p>
+            <a:r>
+              <a:rPr lang="en-US" sz="1200" dirty="0">
+                <a:solidFill>
+                  <a:srgbClr val="7030A0"/>
+                </a:solidFill>
+                <a:latin typeface="Courier New" panose="02070309020205020404" pitchFamily="49" charset="0"/>
+                <a:cs typeface="Courier New" panose="02070309020205020404" pitchFamily="49" charset="0"/>
+              </a:rPr>
+              <a:t>Number of attributes: 11</a:t>
+            </a:r>
+          </a:p>
+          <a:p>
+            <a:r>
+              <a:rPr lang="en-US" sz="1200" dirty="0">
+                <a:solidFill>
+                  <a:srgbClr val="7030A0"/>
+                </a:solidFill>
+                <a:latin typeface="Courier New" panose="02070309020205020404" pitchFamily="49" charset="0"/>
+                <a:cs typeface="Courier New" panose="02070309020205020404" pitchFamily="49" charset="0"/>
+              </a:rPr>
+              <a:t>Epsilon: 5.0; </a:t>
+            </a:r>
+            <a:r>
+              <a:rPr lang="en-US" sz="1200" dirty="0" err="1">
+                <a:solidFill>
+                  <a:srgbClr val="7030A0"/>
+                </a:solidFill>
+                <a:latin typeface="Courier New" panose="02070309020205020404" pitchFamily="49" charset="0"/>
+                <a:cs typeface="Courier New" panose="02070309020205020404" pitchFamily="49" charset="0"/>
+              </a:rPr>
+              <a:t>minPoints</a:t>
+            </a:r>
+            <a:r>
+              <a:rPr lang="en-US" sz="1200" dirty="0">
+                <a:solidFill>
+                  <a:srgbClr val="7030A0"/>
+                </a:solidFill>
+                <a:latin typeface="Courier New" panose="02070309020205020404" pitchFamily="49" charset="0"/>
+                <a:cs typeface="Courier New" panose="02070309020205020404" pitchFamily="49" charset="0"/>
+              </a:rPr>
+              <a:t>: 4</a:t>
+            </a:r>
+          </a:p>
+          <a:p>
+            <a:r>
+              <a:rPr lang="en-US" sz="1200" dirty="0">
+                <a:solidFill>
+                  <a:srgbClr val="7030A0"/>
+                </a:solidFill>
+                <a:latin typeface="Courier New" panose="02070309020205020404" pitchFamily="49" charset="0"/>
+                <a:cs typeface="Courier New" panose="02070309020205020404" pitchFamily="49" charset="0"/>
+              </a:rPr>
+              <a:t>Distance-type: </a:t>
+            </a:r>
+          </a:p>
+          <a:p>
+            <a:r>
+              <a:rPr lang="en-US" sz="1200" dirty="0">
+                <a:solidFill>
+                  <a:srgbClr val="7030A0"/>
+                </a:solidFill>
+                <a:latin typeface="Courier New" panose="02070309020205020404" pitchFamily="49" charset="0"/>
+                <a:cs typeface="Courier New" panose="02070309020205020404" pitchFamily="49" charset="0"/>
+              </a:rPr>
+              <a:t>Number of generated clusters: 1</a:t>
+            </a:r>
+          </a:p>
+          <a:p>
+            <a:r>
+              <a:rPr lang="en-US" sz="1200" dirty="0">
+                <a:solidFill>
+                  <a:srgbClr val="7030A0"/>
+                </a:solidFill>
+                <a:latin typeface="Courier New" panose="02070309020205020404" pitchFamily="49" charset="0"/>
+                <a:cs typeface="Courier New" panose="02070309020205020404" pitchFamily="49" charset="0"/>
+              </a:rPr>
+              <a:t>Elapsed time: .0</a:t>
+            </a:r>
+          </a:p>
+          <a:p>
+            <a:endParaRPr lang="en-US" sz="1200" dirty="0">
+              <a:solidFill>
+                <a:srgbClr val="7030A0"/>
+              </a:solidFill>
+              <a:latin typeface="Courier New" panose="02070309020205020404" pitchFamily="49" charset="0"/>
+              <a:cs typeface="Courier New" panose="02070309020205020404" pitchFamily="49" charset="0"/>
+            </a:endParaRPr>
+          </a:p>
+          <a:p>
+            <a:r>
+              <a:rPr lang="en-US" sz="1200" dirty="0">
+                <a:solidFill>
+                  <a:srgbClr val="7030A0"/>
+                </a:solidFill>
+                <a:latin typeface="Courier New" panose="02070309020205020404" pitchFamily="49" charset="0"/>
+                <a:cs typeface="Courier New" panose="02070309020205020404" pitchFamily="49" charset="0"/>
+              </a:rPr>
+              <a:t>(  0.) 2010,22,2011-06-15,24,2014-01-28,21,2012-02-23,19,2013-07-18,24,2012-  --&gt;  NOISE</a:t>
+            </a:r>
+          </a:p>
+          <a:p>
+            <a:r>
+              <a:rPr lang="en-US" sz="1200" dirty="0">
+                <a:solidFill>
+                  <a:srgbClr val="7030A0"/>
+                </a:solidFill>
+                <a:latin typeface="Courier New" panose="02070309020205020404" pitchFamily="49" charset="0"/>
+                <a:cs typeface="Courier New" panose="02070309020205020404" pitchFamily="49" charset="0"/>
+              </a:rPr>
+              <a:t>(  1.) 2010,28,2011-07-06,26,2012-09-20,25,2011-09-23,29,2011-07-26,22,2012-  --&gt;  0</a:t>
+            </a:r>
+          </a:p>
+          <a:p>
+            <a:r>
+              <a:rPr lang="en-US" sz="1200" dirty="0">
+                <a:solidFill>
+                  <a:srgbClr val="7030A0"/>
+                </a:solidFill>
+                <a:latin typeface="Courier New" panose="02070309020205020404" pitchFamily="49" charset="0"/>
+                <a:cs typeface="Courier New" panose="02070309020205020404" pitchFamily="49" charset="0"/>
+              </a:rPr>
+              <a:t>(  2.) 2010,31,2011-06-15,30,2011-08-30,28,2011-06-20,28,2012-02-22,30,2011-  --&gt;  0</a:t>
+            </a:r>
+          </a:p>
+          <a:p>
+            <a:r>
+              <a:rPr lang="it-IT" sz="1200" dirty="0">
+                <a:solidFill>
+                  <a:srgbClr val="7030A0"/>
+                </a:solidFill>
+                <a:latin typeface="Courier New" panose="02070309020205020404" pitchFamily="49" charset="0"/>
+                <a:cs typeface="Courier New" panose="02070309020205020404" pitchFamily="49" charset="0"/>
+              </a:rPr>
+              <a:t>…</a:t>
+            </a:r>
+            <a:endParaRPr lang="en-US" sz="1200" dirty="0">
+              <a:solidFill>
+                <a:srgbClr val="7030A0"/>
+              </a:solidFill>
+              <a:latin typeface="Courier New" panose="02070309020205020404" pitchFamily="49" charset="0"/>
+              <a:cs typeface="Courier New" panose="02070309020205020404" pitchFamily="49" charset="0"/>
+            </a:endParaRPr>
+          </a:p>
+          <a:p>
+            <a:r>
+              <a:rPr lang="en-US" sz="1200" dirty="0">
+                <a:solidFill>
+                  <a:srgbClr val="7030A0"/>
+                </a:solidFill>
+                <a:latin typeface="Courier New" panose="02070309020205020404" pitchFamily="49" charset="0"/>
+                <a:cs typeface="Courier New" panose="02070309020205020404" pitchFamily="49" charset="0"/>
+              </a:rPr>
+              <a:t>(113.) 2013,30,2014-07-17,31,2015-06-16,26,2014-07-28,30,2016-06-21,25,2016-  --&gt;  0</a:t>
+            </a:r>
+          </a:p>
+          <a:p>
+            <a:r>
+              <a:rPr lang="en-US" sz="1200" dirty="0">
+                <a:solidFill>
+                  <a:srgbClr val="7030A0"/>
+                </a:solidFill>
+                <a:latin typeface="Courier New" panose="02070309020205020404" pitchFamily="49" charset="0"/>
+                <a:cs typeface="Courier New" panose="02070309020205020404" pitchFamily="49" charset="0"/>
+              </a:rPr>
+              <a:t>(114.) 2013,26,2014-06-11,25,2016-07-18,23,2015-02-23,23,2015-09-22,27,2016-  --&gt;  NOISE</a:t>
+            </a:r>
+          </a:p>
+          <a:p>
+            <a:r>
+              <a:rPr lang="en-US" sz="1200" dirty="0">
+                <a:solidFill>
+                  <a:srgbClr val="7030A0"/>
+                </a:solidFill>
+                <a:latin typeface="Courier New" panose="02070309020205020404" pitchFamily="49" charset="0"/>
+                <a:cs typeface="Courier New" panose="02070309020205020404" pitchFamily="49" charset="0"/>
+              </a:rPr>
+              <a:t>(115.) 2013,27,2014-09-12,28,2015-02-13,26,2015-01-08,30,2014-06-10,24,2014-  --&gt;  0</a:t>
+            </a:r>
+          </a:p>
+          <a:p>
+            <a:endParaRPr lang="en-US" sz="1200" dirty="0">
+              <a:solidFill>
+                <a:srgbClr val="7030A0"/>
+              </a:solidFill>
+              <a:latin typeface="Courier New" panose="02070309020205020404" pitchFamily="49" charset="0"/>
+              <a:cs typeface="Courier New" panose="02070309020205020404" pitchFamily="49" charset="0"/>
+            </a:endParaRPr>
+          </a:p>
+          <a:p>
+            <a:endParaRPr lang="en-US" sz="1200" dirty="0">
+              <a:solidFill>
+                <a:srgbClr val="7030A0"/>
+              </a:solidFill>
+              <a:latin typeface="Courier New" panose="02070309020205020404" pitchFamily="49" charset="0"/>
+              <a:cs typeface="Courier New" panose="02070309020205020404" pitchFamily="49" charset="0"/>
+            </a:endParaRPr>
+          </a:p>
+          <a:p>
+            <a:r>
+              <a:rPr lang="en-US" sz="1200" dirty="0">
+                <a:solidFill>
+                  <a:srgbClr val="7030A0"/>
+                </a:solidFill>
+                <a:latin typeface="Courier New" panose="02070309020205020404" pitchFamily="49" charset="0"/>
+                <a:cs typeface="Courier New" panose="02070309020205020404" pitchFamily="49" charset="0"/>
+              </a:rPr>
+              <a:t>Time taken to build model (full training data) : 0 seconds</a:t>
+            </a:r>
+          </a:p>
+          <a:p>
+            <a:endParaRPr lang="en-US" sz="1200" dirty="0">
+              <a:solidFill>
+                <a:srgbClr val="7030A0"/>
+              </a:solidFill>
+              <a:latin typeface="Courier New" panose="02070309020205020404" pitchFamily="49" charset="0"/>
+              <a:cs typeface="Courier New" panose="02070309020205020404" pitchFamily="49" charset="0"/>
+            </a:endParaRPr>
+          </a:p>
+          <a:p>
+            <a:r>
+              <a:rPr lang="en-US" sz="1200" dirty="0">
+                <a:solidFill>
+                  <a:srgbClr val="7030A0"/>
+                </a:solidFill>
+                <a:latin typeface="Courier New" panose="02070309020205020404" pitchFamily="49" charset="0"/>
+                <a:cs typeface="Courier New" panose="02070309020205020404" pitchFamily="49" charset="0"/>
+              </a:rPr>
+              <a:t>=== Model and evaluation on training set ===</a:t>
+            </a:r>
+          </a:p>
+          <a:p>
+            <a:endParaRPr lang="en-US" sz="1200" dirty="0">
+              <a:solidFill>
+                <a:srgbClr val="7030A0"/>
+              </a:solidFill>
+              <a:latin typeface="Courier New" panose="02070309020205020404" pitchFamily="49" charset="0"/>
+              <a:cs typeface="Courier New" panose="02070309020205020404" pitchFamily="49" charset="0"/>
+            </a:endParaRPr>
+          </a:p>
+          <a:p>
+            <a:r>
+              <a:rPr lang="en-US" sz="1200" b="1" dirty="0">
+                <a:solidFill>
+                  <a:srgbClr val="7030A0"/>
+                </a:solidFill>
+                <a:latin typeface="Courier New" panose="02070309020205020404" pitchFamily="49" charset="0"/>
+                <a:cs typeface="Courier New" panose="02070309020205020404" pitchFamily="49" charset="0"/>
+              </a:rPr>
+              <a:t>Clustered Instances</a:t>
+            </a:r>
+          </a:p>
+          <a:p>
+            <a:endParaRPr lang="en-US" sz="1200" b="1" dirty="0">
+              <a:solidFill>
+                <a:srgbClr val="7030A0"/>
+              </a:solidFill>
+              <a:latin typeface="Courier New" panose="02070309020205020404" pitchFamily="49" charset="0"/>
+              <a:cs typeface="Courier New" panose="02070309020205020404" pitchFamily="49" charset="0"/>
+            </a:endParaRPr>
+          </a:p>
+          <a:p>
+            <a:r>
+              <a:rPr lang="en-US" sz="1200" b="1" dirty="0">
+                <a:solidFill>
+                  <a:srgbClr val="7030A0"/>
+                </a:solidFill>
+                <a:latin typeface="Courier New" panose="02070309020205020404" pitchFamily="49" charset="0"/>
+                <a:cs typeface="Courier New" panose="02070309020205020404" pitchFamily="49" charset="0"/>
+              </a:rPr>
+              <a:t>0       88 (100%)</a:t>
+            </a:r>
+          </a:p>
+          <a:p>
+            <a:endParaRPr lang="en-US" sz="1200" b="1" dirty="0">
+              <a:solidFill>
+                <a:srgbClr val="7030A0"/>
+              </a:solidFill>
+              <a:latin typeface="Courier New" panose="02070309020205020404" pitchFamily="49" charset="0"/>
+              <a:cs typeface="Courier New" panose="02070309020205020404" pitchFamily="49" charset="0"/>
+            </a:endParaRPr>
+          </a:p>
+          <a:p>
+            <a:r>
+              <a:rPr lang="en-US" sz="1200" b="1" dirty="0" err="1">
+                <a:solidFill>
+                  <a:srgbClr val="7030A0"/>
+                </a:solidFill>
+                <a:latin typeface="Courier New" panose="02070309020205020404" pitchFamily="49" charset="0"/>
+                <a:cs typeface="Courier New" panose="02070309020205020404" pitchFamily="49" charset="0"/>
+              </a:rPr>
+              <a:t>Unclustered</a:t>
+            </a:r>
+            <a:r>
+              <a:rPr lang="en-US" sz="1200" b="1" dirty="0">
+                <a:solidFill>
+                  <a:srgbClr val="7030A0"/>
+                </a:solidFill>
+                <a:latin typeface="Courier New" panose="02070309020205020404" pitchFamily="49" charset="0"/>
+                <a:cs typeface="Courier New" panose="02070309020205020404" pitchFamily="49" charset="0"/>
+              </a:rPr>
+              <a:t> instances : 28</a:t>
+            </a:r>
+          </a:p>
+          <a:p>
+            <a:endParaRPr lang="en-US" sz="1200" dirty="0">
+              <a:solidFill>
+                <a:srgbClr val="7030A0"/>
+              </a:solidFill>
+              <a:latin typeface="Courier New" panose="02070309020205020404" pitchFamily="49" charset="0"/>
+              <a:cs typeface="Courier New" panose="02070309020205020404" pitchFamily="49" charset="0"/>
+            </a:endParaRPr>
+          </a:p>
+        </p:txBody>
+      </p:sp>
+      <p:sp>
+        <p:nvSpPr>
+          <p:cNvPr id="5" name="CasellaDiTesto 4">
+            <a:extLst>
+              <a:ext uri="{FF2B5EF4-FFF2-40B4-BE49-F238E27FC236}">
+                <a16:creationId xmlns:a16="http://schemas.microsoft.com/office/drawing/2014/main" id="{2D0B1DE4-A8CF-471B-8EC0-77CBC65F7666}"/>
+              </a:ext>
+            </a:extLst>
+          </p:cNvPr>
+          <p:cNvSpPr txBox="1"/>
+          <p:nvPr/>
+        </p:nvSpPr>
+        <p:spPr>
+          <a:xfrm>
+            <a:off x="177396" y="940658"/>
+            <a:ext cx="4018151" cy="400110"/>
+          </a:xfrm>
+          <a:prstGeom prst="rect">
+            <a:avLst/>
+          </a:prstGeom>
+          <a:noFill/>
+        </p:spPr>
+        <p:txBody>
+          <a:bodyPr wrap="none" rtlCol="0">
+            <a:spAutoFit/>
+          </a:bodyPr>
+          <a:lstStyle/>
+          <a:p>
+            <a:r>
+              <a:rPr lang="it-IT" sz="2000" b="1" dirty="0"/>
+              <a:t>DBSCAN</a:t>
+            </a:r>
+            <a:r>
+              <a:rPr lang="it-IT" sz="2000" dirty="0"/>
+              <a:t>, </a:t>
+            </a:r>
+            <a:r>
+              <a:rPr lang="it-IT" sz="2000" i="1" dirty="0"/>
+              <a:t>epsilon</a:t>
+            </a:r>
+            <a:r>
+              <a:rPr lang="it-IT" sz="2000" dirty="0"/>
+              <a:t> = 5.0, </a:t>
+            </a:r>
+            <a:r>
+              <a:rPr lang="it-IT" sz="2000" i="1" dirty="0" err="1"/>
+              <a:t>minPoints</a:t>
+            </a:r>
+            <a:r>
+              <a:rPr lang="it-IT" sz="2000" dirty="0"/>
+              <a:t> = 4</a:t>
+            </a:r>
+            <a:endParaRPr lang="en-US" dirty="0">
+              <a:solidFill>
+                <a:srgbClr val="FF0000"/>
+              </a:solidFill>
+            </a:endParaRPr>
+          </a:p>
+        </p:txBody>
+      </p:sp>
+    </p:spTree>
+    <p:extLst>
+      <p:ext uri="{BB962C8B-B14F-4D97-AF65-F5344CB8AC3E}">
+        <p14:creationId xmlns:p14="http://schemas.microsoft.com/office/powerpoint/2010/main" val="1898551962"/>
+      </p:ext>
+    </p:extLst>
+  </p:cSld>
+  <p:clrMapOvr>
+    <a:masterClrMapping/>
+  </p:clrMapOvr>
+</p:sld>
+</file>
+
+<file path=ppt/slides/slide69.xml><?xml version="1.0" encoding="utf-8"?>
+<p:sld xmlns:a="http://schemas.openxmlformats.org/drawingml/2006/main" xmlns:r="http://schemas.openxmlformats.org/officeDocument/2006/relationships" xmlns:p="http://schemas.openxmlformats.org/presentationml/2006/main">
+  <p:cSld>
+    <p:spTree>
+      <p:nvGrpSpPr>
+        <p:cNvPr id="1" name=""/>
+        <p:cNvGrpSpPr/>
+        <p:nvPr/>
+      </p:nvGrpSpPr>
+      <p:grpSpPr>
+        <a:xfrm>
+          <a:off x="0" y="0"/>
+          <a:ext cx="0" cy="0"/>
+          <a:chOff x="0" y="0"/>
+          <a:chExt cx="0" cy="0"/>
+        </a:xfrm>
+      </p:grpSpPr>
+      <p:sp>
+        <p:nvSpPr>
+          <p:cNvPr id="2" name="Titolo 1">
+            <a:extLst>
+              <a:ext uri="{FF2B5EF4-FFF2-40B4-BE49-F238E27FC236}">
+                <a16:creationId xmlns:a16="http://schemas.microsoft.com/office/drawing/2014/main" id="{A9EE90F1-2530-4502-82B1-0FB3D946B69B}"/>
+              </a:ext>
+            </a:extLst>
+          </p:cNvPr>
+          <p:cNvSpPr txBox="1">
+            <a:spLocks/>
+          </p:cNvSpPr>
+          <p:nvPr/>
+        </p:nvSpPr>
+        <p:spPr>
+          <a:xfrm>
+            <a:off x="755576" y="152400"/>
+            <a:ext cx="8229600" cy="1143000"/>
+          </a:xfrm>
+          <a:prstGeom prst="rect">
+            <a:avLst/>
+          </a:prstGeom>
+        </p:spPr>
+        <p:txBody>
+          <a:bodyPr>
+            <a:noAutofit/>
+          </a:bodyPr>
+          <a:lstStyle>
+            <a:lvl1pPr algn="ctr" defTabSz="342900" rtl="0" eaLnBrk="1" latinLnBrk="0" hangingPunct="1">
+              <a:spcBef>
+                <a:spcPct val="0"/>
+              </a:spcBef>
+              <a:buNone/>
+              <a:defRPr sz="3300" kern="1200">
+                <a:solidFill>
+                  <a:schemeClr val="tx1"/>
+                </a:solidFill>
+                <a:latin typeface="+mj-lt"/>
+                <a:ea typeface="+mj-ea"/>
+                <a:cs typeface="+mj-cs"/>
+              </a:defRPr>
+            </a:lvl1pPr>
+          </a:lstStyle>
+          <a:p>
+            <a:pPr algn="r"/>
+            <a:r>
+              <a:rPr lang="it-IT" sz="2400" b="1" dirty="0">
+                <a:solidFill>
+                  <a:schemeClr val="bg1"/>
+                </a:solidFill>
+              </a:rPr>
+              <a:t>CLUSTER ANALYSIS</a:t>
+            </a:r>
+            <a:r>
+              <a:rPr lang="it-IT" sz="2400" dirty="0">
+                <a:solidFill>
+                  <a:schemeClr val="bg1"/>
+                </a:solidFill>
+              </a:rPr>
+              <a:t>: ESAMI DEL PRIMO ANNO </a:t>
+            </a:r>
+            <a:endParaRPr lang="en-US" sz="2400" dirty="0">
+              <a:solidFill>
+                <a:schemeClr val="bg1"/>
+              </a:solidFill>
+            </a:endParaRPr>
+          </a:p>
+        </p:txBody>
+      </p:sp>
+      <p:sp>
+        <p:nvSpPr>
+          <p:cNvPr id="6" name="CasellaDiTesto 5">
+            <a:extLst>
+              <a:ext uri="{FF2B5EF4-FFF2-40B4-BE49-F238E27FC236}">
+                <a16:creationId xmlns:a16="http://schemas.microsoft.com/office/drawing/2014/main" id="{1014E6A1-4A0D-4489-AFAE-061ADA41E1F6}"/>
+              </a:ext>
+            </a:extLst>
+          </p:cNvPr>
+          <p:cNvSpPr txBox="1"/>
+          <p:nvPr/>
+        </p:nvSpPr>
+        <p:spPr>
+          <a:xfrm>
+            <a:off x="177397" y="836712"/>
+            <a:ext cx="8807780" cy="1077218"/>
+          </a:xfrm>
+          <a:prstGeom prst="rect">
+            <a:avLst/>
+          </a:prstGeom>
+          <a:noFill/>
+        </p:spPr>
+        <p:txBody>
+          <a:bodyPr wrap="square" rtlCol="0">
+            <a:spAutoFit/>
+          </a:bodyPr>
+          <a:lstStyle/>
+          <a:p>
+            <a:pPr algn="just"/>
+            <a:r>
+              <a:rPr lang="it-IT" sz="1600" dirty="0"/>
+              <a:t>Non è stato possibile creare più di un cluster con DBSCAN, indipendentemente dalle impostazioni fornite all’algoritmo. Nella seguente visualizzazione </a:t>
+            </a:r>
+            <a:r>
+              <a:rPr lang="it-IT" sz="1600" dirty="0" err="1"/>
+              <a:t>postprocessata</a:t>
+            </a:r>
+            <a:r>
+              <a:rPr lang="it-IT" sz="1600" dirty="0"/>
+              <a:t> si può notare che le istanze considerate rumore non appartengono a una particolare categoria di risultati: dati i diversi risultati ottenuti con K-MEANS, si può dire che DBSCAN non è adatto a questi dati.</a:t>
+            </a:r>
+            <a:endParaRPr lang="en-US" sz="1400" dirty="0">
+              <a:solidFill>
+                <a:srgbClr val="FF0000"/>
+              </a:solidFill>
+            </a:endParaRPr>
+          </a:p>
+        </p:txBody>
+      </p:sp>
+      <p:pic>
+        <p:nvPicPr>
+          <p:cNvPr id="3" name="Immagine 2">
+            <a:extLst>
+              <a:ext uri="{FF2B5EF4-FFF2-40B4-BE49-F238E27FC236}">
+                <a16:creationId xmlns:a16="http://schemas.microsoft.com/office/drawing/2014/main" id="{B8605DBA-EFD3-479D-B156-EE4DAB7DDF86}"/>
+              </a:ext>
+            </a:extLst>
+          </p:cNvPr>
+          <p:cNvPicPr>
+            <a:picLocks noChangeAspect="1"/>
+          </p:cNvPicPr>
+          <p:nvPr/>
+        </p:nvPicPr>
+        <p:blipFill>
+          <a:blip r:embed="rId2"/>
+          <a:stretch>
+            <a:fillRect/>
+          </a:stretch>
+        </p:blipFill>
+        <p:spPr>
+          <a:xfrm>
+            <a:off x="1161990" y="2017876"/>
+            <a:ext cx="6862894" cy="4795500"/>
+          </a:xfrm>
+          <a:prstGeom prst="rect">
+            <a:avLst/>
+          </a:prstGeom>
+        </p:spPr>
+      </p:pic>
+    </p:spTree>
+    <p:extLst>
+      <p:ext uri="{BB962C8B-B14F-4D97-AF65-F5344CB8AC3E}">
+        <p14:creationId xmlns:p14="http://schemas.microsoft.com/office/powerpoint/2010/main" val="1939102869"/>
       </p:ext>
     </p:extLst>
   </p:cSld>

</xml_diff>

<commit_message>
Aaaaand it's finally OVEEEEERRRRRRRR!
</commit_message>
<xml_diff>
--- a/relazione.pptx
+++ b/relazione.pptx
@@ -79,7 +79,8 @@
     <p:sldId id="331" r:id="rId73"/>
     <p:sldId id="332" r:id="rId74"/>
     <p:sldId id="333" r:id="rId75"/>
-    <p:sldId id="334" r:id="rId76"/>
+    <p:sldId id="335" r:id="rId76"/>
+    <p:sldId id="336" r:id="rId77"/>
   </p:sldIdLst>
   <p:sldSz cx="9144000" cy="6858000" type="screen4x3"/>
   <p:notesSz cx="6858000" cy="9144000"/>
@@ -6580,7 +6581,7 @@
         <p:spPr>
           <a:xfrm>
             <a:off x="107504" y="836712"/>
-            <a:ext cx="1785950" cy="5909310"/>
+            <a:ext cx="1785950" cy="4524315"/>
           </a:xfrm>
           <a:prstGeom prst="rect">
             <a:avLst/>
@@ -6612,16 +6613,13 @@
           <a:p>
             <a:r>
               <a:rPr lang="it-IT" dirty="0"/>
-              <a:t>Si nota un accenno di trama in due punti, sintomo di similarità fra due «fasce» di studenti. Si cercherà di individuarle in seguito con le tecniche di </a:t>
-            </a:r>
-            <a:r>
-              <a:rPr lang="it-IT" dirty="0" err="1"/>
-              <a:t>clustering</a:t>
-            </a:r>
-            <a:r>
-              <a:rPr lang="it-IT" dirty="0"/>
+              <a:t>Si nota un accenno di trama in due punti, sintomo di similarità fra due «fasce» di studenti</a:t>
+            </a:r>
+            <a:r>
+              <a:rPr lang="it-IT" dirty="0" smtClean="0"/>
               <a:t>.</a:t>
             </a:r>
+            <a:endParaRPr lang="it-IT" dirty="0"/>
           </a:p>
         </p:txBody>
       </p:sp>
@@ -8229,6 +8227,13 @@
                 <a:cs typeface="Courier New" panose="02070309020205020404" pitchFamily="49" charset="0"/>
               </a:rPr>
               <a:t>immatricolati coorte 2013 - produttività fino ad aprile 2017</a:t>
+            </a:r>
+            <a:r>
+              <a:rPr lang="it-IT" dirty="0">
+                <a:latin typeface="Courier New" panose="02070309020205020404" pitchFamily="49" charset="0"/>
+                <a:cs typeface="Courier New" panose="02070309020205020404" pitchFamily="49" charset="0"/>
+              </a:rPr>
+              <a:t/>
             </a:r>
             <a:br>
               <a:rPr lang="it-IT" dirty="0">
@@ -12868,7 +12873,7 @@
         </p:spPr>
         <p:txBody>
           <a:bodyPr>
-            <a:normAutofit fontScale="92500" lnSpcReduction="20000"/>
+            <a:normAutofit fontScale="85000" lnSpcReduction="10000"/>
           </a:bodyPr>
           <a:lstStyle/>
           <a:p>
@@ -12982,7 +12987,23 @@
             </a:pPr>
             <a:r>
               <a:rPr lang="it-IT" dirty="0"/>
-              <a:t>Inoltre, è stato deciso di esaminare anche la totalità del dataset.</a:t>
+              <a:t>Inoltre, è stato deciso di </a:t>
+            </a:r>
+            <a:r>
+              <a:rPr lang="it-IT" dirty="0" smtClean="0"/>
+              <a:t>provare ad esaminare </a:t>
+            </a:r>
+            <a:r>
+              <a:rPr lang="it-IT" dirty="0"/>
+              <a:t>anche la </a:t>
+            </a:r>
+            <a:r>
+              <a:rPr lang="it-IT" dirty="0" smtClean="0"/>
+              <a:t>totalità del </a:t>
+            </a:r>
+            <a:r>
+              <a:rPr lang="it-IT" dirty="0"/>
+              <a:t>dataset.</a:t>
             </a:r>
           </a:p>
         </p:txBody>
@@ -18398,7 +18419,15 @@
             </a:r>
             <a:r>
               <a:rPr lang="it-IT" dirty="0"/>
-              <a:t> Questa strada non è stata scelta a causa della natura dei dati: nonostante per alcune coorti su alcuni esami la distribuzione dei risultati può sembrare gaussiana, in tutti gli altri casi si sarebbe distorta sensibilmente.</a:t>
+              <a:t> Questa strada non è stata scelta a causa della natura dei dati: nonostante per alcune coorti su alcuni esami la distribuzione dei risultati può sembrare gaussiana, in tutti gli altri casi </a:t>
+            </a:r>
+            <a:r>
+              <a:rPr lang="it-IT" dirty="0" smtClean="0"/>
+              <a:t>verrebbe </a:t>
+            </a:r>
+            <a:r>
+              <a:rPr lang="it-IT" dirty="0"/>
+              <a:t>distorta sensibilmente.</a:t>
             </a:r>
           </a:p>
         </p:txBody>
@@ -19471,7 +19500,7 @@
         </p:spPr>
         <p:txBody>
           <a:bodyPr vert="horz" lIns="91440" tIns="45720" rIns="91440" bIns="45720" rtlCol="0">
-            <a:normAutofit/>
+            <a:normAutofit lnSpcReduction="10000"/>
           </a:bodyPr>
           <a:lstStyle>
             <a:lvl1pPr marL="257175" indent="-257175" algn="l" defTabSz="342900" rtl="0" eaLnBrk="1" latinLnBrk="0" hangingPunct="1">
@@ -19706,12 +19735,21 @@
                   <a:srgbClr val="0070C0"/>
                 </a:solidFill>
               </a:rPr>
-              <a:t>Gli attributi relativi alla valutazione di questi due corsi sono stati semplicemente eliminati</a:t>
-            </a:r>
-            <a:r>
-              <a:rPr lang="it-IT" dirty="0"/>
-              <a:t>.</a:t>
-            </a:r>
+              <a:t>Gli attributi relativi alla valutazione di questi due corsi sono stati semplicemente </a:t>
+            </a:r>
+            <a:r>
+              <a:rPr lang="it-IT" dirty="0" smtClean="0">
+                <a:solidFill>
+                  <a:srgbClr val="0070C0"/>
+                </a:solidFill>
+              </a:rPr>
+              <a:t>eliminati</a:t>
+            </a:r>
+            <a:r>
+              <a:rPr lang="it-IT" dirty="0" smtClean="0"/>
+              <a:t>, in quanto non contengono alcuna informazione.</a:t>
+            </a:r>
+            <a:endParaRPr lang="it-IT" dirty="0"/>
           </a:p>
           <a:p>
             <a:pPr algn="just"/>
@@ -27847,7 +27885,7 @@
         <p:spPr>
           <a:xfrm>
             <a:off x="190763" y="1772816"/>
-            <a:ext cx="1788949" cy="1077218"/>
+            <a:ext cx="1788949" cy="2800767"/>
           </a:xfrm>
           <a:prstGeom prst="rect">
             <a:avLst/>
@@ -27862,7 +27900,11 @@
           <a:p>
             <a:r>
               <a:rPr lang="it-IT" sz="1600" dirty="0"/>
-              <a:t>I cluster così creati hanno una minore SSE: dovrebbero essere migliori.</a:t>
+              <a:t>I cluster così creati hanno una minore SSE: </a:t>
+            </a:r>
+            <a:r>
+              <a:rPr lang="it-IT" sz="1600" dirty="0" smtClean="0"/>
+              <a:t>dovrebbero essere migliori, ma più probabilmente la causa di questa diminuzione è la rimozione di un attributo nel calcolo della distanza.</a:t>
             </a:r>
             <a:endParaRPr lang="en-US" sz="1600" dirty="0"/>
           </a:p>
@@ -30424,14 +30466,14 @@
             <a:r>
               <a:rPr lang="it-IT" dirty="0">
                 <a:solidFill>
-                  <a:srgbClr val="92D050"/>
+                  <a:srgbClr val="00B050"/>
                 </a:solidFill>
               </a:rPr>
               <a:t>sarà possibile racchiudere ogni coorte di immatricolazione in un cluster?</a:t>
             </a:r>
             <a:endParaRPr lang="en-US" dirty="0">
               <a:solidFill>
-                <a:srgbClr val="92D050"/>
+                <a:srgbClr val="00B050"/>
               </a:solidFill>
             </a:endParaRPr>
           </a:p>
@@ -31460,14 +31502,14 @@
             <a:r>
               <a:rPr lang="it-IT" dirty="0">
                 <a:solidFill>
-                  <a:srgbClr val="92D050"/>
+                  <a:srgbClr val="00B050"/>
                 </a:solidFill>
               </a:rPr>
               <a:t>sarà possibile racchiudere ogni coorte di immatricolazione in un cluster?</a:t>
             </a:r>
             <a:endParaRPr lang="en-US" dirty="0">
               <a:solidFill>
-                <a:srgbClr val="92D050"/>
+                <a:srgbClr val="00B050"/>
               </a:solidFill>
             </a:endParaRPr>
           </a:p>
@@ -35415,14 +35457,14 @@
             <a:r>
               <a:rPr lang="it-IT" dirty="0">
                 <a:solidFill>
-                  <a:srgbClr val="92D050"/>
+                  <a:srgbClr val="00B050"/>
                 </a:solidFill>
               </a:rPr>
               <a:t>sarà possibile racchiudere ogni coorte di immatricolazione in un cluster?</a:t>
             </a:r>
             <a:endParaRPr lang="en-US" dirty="0">
               <a:solidFill>
-                <a:srgbClr val="92D050"/>
+                <a:srgbClr val="00B050"/>
               </a:solidFill>
             </a:endParaRPr>
           </a:p>
@@ -35966,14 +36008,14 @@
             <a:r>
               <a:rPr lang="it-IT" dirty="0">
                 <a:solidFill>
-                  <a:srgbClr val="92D050"/>
+                  <a:srgbClr val="00B050"/>
                 </a:solidFill>
               </a:rPr>
               <a:t>sarà possibile racchiudere ogni coorte di immatricolazione in un cluster?</a:t>
             </a:r>
             <a:endParaRPr lang="en-US" dirty="0">
               <a:solidFill>
-                <a:srgbClr val="92D050"/>
+                <a:srgbClr val="00B050"/>
               </a:solidFill>
             </a:endParaRPr>
           </a:p>
@@ -36196,7 +36238,23 @@
                   <a:srgbClr val="00B050"/>
                 </a:solidFill>
               </a:rPr>
-              <a:t>–  Racchiudere ogni coorte di in un cluster? </a:t>
+              <a:t>–  Racchiudere ogni </a:t>
+            </a:r>
+            <a:r>
+              <a:rPr lang="it-IT" sz="2000" dirty="0" smtClean="0">
+                <a:solidFill>
+                  <a:srgbClr val="00B050"/>
+                </a:solidFill>
+              </a:rPr>
+              <a:t>coorte </a:t>
+            </a:r>
+            <a:r>
+              <a:rPr lang="it-IT" sz="2000" dirty="0">
+                <a:solidFill>
+                  <a:srgbClr val="00B050"/>
+                </a:solidFill>
+              </a:rPr>
+              <a:t>in un cluster? </a:t>
             </a:r>
             <a:endParaRPr lang="it-IT" dirty="0">
               <a:solidFill>
@@ -36672,7 +36730,23 @@
                   <a:srgbClr val="00B050"/>
                 </a:solidFill>
               </a:rPr>
-              <a:t>–  Racchiudere ogni coorte di in un cluster? </a:t>
+              <a:t>–  Racchiudere ogni </a:t>
+            </a:r>
+            <a:r>
+              <a:rPr lang="it-IT" sz="2000" dirty="0" smtClean="0">
+                <a:solidFill>
+                  <a:srgbClr val="00B050"/>
+                </a:solidFill>
+              </a:rPr>
+              <a:t>coorte </a:t>
+            </a:r>
+            <a:r>
+              <a:rPr lang="it-IT" sz="2000" dirty="0">
+                <a:solidFill>
+                  <a:srgbClr val="00B050"/>
+                </a:solidFill>
+              </a:rPr>
+              <a:t>in un cluster? </a:t>
             </a:r>
             <a:endParaRPr lang="it-IT" dirty="0">
               <a:solidFill>
@@ -40965,44 +41039,446 @@
       </p:grpSpPr>
       <p:sp>
         <p:nvSpPr>
-          <p:cNvPr id="2" name="CasellaDiTesto 1">
+          <p:cNvPr id="2" name="Titolo 1"/>
+          <p:cNvSpPr>
+            <a:spLocks noGrp="1"/>
+          </p:cNvSpPr>
+          <p:nvPr>
+            <p:ph type="title"/>
+          </p:nvPr>
+        </p:nvSpPr>
+        <p:spPr/>
+        <p:txBody>
+          <a:bodyPr/>
+          <a:lstStyle/>
+          <a:p>
+            <a:r>
+              <a:rPr lang="it-IT" dirty="0" smtClean="0"/>
+              <a:t>CONCLUSIONI</a:t>
+            </a:r>
+            <a:endParaRPr lang="it-IT" dirty="0"/>
+          </a:p>
+        </p:txBody>
+      </p:sp>
+      <p:sp>
+        <p:nvSpPr>
+          <p:cNvPr id="3" name="Segnaposto contenuto 2"/>
+          <p:cNvSpPr>
+            <a:spLocks noGrp="1"/>
+          </p:cNvSpPr>
+          <p:nvPr>
+            <p:ph idx="1"/>
+          </p:nvPr>
+        </p:nvSpPr>
+        <p:spPr/>
+        <p:txBody>
+          <a:bodyPr/>
+          <a:lstStyle/>
+          <a:p>
+            <a:pPr marL="0" indent="0" algn="just">
+              <a:buNone/>
+            </a:pPr>
+            <a:r>
+              <a:rPr lang="it-IT" dirty="0" smtClean="0">
+                <a:solidFill>
+                  <a:srgbClr val="FF0000"/>
+                </a:solidFill>
+              </a:rPr>
+              <a:t>Alla luce dei risultati della cluster </a:t>
+            </a:r>
+            <a:r>
+              <a:rPr lang="it-IT" dirty="0" err="1" smtClean="0">
+                <a:solidFill>
+                  <a:srgbClr val="FF0000"/>
+                </a:solidFill>
+              </a:rPr>
+              <a:t>analysis</a:t>
+            </a:r>
+            <a:r>
+              <a:rPr lang="it-IT" dirty="0" smtClean="0">
+                <a:solidFill>
+                  <a:srgbClr val="FF0000"/>
+                </a:solidFill>
+              </a:rPr>
+              <a:t>, cosa si è scoperto?</a:t>
+            </a:r>
+            <a:endParaRPr lang="it-IT" sz="1800" dirty="0" smtClean="0">
+              <a:solidFill>
+                <a:schemeClr val="bg1">
+                  <a:lumMod val="50000"/>
+                </a:schemeClr>
+              </a:solidFill>
+            </a:endParaRPr>
+          </a:p>
+          <a:p>
+            <a:pPr marL="0" indent="0" algn="just">
+              <a:buNone/>
+            </a:pPr>
+            <a:endParaRPr lang="it-IT" sz="1800" dirty="0" smtClean="0">
+              <a:solidFill>
+                <a:schemeClr val="bg1">
+                  <a:lumMod val="50000"/>
+                </a:schemeClr>
+              </a:solidFill>
+            </a:endParaRPr>
+          </a:p>
+          <a:p>
+            <a:pPr algn="just"/>
+            <a:r>
+              <a:rPr lang="it-IT" dirty="0" smtClean="0"/>
+              <a:t>In un caso è stato possibile ricondurre i cluster generati alle coorti di immatricolazione, ma solo grazie agli attributi di date. </a:t>
+            </a:r>
+          </a:p>
+          <a:p>
+            <a:pPr lvl="1" algn="just"/>
+            <a:r>
+              <a:rPr lang="it-IT" dirty="0" smtClean="0"/>
+              <a:t>L’algoritmo migliore per fare questo si è rivelato essere quello </a:t>
+            </a:r>
+            <a:r>
+              <a:rPr lang="it-IT" dirty="0" err="1" smtClean="0"/>
+              <a:t>agglomerativo</a:t>
+            </a:r>
+            <a:r>
+              <a:rPr lang="it-IT" dirty="0" smtClean="0"/>
+              <a:t>.</a:t>
+            </a:r>
+          </a:p>
+          <a:p>
+            <a:pPr algn="just"/>
+            <a:endParaRPr lang="it-IT" dirty="0" smtClean="0"/>
+          </a:p>
+          <a:p>
+            <a:pPr algn="just"/>
+            <a:r>
+              <a:rPr lang="it-IT" dirty="0" smtClean="0"/>
+              <a:t>Nella divisione fra studenti performanti e meno performanti, l’attributo più incisivo è il numero di crediti ottenuti.</a:t>
+            </a:r>
+            <a:endParaRPr lang="it-IT" dirty="0"/>
+          </a:p>
+        </p:txBody>
+      </p:sp>
+      <p:sp>
+        <p:nvSpPr>
+          <p:cNvPr id="4" name="Titolo 1">
             <a:extLst>
               <a:ext uri="{FF2B5EF4-FFF2-40B4-BE49-F238E27FC236}">
-                <a16:creationId xmlns:a16="http://schemas.microsoft.com/office/drawing/2014/main" id="{3BAD42BA-06DA-408A-9501-068DEC11EBCE}"/>
+                <a16:creationId xmlns:a16="http://schemas.microsoft.com/office/drawing/2014/main" id="{A9EE90F1-2530-4502-82B1-0FB3D946B69B}"/>
               </a:ext>
             </a:extLst>
           </p:cNvPr>
-          <p:cNvSpPr txBox="1"/>
+          <p:cNvSpPr txBox="1">
+            <a:spLocks/>
+          </p:cNvSpPr>
           <p:nvPr/>
         </p:nvSpPr>
         <p:spPr>
           <a:xfrm>
-            <a:off x="1475656" y="2564904"/>
-            <a:ext cx="3744416" cy="369332"/>
+            <a:off x="755576" y="152400"/>
+            <a:ext cx="8229600" cy="1143000"/>
           </a:xfrm>
           <a:prstGeom prst="rect">
             <a:avLst/>
           </a:prstGeom>
-          <a:noFill/>
         </p:spPr>
         <p:txBody>
-          <a:bodyPr wrap="square" rtlCol="0">
-            <a:spAutoFit/>
+          <a:bodyPr>
+            <a:noAutofit/>
           </a:bodyPr>
-          <a:lstStyle/>
-          <a:p>
-            <a:r>
-              <a:rPr lang="it-IT" dirty="0" err="1"/>
-              <a:t>conclusioniiiiiiiiiiiiiiiiiiiiii</a:t>
-            </a:r>
-            <a:endParaRPr lang="en-US" dirty="0"/>
+          <a:lstStyle>
+            <a:lvl1pPr algn="ctr" defTabSz="342900" rtl="0" eaLnBrk="1" latinLnBrk="0" hangingPunct="1">
+              <a:spcBef>
+                <a:spcPct val="0"/>
+              </a:spcBef>
+              <a:buNone/>
+              <a:defRPr sz="3300" kern="1200">
+                <a:solidFill>
+                  <a:schemeClr val="tx1"/>
+                </a:solidFill>
+                <a:latin typeface="+mj-lt"/>
+                <a:ea typeface="+mj-ea"/>
+                <a:cs typeface="+mj-cs"/>
+              </a:defRPr>
+            </a:lvl1pPr>
+          </a:lstStyle>
+          <a:p>
+            <a:pPr algn="r"/>
+            <a:r>
+              <a:rPr lang="it-IT" sz="2400" b="1" dirty="0" smtClean="0">
+                <a:solidFill>
+                  <a:schemeClr val="bg1"/>
+                </a:solidFill>
+              </a:rPr>
+              <a:t>CONCLUSIONI</a:t>
+            </a:r>
+            <a:endParaRPr lang="en-US" sz="2400" dirty="0">
+              <a:solidFill>
+                <a:schemeClr val="bg1"/>
+              </a:solidFill>
+            </a:endParaRPr>
           </a:p>
         </p:txBody>
       </p:sp>
     </p:spTree>
     <p:extLst>
       <p:ext uri="{BB962C8B-B14F-4D97-AF65-F5344CB8AC3E}">
-        <p14:creationId xmlns:p14="http://schemas.microsoft.com/office/powerpoint/2010/main" val="3761870951"/>
+        <p14:creationId xmlns:p14="http://schemas.microsoft.com/office/powerpoint/2010/main" val="3521783151"/>
+      </p:ext>
+    </p:extLst>
+  </p:cSld>
+  <p:clrMapOvr>
+    <a:masterClrMapping/>
+  </p:clrMapOvr>
+</p:sld>
+</file>
+
+<file path=ppt/slides/slide76.xml><?xml version="1.0" encoding="utf-8"?>
+<p:sld xmlns:a="http://schemas.openxmlformats.org/drawingml/2006/main" xmlns:r="http://schemas.openxmlformats.org/officeDocument/2006/relationships" xmlns:p="http://schemas.openxmlformats.org/presentationml/2006/main">
+  <p:cSld>
+    <p:spTree>
+      <p:nvGrpSpPr>
+        <p:cNvPr id="1" name=""/>
+        <p:cNvGrpSpPr/>
+        <p:nvPr/>
+      </p:nvGrpSpPr>
+      <p:grpSpPr>
+        <a:xfrm>
+          <a:off x="0" y="0"/>
+          <a:ext cx="0" cy="0"/>
+          <a:chOff x="0" y="0"/>
+          <a:chExt cx="0" cy="0"/>
+        </a:xfrm>
+      </p:grpSpPr>
+      <p:sp>
+        <p:nvSpPr>
+          <p:cNvPr id="2" name="Titolo 1"/>
+          <p:cNvSpPr>
+            <a:spLocks noGrp="1"/>
+          </p:cNvSpPr>
+          <p:nvPr>
+            <p:ph type="title"/>
+          </p:nvPr>
+        </p:nvSpPr>
+        <p:spPr/>
+        <p:txBody>
+          <a:bodyPr/>
+          <a:lstStyle/>
+          <a:p>
+            <a:r>
+              <a:rPr lang="it-IT" dirty="0" smtClean="0"/>
+              <a:t>CONCLUSIONI</a:t>
+            </a:r>
+            <a:endParaRPr lang="it-IT" dirty="0"/>
+          </a:p>
+        </p:txBody>
+      </p:sp>
+      <p:sp>
+        <p:nvSpPr>
+          <p:cNvPr id="3" name="Segnaposto contenuto 2"/>
+          <p:cNvSpPr>
+            <a:spLocks noGrp="1"/>
+          </p:cNvSpPr>
+          <p:nvPr>
+            <p:ph idx="1"/>
+          </p:nvPr>
+        </p:nvSpPr>
+        <p:spPr/>
+        <p:txBody>
+          <a:bodyPr>
+            <a:normAutofit lnSpcReduction="10000"/>
+          </a:bodyPr>
+          <a:lstStyle/>
+          <a:p>
+            <a:pPr marL="0" indent="0" algn="just">
+              <a:buNone/>
+            </a:pPr>
+            <a:r>
+              <a:rPr lang="it-IT" dirty="0" smtClean="0">
+                <a:solidFill>
+                  <a:srgbClr val="FF0000"/>
+                </a:solidFill>
+              </a:rPr>
+              <a:t>Alla luce dei risultati della cluster </a:t>
+            </a:r>
+            <a:r>
+              <a:rPr lang="it-IT" dirty="0" err="1" smtClean="0">
+                <a:solidFill>
+                  <a:srgbClr val="FF0000"/>
+                </a:solidFill>
+              </a:rPr>
+              <a:t>analysis</a:t>
+            </a:r>
+            <a:r>
+              <a:rPr lang="it-IT" dirty="0" smtClean="0">
+                <a:solidFill>
+                  <a:srgbClr val="FF0000"/>
+                </a:solidFill>
+              </a:rPr>
+              <a:t>, cosa si è scoperto?</a:t>
+            </a:r>
+            <a:endParaRPr lang="it-IT" sz="1800" dirty="0" smtClean="0">
+              <a:solidFill>
+                <a:schemeClr val="bg1">
+                  <a:lumMod val="50000"/>
+                </a:schemeClr>
+              </a:solidFill>
+            </a:endParaRPr>
+          </a:p>
+          <a:p>
+            <a:pPr marL="0" indent="0" algn="just">
+              <a:buNone/>
+            </a:pPr>
+            <a:endParaRPr lang="it-IT" sz="1800" dirty="0" smtClean="0">
+              <a:solidFill>
+                <a:schemeClr val="bg1">
+                  <a:lumMod val="50000"/>
+                </a:schemeClr>
+              </a:solidFill>
+            </a:endParaRPr>
+          </a:p>
+          <a:p>
+            <a:pPr algn="just"/>
+            <a:r>
+              <a:rPr lang="it-IT" dirty="0" smtClean="0"/>
+              <a:t>Gli studenti hanno avuto una forte tendenza a trascurare gli esami difficili continuando ad acquisire crediti.</a:t>
+            </a:r>
+          </a:p>
+          <a:p>
+            <a:pPr lvl="1" algn="just"/>
+            <a:r>
+              <a:rPr lang="it-IT" dirty="0" smtClean="0">
+                <a:solidFill>
+                  <a:schemeClr val="bg1">
+                    <a:lumMod val="50000"/>
+                  </a:schemeClr>
+                </a:solidFill>
+              </a:rPr>
+              <a:t>(ma questo lo si è notato in fase di data </a:t>
+            </a:r>
+            <a:r>
+              <a:rPr lang="it-IT" dirty="0" err="1" smtClean="0">
+                <a:solidFill>
+                  <a:schemeClr val="bg1">
+                    <a:lumMod val="50000"/>
+                  </a:schemeClr>
+                </a:solidFill>
+              </a:rPr>
+              <a:t>understanding</a:t>
+            </a:r>
+            <a:r>
+              <a:rPr lang="it-IT" dirty="0" smtClean="0">
+                <a:solidFill>
+                  <a:schemeClr val="bg1">
+                    <a:lumMod val="50000"/>
+                  </a:schemeClr>
+                </a:solidFill>
+              </a:rPr>
+              <a:t>)</a:t>
+            </a:r>
+          </a:p>
+          <a:p>
+            <a:pPr lvl="1" algn="just"/>
+            <a:endParaRPr lang="it-IT" dirty="0" smtClean="0">
+              <a:solidFill>
+                <a:schemeClr val="bg1">
+                  <a:lumMod val="50000"/>
+                </a:schemeClr>
+              </a:solidFill>
+            </a:endParaRPr>
+          </a:p>
+          <a:p>
+            <a:pPr marL="0" lvl="1" indent="0" algn="just">
+              <a:buNone/>
+            </a:pPr>
+            <a:r>
+              <a:rPr lang="it-IT" sz="2400" dirty="0">
+                <a:solidFill>
+                  <a:srgbClr val="002060"/>
+                </a:solidFill>
+              </a:rPr>
+              <a:t>Quest’ultimo punto è forse l’aspetto più interessante che si è notato in tutta questa </a:t>
+            </a:r>
+            <a:r>
+              <a:rPr lang="it-IT" sz="2400" dirty="0" smtClean="0">
+                <a:solidFill>
+                  <a:srgbClr val="002060"/>
+                </a:solidFill>
+              </a:rPr>
+              <a:t>analisi: quel comportamento non è in generale una buona pratica, si potrebbe pensare di scoraggiarla ulteriormente, magari irrigidendo ed ampliando l’albero delle propedeuticità.</a:t>
+            </a:r>
+            <a:endParaRPr lang="it-IT" sz="2400" dirty="0">
+              <a:solidFill>
+                <a:srgbClr val="002060"/>
+              </a:solidFill>
+            </a:endParaRPr>
+          </a:p>
+        </p:txBody>
+      </p:sp>
+      <p:sp>
+        <p:nvSpPr>
+          <p:cNvPr id="4" name="Titolo 1">
+            <a:extLst>
+              <a:ext uri="{FF2B5EF4-FFF2-40B4-BE49-F238E27FC236}">
+                <a16:creationId xmlns:a16="http://schemas.microsoft.com/office/drawing/2014/main" id="{A9EE90F1-2530-4502-82B1-0FB3D946B69B}"/>
+              </a:ext>
+            </a:extLst>
+          </p:cNvPr>
+          <p:cNvSpPr txBox="1">
+            <a:spLocks/>
+          </p:cNvSpPr>
+          <p:nvPr/>
+        </p:nvSpPr>
+        <p:spPr>
+          <a:xfrm>
+            <a:off x="755576" y="152400"/>
+            <a:ext cx="8229600" cy="1143000"/>
+          </a:xfrm>
+          <a:prstGeom prst="rect">
+            <a:avLst/>
+          </a:prstGeom>
+        </p:spPr>
+        <p:txBody>
+          <a:bodyPr>
+            <a:noAutofit/>
+          </a:bodyPr>
+          <a:lstStyle>
+            <a:lvl1pPr algn="ctr" defTabSz="342900" rtl="0" eaLnBrk="1" latinLnBrk="0" hangingPunct="1">
+              <a:spcBef>
+                <a:spcPct val="0"/>
+              </a:spcBef>
+              <a:buNone/>
+              <a:defRPr sz="3300" kern="1200">
+                <a:solidFill>
+                  <a:schemeClr val="tx1"/>
+                </a:solidFill>
+                <a:latin typeface="+mj-lt"/>
+                <a:ea typeface="+mj-ea"/>
+                <a:cs typeface="+mj-cs"/>
+              </a:defRPr>
+            </a:lvl1pPr>
+          </a:lstStyle>
+          <a:p>
+            <a:pPr algn="r"/>
+            <a:r>
+              <a:rPr lang="it-IT" sz="2400" b="1" dirty="0" smtClean="0">
+                <a:solidFill>
+                  <a:schemeClr val="bg1"/>
+                </a:solidFill>
+              </a:rPr>
+              <a:t>CONCLUSIONI</a:t>
+            </a:r>
+            <a:endParaRPr lang="en-US" sz="2400" dirty="0">
+              <a:solidFill>
+                <a:schemeClr val="bg1"/>
+              </a:solidFill>
+            </a:endParaRPr>
+          </a:p>
+        </p:txBody>
+      </p:sp>
+    </p:spTree>
+    <p:extLst>
+      <p:ext uri="{BB962C8B-B14F-4D97-AF65-F5344CB8AC3E}">
+        <p14:creationId xmlns:p14="http://schemas.microsoft.com/office/powerpoint/2010/main" val="2113436981"/>
       </p:ext>
     </p:extLst>
   </p:cSld>

</xml_diff>